<commit_message>
Added how to connect app view to url.
</commit_message>
<xml_diff>
--- a/Django.pptx
+++ b/Django.pptx
@@ -2394,7 +2394,7 @@
           </a:ln>
           <a:extLst>
             <a:ext uri="{C572A759-6A51-4108-AA02-DFA0A04FC94B}">
-              <ma14:wrappingTextBoxFlag xmlns:ma14="http://schemas.microsoft.com/office/mac/drawingml/2011/main" xmlns:a14="http://schemas.microsoft.com/office/drawing/2010/main" xmlns:m="http://schemas.openxmlformats.org/officeDocument/2006/math" xmlns="" val="1"/>
+              <ma14:wrappingTextBoxFlag xmlns="" xmlns:m="http://schemas.openxmlformats.org/officeDocument/2006/math" xmlns:a14="http://schemas.microsoft.com/office/drawing/2010/main" xmlns:ma14="http://schemas.microsoft.com/office/mac/drawingml/2011/main" val="1"/>
             </a:ext>
           </a:extLst>
         </p:spPr>
@@ -2433,7 +2433,7 @@
           </a:ln>
           <a:extLst>
             <a:ext uri="{C572A759-6A51-4108-AA02-DFA0A04FC94B}">
-              <ma14:wrappingTextBoxFlag xmlns:ma14="http://schemas.microsoft.com/office/mac/drawingml/2011/main" xmlns:a14="http://schemas.microsoft.com/office/drawing/2010/main" xmlns:m="http://schemas.openxmlformats.org/officeDocument/2006/math" xmlns="" val="1"/>
+              <ma14:wrappingTextBoxFlag xmlns="" xmlns:m="http://schemas.openxmlformats.org/officeDocument/2006/math" xmlns:a14="http://schemas.microsoft.com/office/drawing/2010/main" xmlns:ma14="http://schemas.microsoft.com/office/mac/drawingml/2011/main" val="1"/>
             </a:ext>
           </a:extLst>
         </p:spPr>
@@ -3562,7 +3562,7 @@
           <p:nvPr>
             <p:extLst>
               <p:ext uri="{D42A27DB-BD31-4B8C-83A1-F6EECF244321}">
-                <p14:modId xmlns:p14="http://schemas.microsoft.com/office/powerpoint/2010/main" val="316936979"/>
+                <p14:modId xmlns:p14="http://schemas.microsoft.com/office/powerpoint/2010/main" val="1227871383"/>
               </p:ext>
             </p:extLst>
           </p:nvPr>
@@ -3727,7 +3727,7 @@
                           <a:latin typeface="Segoe UI" pitchFamily="34" charset="0"/>
                           <a:cs typeface="Segoe UI" pitchFamily="34" charset="0"/>
                         </a:rPr>
-                        <a:t>my_project</a:t>
+                        <a:t>tango_with_django</a:t>
                       </a:r>
                       <a:endParaRPr lang="en-GB" sz="1000" i="1" dirty="0">
                         <a:solidFill>
@@ -3838,7 +3838,7 @@
                           <a:latin typeface="Segoe UI" pitchFamily="34" charset="0"/>
                           <a:cs typeface="Segoe UI" pitchFamily="34" charset="0"/>
                         </a:rPr>
-                        <a:t>my_project</a:t>
+                        <a:t>tango_with_django</a:t>
                       </a:r>
                       <a:endParaRPr lang="en-GB" sz="1000" i="0" dirty="0">
                         <a:solidFill>
@@ -4712,7 +4712,7 @@
                           <a:latin typeface="Segoe UI" pitchFamily="34" charset="0"/>
                           <a:cs typeface="Segoe UI" pitchFamily="34" charset="0"/>
                         </a:rPr>
-                        <a:t>my_project</a:t>
+                        <a:t>tango_with_django</a:t>
                       </a:r>
                       <a:r>
                         <a:rPr lang="en-GB" sz="1000" i="0" dirty="0">
@@ -4836,15 +4836,22 @@
                         <a:t> </a:t>
                       </a:r>
                       <a:r>
-                        <a:rPr lang="en-GB" sz="1000" i="1" dirty="0">
+                        <a:rPr lang="en-GB" sz="1000" i="1" dirty="0" err="1">
                           <a:solidFill>
                             <a:srgbClr val="000000"/>
                           </a:solidFill>
                           <a:latin typeface="Segoe UI" pitchFamily="34" charset="0"/>
                           <a:cs typeface="Segoe UI" pitchFamily="34" charset="0"/>
                         </a:rPr>
-                        <a:t>hello</a:t>
+                        <a:t>rango</a:t>
                       </a:r>
+                      <a:endParaRPr lang="en-GB" sz="1000" i="1" dirty="0">
+                        <a:solidFill>
+                          <a:srgbClr val="000000"/>
+                        </a:solidFill>
+                        <a:latin typeface="Segoe UI" pitchFamily="34" charset="0"/>
+                        <a:cs typeface="Segoe UI" pitchFamily="34" charset="0"/>
+                      </a:endParaRPr>
                     </a:p>
                   </a:txBody>
                   <a:tcPr marL="46800" marR="46800">
@@ -5250,15 +5257,22 @@
                         <a:t> </a:t>
                       </a:r>
                       <a:r>
-                        <a:rPr lang="en-GB" sz="1000" i="1" dirty="0">
+                        <a:rPr lang="en-GB" sz="1000" i="1" dirty="0" err="1">
                           <a:solidFill>
                             <a:srgbClr val="000000"/>
                           </a:solidFill>
                           <a:latin typeface="Segoe UI" pitchFamily="34" charset="0"/>
                           <a:cs typeface="Segoe UI" pitchFamily="34" charset="0"/>
                         </a:rPr>
-                        <a:t>hello</a:t>
+                        <a:t>rango</a:t>
                       </a:r>
+                      <a:endParaRPr lang="en-GB" sz="1000" i="1" dirty="0">
+                        <a:solidFill>
+                          <a:srgbClr val="000000"/>
+                        </a:solidFill>
+                        <a:latin typeface="Segoe UI" pitchFamily="34" charset="0"/>
+                        <a:cs typeface="Segoe UI" pitchFamily="34" charset="0"/>
+                      </a:endParaRPr>
                     </a:p>
                   </a:txBody>
                   <a:tcPr marL="46800" marR="46800">
@@ -5496,7 +5510,7 @@
           <p:nvPr>
             <p:extLst>
               <p:ext uri="{D42A27DB-BD31-4B8C-83A1-F6EECF244321}">
-                <p14:modId xmlns:p14="http://schemas.microsoft.com/office/powerpoint/2010/main" val="3521545389"/>
+                <p14:modId xmlns:p14="http://schemas.microsoft.com/office/powerpoint/2010/main" val="147438807"/>
               </p:ext>
             </p:extLst>
           </p:nvPr>
@@ -5621,7 +5635,7 @@
                           <a:latin typeface="Segoe UI" pitchFamily="34" charset="0"/>
                           <a:cs typeface="Segoe UI" pitchFamily="34" charset="0"/>
                         </a:rPr>
-                        <a:t>my_project</a:t>
+                        <a:t>tango_with_django</a:t>
                       </a:r>
                       <a:endParaRPr lang="en-GB" sz="1000" i="1" dirty="0">
                         <a:solidFill>
@@ -5903,14 +5917,14 @@
                         <a:t> - </a:t>
                       </a:r>
                       <a:r>
-                        <a:rPr lang="en-GB" sz="1000" i="1" dirty="0">
+                        <a:rPr lang="en-GB" sz="1000" i="1" dirty="0" err="1">
                           <a:solidFill>
                             <a:srgbClr val="000000"/>
                           </a:solidFill>
                           <a:latin typeface="Segoe UI" pitchFamily="34" charset="0"/>
                           <a:cs typeface="Segoe UI" pitchFamily="34" charset="0"/>
                         </a:rPr>
-                        <a:t>hello</a:t>
+                        <a:t>rango</a:t>
                       </a:r>
                       <a:r>
                         <a:rPr lang="en-GB" sz="1000" i="0" dirty="0">
@@ -6014,7 +6028,7 @@
                           <a:latin typeface="Segoe UI" pitchFamily="34" charset="0"/>
                           <a:cs typeface="Segoe UI" pitchFamily="34" charset="0"/>
                         </a:rPr>
-                        <a:t>my_project</a:t>
+                        <a:t>tango_with_django</a:t>
                       </a:r>
                       <a:endParaRPr lang="en-GB" sz="1000" i="1" dirty="0">
                         <a:solidFill>
@@ -6326,6 +6340,1407 @@
                 <a:extLst>
                   <a:ext uri="{0D108BD9-81ED-4DB2-BD59-A6C34878D82A}">
                     <a16:rowId xmlns:a16="http://schemas.microsoft.com/office/drawing/2014/main" val="599195773"/>
+                  </a:ext>
+                </a:extLst>
+              </a:tr>
+            </a:tbl>
+          </a:graphicData>
+        </a:graphic>
+      </p:graphicFrame>
+      <p:graphicFrame>
+        <p:nvGraphicFramePr>
+          <p:cNvPr id="9" name="Table 8">
+            <a:extLst>
+              <a:ext uri="{FF2B5EF4-FFF2-40B4-BE49-F238E27FC236}">
+                <a16:creationId xmlns:a16="http://schemas.microsoft.com/office/drawing/2014/main" id="{229F3275-8557-4434-B412-05A28707DB19}"/>
+              </a:ext>
+            </a:extLst>
+          </p:cNvPr>
+          <p:cNvGraphicFramePr>
+            <a:graphicFrameLocks noGrp="1"/>
+          </p:cNvGraphicFramePr>
+          <p:nvPr>
+            <p:extLst>
+              <p:ext uri="{D42A27DB-BD31-4B8C-83A1-F6EECF244321}">
+                <p14:modId xmlns:p14="http://schemas.microsoft.com/office/powerpoint/2010/main" val="414516467"/>
+              </p:ext>
+            </p:extLst>
+          </p:nvPr>
+        </p:nvGraphicFramePr>
+        <p:xfrm>
+          <a:off x="6561167" y="4808045"/>
+          <a:ext cx="3962053" cy="1239600"/>
+        </p:xfrm>
+        <a:graphic>
+          <a:graphicData uri="http://schemas.openxmlformats.org/drawingml/2006/table">
+            <a:tbl>
+              <a:tblPr firstRow="1" bandRow="1">
+                <a:tableStyleId>{5940675A-B579-460E-94D1-54222C63F5DA}</a:tableStyleId>
+              </a:tblPr>
+              <a:tblGrid>
+                <a:gridCol w="3962053">
+                  <a:extLst>
+                    <a:ext uri="{9D8B030D-6E8A-4147-A177-3AD203B41FA5}">
+                      <a16:colId xmlns:a16="http://schemas.microsoft.com/office/drawing/2014/main" val="20000"/>
+                    </a:ext>
+                  </a:extLst>
+                </a:gridCol>
+              </a:tblGrid>
+              <a:tr h="0">
+                <a:tc>
+                  <a:txBody>
+                    <a:bodyPr/>
+                    <a:lstStyle/>
+                    <a:p>
+                      <a:pPr algn="l"/>
+                      <a:r>
+                        <a:rPr lang="en-GB" sz="1000" b="1" baseline="0" dirty="0">
+                          <a:solidFill>
+                            <a:srgbClr val="000000"/>
+                          </a:solidFill>
+                          <a:latin typeface="Segoe UI" pitchFamily="34" charset="0"/>
+                          <a:cs typeface="Segoe UI" pitchFamily="34" charset="0"/>
+                        </a:rPr>
+                        <a:t>1. Set up app view</a:t>
+                      </a:r>
+                    </a:p>
+                  </a:txBody>
+                  <a:tcPr marL="46800" marR="46800" marT="21600" marB="21600">
+                    <a:lnL w="12700" cap="flat" cmpd="sng" algn="ctr">
+                      <a:solidFill>
+                        <a:schemeClr val="tx1"/>
+                      </a:solidFill>
+                      <a:prstDash val="solid"/>
+                      <a:round/>
+                      <a:headEnd type="none" w="med" len="med"/>
+                      <a:tailEnd type="none" w="med" len="med"/>
+                    </a:lnL>
+                    <a:lnR w="12700" cap="flat" cmpd="sng" algn="ctr">
+                      <a:solidFill>
+                        <a:schemeClr val="tx1"/>
+                      </a:solidFill>
+                      <a:prstDash val="solid"/>
+                      <a:round/>
+                      <a:headEnd type="none" w="med" len="med"/>
+                      <a:tailEnd type="none" w="med" len="med"/>
+                    </a:lnR>
+                    <a:lnT w="12700" cap="flat" cmpd="sng" algn="ctr">
+                      <a:solidFill>
+                        <a:schemeClr val="tx1"/>
+                      </a:solidFill>
+                      <a:prstDash val="solid"/>
+                      <a:round/>
+                      <a:headEnd type="none" w="med" len="med"/>
+                      <a:tailEnd type="none" w="med" len="med"/>
+                    </a:lnT>
+                    <a:lnB w="6350" cap="flat" cmpd="sng" algn="ctr">
+                      <a:noFill/>
+                      <a:prstDash val="solid"/>
+                      <a:round/>
+                      <a:headEnd type="none" w="med" len="med"/>
+                      <a:tailEnd type="none" w="med" len="med"/>
+                    </a:lnB>
+                    <a:lnTlToBr w="12700" cmpd="sng">
+                      <a:noFill/>
+                      <a:prstDash val="solid"/>
+                    </a:lnTlToBr>
+                    <a:lnBlToTr w="12700" cmpd="sng">
+                      <a:noFill/>
+                      <a:prstDash val="solid"/>
+                    </a:lnBlToTr>
+                  </a:tcPr>
+                </a:tc>
+                <a:extLst>
+                  <a:ext uri="{0D108BD9-81ED-4DB2-BD59-A6C34878D82A}">
+                    <a16:rowId xmlns:a16="http://schemas.microsoft.com/office/drawing/2014/main" val="10000"/>
+                  </a:ext>
+                </a:extLst>
+              </a:tr>
+              <a:tr h="0">
+                <a:tc>
+                  <a:txBody>
+                    <a:bodyPr/>
+                    <a:lstStyle/>
+                    <a:p>
+                      <a:pPr marL="0" marR="0" indent="0" algn="l" defTabSz="584200" rtl="0" eaLnBrk="1" fontAlgn="auto" latinLnBrk="0" hangingPunct="1">
+                        <a:lnSpc>
+                          <a:spcPct val="100000"/>
+                        </a:lnSpc>
+                        <a:spcBef>
+                          <a:spcPts val="0"/>
+                        </a:spcBef>
+                        <a:spcAft>
+                          <a:spcPts val="0"/>
+                        </a:spcAft>
+                        <a:buClrTx/>
+                        <a:buSzTx/>
+                        <a:buFontTx/>
+                        <a:buNone/>
+                        <a:tabLst/>
+                        <a:defRPr/>
+                      </a:pPr>
+                      <a:r>
+                        <a:rPr lang="en-GB" sz="1000" i="1" u="none" dirty="0">
+                          <a:solidFill>
+                            <a:srgbClr val="000000"/>
+                          </a:solidFill>
+                          <a:latin typeface="Segoe UI" pitchFamily="34" charset="0"/>
+                          <a:cs typeface="Segoe UI" pitchFamily="34" charset="0"/>
+                        </a:rPr>
+                        <a:t>tango_with_django/rango/views.py</a:t>
+                      </a:r>
+                    </a:p>
+                  </a:txBody>
+                  <a:tcPr marL="46800" marR="46800" marT="21600" marB="21600">
+                    <a:lnL w="12700" cap="flat" cmpd="sng" algn="ctr">
+                      <a:solidFill>
+                        <a:schemeClr val="tx1"/>
+                      </a:solidFill>
+                      <a:prstDash val="solid"/>
+                      <a:round/>
+                      <a:headEnd type="none" w="med" len="med"/>
+                      <a:tailEnd type="none" w="med" len="med"/>
+                    </a:lnL>
+                    <a:lnR w="12700" cap="flat" cmpd="sng" algn="ctr">
+                      <a:solidFill>
+                        <a:schemeClr val="tx1"/>
+                      </a:solidFill>
+                      <a:prstDash val="solid"/>
+                      <a:round/>
+                      <a:headEnd type="none" w="med" len="med"/>
+                      <a:tailEnd type="none" w="med" len="med"/>
+                    </a:lnR>
+                    <a:lnT w="6350" cap="flat" cmpd="sng" algn="ctr">
+                      <a:noFill/>
+                      <a:prstDash val="solid"/>
+                      <a:round/>
+                      <a:headEnd type="none" w="med" len="med"/>
+                      <a:tailEnd type="none" w="med" len="med"/>
+                    </a:lnT>
+                    <a:lnB w="6350" cap="flat" cmpd="sng" algn="ctr">
+                      <a:noFill/>
+                      <a:prstDash val="solid"/>
+                      <a:round/>
+                      <a:headEnd type="none" w="med" len="med"/>
+                      <a:tailEnd type="none" w="med" len="med"/>
+                    </a:lnB>
+                    <a:lnTlToBr w="12700" cmpd="sng">
+                      <a:noFill/>
+                      <a:prstDash val="solid"/>
+                    </a:lnTlToBr>
+                    <a:lnBlToTr w="12700" cmpd="sng">
+                      <a:noFill/>
+                      <a:prstDash val="solid"/>
+                    </a:lnBlToTr>
+                  </a:tcPr>
+                </a:tc>
+                <a:extLst>
+                  <a:ext uri="{0D108BD9-81ED-4DB2-BD59-A6C34878D82A}">
+                    <a16:rowId xmlns:a16="http://schemas.microsoft.com/office/drawing/2014/main" val="694626626"/>
+                  </a:ext>
+                </a:extLst>
+              </a:tr>
+              <a:tr h="0">
+                <a:tc>
+                  <a:txBody>
+                    <a:bodyPr/>
+                    <a:lstStyle/>
+                    <a:p>
+                      <a:pPr marL="0" marR="0" indent="0" algn="l" defTabSz="584200" rtl="0" eaLnBrk="1" fontAlgn="auto" latinLnBrk="0" hangingPunct="1">
+                        <a:lnSpc>
+                          <a:spcPct val="100000"/>
+                        </a:lnSpc>
+                        <a:spcBef>
+                          <a:spcPts val="0"/>
+                        </a:spcBef>
+                        <a:spcAft>
+                          <a:spcPts val="0"/>
+                        </a:spcAft>
+                        <a:buClrTx/>
+                        <a:buSzTx/>
+                        <a:buFontTx/>
+                        <a:buNone/>
+                        <a:tabLst/>
+                        <a:defRPr/>
+                      </a:pPr>
+                      <a:endParaRPr lang="en-GB" sz="1000" i="0" baseline="0" dirty="0">
+                        <a:solidFill>
+                          <a:srgbClr val="000000"/>
+                        </a:solidFill>
+                        <a:latin typeface="Consolas" panose="020B0609020204030204" pitchFamily="49" charset="0"/>
+                        <a:cs typeface="Segoe UI" pitchFamily="34" charset="0"/>
+                      </a:endParaRPr>
+                    </a:p>
+                  </a:txBody>
+                  <a:tcPr marL="46800" marR="46800" marT="21600" marB="21600">
+                    <a:lnL w="12700" cap="flat" cmpd="sng" algn="ctr">
+                      <a:solidFill>
+                        <a:schemeClr val="tx1"/>
+                      </a:solidFill>
+                      <a:prstDash val="solid"/>
+                      <a:round/>
+                      <a:headEnd type="none" w="med" len="med"/>
+                      <a:tailEnd type="none" w="med" len="med"/>
+                    </a:lnL>
+                    <a:lnR w="12700" cap="flat" cmpd="sng" algn="ctr">
+                      <a:solidFill>
+                        <a:schemeClr val="tx1"/>
+                      </a:solidFill>
+                      <a:prstDash val="solid"/>
+                      <a:round/>
+                      <a:headEnd type="none" w="med" len="med"/>
+                      <a:tailEnd type="none" w="med" len="med"/>
+                    </a:lnR>
+                    <a:lnT w="6350" cap="flat" cmpd="sng" algn="ctr">
+                      <a:noFill/>
+                      <a:prstDash val="solid"/>
+                      <a:round/>
+                      <a:headEnd type="none" w="med" len="med"/>
+                      <a:tailEnd type="none" w="med" len="med"/>
+                    </a:lnT>
+                    <a:lnB w="6350" cap="flat" cmpd="sng" algn="ctr">
+                      <a:noFill/>
+                      <a:prstDash val="solid"/>
+                      <a:round/>
+                      <a:headEnd type="none" w="med" len="med"/>
+                      <a:tailEnd type="none" w="med" len="med"/>
+                    </a:lnB>
+                    <a:lnTlToBr w="12700" cmpd="sng">
+                      <a:noFill/>
+                      <a:prstDash val="solid"/>
+                    </a:lnTlToBr>
+                    <a:lnBlToTr w="12700" cmpd="sng">
+                      <a:noFill/>
+                      <a:prstDash val="solid"/>
+                    </a:lnBlToTr>
+                  </a:tcPr>
+                </a:tc>
+                <a:extLst>
+                  <a:ext uri="{0D108BD9-81ED-4DB2-BD59-A6C34878D82A}">
+                    <a16:rowId xmlns:a16="http://schemas.microsoft.com/office/drawing/2014/main" val="3003448997"/>
+                  </a:ext>
+                </a:extLst>
+              </a:tr>
+              <a:tr h="0">
+                <a:tc>
+                  <a:txBody>
+                    <a:bodyPr/>
+                    <a:lstStyle/>
+                    <a:p>
+                      <a:pPr marL="0" marR="0" indent="0" algn="l" defTabSz="584200" rtl="0" eaLnBrk="1" fontAlgn="auto" latinLnBrk="0" hangingPunct="1">
+                        <a:lnSpc>
+                          <a:spcPct val="100000"/>
+                        </a:lnSpc>
+                        <a:spcBef>
+                          <a:spcPts val="0"/>
+                        </a:spcBef>
+                        <a:spcAft>
+                          <a:spcPts val="0"/>
+                        </a:spcAft>
+                        <a:buClrTx/>
+                        <a:buSzTx/>
+                        <a:buFontTx/>
+                        <a:buNone/>
+                        <a:tabLst/>
+                        <a:defRPr/>
+                      </a:pPr>
+                      <a:r>
+                        <a:rPr lang="en-US" sz="1000" i="0" baseline="0" dirty="0">
+                          <a:solidFill>
+                            <a:srgbClr val="000000"/>
+                          </a:solidFill>
+                          <a:latin typeface="Consolas" panose="020B0609020204030204" pitchFamily="49" charset="0"/>
+                          <a:cs typeface="Segoe UI" pitchFamily="34" charset="0"/>
+                        </a:rPr>
+                        <a:t>from </a:t>
+                      </a:r>
+                      <a:r>
+                        <a:rPr lang="en-US" sz="1000" i="0" baseline="0" dirty="0" err="1">
+                          <a:solidFill>
+                            <a:srgbClr val="000000"/>
+                          </a:solidFill>
+                          <a:latin typeface="Consolas" panose="020B0609020204030204" pitchFamily="49" charset="0"/>
+                          <a:cs typeface="Segoe UI" pitchFamily="34" charset="0"/>
+                        </a:rPr>
+                        <a:t>django.http</a:t>
+                      </a:r>
+                      <a:r>
+                        <a:rPr lang="en-US" sz="1000" i="0" baseline="0" dirty="0">
+                          <a:solidFill>
+                            <a:srgbClr val="000000"/>
+                          </a:solidFill>
+                          <a:latin typeface="Consolas" panose="020B0609020204030204" pitchFamily="49" charset="0"/>
+                          <a:cs typeface="Segoe UI" pitchFamily="34" charset="0"/>
+                        </a:rPr>
+                        <a:t> import </a:t>
+                      </a:r>
+                      <a:r>
+                        <a:rPr lang="en-US" sz="1000" i="0" baseline="0" dirty="0" err="1">
+                          <a:solidFill>
+                            <a:srgbClr val="000000"/>
+                          </a:solidFill>
+                          <a:latin typeface="Consolas" panose="020B0609020204030204" pitchFamily="49" charset="0"/>
+                          <a:cs typeface="Segoe UI" pitchFamily="34" charset="0"/>
+                        </a:rPr>
+                        <a:t>HttpResponse</a:t>
+                      </a:r>
+                      <a:endParaRPr lang="en-US" sz="1000" i="0" baseline="0" dirty="0">
+                        <a:solidFill>
+                          <a:srgbClr val="000000"/>
+                        </a:solidFill>
+                        <a:latin typeface="Consolas" panose="020B0609020204030204" pitchFamily="49" charset="0"/>
+                        <a:cs typeface="Segoe UI" pitchFamily="34" charset="0"/>
+                      </a:endParaRPr>
+                    </a:p>
+                    <a:p>
+                      <a:pPr marL="0" marR="0" indent="0" algn="l" defTabSz="584200" rtl="0" eaLnBrk="1" fontAlgn="auto" latinLnBrk="0" hangingPunct="1">
+                        <a:lnSpc>
+                          <a:spcPct val="100000"/>
+                        </a:lnSpc>
+                        <a:spcBef>
+                          <a:spcPts val="0"/>
+                        </a:spcBef>
+                        <a:spcAft>
+                          <a:spcPts val="0"/>
+                        </a:spcAft>
+                        <a:buClrTx/>
+                        <a:buSzTx/>
+                        <a:buFontTx/>
+                        <a:buNone/>
+                        <a:tabLst/>
+                        <a:defRPr/>
+                      </a:pPr>
+                      <a:endParaRPr lang="en-US" sz="1000" i="0" baseline="0" dirty="0">
+                        <a:solidFill>
+                          <a:srgbClr val="000000"/>
+                        </a:solidFill>
+                        <a:latin typeface="Consolas" panose="020B0609020204030204" pitchFamily="49" charset="0"/>
+                        <a:cs typeface="Segoe UI" pitchFamily="34" charset="0"/>
+                      </a:endParaRPr>
+                    </a:p>
+                    <a:p>
+                      <a:pPr marL="0" marR="0" indent="0" algn="l" defTabSz="584200" rtl="0" eaLnBrk="1" fontAlgn="auto" latinLnBrk="0" hangingPunct="1">
+                        <a:lnSpc>
+                          <a:spcPct val="100000"/>
+                        </a:lnSpc>
+                        <a:spcBef>
+                          <a:spcPts val="0"/>
+                        </a:spcBef>
+                        <a:spcAft>
+                          <a:spcPts val="0"/>
+                        </a:spcAft>
+                        <a:buClrTx/>
+                        <a:buSzTx/>
+                        <a:buFontTx/>
+                        <a:buNone/>
+                        <a:tabLst/>
+                        <a:defRPr/>
+                      </a:pPr>
+                      <a:r>
+                        <a:rPr lang="en-US" sz="1000" i="0" baseline="0" dirty="0">
+                          <a:solidFill>
+                            <a:srgbClr val="000000"/>
+                          </a:solidFill>
+                          <a:latin typeface="Consolas" panose="020B0609020204030204" pitchFamily="49" charset="0"/>
+                          <a:cs typeface="Segoe UI" pitchFamily="34" charset="0"/>
+                        </a:rPr>
+                        <a:t>def index(request):</a:t>
+                      </a:r>
+                    </a:p>
+                    <a:p>
+                      <a:pPr marL="0" marR="0" indent="0" algn="l" defTabSz="584200" rtl="0" eaLnBrk="1" fontAlgn="auto" latinLnBrk="0" hangingPunct="1">
+                        <a:lnSpc>
+                          <a:spcPct val="100000"/>
+                        </a:lnSpc>
+                        <a:spcBef>
+                          <a:spcPts val="0"/>
+                        </a:spcBef>
+                        <a:spcAft>
+                          <a:spcPts val="0"/>
+                        </a:spcAft>
+                        <a:buClrTx/>
+                        <a:buSzTx/>
+                        <a:buFontTx/>
+                        <a:buNone/>
+                        <a:tabLst/>
+                        <a:defRPr/>
+                      </a:pPr>
+                      <a:r>
+                        <a:rPr lang="en-US" sz="1000" i="0" baseline="0" dirty="0">
+                          <a:solidFill>
+                            <a:srgbClr val="000000"/>
+                          </a:solidFill>
+                          <a:latin typeface="Consolas" panose="020B0609020204030204" pitchFamily="49" charset="0"/>
+                          <a:cs typeface="Segoe UI" pitchFamily="34" charset="0"/>
+                        </a:rPr>
+                        <a:t>    return </a:t>
+                      </a:r>
+                      <a:r>
+                        <a:rPr lang="en-US" sz="1000" i="0" baseline="0" dirty="0" err="1">
+                          <a:solidFill>
+                            <a:srgbClr val="000000"/>
+                          </a:solidFill>
+                          <a:latin typeface="Consolas" panose="020B0609020204030204" pitchFamily="49" charset="0"/>
+                          <a:cs typeface="Segoe UI" pitchFamily="34" charset="0"/>
+                        </a:rPr>
+                        <a:t>HttpResponse</a:t>
+                      </a:r>
+                      <a:r>
+                        <a:rPr lang="en-US" sz="1000" i="0" baseline="0" dirty="0">
+                          <a:solidFill>
+                            <a:srgbClr val="000000"/>
+                          </a:solidFill>
+                          <a:latin typeface="Consolas" panose="020B0609020204030204" pitchFamily="49" charset="0"/>
+                          <a:cs typeface="Segoe UI" pitchFamily="34" charset="0"/>
+                        </a:rPr>
+                        <a:t>("</a:t>
+                      </a:r>
+                      <a:r>
+                        <a:rPr lang="en-US" sz="1000" i="0" baseline="0" dirty="0" err="1">
+                          <a:solidFill>
+                            <a:srgbClr val="000000"/>
+                          </a:solidFill>
+                          <a:latin typeface="Consolas" panose="020B0609020204030204" pitchFamily="49" charset="0"/>
+                          <a:cs typeface="Segoe UI" pitchFamily="34" charset="0"/>
+                        </a:rPr>
+                        <a:t>Rango</a:t>
+                      </a:r>
+                      <a:r>
+                        <a:rPr lang="en-US" sz="1000" i="0" baseline="0" dirty="0">
+                          <a:solidFill>
+                            <a:srgbClr val="000000"/>
+                          </a:solidFill>
+                          <a:latin typeface="Consolas" panose="020B0609020204030204" pitchFamily="49" charset="0"/>
+                          <a:cs typeface="Segoe UI" pitchFamily="34" charset="0"/>
+                        </a:rPr>
+                        <a:t> says hey there world!")</a:t>
+                      </a:r>
+                      <a:endParaRPr lang="en-GB" sz="1000" i="0" baseline="0" dirty="0">
+                        <a:solidFill>
+                          <a:srgbClr val="000000"/>
+                        </a:solidFill>
+                        <a:latin typeface="Consolas" panose="020B0609020204030204" pitchFamily="49" charset="0"/>
+                        <a:cs typeface="Segoe UI" pitchFamily="34" charset="0"/>
+                      </a:endParaRPr>
+                    </a:p>
+                  </a:txBody>
+                  <a:tcPr marL="46800" marR="46800" marT="21600" marB="21600">
+                    <a:lnL w="12700" cap="flat" cmpd="sng" algn="ctr">
+                      <a:solidFill>
+                        <a:schemeClr val="tx1"/>
+                      </a:solidFill>
+                      <a:prstDash val="solid"/>
+                      <a:round/>
+                      <a:headEnd type="none" w="med" len="med"/>
+                      <a:tailEnd type="none" w="med" len="med"/>
+                    </a:lnL>
+                    <a:lnR w="12700" cap="flat" cmpd="sng" algn="ctr">
+                      <a:solidFill>
+                        <a:schemeClr val="tx1"/>
+                      </a:solidFill>
+                      <a:prstDash val="solid"/>
+                      <a:round/>
+                      <a:headEnd type="none" w="med" len="med"/>
+                      <a:tailEnd type="none" w="med" len="med"/>
+                    </a:lnR>
+                    <a:lnT w="6350" cap="flat" cmpd="sng" algn="ctr">
+                      <a:noFill/>
+                      <a:prstDash val="solid"/>
+                      <a:round/>
+                      <a:headEnd type="none" w="med" len="med"/>
+                      <a:tailEnd type="none" w="med" len="med"/>
+                    </a:lnT>
+                    <a:lnB w="6350" cap="flat" cmpd="sng" algn="ctr">
+                      <a:noFill/>
+                      <a:prstDash val="solid"/>
+                      <a:round/>
+                      <a:headEnd type="none" w="med" len="med"/>
+                      <a:tailEnd type="none" w="med" len="med"/>
+                    </a:lnB>
+                    <a:lnTlToBr w="12700" cmpd="sng">
+                      <a:noFill/>
+                      <a:prstDash val="solid"/>
+                    </a:lnTlToBr>
+                    <a:lnBlToTr w="12700" cmpd="sng">
+                      <a:noFill/>
+                      <a:prstDash val="solid"/>
+                    </a:lnBlToTr>
+                  </a:tcPr>
+                </a:tc>
+                <a:extLst>
+                  <a:ext uri="{0D108BD9-81ED-4DB2-BD59-A6C34878D82A}">
+                    <a16:rowId xmlns:a16="http://schemas.microsoft.com/office/drawing/2014/main" val="3983574495"/>
+                  </a:ext>
+                </a:extLst>
+              </a:tr>
+            </a:tbl>
+          </a:graphicData>
+        </a:graphic>
+      </p:graphicFrame>
+      <p:graphicFrame>
+        <p:nvGraphicFramePr>
+          <p:cNvPr id="11" name="Table 10">
+            <a:extLst>
+              <a:ext uri="{FF2B5EF4-FFF2-40B4-BE49-F238E27FC236}">
+                <a16:creationId xmlns:a16="http://schemas.microsoft.com/office/drawing/2014/main" id="{35E538F1-21BC-41DA-B1F9-6CE05145A741}"/>
+              </a:ext>
+            </a:extLst>
+          </p:cNvPr>
+          <p:cNvGraphicFramePr>
+            <a:graphicFrameLocks noGrp="1"/>
+          </p:cNvGraphicFramePr>
+          <p:nvPr>
+            <p:extLst>
+              <p:ext uri="{D42A27DB-BD31-4B8C-83A1-F6EECF244321}">
+                <p14:modId xmlns:p14="http://schemas.microsoft.com/office/powerpoint/2010/main" val="1726444452"/>
+              </p:ext>
+            </p:extLst>
+          </p:nvPr>
+        </p:nvGraphicFramePr>
+        <p:xfrm>
+          <a:off x="6561165" y="6202661"/>
+          <a:ext cx="3962053" cy="1696800"/>
+        </p:xfrm>
+        <a:graphic>
+          <a:graphicData uri="http://schemas.openxmlformats.org/drawingml/2006/table">
+            <a:tbl>
+              <a:tblPr firstRow="1" bandRow="1">
+                <a:tableStyleId>{5940675A-B579-460E-94D1-54222C63F5DA}</a:tableStyleId>
+              </a:tblPr>
+              <a:tblGrid>
+                <a:gridCol w="3962053">
+                  <a:extLst>
+                    <a:ext uri="{9D8B030D-6E8A-4147-A177-3AD203B41FA5}">
+                      <a16:colId xmlns:a16="http://schemas.microsoft.com/office/drawing/2014/main" val="20000"/>
+                    </a:ext>
+                  </a:extLst>
+                </a:gridCol>
+              </a:tblGrid>
+              <a:tr h="0">
+                <a:tc>
+                  <a:txBody>
+                    <a:bodyPr/>
+                    <a:lstStyle/>
+                    <a:p>
+                      <a:pPr algn="l"/>
+                      <a:r>
+                        <a:rPr lang="en-GB" sz="1000" b="1" baseline="0" dirty="0">
+                          <a:solidFill>
+                            <a:srgbClr val="000000"/>
+                          </a:solidFill>
+                          <a:latin typeface="Segoe UI" pitchFamily="34" charset="0"/>
+                          <a:cs typeface="Segoe UI" pitchFamily="34" charset="0"/>
+                        </a:rPr>
+                        <a:t>2. Connect app view to </a:t>
+                      </a:r>
+                      <a:r>
+                        <a:rPr lang="en-GB" sz="1000" b="1" baseline="0" dirty="0" err="1">
+                          <a:solidFill>
+                            <a:srgbClr val="000000"/>
+                          </a:solidFill>
+                          <a:latin typeface="Segoe UI" pitchFamily="34" charset="0"/>
+                          <a:cs typeface="Segoe UI" pitchFamily="34" charset="0"/>
+                        </a:rPr>
+                        <a:t>url</a:t>
+                      </a:r>
+                      <a:endParaRPr lang="en-GB" sz="1000" b="1" baseline="0" dirty="0">
+                        <a:solidFill>
+                          <a:srgbClr val="000000"/>
+                        </a:solidFill>
+                        <a:latin typeface="Segoe UI" pitchFamily="34" charset="0"/>
+                        <a:cs typeface="Segoe UI" pitchFamily="34" charset="0"/>
+                      </a:endParaRPr>
+                    </a:p>
+                  </a:txBody>
+                  <a:tcPr marL="46800" marR="46800" marT="21600" marB="21600">
+                    <a:lnL w="12700" cap="flat" cmpd="sng" algn="ctr">
+                      <a:solidFill>
+                        <a:schemeClr val="tx1"/>
+                      </a:solidFill>
+                      <a:prstDash val="solid"/>
+                      <a:round/>
+                      <a:headEnd type="none" w="med" len="med"/>
+                      <a:tailEnd type="none" w="med" len="med"/>
+                    </a:lnL>
+                    <a:lnR w="12700" cap="flat" cmpd="sng" algn="ctr">
+                      <a:solidFill>
+                        <a:schemeClr val="tx1"/>
+                      </a:solidFill>
+                      <a:prstDash val="solid"/>
+                      <a:round/>
+                      <a:headEnd type="none" w="med" len="med"/>
+                      <a:tailEnd type="none" w="med" len="med"/>
+                    </a:lnR>
+                    <a:lnT w="12700" cap="flat" cmpd="sng" algn="ctr">
+                      <a:solidFill>
+                        <a:schemeClr val="tx1"/>
+                      </a:solidFill>
+                      <a:prstDash val="solid"/>
+                      <a:round/>
+                      <a:headEnd type="none" w="med" len="med"/>
+                      <a:tailEnd type="none" w="med" len="med"/>
+                    </a:lnT>
+                    <a:lnB w="6350" cap="flat" cmpd="sng" algn="ctr">
+                      <a:noFill/>
+                      <a:prstDash val="solid"/>
+                      <a:round/>
+                      <a:headEnd type="none" w="med" len="med"/>
+                      <a:tailEnd type="none" w="med" len="med"/>
+                    </a:lnB>
+                    <a:lnTlToBr w="12700" cmpd="sng">
+                      <a:noFill/>
+                      <a:prstDash val="solid"/>
+                    </a:lnTlToBr>
+                    <a:lnBlToTr w="12700" cmpd="sng">
+                      <a:noFill/>
+                      <a:prstDash val="solid"/>
+                    </a:lnBlToTr>
+                  </a:tcPr>
+                </a:tc>
+                <a:extLst>
+                  <a:ext uri="{0D108BD9-81ED-4DB2-BD59-A6C34878D82A}">
+                    <a16:rowId xmlns:a16="http://schemas.microsoft.com/office/drawing/2014/main" val="10000"/>
+                  </a:ext>
+                </a:extLst>
+              </a:tr>
+              <a:tr h="0">
+                <a:tc>
+                  <a:txBody>
+                    <a:bodyPr/>
+                    <a:lstStyle/>
+                    <a:p>
+                      <a:pPr marL="0" marR="0" indent="0" algn="l" defTabSz="584200" rtl="0" eaLnBrk="1" fontAlgn="auto" latinLnBrk="0" hangingPunct="1">
+                        <a:lnSpc>
+                          <a:spcPct val="100000"/>
+                        </a:lnSpc>
+                        <a:spcBef>
+                          <a:spcPts val="0"/>
+                        </a:spcBef>
+                        <a:spcAft>
+                          <a:spcPts val="0"/>
+                        </a:spcAft>
+                        <a:buClrTx/>
+                        <a:buSzTx/>
+                        <a:buFontTx/>
+                        <a:buNone/>
+                        <a:tabLst/>
+                        <a:defRPr/>
+                      </a:pPr>
+                      <a:r>
+                        <a:rPr lang="en-GB" sz="1000" i="1" u="none" dirty="0">
+                          <a:solidFill>
+                            <a:srgbClr val="000000"/>
+                          </a:solidFill>
+                          <a:latin typeface="Segoe UI" pitchFamily="34" charset="0"/>
+                          <a:cs typeface="Segoe UI" pitchFamily="34" charset="0"/>
+                        </a:rPr>
+                        <a:t>tango_with_django/tango_with_django/urls.py</a:t>
+                      </a:r>
+                    </a:p>
+                  </a:txBody>
+                  <a:tcPr marL="46800" marR="46800" marT="21600" marB="21600">
+                    <a:lnL w="12700" cap="flat" cmpd="sng" algn="ctr">
+                      <a:solidFill>
+                        <a:schemeClr val="tx1"/>
+                      </a:solidFill>
+                      <a:prstDash val="solid"/>
+                      <a:round/>
+                      <a:headEnd type="none" w="med" len="med"/>
+                      <a:tailEnd type="none" w="med" len="med"/>
+                    </a:lnL>
+                    <a:lnR w="12700" cap="flat" cmpd="sng" algn="ctr">
+                      <a:solidFill>
+                        <a:schemeClr val="tx1"/>
+                      </a:solidFill>
+                      <a:prstDash val="solid"/>
+                      <a:round/>
+                      <a:headEnd type="none" w="med" len="med"/>
+                      <a:tailEnd type="none" w="med" len="med"/>
+                    </a:lnR>
+                    <a:lnT w="6350" cap="flat" cmpd="sng" algn="ctr">
+                      <a:noFill/>
+                      <a:prstDash val="solid"/>
+                      <a:round/>
+                      <a:headEnd type="none" w="med" len="med"/>
+                      <a:tailEnd type="none" w="med" len="med"/>
+                    </a:lnT>
+                    <a:lnB w="6350" cap="flat" cmpd="sng" algn="ctr">
+                      <a:noFill/>
+                      <a:prstDash val="solid"/>
+                      <a:round/>
+                      <a:headEnd type="none" w="med" len="med"/>
+                      <a:tailEnd type="none" w="med" len="med"/>
+                    </a:lnB>
+                    <a:lnTlToBr w="12700" cmpd="sng">
+                      <a:noFill/>
+                      <a:prstDash val="solid"/>
+                    </a:lnTlToBr>
+                    <a:lnBlToTr w="12700" cmpd="sng">
+                      <a:noFill/>
+                      <a:prstDash val="solid"/>
+                    </a:lnBlToTr>
+                  </a:tcPr>
+                </a:tc>
+                <a:extLst>
+                  <a:ext uri="{0D108BD9-81ED-4DB2-BD59-A6C34878D82A}">
+                    <a16:rowId xmlns:a16="http://schemas.microsoft.com/office/drawing/2014/main" val="694626626"/>
+                  </a:ext>
+                </a:extLst>
+              </a:tr>
+              <a:tr h="0">
+                <a:tc>
+                  <a:txBody>
+                    <a:bodyPr/>
+                    <a:lstStyle/>
+                    <a:p>
+                      <a:pPr marL="0" marR="0" indent="0" algn="l" defTabSz="584200" rtl="0" eaLnBrk="1" fontAlgn="auto" latinLnBrk="0" hangingPunct="1">
+                        <a:lnSpc>
+                          <a:spcPct val="100000"/>
+                        </a:lnSpc>
+                        <a:spcBef>
+                          <a:spcPts val="0"/>
+                        </a:spcBef>
+                        <a:spcAft>
+                          <a:spcPts val="0"/>
+                        </a:spcAft>
+                        <a:buClrTx/>
+                        <a:buSzTx/>
+                        <a:buFontTx/>
+                        <a:buNone/>
+                        <a:tabLst/>
+                        <a:defRPr/>
+                      </a:pPr>
+                      <a:endParaRPr lang="en-GB" sz="1000" i="0" baseline="0" dirty="0">
+                        <a:solidFill>
+                          <a:srgbClr val="000000"/>
+                        </a:solidFill>
+                        <a:latin typeface="Consolas" panose="020B0609020204030204" pitchFamily="49" charset="0"/>
+                        <a:cs typeface="Segoe UI" pitchFamily="34" charset="0"/>
+                      </a:endParaRPr>
+                    </a:p>
+                  </a:txBody>
+                  <a:tcPr marL="46800" marR="46800" marT="21600" marB="21600">
+                    <a:lnL w="12700" cap="flat" cmpd="sng" algn="ctr">
+                      <a:solidFill>
+                        <a:schemeClr val="tx1"/>
+                      </a:solidFill>
+                      <a:prstDash val="solid"/>
+                      <a:round/>
+                      <a:headEnd type="none" w="med" len="med"/>
+                      <a:tailEnd type="none" w="med" len="med"/>
+                    </a:lnL>
+                    <a:lnR w="12700" cap="flat" cmpd="sng" algn="ctr">
+                      <a:solidFill>
+                        <a:schemeClr val="tx1"/>
+                      </a:solidFill>
+                      <a:prstDash val="solid"/>
+                      <a:round/>
+                      <a:headEnd type="none" w="med" len="med"/>
+                      <a:tailEnd type="none" w="med" len="med"/>
+                    </a:lnR>
+                    <a:lnT w="6350" cap="flat" cmpd="sng" algn="ctr">
+                      <a:noFill/>
+                      <a:prstDash val="solid"/>
+                      <a:round/>
+                      <a:headEnd type="none" w="med" len="med"/>
+                      <a:tailEnd type="none" w="med" len="med"/>
+                    </a:lnT>
+                    <a:lnB w="6350" cap="flat" cmpd="sng" algn="ctr">
+                      <a:noFill/>
+                      <a:prstDash val="solid"/>
+                      <a:round/>
+                      <a:headEnd type="none" w="med" len="med"/>
+                      <a:tailEnd type="none" w="med" len="med"/>
+                    </a:lnB>
+                    <a:lnTlToBr w="12700" cmpd="sng">
+                      <a:noFill/>
+                      <a:prstDash val="solid"/>
+                    </a:lnTlToBr>
+                    <a:lnBlToTr w="12700" cmpd="sng">
+                      <a:noFill/>
+                      <a:prstDash val="solid"/>
+                    </a:lnBlToTr>
+                  </a:tcPr>
+                </a:tc>
+                <a:extLst>
+                  <a:ext uri="{0D108BD9-81ED-4DB2-BD59-A6C34878D82A}">
+                    <a16:rowId xmlns:a16="http://schemas.microsoft.com/office/drawing/2014/main" val="1345526979"/>
+                  </a:ext>
+                </a:extLst>
+              </a:tr>
+              <a:tr h="0">
+                <a:tc>
+                  <a:txBody>
+                    <a:bodyPr/>
+                    <a:lstStyle/>
+                    <a:p>
+                      <a:pPr marL="0" marR="0" indent="0" algn="l" defTabSz="584200" rtl="0" eaLnBrk="1" fontAlgn="auto" latinLnBrk="0" hangingPunct="1">
+                        <a:lnSpc>
+                          <a:spcPct val="100000"/>
+                        </a:lnSpc>
+                        <a:spcBef>
+                          <a:spcPts val="0"/>
+                        </a:spcBef>
+                        <a:spcAft>
+                          <a:spcPts val="0"/>
+                        </a:spcAft>
+                        <a:buClrTx/>
+                        <a:buSzTx/>
+                        <a:buFontTx/>
+                        <a:buNone/>
+                        <a:tabLst/>
+                        <a:defRPr/>
+                      </a:pPr>
+                      <a:r>
+                        <a:rPr lang="en-US" sz="1000" i="0" baseline="0" dirty="0">
+                          <a:solidFill>
+                            <a:srgbClr val="000000"/>
+                          </a:solidFill>
+                          <a:latin typeface="Consolas" panose="020B0609020204030204" pitchFamily="49" charset="0"/>
+                          <a:cs typeface="Segoe UI" pitchFamily="34" charset="0"/>
+                        </a:rPr>
+                        <a:t>from </a:t>
+                      </a:r>
+                      <a:r>
+                        <a:rPr lang="en-US" sz="1000" i="0" baseline="0" dirty="0" err="1">
+                          <a:solidFill>
+                            <a:srgbClr val="000000"/>
+                          </a:solidFill>
+                          <a:latin typeface="Consolas" panose="020B0609020204030204" pitchFamily="49" charset="0"/>
+                          <a:cs typeface="Segoe UI" pitchFamily="34" charset="0"/>
+                        </a:rPr>
+                        <a:t>django.contrib</a:t>
+                      </a:r>
+                      <a:r>
+                        <a:rPr lang="en-US" sz="1000" i="0" baseline="0" dirty="0">
+                          <a:solidFill>
+                            <a:srgbClr val="000000"/>
+                          </a:solidFill>
+                          <a:latin typeface="Consolas" panose="020B0609020204030204" pitchFamily="49" charset="0"/>
+                          <a:cs typeface="Segoe UI" pitchFamily="34" charset="0"/>
+                        </a:rPr>
+                        <a:t> import admin</a:t>
+                      </a:r>
+                    </a:p>
+                    <a:p>
+                      <a:pPr marL="0" marR="0" indent="0" algn="l" defTabSz="584200" rtl="0" eaLnBrk="1" fontAlgn="auto" latinLnBrk="0" hangingPunct="1">
+                        <a:lnSpc>
+                          <a:spcPct val="100000"/>
+                        </a:lnSpc>
+                        <a:spcBef>
+                          <a:spcPts val="0"/>
+                        </a:spcBef>
+                        <a:spcAft>
+                          <a:spcPts val="0"/>
+                        </a:spcAft>
+                        <a:buClrTx/>
+                        <a:buSzTx/>
+                        <a:buFontTx/>
+                        <a:buNone/>
+                        <a:tabLst/>
+                        <a:defRPr/>
+                      </a:pPr>
+                      <a:r>
+                        <a:rPr lang="en-US" sz="1000" i="0" baseline="0" dirty="0">
+                          <a:solidFill>
+                            <a:srgbClr val="000000"/>
+                          </a:solidFill>
+                          <a:latin typeface="Consolas" panose="020B0609020204030204" pitchFamily="49" charset="0"/>
+                          <a:cs typeface="Segoe UI" pitchFamily="34" charset="0"/>
+                        </a:rPr>
+                        <a:t>from </a:t>
+                      </a:r>
+                      <a:r>
+                        <a:rPr lang="en-US" sz="1000" i="0" baseline="0" dirty="0" err="1">
+                          <a:solidFill>
+                            <a:srgbClr val="000000"/>
+                          </a:solidFill>
+                          <a:latin typeface="Consolas" panose="020B0609020204030204" pitchFamily="49" charset="0"/>
+                          <a:cs typeface="Segoe UI" pitchFamily="34" charset="0"/>
+                        </a:rPr>
+                        <a:t>django.urls</a:t>
+                      </a:r>
+                      <a:r>
+                        <a:rPr lang="en-US" sz="1000" i="0" baseline="0" dirty="0">
+                          <a:solidFill>
+                            <a:srgbClr val="000000"/>
+                          </a:solidFill>
+                          <a:latin typeface="Consolas" panose="020B0609020204030204" pitchFamily="49" charset="0"/>
+                          <a:cs typeface="Segoe UI" pitchFamily="34" charset="0"/>
+                        </a:rPr>
+                        <a:t> import include, path</a:t>
+                      </a:r>
+                    </a:p>
+                    <a:p>
+                      <a:pPr marL="0" marR="0" indent="0" algn="l" defTabSz="584200" rtl="0" eaLnBrk="1" fontAlgn="auto" latinLnBrk="0" hangingPunct="1">
+                        <a:lnSpc>
+                          <a:spcPct val="100000"/>
+                        </a:lnSpc>
+                        <a:spcBef>
+                          <a:spcPts val="0"/>
+                        </a:spcBef>
+                        <a:spcAft>
+                          <a:spcPts val="0"/>
+                        </a:spcAft>
+                        <a:buClrTx/>
+                        <a:buSzTx/>
+                        <a:buFontTx/>
+                        <a:buNone/>
+                        <a:tabLst/>
+                        <a:defRPr/>
+                      </a:pPr>
+                      <a:endParaRPr lang="en-US" sz="1000" i="0" baseline="0" dirty="0">
+                        <a:solidFill>
+                          <a:srgbClr val="000000"/>
+                        </a:solidFill>
+                        <a:latin typeface="Consolas" panose="020B0609020204030204" pitchFamily="49" charset="0"/>
+                        <a:cs typeface="Segoe UI" pitchFamily="34" charset="0"/>
+                      </a:endParaRPr>
+                    </a:p>
+                    <a:p>
+                      <a:pPr marL="0" marR="0" indent="0" algn="l" defTabSz="584200" rtl="0" eaLnBrk="1" fontAlgn="auto" latinLnBrk="0" hangingPunct="1">
+                        <a:lnSpc>
+                          <a:spcPct val="100000"/>
+                        </a:lnSpc>
+                        <a:spcBef>
+                          <a:spcPts val="0"/>
+                        </a:spcBef>
+                        <a:spcAft>
+                          <a:spcPts val="0"/>
+                        </a:spcAft>
+                        <a:buClrTx/>
+                        <a:buSzTx/>
+                        <a:buFontTx/>
+                        <a:buNone/>
+                        <a:tabLst/>
+                        <a:defRPr/>
+                      </a:pPr>
+                      <a:r>
+                        <a:rPr lang="en-US" sz="1000" i="0" baseline="0" dirty="0" err="1">
+                          <a:solidFill>
+                            <a:srgbClr val="000000"/>
+                          </a:solidFill>
+                          <a:latin typeface="Consolas" panose="020B0609020204030204" pitchFamily="49" charset="0"/>
+                          <a:cs typeface="Segoe UI" pitchFamily="34" charset="0"/>
+                        </a:rPr>
+                        <a:t>urlpatterns</a:t>
+                      </a:r>
+                      <a:r>
+                        <a:rPr lang="en-US" sz="1000" i="0" baseline="0" dirty="0">
+                          <a:solidFill>
+                            <a:srgbClr val="000000"/>
+                          </a:solidFill>
+                          <a:latin typeface="Consolas" panose="020B0609020204030204" pitchFamily="49" charset="0"/>
+                          <a:cs typeface="Segoe UI" pitchFamily="34" charset="0"/>
+                        </a:rPr>
+                        <a:t> = [</a:t>
+                      </a:r>
+                    </a:p>
+                    <a:p>
+                      <a:pPr marL="0" marR="0" indent="0" algn="l" defTabSz="584200" rtl="0" eaLnBrk="1" fontAlgn="auto" latinLnBrk="0" hangingPunct="1">
+                        <a:lnSpc>
+                          <a:spcPct val="100000"/>
+                        </a:lnSpc>
+                        <a:spcBef>
+                          <a:spcPts val="0"/>
+                        </a:spcBef>
+                        <a:spcAft>
+                          <a:spcPts val="0"/>
+                        </a:spcAft>
+                        <a:buClrTx/>
+                        <a:buSzTx/>
+                        <a:buFontTx/>
+                        <a:buNone/>
+                        <a:tabLst/>
+                        <a:defRPr/>
+                      </a:pPr>
+                      <a:r>
+                        <a:rPr lang="en-US" sz="1000" i="0" baseline="0" dirty="0">
+                          <a:solidFill>
+                            <a:srgbClr val="000000"/>
+                          </a:solidFill>
+                          <a:latin typeface="Consolas" panose="020B0609020204030204" pitchFamily="49" charset="0"/>
+                          <a:cs typeface="Segoe UI" pitchFamily="34" charset="0"/>
+                        </a:rPr>
+                        <a:t>    path('admin/', </a:t>
+                      </a:r>
+                      <a:r>
+                        <a:rPr lang="en-US" sz="1000" i="0" baseline="0" dirty="0" err="1">
+                          <a:solidFill>
+                            <a:srgbClr val="000000"/>
+                          </a:solidFill>
+                          <a:latin typeface="Consolas" panose="020B0609020204030204" pitchFamily="49" charset="0"/>
+                          <a:cs typeface="Segoe UI" pitchFamily="34" charset="0"/>
+                        </a:rPr>
+                        <a:t>admin.site.urls</a:t>
+                      </a:r>
+                      <a:r>
+                        <a:rPr lang="en-US" sz="1000" i="0" baseline="0" dirty="0">
+                          <a:solidFill>
+                            <a:srgbClr val="000000"/>
+                          </a:solidFill>
+                          <a:latin typeface="Consolas" panose="020B0609020204030204" pitchFamily="49" charset="0"/>
+                          <a:cs typeface="Segoe UI" pitchFamily="34" charset="0"/>
+                        </a:rPr>
+                        <a:t>),</a:t>
+                      </a:r>
+                    </a:p>
+                    <a:p>
+                      <a:pPr marL="0" marR="0" indent="0" algn="l" defTabSz="584200" rtl="0" eaLnBrk="1" fontAlgn="auto" latinLnBrk="0" hangingPunct="1">
+                        <a:lnSpc>
+                          <a:spcPct val="100000"/>
+                        </a:lnSpc>
+                        <a:spcBef>
+                          <a:spcPts val="0"/>
+                        </a:spcBef>
+                        <a:spcAft>
+                          <a:spcPts val="0"/>
+                        </a:spcAft>
+                        <a:buClrTx/>
+                        <a:buSzTx/>
+                        <a:buFontTx/>
+                        <a:buNone/>
+                        <a:tabLst/>
+                        <a:defRPr/>
+                      </a:pPr>
+                      <a:r>
+                        <a:rPr lang="en-US" sz="1000" i="0" baseline="0" dirty="0">
+                          <a:solidFill>
+                            <a:srgbClr val="000000"/>
+                          </a:solidFill>
+                          <a:latin typeface="Consolas" panose="020B0609020204030204" pitchFamily="49" charset="0"/>
+                          <a:cs typeface="Segoe UI" pitchFamily="34" charset="0"/>
+                        </a:rPr>
+                        <a:t>    path('</a:t>
+                      </a:r>
+                      <a:r>
+                        <a:rPr lang="en-US" sz="1000" i="0" baseline="0" dirty="0" err="1">
+                          <a:solidFill>
+                            <a:srgbClr val="000000"/>
+                          </a:solidFill>
+                          <a:latin typeface="Consolas" panose="020B0609020204030204" pitchFamily="49" charset="0"/>
+                          <a:cs typeface="Segoe UI" pitchFamily="34" charset="0"/>
+                        </a:rPr>
+                        <a:t>rango</a:t>
+                      </a:r>
+                      <a:r>
+                        <a:rPr lang="en-US" sz="1000" i="0" baseline="0" dirty="0">
+                          <a:solidFill>
+                            <a:srgbClr val="000000"/>
+                          </a:solidFill>
+                          <a:latin typeface="Consolas" panose="020B0609020204030204" pitchFamily="49" charset="0"/>
+                          <a:cs typeface="Segoe UI" pitchFamily="34" charset="0"/>
+                        </a:rPr>
+                        <a:t>/', include('</a:t>
+                      </a:r>
+                      <a:r>
+                        <a:rPr lang="en-US" sz="1000" i="0" baseline="0" dirty="0" err="1">
+                          <a:solidFill>
+                            <a:srgbClr val="000000"/>
+                          </a:solidFill>
+                          <a:latin typeface="Consolas" panose="020B0609020204030204" pitchFamily="49" charset="0"/>
+                          <a:cs typeface="Segoe UI" pitchFamily="34" charset="0"/>
+                        </a:rPr>
+                        <a:t>rango.urls</a:t>
+                      </a:r>
+                      <a:r>
+                        <a:rPr lang="en-US" sz="1000" i="0" baseline="0" dirty="0">
+                          <a:solidFill>
+                            <a:srgbClr val="000000"/>
+                          </a:solidFill>
+                          <a:latin typeface="Consolas" panose="020B0609020204030204" pitchFamily="49" charset="0"/>
+                          <a:cs typeface="Segoe UI" pitchFamily="34" charset="0"/>
+                        </a:rPr>
+                        <a:t>')),</a:t>
+                      </a:r>
+                    </a:p>
+                    <a:p>
+                      <a:pPr marL="0" marR="0" indent="0" algn="l" defTabSz="584200" rtl="0" eaLnBrk="1" fontAlgn="auto" latinLnBrk="0" hangingPunct="1">
+                        <a:lnSpc>
+                          <a:spcPct val="100000"/>
+                        </a:lnSpc>
+                        <a:spcBef>
+                          <a:spcPts val="0"/>
+                        </a:spcBef>
+                        <a:spcAft>
+                          <a:spcPts val="0"/>
+                        </a:spcAft>
+                        <a:buClrTx/>
+                        <a:buSzTx/>
+                        <a:buFontTx/>
+                        <a:buNone/>
+                        <a:tabLst/>
+                        <a:defRPr/>
+                      </a:pPr>
+                      <a:r>
+                        <a:rPr lang="en-US" sz="1000" i="0" baseline="0" dirty="0">
+                          <a:solidFill>
+                            <a:srgbClr val="000000"/>
+                          </a:solidFill>
+                          <a:latin typeface="Consolas" panose="020B0609020204030204" pitchFamily="49" charset="0"/>
+                          <a:cs typeface="Segoe UI" pitchFamily="34" charset="0"/>
+                        </a:rPr>
+                        <a:t>]</a:t>
+                      </a:r>
+                      <a:endParaRPr lang="en-GB" sz="1000" i="0" baseline="0" dirty="0">
+                        <a:solidFill>
+                          <a:srgbClr val="000000"/>
+                        </a:solidFill>
+                        <a:latin typeface="Consolas" panose="020B0609020204030204" pitchFamily="49" charset="0"/>
+                        <a:cs typeface="Segoe UI" pitchFamily="34" charset="0"/>
+                      </a:endParaRPr>
+                    </a:p>
+                  </a:txBody>
+                  <a:tcPr marL="46800" marR="46800" marT="21600" marB="21600">
+                    <a:lnL w="12700" cap="flat" cmpd="sng" algn="ctr">
+                      <a:solidFill>
+                        <a:schemeClr val="tx1"/>
+                      </a:solidFill>
+                      <a:prstDash val="solid"/>
+                      <a:round/>
+                      <a:headEnd type="none" w="med" len="med"/>
+                      <a:tailEnd type="none" w="med" len="med"/>
+                    </a:lnL>
+                    <a:lnR w="12700" cap="flat" cmpd="sng" algn="ctr">
+                      <a:solidFill>
+                        <a:schemeClr val="tx1"/>
+                      </a:solidFill>
+                      <a:prstDash val="solid"/>
+                      <a:round/>
+                      <a:headEnd type="none" w="med" len="med"/>
+                      <a:tailEnd type="none" w="med" len="med"/>
+                    </a:lnR>
+                    <a:lnT w="6350" cap="flat" cmpd="sng" algn="ctr">
+                      <a:noFill/>
+                      <a:prstDash val="solid"/>
+                      <a:round/>
+                      <a:headEnd type="none" w="med" len="med"/>
+                      <a:tailEnd type="none" w="med" len="med"/>
+                    </a:lnT>
+                    <a:lnB w="6350" cap="flat" cmpd="sng" algn="ctr">
+                      <a:noFill/>
+                      <a:prstDash val="solid"/>
+                      <a:round/>
+                      <a:headEnd type="none" w="med" len="med"/>
+                      <a:tailEnd type="none" w="med" len="med"/>
+                    </a:lnB>
+                    <a:lnTlToBr w="12700" cmpd="sng">
+                      <a:noFill/>
+                      <a:prstDash val="solid"/>
+                    </a:lnTlToBr>
+                    <a:lnBlToTr w="12700" cmpd="sng">
+                      <a:noFill/>
+                      <a:prstDash val="solid"/>
+                    </a:lnBlToTr>
+                  </a:tcPr>
+                </a:tc>
+                <a:extLst>
+                  <a:ext uri="{0D108BD9-81ED-4DB2-BD59-A6C34878D82A}">
+                    <a16:rowId xmlns:a16="http://schemas.microsoft.com/office/drawing/2014/main" val="3983574495"/>
+                  </a:ext>
+                </a:extLst>
+              </a:tr>
+            </a:tbl>
+          </a:graphicData>
+        </a:graphic>
+      </p:graphicFrame>
+      <p:graphicFrame>
+        <p:nvGraphicFramePr>
+          <p:cNvPr id="15" name="Table 14">
+            <a:extLst>
+              <a:ext uri="{FF2B5EF4-FFF2-40B4-BE49-F238E27FC236}">
+                <a16:creationId xmlns:a16="http://schemas.microsoft.com/office/drawing/2014/main" id="{561DBC30-D9A1-4DB8-B239-334C2569F14B}"/>
+              </a:ext>
+            </a:extLst>
+          </p:cNvPr>
+          <p:cNvGraphicFramePr>
+            <a:graphicFrameLocks noGrp="1"/>
+          </p:cNvGraphicFramePr>
+          <p:nvPr>
+            <p:extLst>
+              <p:ext uri="{D42A27DB-BD31-4B8C-83A1-F6EECF244321}">
+                <p14:modId xmlns:p14="http://schemas.microsoft.com/office/powerpoint/2010/main" val="2728281873"/>
+              </p:ext>
+            </p:extLst>
+          </p:nvPr>
+        </p:nvGraphicFramePr>
+        <p:xfrm>
+          <a:off x="6561165" y="8054477"/>
+          <a:ext cx="3962053" cy="391200"/>
+        </p:xfrm>
+        <a:graphic>
+          <a:graphicData uri="http://schemas.openxmlformats.org/drawingml/2006/table">
+            <a:tbl>
+              <a:tblPr firstRow="1" bandRow="1">
+                <a:tableStyleId>{5940675A-B579-460E-94D1-54222C63F5DA}</a:tableStyleId>
+              </a:tblPr>
+              <a:tblGrid>
+                <a:gridCol w="3962053">
+                  <a:extLst>
+                    <a:ext uri="{9D8B030D-6E8A-4147-A177-3AD203B41FA5}">
+                      <a16:colId xmlns:a16="http://schemas.microsoft.com/office/drawing/2014/main" val="20000"/>
+                    </a:ext>
+                  </a:extLst>
+                </a:gridCol>
+              </a:tblGrid>
+              <a:tr h="0">
+                <a:tc>
+                  <a:txBody>
+                    <a:bodyPr/>
+                    <a:lstStyle/>
+                    <a:p>
+                      <a:pPr algn="l"/>
+                      <a:r>
+                        <a:rPr lang="en-GB" sz="1000" b="1" baseline="0" dirty="0">
+                          <a:solidFill>
+                            <a:srgbClr val="000000"/>
+                          </a:solidFill>
+                          <a:latin typeface="Segoe UI" pitchFamily="34" charset="0"/>
+                          <a:cs typeface="Segoe UI" pitchFamily="34" charset="0"/>
+                        </a:rPr>
+                        <a:t>3. Run server</a:t>
+                      </a:r>
+                    </a:p>
+                  </a:txBody>
+                  <a:tcPr marL="46800" marR="46800" marT="21600" marB="21600">
+                    <a:lnL w="12700" cap="flat" cmpd="sng" algn="ctr">
+                      <a:solidFill>
+                        <a:schemeClr val="tx1"/>
+                      </a:solidFill>
+                      <a:prstDash val="solid"/>
+                      <a:round/>
+                      <a:headEnd type="none" w="med" len="med"/>
+                      <a:tailEnd type="none" w="med" len="med"/>
+                    </a:lnL>
+                    <a:lnR w="12700" cap="flat" cmpd="sng" algn="ctr">
+                      <a:solidFill>
+                        <a:schemeClr val="tx1"/>
+                      </a:solidFill>
+                      <a:prstDash val="solid"/>
+                      <a:round/>
+                      <a:headEnd type="none" w="med" len="med"/>
+                      <a:tailEnd type="none" w="med" len="med"/>
+                    </a:lnR>
+                    <a:lnT w="12700" cap="flat" cmpd="sng" algn="ctr">
+                      <a:solidFill>
+                        <a:schemeClr val="tx1"/>
+                      </a:solidFill>
+                      <a:prstDash val="solid"/>
+                      <a:round/>
+                      <a:headEnd type="none" w="med" len="med"/>
+                      <a:tailEnd type="none" w="med" len="med"/>
+                    </a:lnT>
+                    <a:lnB w="6350" cap="flat" cmpd="sng" algn="ctr">
+                      <a:noFill/>
+                      <a:prstDash val="solid"/>
+                      <a:round/>
+                      <a:headEnd type="none" w="med" len="med"/>
+                      <a:tailEnd type="none" w="med" len="med"/>
+                    </a:lnB>
+                    <a:lnTlToBr w="12700" cmpd="sng">
+                      <a:noFill/>
+                      <a:prstDash val="solid"/>
+                    </a:lnTlToBr>
+                    <a:lnBlToTr w="12700" cmpd="sng">
+                      <a:noFill/>
+                      <a:prstDash val="solid"/>
+                    </a:lnBlToTr>
+                  </a:tcPr>
+                </a:tc>
+                <a:extLst>
+                  <a:ext uri="{0D108BD9-81ED-4DB2-BD59-A6C34878D82A}">
+                    <a16:rowId xmlns:a16="http://schemas.microsoft.com/office/drawing/2014/main" val="10000"/>
+                  </a:ext>
+                </a:extLst>
+              </a:tr>
+              <a:tr h="0">
+                <a:tc>
+                  <a:txBody>
+                    <a:bodyPr/>
+                    <a:lstStyle/>
+                    <a:p>
+                      <a:pPr marL="0" marR="0" indent="0" algn="l" defTabSz="584200" rtl="0" eaLnBrk="1" fontAlgn="auto" latinLnBrk="0" hangingPunct="1">
+                        <a:lnSpc>
+                          <a:spcPct val="100000"/>
+                        </a:lnSpc>
+                        <a:spcBef>
+                          <a:spcPts val="0"/>
+                        </a:spcBef>
+                        <a:spcAft>
+                          <a:spcPts val="0"/>
+                        </a:spcAft>
+                        <a:buClrTx/>
+                        <a:buSzTx/>
+                        <a:buFontTx/>
+                        <a:buNone/>
+                        <a:tabLst/>
+                        <a:defRPr/>
+                      </a:pPr>
+                      <a:r>
+                        <a:rPr lang="en-GB" sz="1000" i="0" dirty="0">
+                          <a:solidFill>
+                            <a:srgbClr val="000000"/>
+                          </a:solidFill>
+                          <a:latin typeface="Segoe UI" pitchFamily="34" charset="0"/>
+                          <a:cs typeface="Segoe UI" pitchFamily="34" charset="0"/>
+                        </a:rPr>
+                        <a:t>Visit http://127.0.0.1:8000/rango/</a:t>
+                      </a:r>
+                      <a:endParaRPr lang="en-GB" sz="1000" i="1" u="none" dirty="0">
+                        <a:solidFill>
+                          <a:srgbClr val="000000"/>
+                        </a:solidFill>
+                        <a:latin typeface="Segoe UI" pitchFamily="34" charset="0"/>
+                        <a:cs typeface="Segoe UI" pitchFamily="34" charset="0"/>
+                      </a:endParaRPr>
+                    </a:p>
+                  </a:txBody>
+                  <a:tcPr marL="46800" marR="46800" marT="21600" marB="21600">
+                    <a:lnL w="12700" cap="flat" cmpd="sng" algn="ctr">
+                      <a:solidFill>
+                        <a:schemeClr val="tx1"/>
+                      </a:solidFill>
+                      <a:prstDash val="solid"/>
+                      <a:round/>
+                      <a:headEnd type="none" w="med" len="med"/>
+                      <a:tailEnd type="none" w="med" len="med"/>
+                    </a:lnL>
+                    <a:lnR w="12700" cap="flat" cmpd="sng" algn="ctr">
+                      <a:solidFill>
+                        <a:schemeClr val="tx1"/>
+                      </a:solidFill>
+                      <a:prstDash val="solid"/>
+                      <a:round/>
+                      <a:headEnd type="none" w="med" len="med"/>
+                      <a:tailEnd type="none" w="med" len="med"/>
+                    </a:lnR>
+                    <a:lnT w="6350" cap="flat" cmpd="sng" algn="ctr">
+                      <a:noFill/>
+                      <a:prstDash val="solid"/>
+                      <a:round/>
+                      <a:headEnd type="none" w="med" len="med"/>
+                      <a:tailEnd type="none" w="med" len="med"/>
+                    </a:lnT>
+                    <a:lnB w="6350" cap="flat" cmpd="sng" algn="ctr">
+                      <a:noFill/>
+                      <a:prstDash val="solid"/>
+                      <a:round/>
+                      <a:headEnd type="none" w="med" len="med"/>
+                      <a:tailEnd type="none" w="med" len="med"/>
+                    </a:lnB>
+                    <a:lnTlToBr w="12700" cmpd="sng">
+                      <a:noFill/>
+                      <a:prstDash val="solid"/>
+                    </a:lnTlToBr>
+                    <a:lnBlToTr w="12700" cmpd="sng">
+                      <a:noFill/>
+                      <a:prstDash val="solid"/>
+                    </a:lnBlToTr>
+                  </a:tcPr>
+                </a:tc>
+                <a:extLst>
+                  <a:ext uri="{0D108BD9-81ED-4DB2-BD59-A6C34878D82A}">
+                    <a16:rowId xmlns:a16="http://schemas.microsoft.com/office/drawing/2014/main" val="694626626"/>
                   </a:ext>
                 </a:extLst>
               </a:tr>

</xml_diff>

<commit_message>
Added use of templates for app view.
</commit_message>
<xml_diff>
--- a/Django.pptx
+++ b/Django.pptx
@@ -2394,7 +2394,7 @@
           </a:ln>
           <a:extLst>
             <a:ext uri="{C572A759-6A51-4108-AA02-DFA0A04FC94B}">
-              <ma14:wrappingTextBoxFlag xmlns="" xmlns:m="http://schemas.openxmlformats.org/officeDocument/2006/math" xmlns:a14="http://schemas.microsoft.com/office/drawing/2010/main" xmlns:ma14="http://schemas.microsoft.com/office/mac/drawingml/2011/main" val="1"/>
+              <ma14:wrappingTextBoxFlag xmlns:ma14="http://schemas.microsoft.com/office/mac/drawingml/2011/main" xmlns:a14="http://schemas.microsoft.com/office/drawing/2010/main" xmlns:m="http://schemas.openxmlformats.org/officeDocument/2006/math" xmlns="" val="1"/>
             </a:ext>
           </a:extLst>
         </p:spPr>
@@ -2433,7 +2433,7 @@
           </a:ln>
           <a:extLst>
             <a:ext uri="{C572A759-6A51-4108-AA02-DFA0A04FC94B}">
-              <ma14:wrappingTextBoxFlag xmlns="" xmlns:m="http://schemas.openxmlformats.org/officeDocument/2006/math" xmlns:a14="http://schemas.microsoft.com/office/drawing/2010/main" xmlns:ma14="http://schemas.microsoft.com/office/mac/drawingml/2011/main" val="1"/>
+              <ma14:wrappingTextBoxFlag xmlns:ma14="http://schemas.microsoft.com/office/mac/drawingml/2011/main" xmlns:a14="http://schemas.microsoft.com/office/drawing/2010/main" xmlns:m="http://schemas.openxmlformats.org/officeDocument/2006/math" xmlns="" val="1"/>
             </a:ext>
           </a:extLst>
         </p:spPr>
@@ -5510,14 +5510,14 @@
           <p:nvPr>
             <p:extLst>
               <p:ext uri="{D42A27DB-BD31-4B8C-83A1-F6EECF244321}">
-                <p14:modId xmlns:p14="http://schemas.microsoft.com/office/powerpoint/2010/main" val="147438807"/>
+                <p14:modId xmlns:p14="http://schemas.microsoft.com/office/powerpoint/2010/main" val="800509338"/>
               </p:ext>
             </p:extLst>
           </p:nvPr>
         </p:nvGraphicFramePr>
         <p:xfrm>
           <a:off x="3868767" y="1227219"/>
-          <a:ext cx="3140075" cy="2022000"/>
+          <a:ext cx="3140075" cy="2479200"/>
         </p:xfrm>
         <a:graphic>
           <a:graphicData uri="http://schemas.openxmlformats.org/drawingml/2006/table">
@@ -6207,6 +6207,110 @@
                           <a:cs typeface="Segoe UI" pitchFamily="34" charset="0"/>
                         </a:rPr>
                         <a:t> - - wsgi.py</a:t>
+                      </a:r>
+                    </a:p>
+                    <a:p>
+                      <a:pPr marL="0" marR="0" indent="0" algn="l" defTabSz="584200" rtl="0" eaLnBrk="1" fontAlgn="auto" latinLnBrk="0" hangingPunct="1">
+                        <a:lnSpc>
+                          <a:spcPct val="100000"/>
+                        </a:lnSpc>
+                        <a:spcBef>
+                          <a:spcPts val="0"/>
+                        </a:spcBef>
+                        <a:spcAft>
+                          <a:spcPts val="0"/>
+                        </a:spcAft>
+                        <a:buClrTx/>
+                        <a:buSzTx/>
+                        <a:buFontTx/>
+                        <a:buNone/>
+                        <a:tabLst/>
+                        <a:defRPr/>
+                      </a:pPr>
+                      <a:r>
+                        <a:rPr lang="en-GB" sz="1000" i="0" dirty="0">
+                          <a:solidFill>
+                            <a:srgbClr val="000000"/>
+                          </a:solidFill>
+                          <a:latin typeface="Segoe UI" pitchFamily="34" charset="0"/>
+                          <a:cs typeface="Segoe UI" pitchFamily="34" charset="0"/>
+                        </a:rPr>
+                        <a:t> - - templates</a:t>
+                      </a:r>
+                    </a:p>
+                    <a:p>
+                      <a:pPr marL="0" marR="0" indent="0" algn="l" defTabSz="584200" rtl="0" eaLnBrk="1" fontAlgn="auto" latinLnBrk="0" hangingPunct="1">
+                        <a:lnSpc>
+                          <a:spcPct val="100000"/>
+                        </a:lnSpc>
+                        <a:spcBef>
+                          <a:spcPts val="0"/>
+                        </a:spcBef>
+                        <a:spcAft>
+                          <a:spcPts val="0"/>
+                        </a:spcAft>
+                        <a:buClrTx/>
+                        <a:buSzTx/>
+                        <a:buFontTx/>
+                        <a:buNone/>
+                        <a:tabLst/>
+                        <a:defRPr/>
+                      </a:pPr>
+                      <a:r>
+                        <a:rPr lang="en-GB" sz="1000" i="0" dirty="0">
+                          <a:solidFill>
+                            <a:srgbClr val="000000"/>
+                          </a:solidFill>
+                          <a:latin typeface="Segoe UI" pitchFamily="34" charset="0"/>
+                          <a:cs typeface="Segoe UI" pitchFamily="34" charset="0"/>
+                        </a:rPr>
+                        <a:t> - - - </a:t>
+                      </a:r>
+                      <a:r>
+                        <a:rPr lang="en-GB" sz="1000" i="0" dirty="0" err="1">
+                          <a:solidFill>
+                            <a:srgbClr val="000000"/>
+                          </a:solidFill>
+                          <a:latin typeface="Segoe UI" pitchFamily="34" charset="0"/>
+                          <a:cs typeface="Segoe UI" pitchFamily="34" charset="0"/>
+                        </a:rPr>
+                        <a:t>rango</a:t>
+                      </a:r>
+                      <a:endParaRPr lang="en-GB" sz="1000" i="0" dirty="0">
+                        <a:solidFill>
+                          <a:srgbClr val="000000"/>
+                        </a:solidFill>
+                        <a:latin typeface="Segoe UI" pitchFamily="34" charset="0"/>
+                        <a:cs typeface="Segoe UI" pitchFamily="34" charset="0"/>
+                      </a:endParaRPr>
+                    </a:p>
+                    <a:p>
+                      <a:pPr marL="0" marR="0" indent="0" algn="l" defTabSz="584200" rtl="0" eaLnBrk="1" fontAlgn="auto" latinLnBrk="0" hangingPunct="1">
+                        <a:lnSpc>
+                          <a:spcPct val="100000"/>
+                        </a:lnSpc>
+                        <a:spcBef>
+                          <a:spcPts val="0"/>
+                        </a:spcBef>
+                        <a:spcAft>
+                          <a:spcPts val="0"/>
+                        </a:spcAft>
+                        <a:buClrTx/>
+                        <a:buSzTx/>
+                        <a:buFontTx/>
+                        <a:buNone/>
+                        <a:tabLst/>
+                        <a:defRPr/>
+                      </a:pPr>
+                      <a:r>
+                        <a:rPr lang="en-GB" sz="1000" i="0" dirty="0">
+                          <a:solidFill>
+                            <a:srgbClr val="000000"/>
+                          </a:solidFill>
+                          <a:latin typeface="Segoe UI" pitchFamily="34" charset="0"/>
+                          <a:cs typeface="Segoe UI" pitchFamily="34" charset="0"/>
+                        </a:rPr>
+                        <a:t> - - - - index.html</a:t>
                       </a:r>
                     </a:p>
                   </a:txBody>
@@ -6362,13 +6466,13 @@
           <p:nvPr>
             <p:extLst>
               <p:ext uri="{D42A27DB-BD31-4B8C-83A1-F6EECF244321}">
-                <p14:modId xmlns:p14="http://schemas.microsoft.com/office/powerpoint/2010/main" val="414516467"/>
+                <p14:modId xmlns:p14="http://schemas.microsoft.com/office/powerpoint/2010/main" val="4212848574"/>
               </p:ext>
             </p:extLst>
           </p:nvPr>
         </p:nvGraphicFramePr>
         <p:xfrm>
-          <a:off x="6561167" y="4808045"/>
+          <a:off x="4026247" y="4328168"/>
           <a:ext cx="3962053" cy="1239600"/>
         </p:xfrm>
         <a:graphic>
@@ -6401,7 +6505,7 @@
                           <a:latin typeface="Segoe UI" pitchFamily="34" charset="0"/>
                           <a:cs typeface="Segoe UI" pitchFamily="34" charset="0"/>
                         </a:rPr>
-                        <a:t>1. Set up app view</a:t>
+                        <a:t>1A. Set up app view</a:t>
                       </a:r>
                     </a:p>
                   </a:txBody>
@@ -6892,13 +6996,13 @@
           <p:nvPr>
             <p:extLst>
               <p:ext uri="{D42A27DB-BD31-4B8C-83A1-F6EECF244321}">
-                <p14:modId xmlns:p14="http://schemas.microsoft.com/office/powerpoint/2010/main" val="1726444452"/>
+                <p14:modId xmlns:p14="http://schemas.microsoft.com/office/powerpoint/2010/main" val="3543906862"/>
               </p:ext>
             </p:extLst>
           </p:nvPr>
         </p:nvGraphicFramePr>
         <p:xfrm>
-          <a:off x="6561165" y="6202661"/>
+          <a:off x="4026245" y="5722784"/>
           <a:ext cx="3962053" cy="1696800"/>
         </p:xfrm>
         <a:graphic>
@@ -7559,14 +7663,14 @@
           <p:nvPr>
             <p:extLst>
               <p:ext uri="{D42A27DB-BD31-4B8C-83A1-F6EECF244321}">
-                <p14:modId xmlns:p14="http://schemas.microsoft.com/office/powerpoint/2010/main" val="2728281873"/>
+                <p14:modId xmlns:p14="http://schemas.microsoft.com/office/powerpoint/2010/main" val="4206051542"/>
               </p:ext>
             </p:extLst>
           </p:nvPr>
         </p:nvGraphicFramePr>
         <p:xfrm>
-          <a:off x="6561165" y="8054477"/>
-          <a:ext cx="3962053" cy="391200"/>
+          <a:off x="4026245" y="9395939"/>
+          <a:ext cx="8993069" cy="391200"/>
         </p:xfrm>
         <a:graphic>
           <a:graphicData uri="http://schemas.openxmlformats.org/drawingml/2006/table">
@@ -7575,7 +7679,7 @@
                 <a:tableStyleId>{5940675A-B579-460E-94D1-54222C63F5DA}</a:tableStyleId>
               </a:tblPr>
               <a:tblGrid>
-                <a:gridCol w="3962053">
+                <a:gridCol w="8993069">
                   <a:extLst>
                     <a:ext uri="{9D8B030D-6E8A-4147-A177-3AD203B41FA5}">
                       <a16:colId xmlns:a16="http://schemas.microsoft.com/office/drawing/2014/main" val="20000"/>
@@ -7598,7 +7702,7 @@
                           <a:latin typeface="Segoe UI" pitchFamily="34" charset="0"/>
                           <a:cs typeface="Segoe UI" pitchFamily="34" charset="0"/>
                         </a:rPr>
-                        <a:t>3. Run server</a:t>
+                        <a:t>Run server</a:t>
                       </a:r>
                     </a:p>
                   </a:txBody>
@@ -7741,6 +7845,1782 @@
                 <a:extLst>
                   <a:ext uri="{0D108BD9-81ED-4DB2-BD59-A6C34878D82A}">
                     <a16:rowId xmlns:a16="http://schemas.microsoft.com/office/drawing/2014/main" val="694626626"/>
+                  </a:ext>
+                </a:extLst>
+              </a:tr>
+            </a:tbl>
+          </a:graphicData>
+        </a:graphic>
+      </p:graphicFrame>
+      <p:graphicFrame>
+        <p:nvGraphicFramePr>
+          <p:cNvPr id="16" name="Table 15">
+            <a:extLst>
+              <a:ext uri="{FF2B5EF4-FFF2-40B4-BE49-F238E27FC236}">
+                <a16:creationId xmlns:a16="http://schemas.microsoft.com/office/drawing/2014/main" id="{C8A98EF0-E742-4CF5-9ECA-543E2A443E53}"/>
+              </a:ext>
+            </a:extLst>
+          </p:cNvPr>
+          <p:cNvGraphicFramePr>
+            <a:graphicFrameLocks noGrp="1"/>
+          </p:cNvGraphicFramePr>
+          <p:nvPr>
+            <p:extLst>
+              <p:ext uri="{D42A27DB-BD31-4B8C-83A1-F6EECF244321}">
+                <p14:modId xmlns:p14="http://schemas.microsoft.com/office/powerpoint/2010/main" val="4210577233"/>
+              </p:ext>
+            </p:extLst>
+          </p:nvPr>
+        </p:nvGraphicFramePr>
+        <p:xfrm>
+          <a:off x="8133427" y="4328168"/>
+          <a:ext cx="4885887" cy="1544400"/>
+        </p:xfrm>
+        <a:graphic>
+          <a:graphicData uri="http://schemas.openxmlformats.org/drawingml/2006/table">
+            <a:tbl>
+              <a:tblPr firstRow="1" bandRow="1">
+                <a:tableStyleId>{5940675A-B579-460E-94D1-54222C63F5DA}</a:tableStyleId>
+              </a:tblPr>
+              <a:tblGrid>
+                <a:gridCol w="4885887">
+                  <a:extLst>
+                    <a:ext uri="{9D8B030D-6E8A-4147-A177-3AD203B41FA5}">
+                      <a16:colId xmlns:a16="http://schemas.microsoft.com/office/drawing/2014/main" val="20000"/>
+                    </a:ext>
+                  </a:extLst>
+                </a:gridCol>
+              </a:tblGrid>
+              <a:tr h="0">
+                <a:tc>
+                  <a:txBody>
+                    <a:bodyPr/>
+                    <a:lstStyle/>
+                    <a:p>
+                      <a:pPr algn="l"/>
+                      <a:r>
+                        <a:rPr lang="en-GB" sz="1000" b="1" baseline="0" dirty="0">
+                          <a:solidFill>
+                            <a:srgbClr val="000000"/>
+                          </a:solidFill>
+                          <a:latin typeface="Segoe UI" pitchFamily="34" charset="0"/>
+                          <a:cs typeface="Segoe UI" pitchFamily="34" charset="0"/>
+                        </a:rPr>
+                        <a:t>1B. Set up app view</a:t>
+                      </a:r>
+                    </a:p>
+                  </a:txBody>
+                  <a:tcPr marL="46800" marR="46800" marT="21600" marB="21600">
+                    <a:lnL w="12700" cap="flat" cmpd="sng" algn="ctr">
+                      <a:solidFill>
+                        <a:schemeClr val="tx1"/>
+                      </a:solidFill>
+                      <a:prstDash val="solid"/>
+                      <a:round/>
+                      <a:headEnd type="none" w="med" len="med"/>
+                      <a:tailEnd type="none" w="med" len="med"/>
+                    </a:lnL>
+                    <a:lnR w="12700" cap="flat" cmpd="sng" algn="ctr">
+                      <a:solidFill>
+                        <a:schemeClr val="tx1"/>
+                      </a:solidFill>
+                      <a:prstDash val="solid"/>
+                      <a:round/>
+                      <a:headEnd type="none" w="med" len="med"/>
+                      <a:tailEnd type="none" w="med" len="med"/>
+                    </a:lnR>
+                    <a:lnT w="12700" cap="flat" cmpd="sng" algn="ctr">
+                      <a:solidFill>
+                        <a:schemeClr val="tx1"/>
+                      </a:solidFill>
+                      <a:prstDash val="solid"/>
+                      <a:round/>
+                      <a:headEnd type="none" w="med" len="med"/>
+                      <a:tailEnd type="none" w="med" len="med"/>
+                    </a:lnT>
+                    <a:lnB w="6350" cap="flat" cmpd="sng" algn="ctr">
+                      <a:noFill/>
+                      <a:prstDash val="solid"/>
+                      <a:round/>
+                      <a:headEnd type="none" w="med" len="med"/>
+                      <a:tailEnd type="none" w="med" len="med"/>
+                    </a:lnB>
+                    <a:lnTlToBr w="12700" cmpd="sng">
+                      <a:noFill/>
+                      <a:prstDash val="solid"/>
+                    </a:lnTlToBr>
+                    <a:lnBlToTr w="12700" cmpd="sng">
+                      <a:noFill/>
+                      <a:prstDash val="solid"/>
+                    </a:lnBlToTr>
+                  </a:tcPr>
+                </a:tc>
+                <a:extLst>
+                  <a:ext uri="{0D108BD9-81ED-4DB2-BD59-A6C34878D82A}">
+                    <a16:rowId xmlns:a16="http://schemas.microsoft.com/office/drawing/2014/main" val="10000"/>
+                  </a:ext>
+                </a:extLst>
+              </a:tr>
+              <a:tr h="0">
+                <a:tc>
+                  <a:txBody>
+                    <a:bodyPr/>
+                    <a:lstStyle/>
+                    <a:p>
+                      <a:pPr marL="0" marR="0" indent="0" algn="l" defTabSz="584200" rtl="0" eaLnBrk="1" fontAlgn="auto" latinLnBrk="0" hangingPunct="1">
+                        <a:lnSpc>
+                          <a:spcPct val="100000"/>
+                        </a:lnSpc>
+                        <a:spcBef>
+                          <a:spcPts val="0"/>
+                        </a:spcBef>
+                        <a:spcAft>
+                          <a:spcPts val="0"/>
+                        </a:spcAft>
+                        <a:buClrTx/>
+                        <a:buSzTx/>
+                        <a:buFontTx/>
+                        <a:buNone/>
+                        <a:tabLst/>
+                        <a:defRPr/>
+                      </a:pPr>
+                      <a:r>
+                        <a:rPr lang="en-GB" sz="1000" i="1" u="none" dirty="0">
+                          <a:solidFill>
+                            <a:srgbClr val="000000"/>
+                          </a:solidFill>
+                          <a:latin typeface="Segoe UI" pitchFamily="34" charset="0"/>
+                          <a:cs typeface="Segoe UI" pitchFamily="34" charset="0"/>
+                        </a:rPr>
+                        <a:t>tango_with_django/rango/views.py</a:t>
+                      </a:r>
+                    </a:p>
+                  </a:txBody>
+                  <a:tcPr marL="46800" marR="46800" marT="21600" marB="21600">
+                    <a:lnL w="12700" cap="flat" cmpd="sng" algn="ctr">
+                      <a:solidFill>
+                        <a:schemeClr val="tx1"/>
+                      </a:solidFill>
+                      <a:prstDash val="solid"/>
+                      <a:round/>
+                      <a:headEnd type="none" w="med" len="med"/>
+                      <a:tailEnd type="none" w="med" len="med"/>
+                    </a:lnL>
+                    <a:lnR w="12700" cap="flat" cmpd="sng" algn="ctr">
+                      <a:solidFill>
+                        <a:schemeClr val="tx1"/>
+                      </a:solidFill>
+                      <a:prstDash val="solid"/>
+                      <a:round/>
+                      <a:headEnd type="none" w="med" len="med"/>
+                      <a:tailEnd type="none" w="med" len="med"/>
+                    </a:lnR>
+                    <a:lnT w="6350" cap="flat" cmpd="sng" algn="ctr">
+                      <a:noFill/>
+                      <a:prstDash val="solid"/>
+                      <a:round/>
+                      <a:headEnd type="none" w="med" len="med"/>
+                      <a:tailEnd type="none" w="med" len="med"/>
+                    </a:lnT>
+                    <a:lnB w="6350" cap="flat" cmpd="sng" algn="ctr">
+                      <a:noFill/>
+                      <a:prstDash val="solid"/>
+                      <a:round/>
+                      <a:headEnd type="none" w="med" len="med"/>
+                      <a:tailEnd type="none" w="med" len="med"/>
+                    </a:lnB>
+                    <a:lnTlToBr w="12700" cmpd="sng">
+                      <a:noFill/>
+                      <a:prstDash val="solid"/>
+                    </a:lnTlToBr>
+                    <a:lnBlToTr w="12700" cmpd="sng">
+                      <a:noFill/>
+                      <a:prstDash val="solid"/>
+                    </a:lnBlToTr>
+                  </a:tcPr>
+                </a:tc>
+                <a:extLst>
+                  <a:ext uri="{0D108BD9-81ED-4DB2-BD59-A6C34878D82A}">
+                    <a16:rowId xmlns:a16="http://schemas.microsoft.com/office/drawing/2014/main" val="694626626"/>
+                  </a:ext>
+                </a:extLst>
+              </a:tr>
+              <a:tr h="0">
+                <a:tc>
+                  <a:txBody>
+                    <a:bodyPr/>
+                    <a:lstStyle/>
+                    <a:p>
+                      <a:pPr marL="0" marR="0" indent="0" algn="l" defTabSz="584200" rtl="0" eaLnBrk="1" fontAlgn="auto" latinLnBrk="0" hangingPunct="1">
+                        <a:lnSpc>
+                          <a:spcPct val="100000"/>
+                        </a:lnSpc>
+                        <a:spcBef>
+                          <a:spcPts val="0"/>
+                        </a:spcBef>
+                        <a:spcAft>
+                          <a:spcPts val="0"/>
+                        </a:spcAft>
+                        <a:buClrTx/>
+                        <a:buSzTx/>
+                        <a:buFontTx/>
+                        <a:buNone/>
+                        <a:tabLst/>
+                        <a:defRPr/>
+                      </a:pPr>
+                      <a:endParaRPr lang="en-GB" sz="1000" i="0" baseline="0" dirty="0">
+                        <a:solidFill>
+                          <a:srgbClr val="000000"/>
+                        </a:solidFill>
+                        <a:latin typeface="Consolas" panose="020B0609020204030204" pitchFamily="49" charset="0"/>
+                        <a:cs typeface="Segoe UI" pitchFamily="34" charset="0"/>
+                      </a:endParaRPr>
+                    </a:p>
+                  </a:txBody>
+                  <a:tcPr marL="46800" marR="46800" marT="21600" marB="21600">
+                    <a:lnL w="12700" cap="flat" cmpd="sng" algn="ctr">
+                      <a:solidFill>
+                        <a:schemeClr val="tx1"/>
+                      </a:solidFill>
+                      <a:prstDash val="solid"/>
+                      <a:round/>
+                      <a:headEnd type="none" w="med" len="med"/>
+                      <a:tailEnd type="none" w="med" len="med"/>
+                    </a:lnL>
+                    <a:lnR w="12700" cap="flat" cmpd="sng" algn="ctr">
+                      <a:solidFill>
+                        <a:schemeClr val="tx1"/>
+                      </a:solidFill>
+                      <a:prstDash val="solid"/>
+                      <a:round/>
+                      <a:headEnd type="none" w="med" len="med"/>
+                      <a:tailEnd type="none" w="med" len="med"/>
+                    </a:lnR>
+                    <a:lnT w="6350" cap="flat" cmpd="sng" algn="ctr">
+                      <a:noFill/>
+                      <a:prstDash val="solid"/>
+                      <a:round/>
+                      <a:headEnd type="none" w="med" len="med"/>
+                      <a:tailEnd type="none" w="med" len="med"/>
+                    </a:lnT>
+                    <a:lnB w="6350" cap="flat" cmpd="sng" algn="ctr">
+                      <a:noFill/>
+                      <a:prstDash val="solid"/>
+                      <a:round/>
+                      <a:headEnd type="none" w="med" len="med"/>
+                      <a:tailEnd type="none" w="med" len="med"/>
+                    </a:lnB>
+                    <a:lnTlToBr w="12700" cmpd="sng">
+                      <a:noFill/>
+                      <a:prstDash val="solid"/>
+                    </a:lnTlToBr>
+                    <a:lnBlToTr w="12700" cmpd="sng">
+                      <a:noFill/>
+                      <a:prstDash val="solid"/>
+                    </a:lnBlToTr>
+                  </a:tcPr>
+                </a:tc>
+                <a:extLst>
+                  <a:ext uri="{0D108BD9-81ED-4DB2-BD59-A6C34878D82A}">
+                    <a16:rowId xmlns:a16="http://schemas.microsoft.com/office/drawing/2014/main" val="3003448997"/>
+                  </a:ext>
+                </a:extLst>
+              </a:tr>
+              <a:tr h="0">
+                <a:tc>
+                  <a:txBody>
+                    <a:bodyPr/>
+                    <a:lstStyle/>
+                    <a:p>
+                      <a:pPr marL="0" marR="0" indent="0" algn="l" defTabSz="584200" rtl="0" eaLnBrk="1" fontAlgn="auto" latinLnBrk="0" hangingPunct="1">
+                        <a:lnSpc>
+                          <a:spcPct val="100000"/>
+                        </a:lnSpc>
+                        <a:spcBef>
+                          <a:spcPts val="0"/>
+                        </a:spcBef>
+                        <a:spcAft>
+                          <a:spcPts val="0"/>
+                        </a:spcAft>
+                        <a:buClrTx/>
+                        <a:buSzTx/>
+                        <a:buFontTx/>
+                        <a:buNone/>
+                        <a:tabLst/>
+                        <a:defRPr/>
+                      </a:pPr>
+                      <a:r>
+                        <a:rPr lang="en-US" sz="1000" i="0" baseline="0" dirty="0">
+                          <a:solidFill>
+                            <a:srgbClr val="000000"/>
+                          </a:solidFill>
+                          <a:latin typeface="Consolas" panose="020B0609020204030204" pitchFamily="49" charset="0"/>
+                          <a:cs typeface="Segoe UI" pitchFamily="34" charset="0"/>
+                        </a:rPr>
+                        <a:t>from </a:t>
+                      </a:r>
+                      <a:r>
+                        <a:rPr lang="en-US" sz="1000" i="0" baseline="0" dirty="0" err="1">
+                          <a:solidFill>
+                            <a:srgbClr val="000000"/>
+                          </a:solidFill>
+                          <a:latin typeface="Consolas" panose="020B0609020204030204" pitchFamily="49" charset="0"/>
+                          <a:cs typeface="Segoe UI" pitchFamily="34" charset="0"/>
+                        </a:rPr>
+                        <a:t>django.http</a:t>
+                      </a:r>
+                      <a:r>
+                        <a:rPr lang="en-US" sz="1000" i="0" baseline="0" dirty="0">
+                          <a:solidFill>
+                            <a:srgbClr val="000000"/>
+                          </a:solidFill>
+                          <a:latin typeface="Consolas" panose="020B0609020204030204" pitchFamily="49" charset="0"/>
+                          <a:cs typeface="Segoe UI" pitchFamily="34" charset="0"/>
+                        </a:rPr>
+                        <a:t> import </a:t>
+                      </a:r>
+                      <a:r>
+                        <a:rPr lang="en-US" sz="1000" i="0" baseline="0" dirty="0" err="1">
+                          <a:solidFill>
+                            <a:srgbClr val="000000"/>
+                          </a:solidFill>
+                          <a:latin typeface="Consolas" panose="020B0609020204030204" pitchFamily="49" charset="0"/>
+                          <a:cs typeface="Segoe UI" pitchFamily="34" charset="0"/>
+                        </a:rPr>
+                        <a:t>HttpResponse</a:t>
+                      </a:r>
+                      <a:endParaRPr lang="en-US" sz="1000" i="0" baseline="0" dirty="0">
+                        <a:solidFill>
+                          <a:srgbClr val="000000"/>
+                        </a:solidFill>
+                        <a:latin typeface="Consolas" panose="020B0609020204030204" pitchFamily="49" charset="0"/>
+                        <a:cs typeface="Segoe UI" pitchFamily="34" charset="0"/>
+                      </a:endParaRPr>
+                    </a:p>
+                    <a:p>
+                      <a:pPr marL="0" marR="0" lvl="0" indent="0" algn="l" defTabSz="584200" rtl="0" eaLnBrk="1" fontAlgn="auto" latinLnBrk="0" hangingPunct="1">
+                        <a:lnSpc>
+                          <a:spcPct val="100000"/>
+                        </a:lnSpc>
+                        <a:spcBef>
+                          <a:spcPts val="0"/>
+                        </a:spcBef>
+                        <a:spcAft>
+                          <a:spcPts val="0"/>
+                        </a:spcAft>
+                        <a:buClrTx/>
+                        <a:buSzTx/>
+                        <a:buFontTx/>
+                        <a:buNone/>
+                        <a:tabLst/>
+                        <a:defRPr/>
+                      </a:pPr>
+                      <a:r>
+                        <a:rPr lang="en-US" sz="1000" i="0" baseline="0" dirty="0">
+                          <a:solidFill>
+                            <a:srgbClr val="000000"/>
+                          </a:solidFill>
+                          <a:latin typeface="Consolas" panose="020B0609020204030204" pitchFamily="49" charset="0"/>
+                          <a:cs typeface="Segoe UI" pitchFamily="34" charset="0"/>
+                        </a:rPr>
+                        <a:t>from </a:t>
+                      </a:r>
+                      <a:r>
+                        <a:rPr lang="en-US" sz="1000" i="0" baseline="0" dirty="0" err="1">
+                          <a:solidFill>
+                            <a:srgbClr val="000000"/>
+                          </a:solidFill>
+                          <a:latin typeface="Consolas" panose="020B0609020204030204" pitchFamily="49" charset="0"/>
+                          <a:cs typeface="Segoe UI" pitchFamily="34" charset="0"/>
+                        </a:rPr>
+                        <a:t>django.shortcuts</a:t>
+                      </a:r>
+                      <a:r>
+                        <a:rPr lang="en-US" sz="1000" i="0" baseline="0" dirty="0">
+                          <a:solidFill>
+                            <a:srgbClr val="000000"/>
+                          </a:solidFill>
+                          <a:latin typeface="Consolas" panose="020B0609020204030204" pitchFamily="49" charset="0"/>
+                          <a:cs typeface="Segoe UI" pitchFamily="34" charset="0"/>
+                        </a:rPr>
+                        <a:t> import render</a:t>
+                      </a:r>
+                    </a:p>
+                    <a:p>
+                      <a:pPr marL="0" marR="0" indent="0" algn="l" defTabSz="584200" rtl="0" eaLnBrk="1" fontAlgn="auto" latinLnBrk="0" hangingPunct="1">
+                        <a:lnSpc>
+                          <a:spcPct val="100000"/>
+                        </a:lnSpc>
+                        <a:spcBef>
+                          <a:spcPts val="0"/>
+                        </a:spcBef>
+                        <a:spcAft>
+                          <a:spcPts val="0"/>
+                        </a:spcAft>
+                        <a:buClrTx/>
+                        <a:buSzTx/>
+                        <a:buFontTx/>
+                        <a:buNone/>
+                        <a:tabLst/>
+                        <a:defRPr/>
+                      </a:pPr>
+                      <a:endParaRPr lang="en-US" sz="1000" i="0" baseline="0" dirty="0">
+                        <a:solidFill>
+                          <a:srgbClr val="000000"/>
+                        </a:solidFill>
+                        <a:latin typeface="Consolas" panose="020B0609020204030204" pitchFamily="49" charset="0"/>
+                        <a:cs typeface="Segoe UI" pitchFamily="34" charset="0"/>
+                      </a:endParaRPr>
+                    </a:p>
+                    <a:p>
+                      <a:pPr marL="0" marR="0" indent="0" algn="l" defTabSz="584200" rtl="0" eaLnBrk="1" fontAlgn="auto" latinLnBrk="0" hangingPunct="1">
+                        <a:lnSpc>
+                          <a:spcPct val="100000"/>
+                        </a:lnSpc>
+                        <a:spcBef>
+                          <a:spcPts val="0"/>
+                        </a:spcBef>
+                        <a:spcAft>
+                          <a:spcPts val="0"/>
+                        </a:spcAft>
+                        <a:buClrTx/>
+                        <a:buSzTx/>
+                        <a:buFontTx/>
+                        <a:buNone/>
+                        <a:tabLst/>
+                        <a:defRPr/>
+                      </a:pPr>
+                      <a:r>
+                        <a:rPr lang="en-US" sz="1000" i="0" baseline="0" dirty="0">
+                          <a:solidFill>
+                            <a:srgbClr val="000000"/>
+                          </a:solidFill>
+                          <a:latin typeface="Consolas" panose="020B0609020204030204" pitchFamily="49" charset="0"/>
+                          <a:cs typeface="Segoe UI" pitchFamily="34" charset="0"/>
+                        </a:rPr>
+                        <a:t>def index(request):</a:t>
+                      </a:r>
+                    </a:p>
+                    <a:p>
+                      <a:pPr marL="0" marR="0" indent="0" algn="l" defTabSz="584200" rtl="0" eaLnBrk="1" fontAlgn="auto" latinLnBrk="0" hangingPunct="1">
+                        <a:lnSpc>
+                          <a:spcPct val="100000"/>
+                        </a:lnSpc>
+                        <a:spcBef>
+                          <a:spcPts val="0"/>
+                        </a:spcBef>
+                        <a:spcAft>
+                          <a:spcPts val="0"/>
+                        </a:spcAft>
+                        <a:buClrTx/>
+                        <a:buSzTx/>
+                        <a:buFontTx/>
+                        <a:buNone/>
+                        <a:tabLst/>
+                        <a:defRPr/>
+                      </a:pPr>
+                      <a:r>
+                        <a:rPr lang="en-US" sz="1000" i="0" baseline="0" dirty="0">
+                          <a:solidFill>
+                            <a:srgbClr val="000000"/>
+                          </a:solidFill>
+                          <a:latin typeface="Consolas" panose="020B0609020204030204" pitchFamily="49" charset="0"/>
+                          <a:cs typeface="Segoe UI" pitchFamily="34" charset="0"/>
+                        </a:rPr>
+                        <a:t>    </a:t>
+                      </a:r>
+                      <a:r>
+                        <a:rPr lang="en-US" sz="1000" i="0" baseline="0" dirty="0" err="1">
+                          <a:solidFill>
+                            <a:srgbClr val="000000"/>
+                          </a:solidFill>
+                          <a:latin typeface="Consolas" panose="020B0609020204030204" pitchFamily="49" charset="0"/>
+                          <a:cs typeface="Segoe UI" pitchFamily="34" charset="0"/>
+                        </a:rPr>
+                        <a:t>context_dict</a:t>
+                      </a:r>
+                      <a:r>
+                        <a:rPr lang="en-US" sz="1000" i="0" baseline="0" dirty="0">
+                          <a:solidFill>
+                            <a:srgbClr val="000000"/>
+                          </a:solidFill>
+                          <a:latin typeface="Consolas" panose="020B0609020204030204" pitchFamily="49" charset="0"/>
+                          <a:cs typeface="Segoe UI" pitchFamily="34" charset="0"/>
+                        </a:rPr>
+                        <a:t> = {'</a:t>
+                      </a:r>
+                      <a:r>
+                        <a:rPr lang="en-US" sz="1000" i="0" baseline="0" dirty="0" err="1">
+                          <a:solidFill>
+                            <a:srgbClr val="000000"/>
+                          </a:solidFill>
+                          <a:latin typeface="Consolas" panose="020B0609020204030204" pitchFamily="49" charset="0"/>
+                          <a:cs typeface="Segoe UI" pitchFamily="34" charset="0"/>
+                        </a:rPr>
+                        <a:t>boldmessage</a:t>
+                      </a:r>
+                      <a:r>
+                        <a:rPr lang="en-US" sz="1000" i="0" baseline="0" dirty="0">
+                          <a:solidFill>
+                            <a:srgbClr val="000000"/>
+                          </a:solidFill>
+                          <a:latin typeface="Consolas" panose="020B0609020204030204" pitchFamily="49" charset="0"/>
+                          <a:cs typeface="Segoe UI" pitchFamily="34" charset="0"/>
+                        </a:rPr>
+                        <a:t>': "I am bold"}</a:t>
+                      </a:r>
+                    </a:p>
+                    <a:p>
+                      <a:pPr marL="0" marR="0" indent="0" algn="l" defTabSz="584200" rtl="0" eaLnBrk="1" fontAlgn="auto" latinLnBrk="0" hangingPunct="1">
+                        <a:lnSpc>
+                          <a:spcPct val="100000"/>
+                        </a:lnSpc>
+                        <a:spcBef>
+                          <a:spcPts val="0"/>
+                        </a:spcBef>
+                        <a:spcAft>
+                          <a:spcPts val="0"/>
+                        </a:spcAft>
+                        <a:buClrTx/>
+                        <a:buSzTx/>
+                        <a:buFontTx/>
+                        <a:buNone/>
+                        <a:tabLst/>
+                        <a:defRPr/>
+                      </a:pPr>
+                      <a:r>
+                        <a:rPr lang="en-US" sz="1000" i="0" baseline="0" dirty="0">
+                          <a:solidFill>
+                            <a:srgbClr val="000000"/>
+                          </a:solidFill>
+                          <a:latin typeface="Consolas" panose="020B0609020204030204" pitchFamily="49" charset="0"/>
+                          <a:cs typeface="Segoe UI" pitchFamily="34" charset="0"/>
+                        </a:rPr>
+                        <a:t>    return render(request, '</a:t>
+                      </a:r>
+                      <a:r>
+                        <a:rPr lang="en-US" sz="1000" i="0" baseline="0" dirty="0" err="1">
+                          <a:solidFill>
+                            <a:srgbClr val="000000"/>
+                          </a:solidFill>
+                          <a:latin typeface="Consolas" panose="020B0609020204030204" pitchFamily="49" charset="0"/>
+                          <a:cs typeface="Segoe UI" pitchFamily="34" charset="0"/>
+                        </a:rPr>
+                        <a:t>rango</a:t>
+                      </a:r>
+                      <a:r>
+                        <a:rPr lang="en-US" sz="1000" i="0" baseline="0" dirty="0">
+                          <a:solidFill>
+                            <a:srgbClr val="000000"/>
+                          </a:solidFill>
+                          <a:latin typeface="Consolas" panose="020B0609020204030204" pitchFamily="49" charset="0"/>
+                          <a:cs typeface="Segoe UI" pitchFamily="34" charset="0"/>
+                        </a:rPr>
+                        <a:t>/index.html', </a:t>
+                      </a:r>
+                      <a:r>
+                        <a:rPr lang="en-US" sz="1000" i="0" baseline="0" dirty="0" err="1">
+                          <a:solidFill>
+                            <a:srgbClr val="000000"/>
+                          </a:solidFill>
+                          <a:latin typeface="Consolas" panose="020B0609020204030204" pitchFamily="49" charset="0"/>
+                          <a:cs typeface="Segoe UI" pitchFamily="34" charset="0"/>
+                        </a:rPr>
+                        <a:t>context_dict</a:t>
+                      </a:r>
+                      <a:r>
+                        <a:rPr lang="en-US" sz="1000" i="0" baseline="0" dirty="0">
+                          <a:solidFill>
+                            <a:srgbClr val="000000"/>
+                          </a:solidFill>
+                          <a:latin typeface="Consolas" panose="020B0609020204030204" pitchFamily="49" charset="0"/>
+                          <a:cs typeface="Segoe UI" pitchFamily="34" charset="0"/>
+                        </a:rPr>
+                        <a:t>)</a:t>
+                      </a:r>
+                      <a:endParaRPr lang="en-GB" sz="1000" i="0" baseline="0" dirty="0">
+                        <a:solidFill>
+                          <a:srgbClr val="000000"/>
+                        </a:solidFill>
+                        <a:latin typeface="Consolas" panose="020B0609020204030204" pitchFamily="49" charset="0"/>
+                        <a:cs typeface="Segoe UI" pitchFamily="34" charset="0"/>
+                      </a:endParaRPr>
+                    </a:p>
+                  </a:txBody>
+                  <a:tcPr marL="46800" marR="46800" marT="21600" marB="21600">
+                    <a:lnL w="12700" cap="flat" cmpd="sng" algn="ctr">
+                      <a:solidFill>
+                        <a:schemeClr val="tx1"/>
+                      </a:solidFill>
+                      <a:prstDash val="solid"/>
+                      <a:round/>
+                      <a:headEnd type="none" w="med" len="med"/>
+                      <a:tailEnd type="none" w="med" len="med"/>
+                    </a:lnL>
+                    <a:lnR w="12700" cap="flat" cmpd="sng" algn="ctr">
+                      <a:solidFill>
+                        <a:schemeClr val="tx1"/>
+                      </a:solidFill>
+                      <a:prstDash val="solid"/>
+                      <a:round/>
+                      <a:headEnd type="none" w="med" len="med"/>
+                      <a:tailEnd type="none" w="med" len="med"/>
+                    </a:lnR>
+                    <a:lnT w="6350" cap="flat" cmpd="sng" algn="ctr">
+                      <a:noFill/>
+                      <a:prstDash val="solid"/>
+                      <a:round/>
+                      <a:headEnd type="none" w="med" len="med"/>
+                      <a:tailEnd type="none" w="med" len="med"/>
+                    </a:lnT>
+                    <a:lnB w="6350" cap="flat" cmpd="sng" algn="ctr">
+                      <a:noFill/>
+                      <a:prstDash val="solid"/>
+                      <a:round/>
+                      <a:headEnd type="none" w="med" len="med"/>
+                      <a:tailEnd type="none" w="med" len="med"/>
+                    </a:lnB>
+                    <a:lnTlToBr w="12700" cmpd="sng">
+                      <a:noFill/>
+                      <a:prstDash val="solid"/>
+                    </a:lnTlToBr>
+                    <a:lnBlToTr w="12700" cmpd="sng">
+                      <a:noFill/>
+                      <a:prstDash val="solid"/>
+                    </a:lnBlToTr>
+                  </a:tcPr>
+                </a:tc>
+                <a:extLst>
+                  <a:ext uri="{0D108BD9-81ED-4DB2-BD59-A6C34878D82A}">
+                    <a16:rowId xmlns:a16="http://schemas.microsoft.com/office/drawing/2014/main" val="3983574495"/>
+                  </a:ext>
+                </a:extLst>
+              </a:tr>
+            </a:tbl>
+          </a:graphicData>
+        </a:graphic>
+      </p:graphicFrame>
+      <p:graphicFrame>
+        <p:nvGraphicFramePr>
+          <p:cNvPr id="17" name="Table 16">
+            <a:extLst>
+              <a:ext uri="{FF2B5EF4-FFF2-40B4-BE49-F238E27FC236}">
+                <a16:creationId xmlns:a16="http://schemas.microsoft.com/office/drawing/2014/main" id="{979F5E75-905B-4CEF-BFA5-A760E30852B5}"/>
+              </a:ext>
+            </a:extLst>
+          </p:cNvPr>
+          <p:cNvGraphicFramePr>
+            <a:graphicFrameLocks noGrp="1"/>
+          </p:cNvGraphicFramePr>
+          <p:nvPr>
+            <p:extLst>
+              <p:ext uri="{D42A27DB-BD31-4B8C-83A1-F6EECF244321}">
+                <p14:modId xmlns:p14="http://schemas.microsoft.com/office/powerpoint/2010/main" val="1136040688"/>
+              </p:ext>
+            </p:extLst>
+          </p:nvPr>
+        </p:nvGraphicFramePr>
+        <p:xfrm>
+          <a:off x="8133427" y="6017425"/>
+          <a:ext cx="4885887" cy="1696800"/>
+        </p:xfrm>
+        <a:graphic>
+          <a:graphicData uri="http://schemas.openxmlformats.org/drawingml/2006/table">
+            <a:tbl>
+              <a:tblPr firstRow="1" bandRow="1">
+                <a:tableStyleId>{5940675A-B579-460E-94D1-54222C63F5DA}</a:tableStyleId>
+              </a:tblPr>
+              <a:tblGrid>
+                <a:gridCol w="4885887">
+                  <a:extLst>
+                    <a:ext uri="{9D8B030D-6E8A-4147-A177-3AD203B41FA5}">
+                      <a16:colId xmlns:a16="http://schemas.microsoft.com/office/drawing/2014/main" val="20000"/>
+                    </a:ext>
+                  </a:extLst>
+                </a:gridCol>
+              </a:tblGrid>
+              <a:tr h="0">
+                <a:tc>
+                  <a:txBody>
+                    <a:bodyPr/>
+                    <a:lstStyle/>
+                    <a:p>
+                      <a:pPr algn="l"/>
+                      <a:r>
+                        <a:rPr lang="en-GB" sz="1000" b="1" baseline="0" dirty="0">
+                          <a:solidFill>
+                            <a:srgbClr val="000000"/>
+                          </a:solidFill>
+                          <a:latin typeface="Segoe UI" pitchFamily="34" charset="0"/>
+                          <a:cs typeface="Segoe UI" pitchFamily="34" charset="0"/>
+                        </a:rPr>
+                        <a:t>3. Create html template</a:t>
+                      </a:r>
+                    </a:p>
+                  </a:txBody>
+                  <a:tcPr marL="46800" marR="46800" marT="21600" marB="21600">
+                    <a:lnL w="12700" cap="flat" cmpd="sng" algn="ctr">
+                      <a:solidFill>
+                        <a:schemeClr val="tx1"/>
+                      </a:solidFill>
+                      <a:prstDash val="solid"/>
+                      <a:round/>
+                      <a:headEnd type="none" w="med" len="med"/>
+                      <a:tailEnd type="none" w="med" len="med"/>
+                    </a:lnL>
+                    <a:lnR w="12700" cap="flat" cmpd="sng" algn="ctr">
+                      <a:solidFill>
+                        <a:schemeClr val="tx1"/>
+                      </a:solidFill>
+                      <a:prstDash val="solid"/>
+                      <a:round/>
+                      <a:headEnd type="none" w="med" len="med"/>
+                      <a:tailEnd type="none" w="med" len="med"/>
+                    </a:lnR>
+                    <a:lnT w="12700" cap="flat" cmpd="sng" algn="ctr">
+                      <a:solidFill>
+                        <a:schemeClr val="tx1"/>
+                      </a:solidFill>
+                      <a:prstDash val="solid"/>
+                      <a:round/>
+                      <a:headEnd type="none" w="med" len="med"/>
+                      <a:tailEnd type="none" w="med" len="med"/>
+                    </a:lnT>
+                    <a:lnB w="6350" cap="flat" cmpd="sng" algn="ctr">
+                      <a:noFill/>
+                      <a:prstDash val="solid"/>
+                      <a:round/>
+                      <a:headEnd type="none" w="med" len="med"/>
+                      <a:tailEnd type="none" w="med" len="med"/>
+                    </a:lnB>
+                    <a:lnTlToBr w="12700" cmpd="sng">
+                      <a:noFill/>
+                      <a:prstDash val="solid"/>
+                    </a:lnTlToBr>
+                    <a:lnBlToTr w="12700" cmpd="sng">
+                      <a:noFill/>
+                      <a:prstDash val="solid"/>
+                    </a:lnBlToTr>
+                  </a:tcPr>
+                </a:tc>
+                <a:extLst>
+                  <a:ext uri="{0D108BD9-81ED-4DB2-BD59-A6C34878D82A}">
+                    <a16:rowId xmlns:a16="http://schemas.microsoft.com/office/drawing/2014/main" val="10000"/>
+                  </a:ext>
+                </a:extLst>
+              </a:tr>
+              <a:tr h="0">
+                <a:tc>
+                  <a:txBody>
+                    <a:bodyPr/>
+                    <a:lstStyle/>
+                    <a:p>
+                      <a:pPr marL="0" marR="0" indent="0" algn="l" defTabSz="584200" rtl="0" eaLnBrk="1" fontAlgn="auto" latinLnBrk="0" hangingPunct="1">
+                        <a:lnSpc>
+                          <a:spcPct val="100000"/>
+                        </a:lnSpc>
+                        <a:spcBef>
+                          <a:spcPts val="0"/>
+                        </a:spcBef>
+                        <a:spcAft>
+                          <a:spcPts val="0"/>
+                        </a:spcAft>
+                        <a:buClrTx/>
+                        <a:buSzTx/>
+                        <a:buFontTx/>
+                        <a:buNone/>
+                        <a:tabLst/>
+                        <a:defRPr/>
+                      </a:pPr>
+                      <a:r>
+                        <a:rPr lang="en-GB" sz="1000" i="1" u="none" dirty="0">
+                          <a:solidFill>
+                            <a:srgbClr val="000000"/>
+                          </a:solidFill>
+                          <a:latin typeface="Segoe UI" pitchFamily="34" charset="0"/>
+                          <a:cs typeface="Segoe UI" pitchFamily="34" charset="0"/>
+                        </a:rPr>
+                        <a:t>tango_with_django/</a:t>
+                      </a:r>
+                      <a:r>
+                        <a:rPr lang="en-GB" sz="1000" i="1" u="none" dirty="0" err="1">
+                          <a:solidFill>
+                            <a:srgbClr val="000000"/>
+                          </a:solidFill>
+                          <a:latin typeface="Segoe UI" pitchFamily="34" charset="0"/>
+                          <a:cs typeface="Segoe UI" pitchFamily="34" charset="0"/>
+                        </a:rPr>
+                        <a:t>tango_with_django</a:t>
+                      </a:r>
+                      <a:r>
+                        <a:rPr lang="en-GB" sz="1000" i="1" u="none" dirty="0">
+                          <a:solidFill>
+                            <a:srgbClr val="000000"/>
+                          </a:solidFill>
+                          <a:latin typeface="Segoe UI" pitchFamily="34" charset="0"/>
+                          <a:cs typeface="Segoe UI" pitchFamily="34" charset="0"/>
+                        </a:rPr>
+                        <a:t>/templates/</a:t>
+                      </a:r>
+                      <a:r>
+                        <a:rPr lang="en-GB" sz="1000" i="1" u="none" dirty="0" err="1">
+                          <a:solidFill>
+                            <a:srgbClr val="000000"/>
+                          </a:solidFill>
+                          <a:latin typeface="Segoe UI" pitchFamily="34" charset="0"/>
+                          <a:cs typeface="Segoe UI" pitchFamily="34" charset="0"/>
+                        </a:rPr>
+                        <a:t>rango</a:t>
+                      </a:r>
+                      <a:r>
+                        <a:rPr lang="en-GB" sz="1000" i="1" u="none" dirty="0">
+                          <a:solidFill>
+                            <a:srgbClr val="000000"/>
+                          </a:solidFill>
+                          <a:latin typeface="Segoe UI" pitchFamily="34" charset="0"/>
+                          <a:cs typeface="Segoe UI" pitchFamily="34" charset="0"/>
+                        </a:rPr>
+                        <a:t>/index.html</a:t>
+                      </a:r>
+                    </a:p>
+                  </a:txBody>
+                  <a:tcPr marL="46800" marR="46800" marT="21600" marB="21600">
+                    <a:lnL w="12700" cap="flat" cmpd="sng" algn="ctr">
+                      <a:solidFill>
+                        <a:schemeClr val="tx1"/>
+                      </a:solidFill>
+                      <a:prstDash val="solid"/>
+                      <a:round/>
+                      <a:headEnd type="none" w="med" len="med"/>
+                      <a:tailEnd type="none" w="med" len="med"/>
+                    </a:lnL>
+                    <a:lnR w="12700" cap="flat" cmpd="sng" algn="ctr">
+                      <a:solidFill>
+                        <a:schemeClr val="tx1"/>
+                      </a:solidFill>
+                      <a:prstDash val="solid"/>
+                      <a:round/>
+                      <a:headEnd type="none" w="med" len="med"/>
+                      <a:tailEnd type="none" w="med" len="med"/>
+                    </a:lnR>
+                    <a:lnT w="6350" cap="flat" cmpd="sng" algn="ctr">
+                      <a:noFill/>
+                      <a:prstDash val="solid"/>
+                      <a:round/>
+                      <a:headEnd type="none" w="med" len="med"/>
+                      <a:tailEnd type="none" w="med" len="med"/>
+                    </a:lnT>
+                    <a:lnB w="6350" cap="flat" cmpd="sng" algn="ctr">
+                      <a:noFill/>
+                      <a:prstDash val="solid"/>
+                      <a:round/>
+                      <a:headEnd type="none" w="med" len="med"/>
+                      <a:tailEnd type="none" w="med" len="med"/>
+                    </a:lnB>
+                    <a:lnTlToBr w="12700" cmpd="sng">
+                      <a:noFill/>
+                      <a:prstDash val="solid"/>
+                    </a:lnTlToBr>
+                    <a:lnBlToTr w="12700" cmpd="sng">
+                      <a:noFill/>
+                      <a:prstDash val="solid"/>
+                    </a:lnBlToTr>
+                  </a:tcPr>
+                </a:tc>
+                <a:extLst>
+                  <a:ext uri="{0D108BD9-81ED-4DB2-BD59-A6C34878D82A}">
+                    <a16:rowId xmlns:a16="http://schemas.microsoft.com/office/drawing/2014/main" val="694626626"/>
+                  </a:ext>
+                </a:extLst>
+              </a:tr>
+              <a:tr h="0">
+                <a:tc>
+                  <a:txBody>
+                    <a:bodyPr/>
+                    <a:lstStyle/>
+                    <a:p>
+                      <a:pPr marL="0" marR="0" indent="0" algn="l" defTabSz="584200" rtl="0" eaLnBrk="1" fontAlgn="auto" latinLnBrk="0" hangingPunct="1">
+                        <a:lnSpc>
+                          <a:spcPct val="100000"/>
+                        </a:lnSpc>
+                        <a:spcBef>
+                          <a:spcPts val="0"/>
+                        </a:spcBef>
+                        <a:spcAft>
+                          <a:spcPts val="0"/>
+                        </a:spcAft>
+                        <a:buClrTx/>
+                        <a:buSzTx/>
+                        <a:buFontTx/>
+                        <a:buNone/>
+                        <a:tabLst/>
+                        <a:defRPr/>
+                      </a:pPr>
+                      <a:endParaRPr lang="en-GB" sz="1000" i="0" baseline="0" dirty="0">
+                        <a:solidFill>
+                          <a:srgbClr val="000000"/>
+                        </a:solidFill>
+                        <a:latin typeface="Consolas" panose="020B0609020204030204" pitchFamily="49" charset="0"/>
+                        <a:cs typeface="Segoe UI" pitchFamily="34" charset="0"/>
+                      </a:endParaRPr>
+                    </a:p>
+                  </a:txBody>
+                  <a:tcPr marL="46800" marR="46800" marT="21600" marB="21600">
+                    <a:lnL w="12700" cap="flat" cmpd="sng" algn="ctr">
+                      <a:solidFill>
+                        <a:schemeClr val="tx1"/>
+                      </a:solidFill>
+                      <a:prstDash val="solid"/>
+                      <a:round/>
+                      <a:headEnd type="none" w="med" len="med"/>
+                      <a:tailEnd type="none" w="med" len="med"/>
+                    </a:lnL>
+                    <a:lnR w="12700" cap="flat" cmpd="sng" algn="ctr">
+                      <a:solidFill>
+                        <a:schemeClr val="tx1"/>
+                      </a:solidFill>
+                      <a:prstDash val="solid"/>
+                      <a:round/>
+                      <a:headEnd type="none" w="med" len="med"/>
+                      <a:tailEnd type="none" w="med" len="med"/>
+                    </a:lnR>
+                    <a:lnT w="6350" cap="flat" cmpd="sng" algn="ctr">
+                      <a:noFill/>
+                      <a:prstDash val="solid"/>
+                      <a:round/>
+                      <a:headEnd type="none" w="med" len="med"/>
+                      <a:tailEnd type="none" w="med" len="med"/>
+                    </a:lnT>
+                    <a:lnB w="6350" cap="flat" cmpd="sng" algn="ctr">
+                      <a:noFill/>
+                      <a:prstDash val="solid"/>
+                      <a:round/>
+                      <a:headEnd type="none" w="med" len="med"/>
+                      <a:tailEnd type="none" w="med" len="med"/>
+                    </a:lnB>
+                    <a:lnTlToBr w="12700" cmpd="sng">
+                      <a:noFill/>
+                      <a:prstDash val="solid"/>
+                    </a:lnTlToBr>
+                    <a:lnBlToTr w="12700" cmpd="sng">
+                      <a:noFill/>
+                      <a:prstDash val="solid"/>
+                    </a:lnBlToTr>
+                  </a:tcPr>
+                </a:tc>
+                <a:extLst>
+                  <a:ext uri="{0D108BD9-81ED-4DB2-BD59-A6C34878D82A}">
+                    <a16:rowId xmlns:a16="http://schemas.microsoft.com/office/drawing/2014/main" val="1345526979"/>
+                  </a:ext>
+                </a:extLst>
+              </a:tr>
+              <a:tr h="0">
+                <a:tc>
+                  <a:txBody>
+                    <a:bodyPr/>
+                    <a:lstStyle/>
+                    <a:p>
+                      <a:pPr marL="0" marR="0" indent="0" algn="l" defTabSz="584200" rtl="0" eaLnBrk="1" fontAlgn="auto" latinLnBrk="0" hangingPunct="1">
+                        <a:lnSpc>
+                          <a:spcPct val="100000"/>
+                        </a:lnSpc>
+                        <a:spcBef>
+                          <a:spcPts val="0"/>
+                        </a:spcBef>
+                        <a:spcAft>
+                          <a:spcPts val="0"/>
+                        </a:spcAft>
+                        <a:buClrTx/>
+                        <a:buSzTx/>
+                        <a:buFontTx/>
+                        <a:buNone/>
+                        <a:tabLst/>
+                        <a:defRPr/>
+                      </a:pPr>
+                      <a:r>
+                        <a:rPr lang="en-US" sz="1000" i="0" baseline="0" dirty="0">
+                          <a:solidFill>
+                            <a:srgbClr val="000000"/>
+                          </a:solidFill>
+                          <a:latin typeface="Consolas" panose="020B0609020204030204" pitchFamily="49" charset="0"/>
+                          <a:cs typeface="Segoe UI" pitchFamily="34" charset="0"/>
+                        </a:rPr>
+                        <a:t>&lt;!DOCTYPE html&gt;</a:t>
+                      </a:r>
+                    </a:p>
+                    <a:p>
+                      <a:pPr marL="0" marR="0" indent="0" algn="l" defTabSz="584200" rtl="0" eaLnBrk="1" fontAlgn="auto" latinLnBrk="0" hangingPunct="1">
+                        <a:lnSpc>
+                          <a:spcPct val="100000"/>
+                        </a:lnSpc>
+                        <a:spcBef>
+                          <a:spcPts val="0"/>
+                        </a:spcBef>
+                        <a:spcAft>
+                          <a:spcPts val="0"/>
+                        </a:spcAft>
+                        <a:buClrTx/>
+                        <a:buSzTx/>
+                        <a:buFontTx/>
+                        <a:buNone/>
+                        <a:tabLst/>
+                        <a:defRPr/>
+                      </a:pPr>
+                      <a:r>
+                        <a:rPr lang="en-US" sz="1000" i="0" baseline="0" dirty="0">
+                          <a:solidFill>
+                            <a:srgbClr val="000000"/>
+                          </a:solidFill>
+                          <a:latin typeface="Consolas" panose="020B0609020204030204" pitchFamily="49" charset="0"/>
+                          <a:cs typeface="Segoe UI" pitchFamily="34" charset="0"/>
+                        </a:rPr>
+                        <a:t>&lt;html&gt;</a:t>
+                      </a:r>
+                    </a:p>
+                    <a:p>
+                      <a:pPr marL="0" marR="0" indent="0" algn="l" defTabSz="584200" rtl="0" eaLnBrk="1" fontAlgn="auto" latinLnBrk="0" hangingPunct="1">
+                        <a:lnSpc>
+                          <a:spcPct val="100000"/>
+                        </a:lnSpc>
+                        <a:spcBef>
+                          <a:spcPts val="0"/>
+                        </a:spcBef>
+                        <a:spcAft>
+                          <a:spcPts val="0"/>
+                        </a:spcAft>
+                        <a:buClrTx/>
+                        <a:buSzTx/>
+                        <a:buFontTx/>
+                        <a:buNone/>
+                        <a:tabLst/>
+                        <a:defRPr/>
+                      </a:pPr>
+                      <a:r>
+                        <a:rPr lang="en-US" sz="1000" i="0" baseline="0" dirty="0">
+                          <a:solidFill>
+                            <a:srgbClr val="000000"/>
+                          </a:solidFill>
+                          <a:latin typeface="Consolas" panose="020B0609020204030204" pitchFamily="49" charset="0"/>
+                          <a:cs typeface="Segoe UI" pitchFamily="34" charset="0"/>
+                        </a:rPr>
+                        <a:t>    &lt;head&gt;...&lt;/head&gt;</a:t>
+                      </a:r>
+                    </a:p>
+                    <a:p>
+                      <a:pPr marL="0" marR="0" indent="0" algn="l" defTabSz="584200" rtl="0" eaLnBrk="1" fontAlgn="auto" latinLnBrk="0" hangingPunct="1">
+                        <a:lnSpc>
+                          <a:spcPct val="100000"/>
+                        </a:lnSpc>
+                        <a:spcBef>
+                          <a:spcPts val="0"/>
+                        </a:spcBef>
+                        <a:spcAft>
+                          <a:spcPts val="0"/>
+                        </a:spcAft>
+                        <a:buClrTx/>
+                        <a:buSzTx/>
+                        <a:buFontTx/>
+                        <a:buNone/>
+                        <a:tabLst/>
+                        <a:defRPr/>
+                      </a:pPr>
+                      <a:r>
+                        <a:rPr lang="en-US" sz="1000" i="0" baseline="0" dirty="0">
+                          <a:solidFill>
+                            <a:srgbClr val="000000"/>
+                          </a:solidFill>
+                          <a:latin typeface="Consolas" panose="020B0609020204030204" pitchFamily="49" charset="0"/>
+                          <a:cs typeface="Segoe UI" pitchFamily="34" charset="0"/>
+                        </a:rPr>
+                        <a:t>    &lt;body&gt;</a:t>
+                      </a:r>
+                    </a:p>
+                    <a:p>
+                      <a:pPr marL="0" marR="0" indent="0" algn="l" defTabSz="584200" rtl="0" eaLnBrk="1" fontAlgn="auto" latinLnBrk="0" hangingPunct="1">
+                        <a:lnSpc>
+                          <a:spcPct val="100000"/>
+                        </a:lnSpc>
+                        <a:spcBef>
+                          <a:spcPts val="0"/>
+                        </a:spcBef>
+                        <a:spcAft>
+                          <a:spcPts val="0"/>
+                        </a:spcAft>
+                        <a:buClrTx/>
+                        <a:buSzTx/>
+                        <a:buFontTx/>
+                        <a:buNone/>
+                        <a:tabLst/>
+                        <a:defRPr/>
+                      </a:pPr>
+                      <a:r>
+                        <a:rPr lang="en-US" sz="1000" i="0" baseline="0" dirty="0">
+                          <a:solidFill>
+                            <a:srgbClr val="000000"/>
+                          </a:solidFill>
+                          <a:latin typeface="Consolas" panose="020B0609020204030204" pitchFamily="49" charset="0"/>
+                          <a:cs typeface="Segoe UI" pitchFamily="34" charset="0"/>
+                        </a:rPr>
+                        <a:t>        &lt;p&gt;Hello {{ </a:t>
+                      </a:r>
+                      <a:r>
+                        <a:rPr lang="en-US" sz="1000" i="0" baseline="0" dirty="0" err="1">
+                          <a:solidFill>
+                            <a:srgbClr val="000000"/>
+                          </a:solidFill>
+                          <a:latin typeface="Consolas" panose="020B0609020204030204" pitchFamily="49" charset="0"/>
+                          <a:cs typeface="Segoe UI" pitchFamily="34" charset="0"/>
+                        </a:rPr>
+                        <a:t>boldmessage</a:t>
+                      </a:r>
+                      <a:r>
+                        <a:rPr lang="en-US" sz="1000" i="0" baseline="0" dirty="0">
+                          <a:solidFill>
+                            <a:srgbClr val="000000"/>
+                          </a:solidFill>
+                          <a:latin typeface="Consolas" panose="020B0609020204030204" pitchFamily="49" charset="0"/>
+                          <a:cs typeface="Segoe UI" pitchFamily="34" charset="0"/>
+                        </a:rPr>
+                        <a:t> }}&lt;/p&gt;</a:t>
+                      </a:r>
+                    </a:p>
+                    <a:p>
+                      <a:pPr marL="0" marR="0" indent="0" algn="l" defTabSz="584200" rtl="0" eaLnBrk="1" fontAlgn="auto" latinLnBrk="0" hangingPunct="1">
+                        <a:lnSpc>
+                          <a:spcPct val="100000"/>
+                        </a:lnSpc>
+                        <a:spcBef>
+                          <a:spcPts val="0"/>
+                        </a:spcBef>
+                        <a:spcAft>
+                          <a:spcPts val="0"/>
+                        </a:spcAft>
+                        <a:buClrTx/>
+                        <a:buSzTx/>
+                        <a:buFontTx/>
+                        <a:buNone/>
+                        <a:tabLst/>
+                        <a:defRPr/>
+                      </a:pPr>
+                      <a:r>
+                        <a:rPr lang="en-US" sz="1000" i="0" baseline="0" dirty="0">
+                          <a:solidFill>
+                            <a:srgbClr val="000000"/>
+                          </a:solidFill>
+                          <a:latin typeface="Consolas" panose="020B0609020204030204" pitchFamily="49" charset="0"/>
+                          <a:cs typeface="Segoe UI" pitchFamily="34" charset="0"/>
+                        </a:rPr>
+                        <a:t>    &lt;/body&gt;</a:t>
+                      </a:r>
+                    </a:p>
+                    <a:p>
+                      <a:pPr marL="0" marR="0" indent="0" algn="l" defTabSz="584200" rtl="0" eaLnBrk="1" fontAlgn="auto" latinLnBrk="0" hangingPunct="1">
+                        <a:lnSpc>
+                          <a:spcPct val="100000"/>
+                        </a:lnSpc>
+                        <a:spcBef>
+                          <a:spcPts val="0"/>
+                        </a:spcBef>
+                        <a:spcAft>
+                          <a:spcPts val="0"/>
+                        </a:spcAft>
+                        <a:buClrTx/>
+                        <a:buSzTx/>
+                        <a:buFontTx/>
+                        <a:buNone/>
+                        <a:tabLst/>
+                        <a:defRPr/>
+                      </a:pPr>
+                      <a:r>
+                        <a:rPr lang="en-US" sz="1000" i="0" baseline="0" dirty="0">
+                          <a:solidFill>
+                            <a:srgbClr val="000000"/>
+                          </a:solidFill>
+                          <a:latin typeface="Consolas" panose="020B0609020204030204" pitchFamily="49" charset="0"/>
+                          <a:cs typeface="Segoe UI" pitchFamily="34" charset="0"/>
+                        </a:rPr>
+                        <a:t>&lt;/html&gt;</a:t>
+                      </a:r>
+                      <a:endParaRPr lang="en-GB" sz="1000" i="0" baseline="0" dirty="0">
+                        <a:solidFill>
+                          <a:srgbClr val="000000"/>
+                        </a:solidFill>
+                        <a:latin typeface="Consolas" panose="020B0609020204030204" pitchFamily="49" charset="0"/>
+                        <a:cs typeface="Segoe UI" pitchFamily="34" charset="0"/>
+                      </a:endParaRPr>
+                    </a:p>
+                  </a:txBody>
+                  <a:tcPr marL="46800" marR="46800" marT="21600" marB="21600">
+                    <a:lnL w="12700" cap="flat" cmpd="sng" algn="ctr">
+                      <a:solidFill>
+                        <a:schemeClr val="tx1"/>
+                      </a:solidFill>
+                      <a:prstDash val="solid"/>
+                      <a:round/>
+                      <a:headEnd type="none" w="med" len="med"/>
+                      <a:tailEnd type="none" w="med" len="med"/>
+                    </a:lnL>
+                    <a:lnR w="12700" cap="flat" cmpd="sng" algn="ctr">
+                      <a:solidFill>
+                        <a:schemeClr val="tx1"/>
+                      </a:solidFill>
+                      <a:prstDash val="solid"/>
+                      <a:round/>
+                      <a:headEnd type="none" w="med" len="med"/>
+                      <a:tailEnd type="none" w="med" len="med"/>
+                    </a:lnR>
+                    <a:lnT w="6350" cap="flat" cmpd="sng" algn="ctr">
+                      <a:noFill/>
+                      <a:prstDash val="solid"/>
+                      <a:round/>
+                      <a:headEnd type="none" w="med" len="med"/>
+                      <a:tailEnd type="none" w="med" len="med"/>
+                    </a:lnT>
+                    <a:lnB w="6350" cap="flat" cmpd="sng" algn="ctr">
+                      <a:noFill/>
+                      <a:prstDash val="solid"/>
+                      <a:round/>
+                      <a:headEnd type="none" w="med" len="med"/>
+                      <a:tailEnd type="none" w="med" len="med"/>
+                    </a:lnB>
+                    <a:lnTlToBr w="12700" cmpd="sng">
+                      <a:noFill/>
+                      <a:prstDash val="solid"/>
+                    </a:lnTlToBr>
+                    <a:lnBlToTr w="12700" cmpd="sng">
+                      <a:noFill/>
+                      <a:prstDash val="solid"/>
+                    </a:lnBlToTr>
+                  </a:tcPr>
+                </a:tc>
+                <a:extLst>
+                  <a:ext uri="{0D108BD9-81ED-4DB2-BD59-A6C34878D82A}">
+                    <a16:rowId xmlns:a16="http://schemas.microsoft.com/office/drawing/2014/main" val="3983574495"/>
+                  </a:ext>
+                </a:extLst>
+              </a:tr>
+            </a:tbl>
+          </a:graphicData>
+        </a:graphic>
+      </p:graphicFrame>
+      <p:graphicFrame>
+        <p:nvGraphicFramePr>
+          <p:cNvPr id="18" name="Table 17">
+            <a:extLst>
+              <a:ext uri="{FF2B5EF4-FFF2-40B4-BE49-F238E27FC236}">
+                <a16:creationId xmlns:a16="http://schemas.microsoft.com/office/drawing/2014/main" id="{B1F39DB2-410F-411B-8B8D-B69DEDC949C4}"/>
+              </a:ext>
+            </a:extLst>
+          </p:cNvPr>
+          <p:cNvGraphicFramePr>
+            <a:graphicFrameLocks noGrp="1"/>
+          </p:cNvGraphicFramePr>
+          <p:nvPr>
+            <p:extLst>
+              <p:ext uri="{D42A27DB-BD31-4B8C-83A1-F6EECF244321}">
+                <p14:modId xmlns:p14="http://schemas.microsoft.com/office/powerpoint/2010/main" val="3998806888"/>
+              </p:ext>
+            </p:extLst>
+          </p:nvPr>
+        </p:nvGraphicFramePr>
+        <p:xfrm>
+          <a:off x="8133427" y="7859082"/>
+          <a:ext cx="4885887" cy="1392000"/>
+        </p:xfrm>
+        <a:graphic>
+          <a:graphicData uri="http://schemas.openxmlformats.org/drawingml/2006/table">
+            <a:tbl>
+              <a:tblPr firstRow="1" bandRow="1">
+                <a:tableStyleId>{5940675A-B579-460E-94D1-54222C63F5DA}</a:tableStyleId>
+              </a:tblPr>
+              <a:tblGrid>
+                <a:gridCol w="4885887">
+                  <a:extLst>
+                    <a:ext uri="{9D8B030D-6E8A-4147-A177-3AD203B41FA5}">
+                      <a16:colId xmlns:a16="http://schemas.microsoft.com/office/drawing/2014/main" val="20000"/>
+                    </a:ext>
+                  </a:extLst>
+                </a:gridCol>
+              </a:tblGrid>
+              <a:tr h="0">
+                <a:tc>
+                  <a:txBody>
+                    <a:bodyPr/>
+                    <a:lstStyle/>
+                    <a:p>
+                      <a:pPr algn="l"/>
+                      <a:r>
+                        <a:rPr lang="en-GB" sz="1000" b="1" baseline="0" dirty="0">
+                          <a:solidFill>
+                            <a:srgbClr val="000000"/>
+                          </a:solidFill>
+                          <a:latin typeface="Segoe UI" pitchFamily="34" charset="0"/>
+                          <a:cs typeface="Segoe UI" pitchFamily="34" charset="0"/>
+                        </a:rPr>
+                        <a:t>4. Create html template</a:t>
+                      </a:r>
+                    </a:p>
+                  </a:txBody>
+                  <a:tcPr marL="46800" marR="46800" marT="21600" marB="21600">
+                    <a:lnL w="12700" cap="flat" cmpd="sng" algn="ctr">
+                      <a:solidFill>
+                        <a:schemeClr val="tx1"/>
+                      </a:solidFill>
+                      <a:prstDash val="solid"/>
+                      <a:round/>
+                      <a:headEnd type="none" w="med" len="med"/>
+                      <a:tailEnd type="none" w="med" len="med"/>
+                    </a:lnL>
+                    <a:lnR w="12700" cap="flat" cmpd="sng" algn="ctr">
+                      <a:solidFill>
+                        <a:schemeClr val="tx1"/>
+                      </a:solidFill>
+                      <a:prstDash val="solid"/>
+                      <a:round/>
+                      <a:headEnd type="none" w="med" len="med"/>
+                      <a:tailEnd type="none" w="med" len="med"/>
+                    </a:lnR>
+                    <a:lnT w="12700" cap="flat" cmpd="sng" algn="ctr">
+                      <a:solidFill>
+                        <a:schemeClr val="tx1"/>
+                      </a:solidFill>
+                      <a:prstDash val="solid"/>
+                      <a:round/>
+                      <a:headEnd type="none" w="med" len="med"/>
+                      <a:tailEnd type="none" w="med" len="med"/>
+                    </a:lnT>
+                    <a:lnB w="6350" cap="flat" cmpd="sng" algn="ctr">
+                      <a:noFill/>
+                      <a:prstDash val="solid"/>
+                      <a:round/>
+                      <a:headEnd type="none" w="med" len="med"/>
+                      <a:tailEnd type="none" w="med" len="med"/>
+                    </a:lnB>
+                    <a:lnTlToBr w="12700" cmpd="sng">
+                      <a:noFill/>
+                      <a:prstDash val="solid"/>
+                    </a:lnTlToBr>
+                    <a:lnBlToTr w="12700" cmpd="sng">
+                      <a:noFill/>
+                      <a:prstDash val="solid"/>
+                    </a:lnBlToTr>
+                  </a:tcPr>
+                </a:tc>
+                <a:extLst>
+                  <a:ext uri="{0D108BD9-81ED-4DB2-BD59-A6C34878D82A}">
+                    <a16:rowId xmlns:a16="http://schemas.microsoft.com/office/drawing/2014/main" val="10000"/>
+                  </a:ext>
+                </a:extLst>
+              </a:tr>
+              <a:tr h="0">
+                <a:tc>
+                  <a:txBody>
+                    <a:bodyPr/>
+                    <a:lstStyle/>
+                    <a:p>
+                      <a:pPr marL="0" marR="0" indent="0" algn="l" defTabSz="584200" rtl="0" eaLnBrk="1" fontAlgn="auto" latinLnBrk="0" hangingPunct="1">
+                        <a:lnSpc>
+                          <a:spcPct val="100000"/>
+                        </a:lnSpc>
+                        <a:spcBef>
+                          <a:spcPts val="0"/>
+                        </a:spcBef>
+                        <a:spcAft>
+                          <a:spcPts val="0"/>
+                        </a:spcAft>
+                        <a:buClrTx/>
+                        <a:buSzTx/>
+                        <a:buFontTx/>
+                        <a:buNone/>
+                        <a:tabLst/>
+                        <a:defRPr/>
+                      </a:pPr>
+                      <a:r>
+                        <a:rPr lang="en-GB" sz="1000" i="1" u="none" dirty="0">
+                          <a:solidFill>
+                            <a:srgbClr val="000000"/>
+                          </a:solidFill>
+                          <a:latin typeface="Segoe UI" pitchFamily="34" charset="0"/>
+                          <a:cs typeface="Segoe UI" pitchFamily="34" charset="0"/>
+                        </a:rPr>
+                        <a:t>tango_with_django/tango_with_django/settings.py</a:t>
+                      </a:r>
+                    </a:p>
+                  </a:txBody>
+                  <a:tcPr marL="46800" marR="46800" marT="21600" marB="21600">
+                    <a:lnL w="12700" cap="flat" cmpd="sng" algn="ctr">
+                      <a:solidFill>
+                        <a:schemeClr val="tx1"/>
+                      </a:solidFill>
+                      <a:prstDash val="solid"/>
+                      <a:round/>
+                      <a:headEnd type="none" w="med" len="med"/>
+                      <a:tailEnd type="none" w="med" len="med"/>
+                    </a:lnL>
+                    <a:lnR w="12700" cap="flat" cmpd="sng" algn="ctr">
+                      <a:solidFill>
+                        <a:schemeClr val="tx1"/>
+                      </a:solidFill>
+                      <a:prstDash val="solid"/>
+                      <a:round/>
+                      <a:headEnd type="none" w="med" len="med"/>
+                      <a:tailEnd type="none" w="med" len="med"/>
+                    </a:lnR>
+                    <a:lnT w="6350" cap="flat" cmpd="sng" algn="ctr">
+                      <a:noFill/>
+                      <a:prstDash val="solid"/>
+                      <a:round/>
+                      <a:headEnd type="none" w="med" len="med"/>
+                      <a:tailEnd type="none" w="med" len="med"/>
+                    </a:lnT>
+                    <a:lnB w="6350" cap="flat" cmpd="sng" algn="ctr">
+                      <a:noFill/>
+                      <a:prstDash val="solid"/>
+                      <a:round/>
+                      <a:headEnd type="none" w="med" len="med"/>
+                      <a:tailEnd type="none" w="med" len="med"/>
+                    </a:lnB>
+                    <a:lnTlToBr w="12700" cmpd="sng">
+                      <a:noFill/>
+                      <a:prstDash val="solid"/>
+                    </a:lnTlToBr>
+                    <a:lnBlToTr w="12700" cmpd="sng">
+                      <a:noFill/>
+                      <a:prstDash val="solid"/>
+                    </a:lnBlToTr>
+                  </a:tcPr>
+                </a:tc>
+                <a:extLst>
+                  <a:ext uri="{0D108BD9-81ED-4DB2-BD59-A6C34878D82A}">
+                    <a16:rowId xmlns:a16="http://schemas.microsoft.com/office/drawing/2014/main" val="694626626"/>
+                  </a:ext>
+                </a:extLst>
+              </a:tr>
+              <a:tr h="0">
+                <a:tc>
+                  <a:txBody>
+                    <a:bodyPr/>
+                    <a:lstStyle/>
+                    <a:p>
+                      <a:pPr marL="0" marR="0" indent="0" algn="l" defTabSz="584200" rtl="0" eaLnBrk="1" fontAlgn="auto" latinLnBrk="0" hangingPunct="1">
+                        <a:lnSpc>
+                          <a:spcPct val="100000"/>
+                        </a:lnSpc>
+                        <a:spcBef>
+                          <a:spcPts val="0"/>
+                        </a:spcBef>
+                        <a:spcAft>
+                          <a:spcPts val="0"/>
+                        </a:spcAft>
+                        <a:buClrTx/>
+                        <a:buSzTx/>
+                        <a:buFontTx/>
+                        <a:buNone/>
+                        <a:tabLst/>
+                        <a:defRPr/>
+                      </a:pPr>
+                      <a:endParaRPr lang="en-GB" sz="1000" i="0" baseline="0" dirty="0">
+                        <a:solidFill>
+                          <a:srgbClr val="000000"/>
+                        </a:solidFill>
+                        <a:latin typeface="Consolas" panose="020B0609020204030204" pitchFamily="49" charset="0"/>
+                        <a:cs typeface="Segoe UI" pitchFamily="34" charset="0"/>
+                      </a:endParaRPr>
+                    </a:p>
+                  </a:txBody>
+                  <a:tcPr marL="46800" marR="46800" marT="21600" marB="21600">
+                    <a:lnL w="12700" cap="flat" cmpd="sng" algn="ctr">
+                      <a:solidFill>
+                        <a:schemeClr val="tx1"/>
+                      </a:solidFill>
+                      <a:prstDash val="solid"/>
+                      <a:round/>
+                      <a:headEnd type="none" w="med" len="med"/>
+                      <a:tailEnd type="none" w="med" len="med"/>
+                    </a:lnL>
+                    <a:lnR w="12700" cap="flat" cmpd="sng" algn="ctr">
+                      <a:solidFill>
+                        <a:schemeClr val="tx1"/>
+                      </a:solidFill>
+                      <a:prstDash val="solid"/>
+                      <a:round/>
+                      <a:headEnd type="none" w="med" len="med"/>
+                      <a:tailEnd type="none" w="med" len="med"/>
+                    </a:lnR>
+                    <a:lnT w="6350" cap="flat" cmpd="sng" algn="ctr">
+                      <a:noFill/>
+                      <a:prstDash val="solid"/>
+                      <a:round/>
+                      <a:headEnd type="none" w="med" len="med"/>
+                      <a:tailEnd type="none" w="med" len="med"/>
+                    </a:lnT>
+                    <a:lnB w="6350" cap="flat" cmpd="sng" algn="ctr">
+                      <a:noFill/>
+                      <a:prstDash val="solid"/>
+                      <a:round/>
+                      <a:headEnd type="none" w="med" len="med"/>
+                      <a:tailEnd type="none" w="med" len="med"/>
+                    </a:lnB>
+                    <a:lnTlToBr w="12700" cmpd="sng">
+                      <a:noFill/>
+                      <a:prstDash val="solid"/>
+                    </a:lnTlToBr>
+                    <a:lnBlToTr w="12700" cmpd="sng">
+                      <a:noFill/>
+                      <a:prstDash val="solid"/>
+                    </a:lnBlToTr>
+                  </a:tcPr>
+                </a:tc>
+                <a:extLst>
+                  <a:ext uri="{0D108BD9-81ED-4DB2-BD59-A6C34878D82A}">
+                    <a16:rowId xmlns:a16="http://schemas.microsoft.com/office/drawing/2014/main" val="1345526979"/>
+                  </a:ext>
+                </a:extLst>
+              </a:tr>
+              <a:tr h="0">
+                <a:tc>
+                  <a:txBody>
+                    <a:bodyPr/>
+                    <a:lstStyle/>
+                    <a:p>
+                      <a:pPr marL="0" marR="0" indent="0" algn="l" defTabSz="584200" rtl="0" eaLnBrk="1" fontAlgn="auto" latinLnBrk="0" hangingPunct="1">
+                        <a:lnSpc>
+                          <a:spcPct val="100000"/>
+                        </a:lnSpc>
+                        <a:spcBef>
+                          <a:spcPts val="0"/>
+                        </a:spcBef>
+                        <a:spcAft>
+                          <a:spcPts val="0"/>
+                        </a:spcAft>
+                        <a:buClrTx/>
+                        <a:buSzTx/>
+                        <a:buFontTx/>
+                        <a:buNone/>
+                        <a:tabLst/>
+                        <a:defRPr/>
+                      </a:pPr>
+                      <a:r>
+                        <a:rPr lang="en-US" sz="1000" i="0" baseline="0" dirty="0">
+                          <a:solidFill>
+                            <a:srgbClr val="000000"/>
+                          </a:solidFill>
+                          <a:latin typeface="Consolas" panose="020B0609020204030204" pitchFamily="49" charset="0"/>
+                          <a:cs typeface="Segoe UI" pitchFamily="34" charset="0"/>
+                        </a:rPr>
+                        <a:t>TEMPLATES = [{</a:t>
+                      </a:r>
+                    </a:p>
+                    <a:p>
+                      <a:pPr marL="0" marR="0" indent="0" algn="l" defTabSz="584200" rtl="0" eaLnBrk="1" fontAlgn="auto" latinLnBrk="0" hangingPunct="1">
+                        <a:lnSpc>
+                          <a:spcPct val="100000"/>
+                        </a:lnSpc>
+                        <a:spcBef>
+                          <a:spcPts val="0"/>
+                        </a:spcBef>
+                        <a:spcAft>
+                          <a:spcPts val="0"/>
+                        </a:spcAft>
+                        <a:buClrTx/>
+                        <a:buSzTx/>
+                        <a:buFontTx/>
+                        <a:buNone/>
+                        <a:tabLst/>
+                        <a:defRPr/>
+                      </a:pPr>
+                      <a:r>
+                        <a:rPr lang="en-US" sz="1000" i="0" baseline="0" dirty="0">
+                          <a:solidFill>
+                            <a:srgbClr val="000000"/>
+                          </a:solidFill>
+                          <a:latin typeface="Consolas" panose="020B0609020204030204" pitchFamily="49" charset="0"/>
+                          <a:cs typeface="Segoe UI" pitchFamily="34" charset="0"/>
+                        </a:rPr>
+                        <a:t>    ...</a:t>
+                      </a:r>
+                    </a:p>
+                    <a:p>
+                      <a:pPr marL="0" marR="0" indent="0" algn="l" defTabSz="584200" rtl="0" eaLnBrk="1" fontAlgn="auto" latinLnBrk="0" hangingPunct="1">
+                        <a:lnSpc>
+                          <a:spcPct val="100000"/>
+                        </a:lnSpc>
+                        <a:spcBef>
+                          <a:spcPts val="0"/>
+                        </a:spcBef>
+                        <a:spcAft>
+                          <a:spcPts val="0"/>
+                        </a:spcAft>
+                        <a:buClrTx/>
+                        <a:buSzTx/>
+                        <a:buFontTx/>
+                        <a:buNone/>
+                        <a:tabLst/>
+                        <a:defRPr/>
+                      </a:pPr>
+                      <a:r>
+                        <a:rPr lang="en-US" sz="1000" i="0" baseline="0" dirty="0">
+                          <a:solidFill>
+                            <a:srgbClr val="000000"/>
+                          </a:solidFill>
+                          <a:latin typeface="Consolas" panose="020B0609020204030204" pitchFamily="49" charset="0"/>
+                          <a:cs typeface="Segoe UI" pitchFamily="34" charset="0"/>
+                        </a:rPr>
+                        <a:t>    ‘DIRS’: [</a:t>
+                      </a:r>
+                      <a:r>
+                        <a:rPr lang="en-US" sz="1000" i="0" baseline="0" dirty="0" err="1">
+                          <a:solidFill>
+                            <a:srgbClr val="000000"/>
+                          </a:solidFill>
+                          <a:latin typeface="Consolas" panose="020B0609020204030204" pitchFamily="49" charset="0"/>
+                          <a:cs typeface="Segoe UI" pitchFamily="34" charset="0"/>
+                        </a:rPr>
+                        <a:t>os.path.join</a:t>
+                      </a:r>
+                      <a:r>
+                        <a:rPr lang="en-US" sz="1000" i="0" baseline="0" dirty="0">
+                          <a:solidFill>
+                            <a:srgbClr val="000000"/>
+                          </a:solidFill>
+                          <a:latin typeface="Consolas" panose="020B0609020204030204" pitchFamily="49" charset="0"/>
+                          <a:cs typeface="Segoe UI" pitchFamily="34" charset="0"/>
+                        </a:rPr>
+                        <a:t>(BASE_DIR, '</a:t>
+                      </a:r>
+                      <a:r>
+                        <a:rPr lang="en-US" sz="1000" i="0" baseline="0" dirty="0" err="1">
+                          <a:solidFill>
+                            <a:srgbClr val="000000"/>
+                          </a:solidFill>
+                          <a:latin typeface="Consolas" panose="020B0609020204030204" pitchFamily="49" charset="0"/>
+                          <a:cs typeface="Segoe UI" pitchFamily="34" charset="0"/>
+                        </a:rPr>
+                        <a:t>tango_with_django</a:t>
+                      </a:r>
+                      <a:r>
+                        <a:rPr lang="en-US" sz="1000" i="0" baseline="0" dirty="0">
+                          <a:solidFill>
+                            <a:srgbClr val="000000"/>
+                          </a:solidFill>
+                          <a:latin typeface="Consolas" panose="020B0609020204030204" pitchFamily="49" charset="0"/>
+                          <a:cs typeface="Segoe UI" pitchFamily="34" charset="0"/>
+                        </a:rPr>
+                        <a:t>/templates’)],</a:t>
+                      </a:r>
+                    </a:p>
+                    <a:p>
+                      <a:pPr marL="0" marR="0" indent="0" algn="l" defTabSz="584200" rtl="0" eaLnBrk="1" fontAlgn="auto" latinLnBrk="0" hangingPunct="1">
+                        <a:lnSpc>
+                          <a:spcPct val="100000"/>
+                        </a:lnSpc>
+                        <a:spcBef>
+                          <a:spcPts val="0"/>
+                        </a:spcBef>
+                        <a:spcAft>
+                          <a:spcPts val="0"/>
+                        </a:spcAft>
+                        <a:buClrTx/>
+                        <a:buSzTx/>
+                        <a:buFontTx/>
+                        <a:buNone/>
+                        <a:tabLst/>
+                        <a:defRPr/>
+                      </a:pPr>
+                      <a:r>
+                        <a:rPr lang="en-US" sz="1000" i="0" baseline="0" dirty="0">
+                          <a:solidFill>
+                            <a:srgbClr val="000000"/>
+                          </a:solidFill>
+                          <a:latin typeface="Consolas" panose="020B0609020204030204" pitchFamily="49" charset="0"/>
+                          <a:cs typeface="Segoe UI" pitchFamily="34" charset="0"/>
+                        </a:rPr>
+                        <a:t>    ...</a:t>
+                      </a:r>
+                    </a:p>
+                    <a:p>
+                      <a:pPr marL="0" marR="0" indent="0" algn="l" defTabSz="584200" rtl="0" eaLnBrk="1" fontAlgn="auto" latinLnBrk="0" hangingPunct="1">
+                        <a:lnSpc>
+                          <a:spcPct val="100000"/>
+                        </a:lnSpc>
+                        <a:spcBef>
+                          <a:spcPts val="0"/>
+                        </a:spcBef>
+                        <a:spcAft>
+                          <a:spcPts val="0"/>
+                        </a:spcAft>
+                        <a:buClrTx/>
+                        <a:buSzTx/>
+                        <a:buFontTx/>
+                        <a:buNone/>
+                        <a:tabLst/>
+                        <a:defRPr/>
+                      </a:pPr>
+                      <a:r>
+                        <a:rPr lang="en-US" sz="1000" i="0" baseline="0" dirty="0">
+                          <a:solidFill>
+                            <a:srgbClr val="000000"/>
+                          </a:solidFill>
+                          <a:latin typeface="Consolas" panose="020B0609020204030204" pitchFamily="49" charset="0"/>
+                          <a:cs typeface="Segoe UI" pitchFamily="34" charset="0"/>
+                        </a:rPr>
+                        <a:t>}]</a:t>
+                      </a:r>
+                      <a:endParaRPr lang="en-GB" sz="1000" i="0" baseline="0" dirty="0">
+                        <a:solidFill>
+                          <a:srgbClr val="000000"/>
+                        </a:solidFill>
+                        <a:latin typeface="Consolas" panose="020B0609020204030204" pitchFamily="49" charset="0"/>
+                        <a:cs typeface="Segoe UI" pitchFamily="34" charset="0"/>
+                      </a:endParaRPr>
+                    </a:p>
+                  </a:txBody>
+                  <a:tcPr marL="46800" marR="46800" marT="21600" marB="21600">
+                    <a:lnL w="12700" cap="flat" cmpd="sng" algn="ctr">
+                      <a:solidFill>
+                        <a:schemeClr val="tx1"/>
+                      </a:solidFill>
+                      <a:prstDash val="solid"/>
+                      <a:round/>
+                      <a:headEnd type="none" w="med" len="med"/>
+                      <a:tailEnd type="none" w="med" len="med"/>
+                    </a:lnL>
+                    <a:lnR w="12700" cap="flat" cmpd="sng" algn="ctr">
+                      <a:solidFill>
+                        <a:schemeClr val="tx1"/>
+                      </a:solidFill>
+                      <a:prstDash val="solid"/>
+                      <a:round/>
+                      <a:headEnd type="none" w="med" len="med"/>
+                      <a:tailEnd type="none" w="med" len="med"/>
+                    </a:lnR>
+                    <a:lnT w="6350" cap="flat" cmpd="sng" algn="ctr">
+                      <a:noFill/>
+                      <a:prstDash val="solid"/>
+                      <a:round/>
+                      <a:headEnd type="none" w="med" len="med"/>
+                      <a:tailEnd type="none" w="med" len="med"/>
+                    </a:lnT>
+                    <a:lnB w="6350" cap="flat" cmpd="sng" algn="ctr">
+                      <a:noFill/>
+                      <a:prstDash val="solid"/>
+                      <a:round/>
+                      <a:headEnd type="none" w="med" len="med"/>
+                      <a:tailEnd type="none" w="med" len="med"/>
+                    </a:lnB>
+                    <a:lnTlToBr w="12700" cmpd="sng">
+                      <a:noFill/>
+                      <a:prstDash val="solid"/>
+                    </a:lnTlToBr>
+                    <a:lnBlToTr w="12700" cmpd="sng">
+                      <a:noFill/>
+                      <a:prstDash val="solid"/>
+                    </a:lnBlToTr>
+                  </a:tcPr>
+                </a:tc>
+                <a:extLst>
+                  <a:ext uri="{0D108BD9-81ED-4DB2-BD59-A6C34878D82A}">
+                    <a16:rowId xmlns:a16="http://schemas.microsoft.com/office/drawing/2014/main" val="3983574495"/>
                   </a:ext>
                 </a:extLst>
               </a:tr>

</xml_diff>

<commit_message>
Added how to do css files.
</commit_message>
<xml_diff>
--- a/Django.pptx
+++ b/Django.pptx
@@ -425,7 +425,7 @@
           <a:p>
             <a:fld id="{37C50D7F-5172-434D-9E20-E71FDF806C79}" type="datetimeFigureOut">
               <a:rPr lang="en-GB" smtClean="0"/>
-              <a:t>10/08/2019</a:t>
+              <a:t>11/08/2019</a:t>
             </a:fld>
             <a:endParaRPr lang="en-GB"/>
           </a:p>
@@ -2394,7 +2394,7 @@
           </a:ln>
           <a:extLst>
             <a:ext uri="{C572A759-6A51-4108-AA02-DFA0A04FC94B}">
-              <ma14:wrappingTextBoxFlag xmlns="" xmlns:m="http://schemas.openxmlformats.org/officeDocument/2006/math" xmlns:a14="http://schemas.microsoft.com/office/drawing/2010/main" xmlns:ma14="http://schemas.microsoft.com/office/mac/drawingml/2011/main" val="1"/>
+              <ma14:wrappingTextBoxFlag xmlns:ma14="http://schemas.microsoft.com/office/mac/drawingml/2011/main" xmlns:a14="http://schemas.microsoft.com/office/drawing/2010/main" xmlns:m="http://schemas.openxmlformats.org/officeDocument/2006/math" xmlns="" val="1"/>
             </a:ext>
           </a:extLst>
         </p:spPr>
@@ -2433,7 +2433,7 @@
           </a:ln>
           <a:extLst>
             <a:ext uri="{C572A759-6A51-4108-AA02-DFA0A04FC94B}">
-              <ma14:wrappingTextBoxFlag xmlns="" xmlns:m="http://schemas.openxmlformats.org/officeDocument/2006/math" xmlns:a14="http://schemas.microsoft.com/office/drawing/2010/main" xmlns:ma14="http://schemas.microsoft.com/office/mac/drawingml/2011/main" val="1"/>
+              <ma14:wrappingTextBoxFlag xmlns:ma14="http://schemas.microsoft.com/office/mac/drawingml/2011/main" xmlns:a14="http://schemas.microsoft.com/office/drawing/2010/main" xmlns:m="http://schemas.openxmlformats.org/officeDocument/2006/math" xmlns="" val="1"/>
             </a:ext>
           </a:extLst>
         </p:spPr>
@@ -5510,14 +5510,14 @@
           <p:nvPr>
             <p:extLst>
               <p:ext uri="{D42A27DB-BD31-4B8C-83A1-F6EECF244321}">
-                <p14:modId xmlns:p14="http://schemas.microsoft.com/office/powerpoint/2010/main" val="347182449"/>
+                <p14:modId xmlns:p14="http://schemas.microsoft.com/office/powerpoint/2010/main" val="4159632955"/>
               </p:ext>
             </p:extLst>
           </p:nvPr>
         </p:nvGraphicFramePr>
         <p:xfrm>
           <a:off x="3868767" y="1227219"/>
-          <a:ext cx="3140075" cy="2522400"/>
+          <a:ext cx="3140075" cy="2893200"/>
         </p:xfrm>
         <a:graphic>
           <a:graphicData uri="http://schemas.openxmlformats.org/drawingml/2006/table">
@@ -5937,6 +5937,250 @@
                         <a:t> (app)</a:t>
                       </a:r>
                     </a:p>
+                    <a:p>
+                      <a:pPr marL="0" marR="0" indent="0" algn="l" defTabSz="584200" rtl="0" eaLnBrk="1" fontAlgn="auto" latinLnBrk="0" hangingPunct="1">
+                        <a:lnSpc>
+                          <a:spcPct val="100000"/>
+                        </a:lnSpc>
+                        <a:spcBef>
+                          <a:spcPts val="0"/>
+                        </a:spcBef>
+                        <a:spcAft>
+                          <a:spcPts val="0"/>
+                        </a:spcAft>
+                        <a:buClrTx/>
+                        <a:buSzTx/>
+                        <a:buFontTx/>
+                        <a:buNone/>
+                        <a:tabLst/>
+                        <a:defRPr/>
+                      </a:pPr>
+                      <a:r>
+                        <a:rPr lang="en-GB" sz="1000" i="0" dirty="0">
+                          <a:solidFill>
+                            <a:srgbClr val="000000"/>
+                          </a:solidFill>
+                          <a:latin typeface="Segoe UI" pitchFamily="34" charset="0"/>
+                          <a:cs typeface="Segoe UI" pitchFamily="34" charset="0"/>
+                        </a:rPr>
+                        <a:t> - - </a:t>
+                      </a:r>
+                      <a:r>
+                        <a:rPr lang="en-GB" sz="1000" i="0" dirty="0">
+                          <a:solidFill>
+                            <a:srgbClr val="000000"/>
+                          </a:solidFill>
+                          <a:latin typeface="Segoe UI" pitchFamily="34" charset="0"/>
+                          <a:cs typeface="Segoe UI" pitchFamily="34" charset="0"/>
+                          <a:hlinkClick r:id="rId3"/>
+                        </a:rPr>
+                        <a:t>templates</a:t>
+                      </a:r>
+                      <a:endParaRPr lang="en-GB" sz="1000" i="0" dirty="0">
+                        <a:solidFill>
+                          <a:srgbClr val="000000"/>
+                        </a:solidFill>
+                        <a:latin typeface="Segoe UI" pitchFamily="34" charset="0"/>
+                        <a:cs typeface="Segoe UI" pitchFamily="34" charset="0"/>
+                      </a:endParaRPr>
+                    </a:p>
+                    <a:p>
+                      <a:pPr marL="0" marR="0" indent="0" algn="l" defTabSz="584200" rtl="0" eaLnBrk="1" fontAlgn="auto" latinLnBrk="0" hangingPunct="1">
+                        <a:lnSpc>
+                          <a:spcPct val="100000"/>
+                        </a:lnSpc>
+                        <a:spcBef>
+                          <a:spcPts val="0"/>
+                        </a:spcBef>
+                        <a:spcAft>
+                          <a:spcPts val="0"/>
+                        </a:spcAft>
+                        <a:buClrTx/>
+                        <a:buSzTx/>
+                        <a:buFontTx/>
+                        <a:buNone/>
+                        <a:tabLst/>
+                        <a:defRPr/>
+                      </a:pPr>
+                      <a:r>
+                        <a:rPr lang="en-GB" sz="1000" i="0" dirty="0">
+                          <a:solidFill>
+                            <a:srgbClr val="000000"/>
+                          </a:solidFill>
+                          <a:latin typeface="Segoe UI" pitchFamily="34" charset="0"/>
+                          <a:cs typeface="Segoe UI" pitchFamily="34" charset="0"/>
+                        </a:rPr>
+                        <a:t> - - - </a:t>
+                      </a:r>
+                      <a:r>
+                        <a:rPr lang="en-GB" sz="1000" i="0" dirty="0" err="1">
+                          <a:solidFill>
+                            <a:srgbClr val="000000"/>
+                          </a:solidFill>
+                          <a:latin typeface="Segoe UI" pitchFamily="34" charset="0"/>
+                          <a:cs typeface="Segoe UI" pitchFamily="34" charset="0"/>
+                        </a:rPr>
+                        <a:t>rango</a:t>
+                      </a:r>
+                      <a:endParaRPr lang="en-GB" sz="1000" i="0" dirty="0">
+                        <a:solidFill>
+                          <a:srgbClr val="000000"/>
+                        </a:solidFill>
+                        <a:latin typeface="Segoe UI" pitchFamily="34" charset="0"/>
+                        <a:cs typeface="Segoe UI" pitchFamily="34" charset="0"/>
+                      </a:endParaRPr>
+                    </a:p>
+                    <a:p>
+                      <a:pPr marL="0" marR="0" indent="0" algn="l" defTabSz="584200" rtl="0" eaLnBrk="1" fontAlgn="auto" latinLnBrk="0" hangingPunct="1">
+                        <a:lnSpc>
+                          <a:spcPct val="100000"/>
+                        </a:lnSpc>
+                        <a:spcBef>
+                          <a:spcPts val="0"/>
+                        </a:spcBef>
+                        <a:spcAft>
+                          <a:spcPts val="0"/>
+                        </a:spcAft>
+                        <a:buClrTx/>
+                        <a:buSzTx/>
+                        <a:buFontTx/>
+                        <a:buNone/>
+                        <a:tabLst/>
+                        <a:defRPr/>
+                      </a:pPr>
+                      <a:r>
+                        <a:rPr lang="en-GB" sz="1000" i="0" dirty="0">
+                          <a:solidFill>
+                            <a:srgbClr val="000000"/>
+                          </a:solidFill>
+                          <a:latin typeface="Segoe UI" pitchFamily="34" charset="0"/>
+                          <a:cs typeface="Segoe UI" pitchFamily="34" charset="0"/>
+                        </a:rPr>
+                        <a:t> - - - - index.html</a:t>
+                      </a:r>
+                    </a:p>
+                    <a:p>
+                      <a:pPr marL="0" marR="0" indent="0" algn="l" defTabSz="584200" rtl="0" eaLnBrk="1" fontAlgn="auto" latinLnBrk="0" hangingPunct="1">
+                        <a:lnSpc>
+                          <a:spcPct val="100000"/>
+                        </a:lnSpc>
+                        <a:spcBef>
+                          <a:spcPts val="0"/>
+                        </a:spcBef>
+                        <a:spcAft>
+                          <a:spcPts val="0"/>
+                        </a:spcAft>
+                        <a:buClrTx/>
+                        <a:buSzTx/>
+                        <a:buFontTx/>
+                        <a:buNone/>
+                        <a:tabLst/>
+                        <a:defRPr/>
+                      </a:pPr>
+                      <a:r>
+                        <a:rPr lang="en-GB" sz="1000" i="0" dirty="0">
+                          <a:solidFill>
+                            <a:srgbClr val="000000"/>
+                          </a:solidFill>
+                          <a:latin typeface="Segoe UI" pitchFamily="34" charset="0"/>
+                          <a:cs typeface="Segoe UI" pitchFamily="34" charset="0"/>
+                        </a:rPr>
+                        <a:t> - - </a:t>
+                      </a:r>
+                      <a:r>
+                        <a:rPr lang="en-GB" sz="1000" i="0" dirty="0">
+                          <a:solidFill>
+                            <a:srgbClr val="000000"/>
+                          </a:solidFill>
+                          <a:latin typeface="Segoe UI" pitchFamily="34" charset="0"/>
+                          <a:cs typeface="Segoe UI" pitchFamily="34" charset="0"/>
+                          <a:hlinkClick r:id="rId4"/>
+                        </a:rPr>
+                        <a:t>static</a:t>
+                      </a:r>
+                      <a:endParaRPr lang="en-GB" sz="1000" i="0" dirty="0">
+                        <a:solidFill>
+                          <a:srgbClr val="000000"/>
+                        </a:solidFill>
+                        <a:latin typeface="Segoe UI" pitchFamily="34" charset="0"/>
+                        <a:cs typeface="Segoe UI" pitchFamily="34" charset="0"/>
+                      </a:endParaRPr>
+                    </a:p>
+                    <a:p>
+                      <a:pPr marL="0" marR="0" indent="0" algn="l" defTabSz="584200" rtl="0" eaLnBrk="1" fontAlgn="auto" latinLnBrk="0" hangingPunct="1">
+                        <a:lnSpc>
+                          <a:spcPct val="100000"/>
+                        </a:lnSpc>
+                        <a:spcBef>
+                          <a:spcPts val="0"/>
+                        </a:spcBef>
+                        <a:spcAft>
+                          <a:spcPts val="0"/>
+                        </a:spcAft>
+                        <a:buClrTx/>
+                        <a:buSzTx/>
+                        <a:buFontTx/>
+                        <a:buNone/>
+                        <a:tabLst/>
+                        <a:defRPr/>
+                      </a:pPr>
+                      <a:r>
+                        <a:rPr lang="en-GB" sz="1000" i="0" dirty="0">
+                          <a:solidFill>
+                            <a:srgbClr val="000000"/>
+                          </a:solidFill>
+                          <a:latin typeface="Segoe UI" pitchFamily="34" charset="0"/>
+                          <a:cs typeface="Segoe UI" pitchFamily="34" charset="0"/>
+                        </a:rPr>
+                        <a:t> - - - </a:t>
+                      </a:r>
+                      <a:r>
+                        <a:rPr lang="en-GB" sz="1000" i="0" dirty="0" err="1">
+                          <a:solidFill>
+                            <a:srgbClr val="000000"/>
+                          </a:solidFill>
+                          <a:latin typeface="Segoe UI" pitchFamily="34" charset="0"/>
+                          <a:cs typeface="Segoe UI" pitchFamily="34" charset="0"/>
+                        </a:rPr>
+                        <a:t>rango</a:t>
+                      </a:r>
+                      <a:endParaRPr lang="en-GB" sz="1000" i="0" dirty="0">
+                        <a:solidFill>
+                          <a:srgbClr val="000000"/>
+                        </a:solidFill>
+                        <a:latin typeface="Segoe UI" pitchFamily="34" charset="0"/>
+                        <a:cs typeface="Segoe UI" pitchFamily="34" charset="0"/>
+                      </a:endParaRPr>
+                    </a:p>
+                    <a:p>
+                      <a:pPr marL="0" marR="0" indent="0" algn="l" defTabSz="584200" rtl="0" eaLnBrk="1" fontAlgn="auto" latinLnBrk="0" hangingPunct="1">
+                        <a:lnSpc>
+                          <a:spcPct val="100000"/>
+                        </a:lnSpc>
+                        <a:spcBef>
+                          <a:spcPts val="0"/>
+                        </a:spcBef>
+                        <a:spcAft>
+                          <a:spcPts val="0"/>
+                        </a:spcAft>
+                        <a:buClrTx/>
+                        <a:buSzTx/>
+                        <a:buFontTx/>
+                        <a:buNone/>
+                        <a:tabLst/>
+                        <a:defRPr/>
+                      </a:pPr>
+                      <a:r>
+                        <a:rPr lang="en-GB" sz="1000" i="0" dirty="0">
+                          <a:solidFill>
+                            <a:srgbClr val="000000"/>
+                          </a:solidFill>
+                          <a:latin typeface="Segoe UI" pitchFamily="34" charset="0"/>
+                          <a:cs typeface="Segoe UI" pitchFamily="34" charset="0"/>
+                        </a:rPr>
+                        <a:t> - - - - style.css</a:t>
+                      </a:r>
+                    </a:p>
                   </a:txBody>
                   <a:tcPr marL="46800" marR="46800" marT="21600" marB="21600">
                     <a:lnL w="12700" cap="flat" cmpd="sng" algn="ctr">
@@ -6018,48 +6262,19 @@
                           <a:latin typeface="Segoe UI" pitchFamily="34" charset="0"/>
                           <a:cs typeface="Segoe UI" pitchFamily="34" charset="0"/>
                         </a:rPr>
-                        <a:t> - templates</a:t>
-                      </a:r>
-                    </a:p>
-                    <a:p>
-                      <a:pPr marL="0" marR="0" indent="0" algn="l" defTabSz="584200" rtl="0" eaLnBrk="1" fontAlgn="auto" latinLnBrk="0" hangingPunct="1">
-                        <a:lnSpc>
-                          <a:spcPct val="100000"/>
-                        </a:lnSpc>
-                        <a:spcBef>
-                          <a:spcPts val="0"/>
-                        </a:spcBef>
-                        <a:spcAft>
-                          <a:spcPts val="0"/>
-                        </a:spcAft>
-                        <a:buClrTx/>
-                        <a:buSzTx/>
-                        <a:buFontTx/>
-                        <a:buNone/>
-                        <a:tabLst/>
-                        <a:defRPr/>
-                      </a:pPr>
-                      <a:r>
-                        <a:rPr lang="en-GB" sz="1000" i="0" dirty="0">
+                        <a:t> - </a:t>
+                      </a:r>
+                      <a:r>
+                        <a:rPr lang="en-GB" sz="1000" i="1" dirty="0" err="1">
                           <a:solidFill>
                             <a:srgbClr val="000000"/>
                           </a:solidFill>
                           <a:latin typeface="Segoe UI" pitchFamily="34" charset="0"/>
                           <a:cs typeface="Segoe UI" pitchFamily="34" charset="0"/>
                         </a:rPr>
-                        <a:t> - - </a:t>
-                      </a:r>
-                      <a:r>
-                        <a:rPr lang="en-GB" sz="1000" i="0" dirty="0" err="1">
-                          <a:solidFill>
-                            <a:srgbClr val="000000"/>
-                          </a:solidFill>
-                          <a:latin typeface="Segoe UI" pitchFamily="34" charset="0"/>
-                          <a:cs typeface="Segoe UI" pitchFamily="34" charset="0"/>
-                        </a:rPr>
-                        <a:t>rango</a:t>
-                      </a:r>
-                      <a:endParaRPr lang="en-GB" sz="1000" i="0" dirty="0">
+                        <a:t>tango_with_django</a:t>
+                      </a:r>
+                      <a:endParaRPr lang="en-GB" sz="1000" i="1" dirty="0">
                         <a:solidFill>
                           <a:srgbClr val="000000"/>
                         </a:solidFill>
@@ -6093,64 +6308,9 @@
                           <a:latin typeface="Segoe UI" pitchFamily="34" charset="0"/>
                           <a:cs typeface="Segoe UI" pitchFamily="34" charset="0"/>
                         </a:rPr>
-                        <a:t> - - - index.html</a:t>
+                        <a:t> - - __init.py__</a:t>
                       </a:r>
                     </a:p>
-                  </a:txBody>
-                  <a:tcPr marL="46800" marR="46800" marT="21600" marB="21600">
-                    <a:lnL w="12700" cap="flat" cmpd="sng" algn="ctr">
-                      <a:solidFill>
-                        <a:schemeClr val="tx1"/>
-                      </a:solidFill>
-                      <a:prstDash val="solid"/>
-                      <a:round/>
-                      <a:headEnd type="none" w="med" len="med"/>
-                      <a:tailEnd type="none" w="med" len="med"/>
-                    </a:lnL>
-                    <a:lnR w="12700" cap="flat" cmpd="sng" algn="ctr">
-                      <a:solidFill>
-                        <a:schemeClr val="tx1"/>
-                      </a:solidFill>
-                      <a:prstDash val="solid"/>
-                      <a:round/>
-                      <a:headEnd type="none" w="med" len="med"/>
-                      <a:tailEnd type="none" w="med" len="med"/>
-                    </a:lnR>
-                    <a:lnT w="6350" cap="flat" cmpd="sng" algn="ctr">
-                      <a:noFill/>
-                      <a:prstDash val="solid"/>
-                      <a:round/>
-                      <a:headEnd type="none" w="med" len="med"/>
-                      <a:tailEnd type="none" w="med" len="med"/>
-                    </a:lnT>
-                    <a:lnB w="6350" cap="flat" cmpd="sng" algn="ctr">
-                      <a:noFill/>
-                      <a:prstDash val="solid"/>
-                      <a:round/>
-                      <a:headEnd type="none" w="med" len="med"/>
-                      <a:tailEnd type="none" w="med" len="med"/>
-                    </a:lnB>
-                    <a:lnTlToBr w="12700" cmpd="sng">
-                      <a:noFill/>
-                      <a:prstDash val="solid"/>
-                    </a:lnTlToBr>
-                    <a:lnBlToTr w="12700" cmpd="sng">
-                      <a:noFill/>
-                      <a:prstDash val="solid"/>
-                    </a:lnBlToTr>
-                  </a:tcPr>
-                </a:tc>
-                <a:extLst>
-                  <a:ext uri="{0D108BD9-81ED-4DB2-BD59-A6C34878D82A}">
-                    <a16:rowId xmlns:a16="http://schemas.microsoft.com/office/drawing/2014/main" val="2093787048"/>
-                  </a:ext>
-                </a:extLst>
-              </a:tr>
-              <a:tr h="0">
-                <a:tc>
-                  <a:txBody>
-                    <a:bodyPr/>
-                    <a:lstStyle/>
                     <a:p>
                       <a:pPr marL="0" marR="0" indent="0" algn="l" defTabSz="584200" rtl="0" eaLnBrk="1" fontAlgn="auto" latinLnBrk="0" hangingPunct="1">
                         <a:lnSpc>
@@ -6177,81 +6337,9 @@
                           <a:latin typeface="Segoe UI" pitchFamily="34" charset="0"/>
                           <a:cs typeface="Segoe UI" pitchFamily="34" charset="0"/>
                         </a:rPr>
-                        <a:t> - </a:t>
-                      </a:r>
-                      <a:r>
-                        <a:rPr lang="en-GB" sz="1000" i="1" dirty="0" err="1">
-                          <a:solidFill>
-                            <a:srgbClr val="000000"/>
-                          </a:solidFill>
-                          <a:latin typeface="Segoe UI" pitchFamily="34" charset="0"/>
-                          <a:cs typeface="Segoe UI" pitchFamily="34" charset="0"/>
-                        </a:rPr>
-                        <a:t>tango_with_django</a:t>
-                      </a:r>
-                      <a:endParaRPr lang="en-GB" sz="1000" i="1" dirty="0">
-                        <a:solidFill>
-                          <a:srgbClr val="000000"/>
-                        </a:solidFill>
-                        <a:latin typeface="Segoe UI" pitchFamily="34" charset="0"/>
-                        <a:cs typeface="Segoe UI" pitchFamily="34" charset="0"/>
-                      </a:endParaRPr>
+                        <a:t> - - settings.py</a:t>
+                      </a:r>
                     </a:p>
-                  </a:txBody>
-                  <a:tcPr marL="46800" marR="46800" marT="21600" marB="21600">
-                    <a:lnL w="12700" cap="flat" cmpd="sng" algn="ctr">
-                      <a:solidFill>
-                        <a:schemeClr val="tx1"/>
-                      </a:solidFill>
-                      <a:prstDash val="solid"/>
-                      <a:round/>
-                      <a:headEnd type="none" w="med" len="med"/>
-                      <a:tailEnd type="none" w="med" len="med"/>
-                    </a:lnL>
-                    <a:lnR w="12700" cap="flat" cmpd="sng" algn="ctr">
-                      <a:solidFill>
-                        <a:schemeClr val="tx1"/>
-                      </a:solidFill>
-                      <a:prstDash val="solid"/>
-                      <a:round/>
-                      <a:headEnd type="none" w="med" len="med"/>
-                      <a:tailEnd type="none" w="med" len="med"/>
-                    </a:lnR>
-                    <a:lnT w="6350" cap="flat" cmpd="sng" algn="ctr">
-                      <a:noFill/>
-                      <a:prstDash val="solid"/>
-                      <a:round/>
-                      <a:headEnd type="none" w="med" len="med"/>
-                      <a:tailEnd type="none" w="med" len="med"/>
-                    </a:lnT>
-                    <a:lnB w="6350" cap="flat" cmpd="sng" algn="ctr">
-                      <a:noFill/>
-                      <a:prstDash val="solid"/>
-                      <a:round/>
-                      <a:headEnd type="none" w="med" len="med"/>
-                      <a:tailEnd type="none" w="med" len="med"/>
-                    </a:lnB>
-                    <a:lnTlToBr w="12700" cmpd="sng">
-                      <a:noFill/>
-                      <a:prstDash val="solid"/>
-                    </a:lnTlToBr>
-                    <a:lnBlToTr w="12700" cmpd="sng">
-                      <a:noFill/>
-                      <a:prstDash val="solid"/>
-                    </a:lnBlToTr>
-                  </a:tcPr>
-                </a:tc>
-                <a:extLst>
-                  <a:ext uri="{0D108BD9-81ED-4DB2-BD59-A6C34878D82A}">
-                    <a16:rowId xmlns:a16="http://schemas.microsoft.com/office/drawing/2014/main" val="1259011600"/>
-                  </a:ext>
-                </a:extLst>
-              </a:tr>
-              <a:tr h="0">
-                <a:tc>
-                  <a:txBody>
-                    <a:bodyPr/>
-                    <a:lstStyle/>
                     <a:p>
                       <a:pPr marL="0" marR="0" indent="0" algn="l" defTabSz="584200" rtl="0" eaLnBrk="1" fontAlgn="auto" latinLnBrk="0" hangingPunct="1">
                         <a:lnSpc>
@@ -6278,7 +6366,7 @@
                           <a:latin typeface="Segoe UI" pitchFamily="34" charset="0"/>
                           <a:cs typeface="Segoe UI" pitchFamily="34" charset="0"/>
                         </a:rPr>
-                        <a:t> - - __init.py__</a:t>
+                        <a:t> - - urls.py</a:t>
                       </a:r>
                     </a:p>
                     <a:p>
@@ -6307,64 +6395,6 @@
                           <a:latin typeface="Segoe UI" pitchFamily="34" charset="0"/>
                           <a:cs typeface="Segoe UI" pitchFamily="34" charset="0"/>
                         </a:rPr>
-                        <a:t> - - settings.py</a:t>
-                      </a:r>
-                    </a:p>
-                    <a:p>
-                      <a:pPr marL="0" marR="0" indent="0" algn="l" defTabSz="584200" rtl="0" eaLnBrk="1" fontAlgn="auto" latinLnBrk="0" hangingPunct="1">
-                        <a:lnSpc>
-                          <a:spcPct val="100000"/>
-                        </a:lnSpc>
-                        <a:spcBef>
-                          <a:spcPts val="0"/>
-                        </a:spcBef>
-                        <a:spcAft>
-                          <a:spcPts val="0"/>
-                        </a:spcAft>
-                        <a:buClrTx/>
-                        <a:buSzTx/>
-                        <a:buFontTx/>
-                        <a:buNone/>
-                        <a:tabLst/>
-                        <a:defRPr/>
-                      </a:pPr>
-                      <a:r>
-                        <a:rPr lang="en-GB" sz="1000" i="0" dirty="0">
-                          <a:solidFill>
-                            <a:srgbClr val="000000"/>
-                          </a:solidFill>
-                          <a:latin typeface="Segoe UI" pitchFamily="34" charset="0"/>
-                          <a:cs typeface="Segoe UI" pitchFamily="34" charset="0"/>
-                        </a:rPr>
-                        <a:t> - - urls.py</a:t>
-                      </a:r>
-                    </a:p>
-                    <a:p>
-                      <a:pPr marL="0" marR="0" indent="0" algn="l" defTabSz="584200" rtl="0" eaLnBrk="1" fontAlgn="auto" latinLnBrk="0" hangingPunct="1">
-                        <a:lnSpc>
-                          <a:spcPct val="100000"/>
-                        </a:lnSpc>
-                        <a:spcBef>
-                          <a:spcPts val="0"/>
-                        </a:spcBef>
-                        <a:spcAft>
-                          <a:spcPts val="0"/>
-                        </a:spcAft>
-                        <a:buClrTx/>
-                        <a:buSzTx/>
-                        <a:buFontTx/>
-                        <a:buNone/>
-                        <a:tabLst/>
-                        <a:defRPr/>
-                      </a:pPr>
-                      <a:r>
-                        <a:rPr lang="en-GB" sz="1000" i="0" dirty="0">
-                          <a:solidFill>
-                            <a:srgbClr val="000000"/>
-                          </a:solidFill>
-                          <a:latin typeface="Segoe UI" pitchFamily="34" charset="0"/>
-                          <a:cs typeface="Segoe UI" pitchFamily="34" charset="0"/>
-                        </a:rPr>
                         <a:t> - - wsgi.py</a:t>
                       </a:r>
                     </a:p>
@@ -6414,7 +6444,7 @@
                 </a:tc>
                 <a:extLst>
                   <a:ext uri="{0D108BD9-81ED-4DB2-BD59-A6C34878D82A}">
-                    <a16:rowId xmlns:a16="http://schemas.microsoft.com/office/drawing/2014/main" val="567593829"/>
+                    <a16:rowId xmlns:a16="http://schemas.microsoft.com/office/drawing/2014/main" val="1259011600"/>
                   </a:ext>
                 </a:extLst>
               </a:tr>
@@ -7718,13 +7748,13 @@
           <p:nvPr>
             <p:extLst>
               <p:ext uri="{D42A27DB-BD31-4B8C-83A1-F6EECF244321}">
-                <p14:modId xmlns:p14="http://schemas.microsoft.com/office/powerpoint/2010/main" val="4206051542"/>
+                <p14:modId xmlns:p14="http://schemas.microsoft.com/office/powerpoint/2010/main" val="2429121692"/>
               </p:ext>
             </p:extLst>
           </p:nvPr>
         </p:nvGraphicFramePr>
         <p:xfrm>
-          <a:off x="4026245" y="9395939"/>
+          <a:off x="4026244" y="9989736"/>
           <a:ext cx="8993069" cy="391200"/>
         </p:xfrm>
         <a:graphic>
@@ -8570,14 +8600,14 @@
           <p:nvPr>
             <p:extLst>
               <p:ext uri="{D42A27DB-BD31-4B8C-83A1-F6EECF244321}">
-                <p14:modId xmlns:p14="http://schemas.microsoft.com/office/powerpoint/2010/main" val="3863102330"/>
+                <p14:modId xmlns:p14="http://schemas.microsoft.com/office/powerpoint/2010/main" val="142516417"/>
               </p:ext>
             </p:extLst>
           </p:nvPr>
         </p:nvGraphicFramePr>
         <p:xfrm>
           <a:off x="8133427" y="6017425"/>
-          <a:ext cx="4885887" cy="1696800"/>
+          <a:ext cx="4885887" cy="2306400"/>
         </p:xfrm>
         <a:graphic>
           <a:graphicData uri="http://schemas.openxmlformats.org/drawingml/2006/table">
@@ -8919,7 +8949,7 @@
                           <a:latin typeface="Consolas" panose="020B0609020204030204" pitchFamily="49" charset="0"/>
                           <a:cs typeface="Segoe UI" pitchFamily="34" charset="0"/>
                         </a:rPr>
-                        <a:t>&lt;html&gt;</a:t>
+                        <a:t>{% load static %}</a:t>
                       </a:r>
                     </a:p>
                     <a:p>
@@ -8948,7 +8978,203 @@
                           <a:latin typeface="Consolas" panose="020B0609020204030204" pitchFamily="49" charset="0"/>
                           <a:cs typeface="Segoe UI" pitchFamily="34" charset="0"/>
                         </a:rPr>
-                        <a:t>    &lt;head&gt;...&lt;/head&gt;</a:t>
+                        <a:t>&lt;html&gt;</a:t>
+                      </a:r>
+                    </a:p>
+                    <a:p>
+                      <a:pPr marL="0" marR="0" indent="0" algn="l" defTabSz="584200" rtl="0" eaLnBrk="1" fontAlgn="auto" latinLnBrk="0" hangingPunct="1">
+                        <a:lnSpc>
+                          <a:spcPct val="100000"/>
+                        </a:lnSpc>
+                        <a:spcBef>
+                          <a:spcPts val="0"/>
+                        </a:spcBef>
+                        <a:spcAft>
+                          <a:spcPts val="0"/>
+                        </a:spcAft>
+                        <a:buClrTx/>
+                        <a:buSzTx/>
+                        <a:buFontTx/>
+                        <a:buNone/>
+                        <a:tabLst/>
+                        <a:defRPr/>
+                      </a:pPr>
+                      <a:r>
+                        <a:rPr lang="en-US" sz="1000" i="0" baseline="0" dirty="0">
+                          <a:solidFill>
+                            <a:srgbClr val="000000"/>
+                          </a:solidFill>
+                          <a:latin typeface="Consolas" panose="020B0609020204030204" pitchFamily="49" charset="0"/>
+                          <a:cs typeface="Segoe UI" pitchFamily="34" charset="0"/>
+                        </a:rPr>
+                        <a:t>    &lt;head&gt;</a:t>
+                      </a:r>
+                    </a:p>
+                    <a:p>
+                      <a:pPr marL="0" marR="0" indent="0" algn="l" defTabSz="584200" rtl="0" eaLnBrk="1" fontAlgn="auto" latinLnBrk="0" hangingPunct="1">
+                        <a:lnSpc>
+                          <a:spcPct val="100000"/>
+                        </a:lnSpc>
+                        <a:spcBef>
+                          <a:spcPts val="0"/>
+                        </a:spcBef>
+                        <a:spcAft>
+                          <a:spcPts val="0"/>
+                        </a:spcAft>
+                        <a:buClrTx/>
+                        <a:buSzTx/>
+                        <a:buFontTx/>
+                        <a:buNone/>
+                        <a:tabLst/>
+                        <a:defRPr/>
+                      </a:pPr>
+                      <a:r>
+                        <a:rPr lang="en-US" sz="1000" i="0" baseline="0" dirty="0">
+                          <a:solidFill>
+                            <a:srgbClr val="000000"/>
+                          </a:solidFill>
+                          <a:latin typeface="Consolas" panose="020B0609020204030204" pitchFamily="49" charset="0"/>
+                          <a:cs typeface="Segoe UI" pitchFamily="34" charset="0"/>
+                        </a:rPr>
+                        <a:t>        &lt;link </a:t>
+                      </a:r>
+                      <a:r>
+                        <a:rPr lang="en-US" sz="1000" i="0" baseline="0" dirty="0" err="1">
+                          <a:solidFill>
+                            <a:srgbClr val="000000"/>
+                          </a:solidFill>
+                          <a:latin typeface="Consolas" panose="020B0609020204030204" pitchFamily="49" charset="0"/>
+                          <a:cs typeface="Segoe UI" pitchFamily="34" charset="0"/>
+                        </a:rPr>
+                        <a:t>rel</a:t>
+                      </a:r>
+                      <a:r>
+                        <a:rPr lang="en-US" sz="1000" i="0" baseline="0" dirty="0">
+                          <a:solidFill>
+                            <a:srgbClr val="000000"/>
+                          </a:solidFill>
+                          <a:latin typeface="Consolas" panose="020B0609020204030204" pitchFamily="49" charset="0"/>
+                          <a:cs typeface="Segoe UI" pitchFamily="34" charset="0"/>
+                        </a:rPr>
+                        <a:t>="stylesheet" </a:t>
+                      </a:r>
+                    </a:p>
+                    <a:p>
+                      <a:pPr marL="0" marR="0" indent="0" algn="l" defTabSz="584200" rtl="0" eaLnBrk="1" fontAlgn="auto" latinLnBrk="0" hangingPunct="1">
+                        <a:lnSpc>
+                          <a:spcPct val="100000"/>
+                        </a:lnSpc>
+                        <a:spcBef>
+                          <a:spcPts val="0"/>
+                        </a:spcBef>
+                        <a:spcAft>
+                          <a:spcPts val="0"/>
+                        </a:spcAft>
+                        <a:buClrTx/>
+                        <a:buSzTx/>
+                        <a:buFontTx/>
+                        <a:buNone/>
+                        <a:tabLst/>
+                        <a:defRPr/>
+                      </a:pPr>
+                      <a:r>
+                        <a:rPr lang="en-US" sz="1000" i="0" baseline="0" dirty="0">
+                          <a:solidFill>
+                            <a:srgbClr val="000000"/>
+                          </a:solidFill>
+                          <a:latin typeface="Consolas" panose="020B0609020204030204" pitchFamily="49" charset="0"/>
+                          <a:cs typeface="Segoe UI" pitchFamily="34" charset="0"/>
+                        </a:rPr>
+                        <a:t>          type="text/</a:t>
+                      </a:r>
+                      <a:r>
+                        <a:rPr lang="en-US" sz="1000" i="0" baseline="0" dirty="0" err="1">
+                          <a:solidFill>
+                            <a:srgbClr val="000000"/>
+                          </a:solidFill>
+                          <a:latin typeface="Consolas" panose="020B0609020204030204" pitchFamily="49" charset="0"/>
+                          <a:cs typeface="Segoe UI" pitchFamily="34" charset="0"/>
+                        </a:rPr>
+                        <a:t>css</a:t>
+                      </a:r>
+                      <a:r>
+                        <a:rPr lang="en-US" sz="1000" i="0" baseline="0" dirty="0">
+                          <a:solidFill>
+                            <a:srgbClr val="000000"/>
+                          </a:solidFill>
+                          <a:latin typeface="Consolas" panose="020B0609020204030204" pitchFamily="49" charset="0"/>
+                          <a:cs typeface="Segoe UI" pitchFamily="34" charset="0"/>
+                        </a:rPr>
+                        <a:t>" </a:t>
+                      </a:r>
+                      <a:r>
+                        <a:rPr lang="en-US" sz="1000" i="0" baseline="0" dirty="0" err="1">
+                          <a:solidFill>
+                            <a:srgbClr val="000000"/>
+                          </a:solidFill>
+                          <a:latin typeface="Consolas" panose="020B0609020204030204" pitchFamily="49" charset="0"/>
+                          <a:cs typeface="Segoe UI" pitchFamily="34" charset="0"/>
+                        </a:rPr>
+                        <a:t>href</a:t>
+                      </a:r>
+                      <a:r>
+                        <a:rPr lang="en-US" sz="1000" i="0" baseline="0" dirty="0">
+                          <a:solidFill>
+                            <a:srgbClr val="000000"/>
+                          </a:solidFill>
+                          <a:latin typeface="Consolas" panose="020B0609020204030204" pitchFamily="49" charset="0"/>
+                          <a:cs typeface="Segoe UI" pitchFamily="34" charset="0"/>
+                        </a:rPr>
+                        <a:t>="{% static '</a:t>
+                      </a:r>
+                      <a:r>
+                        <a:rPr lang="en-US" sz="1000" i="0" baseline="0" dirty="0" err="1">
+                          <a:solidFill>
+                            <a:srgbClr val="000000"/>
+                          </a:solidFill>
+                          <a:latin typeface="Consolas" panose="020B0609020204030204" pitchFamily="49" charset="0"/>
+                          <a:cs typeface="Segoe UI" pitchFamily="34" charset="0"/>
+                        </a:rPr>
+                        <a:t>rango</a:t>
+                      </a:r>
+                      <a:r>
+                        <a:rPr lang="en-US" sz="1000" i="0" baseline="0" dirty="0">
+                          <a:solidFill>
+                            <a:srgbClr val="000000"/>
+                          </a:solidFill>
+                          <a:latin typeface="Consolas" panose="020B0609020204030204" pitchFamily="49" charset="0"/>
+                          <a:cs typeface="Segoe UI" pitchFamily="34" charset="0"/>
+                        </a:rPr>
+                        <a:t>/style.css' %}"&gt;</a:t>
+                      </a:r>
+                    </a:p>
+                    <a:p>
+                      <a:pPr marL="0" marR="0" indent="0" algn="l" defTabSz="584200" rtl="0" eaLnBrk="1" fontAlgn="auto" latinLnBrk="0" hangingPunct="1">
+                        <a:lnSpc>
+                          <a:spcPct val="100000"/>
+                        </a:lnSpc>
+                        <a:spcBef>
+                          <a:spcPts val="0"/>
+                        </a:spcBef>
+                        <a:spcAft>
+                          <a:spcPts val="0"/>
+                        </a:spcAft>
+                        <a:buClrTx/>
+                        <a:buSzTx/>
+                        <a:buFontTx/>
+                        <a:buNone/>
+                        <a:tabLst/>
+                        <a:defRPr/>
+                      </a:pPr>
+                      <a:r>
+                        <a:rPr lang="en-US" sz="1000" i="0" baseline="0" dirty="0">
+                          <a:solidFill>
+                            <a:srgbClr val="000000"/>
+                          </a:solidFill>
+                          <a:latin typeface="Consolas" panose="020B0609020204030204" pitchFamily="49" charset="0"/>
+                          <a:cs typeface="Segoe UI" pitchFamily="34" charset="0"/>
+                        </a:rPr>
+                        <a:t>    &lt;/head&gt;</a:t>
                       </a:r>
                     </a:p>
                     <a:p>
@@ -9163,13 +9389,13 @@
           <p:nvPr>
             <p:extLst>
               <p:ext uri="{D42A27DB-BD31-4B8C-83A1-F6EECF244321}">
-                <p14:modId xmlns:p14="http://schemas.microsoft.com/office/powerpoint/2010/main" val="2846134780"/>
+                <p14:modId xmlns:p14="http://schemas.microsoft.com/office/powerpoint/2010/main" val="299569834"/>
               </p:ext>
             </p:extLst>
           </p:nvPr>
         </p:nvGraphicFramePr>
         <p:xfrm>
-          <a:off x="8133427" y="7859082"/>
+          <a:off x="8133426" y="8468682"/>
           <a:ext cx="4885887" cy="1392000"/>
         </p:xfrm>
         <a:graphic>

</xml_diff>

<commit_message>
Added how to create models and migrate to db.
</commit_message>
<xml_diff>
--- a/Django.pptx
+++ b/Django.pptx
@@ -5,13 +5,14 @@
     <p:sldMasterId id="2147483648" r:id="rId1"/>
   </p:sldMasterIdLst>
   <p:notesMasterIdLst>
-    <p:notesMasterId r:id="rId3"/>
+    <p:notesMasterId r:id="rId4"/>
   </p:notesMasterIdLst>
   <p:handoutMasterIdLst>
-    <p:handoutMasterId r:id="rId4"/>
+    <p:handoutMasterId r:id="rId5"/>
   </p:handoutMasterIdLst>
   <p:sldIdLst>
     <p:sldId id="257" r:id="rId2"/>
+    <p:sldId id="258" r:id="rId3"/>
   </p:sldIdLst>
   <p:sldSz cx="13970000" cy="10795000"/>
   <p:notesSz cx="9931400" cy="14363700"/>
@@ -425,7 +426,7 @@
           <a:p>
             <a:fld id="{37C50D7F-5172-434D-9E20-E71FDF806C79}" type="datetimeFigureOut">
               <a:rPr lang="en-GB" smtClean="0"/>
-              <a:t>11/08/2019</a:t>
+              <a:t>12/08/2019</a:t>
             </a:fld>
             <a:endParaRPr lang="en-GB"/>
           </a:p>
@@ -750,6 +751,67 @@
     <p:extLst>
       <p:ext uri="{BB962C8B-B14F-4D97-AF65-F5344CB8AC3E}">
         <p14:creationId xmlns:p14="http://schemas.microsoft.com/office/powerpoint/2010/main" val="3933566834"/>
+      </p:ext>
+    </p:extLst>
+  </p:cSld>
+  <p:clrMapOvr>
+    <a:masterClrMapping/>
+  </p:clrMapOvr>
+</p:notes>
+</file>
+
+<file path=ppt/notesSlides/notesSlide2.xml><?xml version="1.0" encoding="utf-8"?>
+<p:notes xmlns:a="http://schemas.openxmlformats.org/drawingml/2006/main" xmlns:r="http://schemas.openxmlformats.org/officeDocument/2006/relationships" xmlns:p="http://schemas.openxmlformats.org/presentationml/2006/main">
+  <p:cSld>
+    <p:spTree>
+      <p:nvGrpSpPr>
+        <p:cNvPr id="1" name=""/>
+        <p:cNvGrpSpPr/>
+        <p:nvPr/>
+      </p:nvGrpSpPr>
+      <p:grpSpPr>
+        <a:xfrm>
+          <a:off x="0" y="0"/>
+          <a:ext cx="0" cy="0"/>
+          <a:chOff x="0" y="0"/>
+          <a:chExt cx="0" cy="0"/>
+        </a:xfrm>
+      </p:grpSpPr>
+      <p:sp>
+        <p:nvSpPr>
+          <p:cNvPr id="2" name="Slide Image Placeholder 1"/>
+          <p:cNvSpPr>
+            <a:spLocks noGrp="1" noRot="1" noChangeAspect="1"/>
+          </p:cNvSpPr>
+          <p:nvPr>
+            <p:ph type="sldImg"/>
+          </p:nvPr>
+        </p:nvSpPr>
+        <p:spPr/>
+      </p:sp>
+      <p:sp>
+        <p:nvSpPr>
+          <p:cNvPr id="3" name="Notes Placeholder 2"/>
+          <p:cNvSpPr>
+            <a:spLocks noGrp="1"/>
+          </p:cNvSpPr>
+          <p:nvPr>
+            <p:ph type="body" idx="1"/>
+          </p:nvPr>
+        </p:nvSpPr>
+        <p:spPr/>
+        <p:txBody>
+          <a:bodyPr/>
+          <a:lstStyle/>
+          <a:p>
+            <a:endParaRPr lang="en-GB" dirty="0"/>
+          </a:p>
+        </p:txBody>
+      </p:sp>
+    </p:spTree>
+    <p:extLst>
+      <p:ext uri="{BB962C8B-B14F-4D97-AF65-F5344CB8AC3E}">
+        <p14:creationId xmlns:p14="http://schemas.microsoft.com/office/powerpoint/2010/main" val="113238277"/>
       </p:ext>
     </p:extLst>
   </p:cSld>
@@ -2394,7 +2456,7 @@
           </a:ln>
           <a:extLst>
             <a:ext uri="{C572A759-6A51-4108-AA02-DFA0A04FC94B}">
-              <ma14:wrappingTextBoxFlag xmlns:ma14="http://schemas.microsoft.com/office/mac/drawingml/2011/main" xmlns:a14="http://schemas.microsoft.com/office/drawing/2010/main" xmlns:m="http://schemas.openxmlformats.org/officeDocument/2006/math" xmlns="" val="1"/>
+              <ma14:wrappingTextBoxFlag xmlns="" xmlns:m="http://schemas.openxmlformats.org/officeDocument/2006/math" xmlns:a14="http://schemas.microsoft.com/office/drawing/2010/main" xmlns:ma14="http://schemas.microsoft.com/office/mac/drawingml/2011/main" val="1"/>
             </a:ext>
           </a:extLst>
         </p:spPr>
@@ -2433,7 +2495,7 @@
           </a:ln>
           <a:extLst>
             <a:ext uri="{C572A759-6A51-4108-AA02-DFA0A04FC94B}">
-              <ma14:wrappingTextBoxFlag xmlns:ma14="http://schemas.microsoft.com/office/mac/drawingml/2011/main" xmlns:a14="http://schemas.microsoft.com/office/drawing/2010/main" xmlns:m="http://schemas.openxmlformats.org/officeDocument/2006/math" xmlns="" val="1"/>
+              <ma14:wrappingTextBoxFlag xmlns="" xmlns:m="http://schemas.openxmlformats.org/officeDocument/2006/math" xmlns:a14="http://schemas.microsoft.com/office/drawing/2010/main" xmlns:ma14="http://schemas.microsoft.com/office/mac/drawingml/2011/main" val="1"/>
             </a:ext>
           </a:extLst>
         </p:spPr>
@@ -9883,6 +9945,2187 @@
     <p:extLst>
       <p:ext uri="{BB962C8B-B14F-4D97-AF65-F5344CB8AC3E}">
         <p14:creationId xmlns:p14="http://schemas.microsoft.com/office/powerpoint/2010/main" val="3567391287"/>
+      </p:ext>
+    </p:extLst>
+  </p:cSld>
+  <p:clrMapOvr>
+    <a:masterClrMapping/>
+  </p:clrMapOvr>
+  <p:transition spd="med"/>
+</p:sld>
+</file>
+
+<file path=ppt/slides/slide2.xml><?xml version="1.0" encoding="utf-8"?>
+<p:sld xmlns:a="http://schemas.openxmlformats.org/drawingml/2006/main" xmlns:r="http://schemas.openxmlformats.org/officeDocument/2006/relationships" xmlns:p="http://schemas.openxmlformats.org/presentationml/2006/main">
+  <p:cSld>
+    <p:spTree>
+      <p:nvGrpSpPr>
+        <p:cNvPr id="1" name=""/>
+        <p:cNvGrpSpPr/>
+        <p:nvPr/>
+      </p:nvGrpSpPr>
+      <p:grpSpPr>
+        <a:xfrm>
+          <a:off x="0" y="0"/>
+          <a:ext cx="0" cy="0"/>
+          <a:chOff x="0" y="0"/>
+          <a:chExt cx="0" cy="0"/>
+        </a:xfrm>
+      </p:grpSpPr>
+      <p:sp>
+        <p:nvSpPr>
+          <p:cNvPr id="792" name="Rectangle 791"/>
+          <p:cNvSpPr/>
+          <p:nvPr/>
+        </p:nvSpPr>
+        <p:spPr>
+          <a:xfrm>
+            <a:off x="288925" y="414064"/>
+            <a:ext cx="11033023" cy="319177"/>
+          </a:xfrm>
+          <a:prstGeom prst="rect">
+            <a:avLst/>
+          </a:prstGeom>
+          <a:noFill/>
+          <a:ln w="0">
+            <a:noFill/>
+          </a:ln>
+          <a:effectLst>
+            <a:outerShdw dir="5400000" sx="1000" sy="1000" algn="ctr" rotWithShape="0">
+              <a:schemeClr val="bg1"/>
+            </a:outerShdw>
+          </a:effectLst>
+        </p:spPr>
+        <p:style>
+          <a:lnRef idx="2">
+            <a:schemeClr val="dk1"/>
+          </a:lnRef>
+          <a:fillRef idx="1">
+            <a:schemeClr val="lt1"/>
+          </a:fillRef>
+          <a:effectRef idx="0">
+            <a:schemeClr val="dk1"/>
+          </a:effectRef>
+          <a:fontRef idx="minor">
+            <a:schemeClr val="dk1"/>
+          </a:fontRef>
+        </p:style>
+        <p:txBody>
+          <a:bodyPr rot="0" spcFirstLastPara="1" vertOverflow="overflow" horzOverflow="overflow" vert="horz" wrap="square" lIns="36000" tIns="36000" rIns="36000" bIns="36000" numCol="1" spcCol="38100" rtlCol="0" anchor="t" anchorCtr="0">
+            <a:noAutofit/>
+          </a:bodyPr>
+          <a:lstStyle/>
+          <a:p>
+            <a:pPr marL="0" marR="0" indent="0" algn="l" defTabSz="584200" rtl="0" fontAlgn="auto" latinLnBrk="0" hangingPunct="0">
+              <a:lnSpc>
+                <a:spcPts val="1500"/>
+              </a:lnSpc>
+              <a:spcBef>
+                <a:spcPts val="0"/>
+              </a:spcBef>
+              <a:spcAft>
+                <a:spcPts val="0"/>
+              </a:spcAft>
+              <a:buClrTx/>
+              <a:buSzTx/>
+              <a:buFontTx/>
+              <a:buNone/>
+              <a:tabLst/>
+            </a:pPr>
+            <a:r>
+              <a:rPr kumimoji="0" lang="en-GB" sz="3600" b="0" i="0" u="none" strike="noStrike" cap="none" spc="0" normalizeH="0" baseline="0" dirty="0">
+                <a:ln>
+                  <a:noFill/>
+                </a:ln>
+                <a:solidFill>
+                  <a:srgbClr val="000000"/>
+                </a:solidFill>
+                <a:effectLst/>
+                <a:uFillTx/>
+                <a:latin typeface="Segoe UI" pitchFamily="34" charset="0"/>
+                <a:ea typeface="Verdana" pitchFamily="34" charset="0"/>
+                <a:cs typeface="Segoe UI" pitchFamily="34" charset="0"/>
+                <a:sym typeface="Source Sans Pro"/>
+              </a:rPr>
+              <a:t>Django</a:t>
+            </a:r>
+          </a:p>
+        </p:txBody>
+      </p:sp>
+      <p:sp>
+        <p:nvSpPr>
+          <p:cNvPr id="793" name="Rectangle 792"/>
+          <p:cNvSpPr/>
+          <p:nvPr/>
+        </p:nvSpPr>
+        <p:spPr>
+          <a:xfrm>
+            <a:off x="272456" y="781918"/>
+            <a:ext cx="5532980" cy="234082"/>
+          </a:xfrm>
+          <a:prstGeom prst="rect">
+            <a:avLst/>
+          </a:prstGeom>
+          <a:noFill/>
+          <a:ln w="0">
+            <a:noFill/>
+          </a:ln>
+          <a:effectLst>
+            <a:outerShdw dir="5400000" sx="1000" sy="1000" algn="ctr" rotWithShape="0">
+              <a:schemeClr val="bg1"/>
+            </a:outerShdw>
+          </a:effectLst>
+        </p:spPr>
+        <p:style>
+          <a:lnRef idx="2">
+            <a:schemeClr val="dk1"/>
+          </a:lnRef>
+          <a:fillRef idx="1">
+            <a:schemeClr val="lt1"/>
+          </a:fillRef>
+          <a:effectRef idx="0">
+            <a:schemeClr val="dk1"/>
+          </a:effectRef>
+          <a:fontRef idx="minor">
+            <a:schemeClr val="dk1"/>
+          </a:fontRef>
+        </p:style>
+        <p:txBody>
+          <a:bodyPr rot="0" spcFirstLastPara="1" vertOverflow="overflow" horzOverflow="overflow" vert="horz" wrap="square" lIns="36000" tIns="36000" rIns="36000" bIns="36000" numCol="1" spcCol="38100" rtlCol="0" anchor="t" anchorCtr="0">
+            <a:noAutofit/>
+          </a:bodyPr>
+          <a:lstStyle/>
+          <a:p>
+            <a:pPr marL="0" marR="0" indent="0" algn="l" defTabSz="584200" rtl="0" fontAlgn="auto" latinLnBrk="0" hangingPunct="0">
+              <a:lnSpc>
+                <a:spcPts val="1500"/>
+              </a:lnSpc>
+              <a:spcBef>
+                <a:spcPts val="0"/>
+              </a:spcBef>
+              <a:spcAft>
+                <a:spcPts val="0"/>
+              </a:spcAft>
+              <a:buClrTx/>
+              <a:buSzTx/>
+              <a:buFontTx/>
+              <a:buNone/>
+              <a:tabLst/>
+            </a:pPr>
+            <a:r>
+              <a:rPr lang="en-GB" sz="1000" b="0" dirty="0">
+                <a:solidFill>
+                  <a:srgbClr val="000000"/>
+                </a:solidFill>
+                <a:latin typeface="Segoe UI" pitchFamily="34" charset="0"/>
+                <a:ea typeface="Verdana" pitchFamily="34" charset="0"/>
+                <a:cs typeface="Segoe UI" pitchFamily="34" charset="0"/>
+              </a:rPr>
+              <a:t>Placeholder</a:t>
+            </a:r>
+            <a:endParaRPr lang="en-GB" sz="1000" b="0" i="1" u="sng" dirty="0">
+              <a:solidFill>
+                <a:srgbClr val="000000"/>
+              </a:solidFill>
+              <a:latin typeface="Segoe UI" pitchFamily="34" charset="0"/>
+              <a:ea typeface="Verdana" pitchFamily="34" charset="0"/>
+              <a:cs typeface="Segoe UI" pitchFamily="34" charset="0"/>
+            </a:endParaRPr>
+          </a:p>
+        </p:txBody>
+      </p:sp>
+      <p:cxnSp>
+        <p:nvCxnSpPr>
+          <p:cNvPr id="5" name="Straight Connector 4"/>
+          <p:cNvCxnSpPr/>
+          <p:nvPr/>
+        </p:nvCxnSpPr>
+        <p:spPr>
+          <a:xfrm>
+            <a:off x="280492" y="767751"/>
+            <a:ext cx="13456701" cy="0"/>
+          </a:xfrm>
+          <a:prstGeom prst="line">
+            <a:avLst/>
+          </a:prstGeom>
+          <a:noFill/>
+          <a:ln w="12700" cap="flat">
+            <a:solidFill>
+              <a:srgbClr val="24292E"/>
+            </a:solidFill>
+            <a:prstDash val="solid"/>
+            <a:miter lim="400000"/>
+          </a:ln>
+          <a:effectLst/>
+          <a:sp3d/>
+        </p:spPr>
+        <p:style>
+          <a:lnRef idx="0">
+            <a:scrgbClr r="0" g="0" b="0"/>
+          </a:lnRef>
+          <a:fillRef idx="0">
+            <a:scrgbClr r="0" g="0" b="0"/>
+          </a:fillRef>
+          <a:effectRef idx="0">
+            <a:scrgbClr r="0" g="0" b="0"/>
+          </a:effectRef>
+          <a:fontRef idx="none"/>
+        </p:style>
+      </p:cxnSp>
+      <p:graphicFrame>
+        <p:nvGraphicFramePr>
+          <p:cNvPr id="16" name="Table 15">
+            <a:extLst>
+              <a:ext uri="{FF2B5EF4-FFF2-40B4-BE49-F238E27FC236}">
+                <a16:creationId xmlns:a16="http://schemas.microsoft.com/office/drawing/2014/main" id="{C8A98EF0-E742-4CF5-9ECA-543E2A443E53}"/>
+              </a:ext>
+            </a:extLst>
+          </p:cNvPr>
+          <p:cNvGraphicFramePr>
+            <a:graphicFrameLocks noGrp="1"/>
+          </p:cNvGraphicFramePr>
+          <p:nvPr>
+            <p:extLst>
+              <p:ext uri="{D42A27DB-BD31-4B8C-83A1-F6EECF244321}">
+                <p14:modId xmlns:p14="http://schemas.microsoft.com/office/powerpoint/2010/main" val="443960388"/>
+              </p:ext>
+            </p:extLst>
+          </p:nvPr>
+        </p:nvGraphicFramePr>
+        <p:xfrm>
+          <a:off x="1117486" y="2267106"/>
+          <a:ext cx="4885887" cy="3068400"/>
+        </p:xfrm>
+        <a:graphic>
+          <a:graphicData uri="http://schemas.openxmlformats.org/drawingml/2006/table">
+            <a:tbl>
+              <a:tblPr firstRow="1" bandRow="1">
+                <a:tableStyleId>{5940675A-B579-460E-94D1-54222C63F5DA}</a:tableStyleId>
+              </a:tblPr>
+              <a:tblGrid>
+                <a:gridCol w="4885887">
+                  <a:extLst>
+                    <a:ext uri="{9D8B030D-6E8A-4147-A177-3AD203B41FA5}">
+                      <a16:colId xmlns:a16="http://schemas.microsoft.com/office/drawing/2014/main" val="20000"/>
+                    </a:ext>
+                  </a:extLst>
+                </a:gridCol>
+              </a:tblGrid>
+              <a:tr h="0">
+                <a:tc>
+                  <a:txBody>
+                    <a:bodyPr/>
+                    <a:lstStyle/>
+                    <a:p>
+                      <a:pPr algn="l"/>
+                      <a:r>
+                        <a:rPr lang="en-GB" sz="1000" b="1" baseline="0" dirty="0">
+                          <a:solidFill>
+                            <a:srgbClr val="000000"/>
+                          </a:solidFill>
+                          <a:latin typeface="Segoe UI" pitchFamily="34" charset="0"/>
+                          <a:cs typeface="Segoe UI" pitchFamily="34" charset="0"/>
+                        </a:rPr>
+                        <a:t>Create Models</a:t>
+                      </a:r>
+                    </a:p>
+                  </a:txBody>
+                  <a:tcPr marL="46800" marR="46800" marT="21600" marB="21600">
+                    <a:lnL w="12700" cap="flat" cmpd="sng" algn="ctr">
+                      <a:solidFill>
+                        <a:schemeClr val="tx1"/>
+                      </a:solidFill>
+                      <a:prstDash val="solid"/>
+                      <a:round/>
+                      <a:headEnd type="none" w="med" len="med"/>
+                      <a:tailEnd type="none" w="med" len="med"/>
+                    </a:lnL>
+                    <a:lnR w="12700" cap="flat" cmpd="sng" algn="ctr">
+                      <a:solidFill>
+                        <a:schemeClr val="tx1"/>
+                      </a:solidFill>
+                      <a:prstDash val="solid"/>
+                      <a:round/>
+                      <a:headEnd type="none" w="med" len="med"/>
+                      <a:tailEnd type="none" w="med" len="med"/>
+                    </a:lnR>
+                    <a:lnT w="12700" cap="flat" cmpd="sng" algn="ctr">
+                      <a:solidFill>
+                        <a:schemeClr val="tx1"/>
+                      </a:solidFill>
+                      <a:prstDash val="solid"/>
+                      <a:round/>
+                      <a:headEnd type="none" w="med" len="med"/>
+                      <a:tailEnd type="none" w="med" len="med"/>
+                    </a:lnT>
+                    <a:lnB w="6350" cap="flat" cmpd="sng" algn="ctr">
+                      <a:noFill/>
+                      <a:prstDash val="solid"/>
+                      <a:round/>
+                      <a:headEnd type="none" w="med" len="med"/>
+                      <a:tailEnd type="none" w="med" len="med"/>
+                    </a:lnB>
+                    <a:lnTlToBr w="12700" cmpd="sng">
+                      <a:noFill/>
+                      <a:prstDash val="solid"/>
+                    </a:lnTlToBr>
+                    <a:lnBlToTr w="12700" cmpd="sng">
+                      <a:noFill/>
+                      <a:prstDash val="solid"/>
+                    </a:lnBlToTr>
+                  </a:tcPr>
+                </a:tc>
+                <a:extLst>
+                  <a:ext uri="{0D108BD9-81ED-4DB2-BD59-A6C34878D82A}">
+                    <a16:rowId xmlns:a16="http://schemas.microsoft.com/office/drawing/2014/main" val="10000"/>
+                  </a:ext>
+                </a:extLst>
+              </a:tr>
+              <a:tr h="0">
+                <a:tc>
+                  <a:txBody>
+                    <a:bodyPr/>
+                    <a:lstStyle/>
+                    <a:p>
+                      <a:pPr marL="0" marR="0" indent="0" algn="l" defTabSz="584200" rtl="0" eaLnBrk="1" fontAlgn="auto" latinLnBrk="0" hangingPunct="1">
+                        <a:lnSpc>
+                          <a:spcPct val="100000"/>
+                        </a:lnSpc>
+                        <a:spcBef>
+                          <a:spcPts val="0"/>
+                        </a:spcBef>
+                        <a:spcAft>
+                          <a:spcPts val="0"/>
+                        </a:spcAft>
+                        <a:buClrTx/>
+                        <a:buSzTx/>
+                        <a:buFontTx/>
+                        <a:buNone/>
+                        <a:tabLst/>
+                        <a:defRPr/>
+                      </a:pPr>
+                      <a:r>
+                        <a:rPr lang="en-GB" sz="1000" i="1" u="none" dirty="0">
+                          <a:solidFill>
+                            <a:srgbClr val="000000"/>
+                          </a:solidFill>
+                          <a:latin typeface="Segoe UI" pitchFamily="34" charset="0"/>
+                          <a:cs typeface="Segoe UI" pitchFamily="34" charset="0"/>
+                        </a:rPr>
+                        <a:t>tango_with_django/rango/models.py</a:t>
+                      </a:r>
+                    </a:p>
+                  </a:txBody>
+                  <a:tcPr marL="46800" marR="46800" marT="21600" marB="21600">
+                    <a:lnL w="12700" cap="flat" cmpd="sng" algn="ctr">
+                      <a:solidFill>
+                        <a:schemeClr val="tx1"/>
+                      </a:solidFill>
+                      <a:prstDash val="solid"/>
+                      <a:round/>
+                      <a:headEnd type="none" w="med" len="med"/>
+                      <a:tailEnd type="none" w="med" len="med"/>
+                    </a:lnL>
+                    <a:lnR w="12700" cap="flat" cmpd="sng" algn="ctr">
+                      <a:solidFill>
+                        <a:schemeClr val="tx1"/>
+                      </a:solidFill>
+                      <a:prstDash val="solid"/>
+                      <a:round/>
+                      <a:headEnd type="none" w="med" len="med"/>
+                      <a:tailEnd type="none" w="med" len="med"/>
+                    </a:lnR>
+                    <a:lnT w="6350" cap="flat" cmpd="sng" algn="ctr">
+                      <a:noFill/>
+                      <a:prstDash val="solid"/>
+                      <a:round/>
+                      <a:headEnd type="none" w="med" len="med"/>
+                      <a:tailEnd type="none" w="med" len="med"/>
+                    </a:lnT>
+                    <a:lnB w="6350" cap="flat" cmpd="sng" algn="ctr">
+                      <a:noFill/>
+                      <a:prstDash val="solid"/>
+                      <a:round/>
+                      <a:headEnd type="none" w="med" len="med"/>
+                      <a:tailEnd type="none" w="med" len="med"/>
+                    </a:lnB>
+                    <a:lnTlToBr w="12700" cmpd="sng">
+                      <a:noFill/>
+                      <a:prstDash val="solid"/>
+                    </a:lnTlToBr>
+                    <a:lnBlToTr w="12700" cmpd="sng">
+                      <a:noFill/>
+                      <a:prstDash val="solid"/>
+                    </a:lnBlToTr>
+                  </a:tcPr>
+                </a:tc>
+                <a:extLst>
+                  <a:ext uri="{0D108BD9-81ED-4DB2-BD59-A6C34878D82A}">
+                    <a16:rowId xmlns:a16="http://schemas.microsoft.com/office/drawing/2014/main" val="694626626"/>
+                  </a:ext>
+                </a:extLst>
+              </a:tr>
+              <a:tr h="0">
+                <a:tc>
+                  <a:txBody>
+                    <a:bodyPr/>
+                    <a:lstStyle/>
+                    <a:p>
+                      <a:pPr marL="0" marR="0" indent="0" algn="l" defTabSz="584200" rtl="0" eaLnBrk="1" fontAlgn="auto" latinLnBrk="0" hangingPunct="1">
+                        <a:lnSpc>
+                          <a:spcPct val="100000"/>
+                        </a:lnSpc>
+                        <a:spcBef>
+                          <a:spcPts val="0"/>
+                        </a:spcBef>
+                        <a:spcAft>
+                          <a:spcPts val="0"/>
+                        </a:spcAft>
+                        <a:buClrTx/>
+                        <a:buSzTx/>
+                        <a:buFontTx/>
+                        <a:buNone/>
+                        <a:tabLst/>
+                        <a:defRPr/>
+                      </a:pPr>
+                      <a:endParaRPr lang="en-GB" sz="1000" i="0" baseline="0" dirty="0">
+                        <a:solidFill>
+                          <a:srgbClr val="000000"/>
+                        </a:solidFill>
+                        <a:latin typeface="Consolas" panose="020B0609020204030204" pitchFamily="49" charset="0"/>
+                        <a:cs typeface="Segoe UI" pitchFamily="34" charset="0"/>
+                      </a:endParaRPr>
+                    </a:p>
+                  </a:txBody>
+                  <a:tcPr marL="46800" marR="46800" marT="21600" marB="21600">
+                    <a:lnL w="12700" cap="flat" cmpd="sng" algn="ctr">
+                      <a:solidFill>
+                        <a:schemeClr val="tx1"/>
+                      </a:solidFill>
+                      <a:prstDash val="solid"/>
+                      <a:round/>
+                      <a:headEnd type="none" w="med" len="med"/>
+                      <a:tailEnd type="none" w="med" len="med"/>
+                    </a:lnL>
+                    <a:lnR w="12700" cap="flat" cmpd="sng" algn="ctr">
+                      <a:solidFill>
+                        <a:schemeClr val="tx1"/>
+                      </a:solidFill>
+                      <a:prstDash val="solid"/>
+                      <a:round/>
+                      <a:headEnd type="none" w="med" len="med"/>
+                      <a:tailEnd type="none" w="med" len="med"/>
+                    </a:lnR>
+                    <a:lnT w="6350" cap="flat" cmpd="sng" algn="ctr">
+                      <a:noFill/>
+                      <a:prstDash val="solid"/>
+                      <a:round/>
+                      <a:headEnd type="none" w="med" len="med"/>
+                      <a:tailEnd type="none" w="med" len="med"/>
+                    </a:lnT>
+                    <a:lnB w="6350" cap="flat" cmpd="sng" algn="ctr">
+                      <a:noFill/>
+                      <a:prstDash val="solid"/>
+                      <a:round/>
+                      <a:headEnd type="none" w="med" len="med"/>
+                      <a:tailEnd type="none" w="med" len="med"/>
+                    </a:lnB>
+                    <a:lnTlToBr w="12700" cmpd="sng">
+                      <a:noFill/>
+                      <a:prstDash val="solid"/>
+                    </a:lnTlToBr>
+                    <a:lnBlToTr w="12700" cmpd="sng">
+                      <a:noFill/>
+                      <a:prstDash val="solid"/>
+                    </a:lnBlToTr>
+                  </a:tcPr>
+                </a:tc>
+                <a:extLst>
+                  <a:ext uri="{0D108BD9-81ED-4DB2-BD59-A6C34878D82A}">
+                    <a16:rowId xmlns:a16="http://schemas.microsoft.com/office/drawing/2014/main" val="3003448997"/>
+                  </a:ext>
+                </a:extLst>
+              </a:tr>
+              <a:tr h="0">
+                <a:tc>
+                  <a:txBody>
+                    <a:bodyPr/>
+                    <a:lstStyle/>
+                    <a:p>
+                      <a:pPr marL="0" marR="0" indent="0" algn="l" defTabSz="584200" rtl="0" eaLnBrk="1" fontAlgn="auto" latinLnBrk="0" hangingPunct="1">
+                        <a:lnSpc>
+                          <a:spcPct val="100000"/>
+                        </a:lnSpc>
+                        <a:spcBef>
+                          <a:spcPts val="0"/>
+                        </a:spcBef>
+                        <a:spcAft>
+                          <a:spcPts val="0"/>
+                        </a:spcAft>
+                        <a:buClrTx/>
+                        <a:buSzTx/>
+                        <a:buFontTx/>
+                        <a:buNone/>
+                        <a:tabLst/>
+                        <a:defRPr/>
+                      </a:pPr>
+                      <a:r>
+                        <a:rPr lang="en-US" sz="1000" i="0" baseline="0" dirty="0">
+                          <a:solidFill>
+                            <a:srgbClr val="000000"/>
+                          </a:solidFill>
+                          <a:latin typeface="Consolas" panose="020B0609020204030204" pitchFamily="49" charset="0"/>
+                          <a:cs typeface="Segoe UI" pitchFamily="34" charset="0"/>
+                        </a:rPr>
+                        <a:t>from </a:t>
+                      </a:r>
+                      <a:r>
+                        <a:rPr lang="en-US" sz="1000" i="0" baseline="0" dirty="0" err="1">
+                          <a:solidFill>
+                            <a:srgbClr val="000000"/>
+                          </a:solidFill>
+                          <a:latin typeface="Consolas" panose="020B0609020204030204" pitchFamily="49" charset="0"/>
+                          <a:cs typeface="Segoe UI" pitchFamily="34" charset="0"/>
+                        </a:rPr>
+                        <a:t>django.db</a:t>
+                      </a:r>
+                      <a:r>
+                        <a:rPr lang="en-US" sz="1000" i="0" baseline="0" dirty="0">
+                          <a:solidFill>
+                            <a:srgbClr val="000000"/>
+                          </a:solidFill>
+                          <a:latin typeface="Consolas" panose="020B0609020204030204" pitchFamily="49" charset="0"/>
+                          <a:cs typeface="Segoe UI" pitchFamily="34" charset="0"/>
+                        </a:rPr>
+                        <a:t> import models</a:t>
+                      </a:r>
+                    </a:p>
+                    <a:p>
+                      <a:pPr marL="0" marR="0" indent="0" algn="l" defTabSz="584200" rtl="0" eaLnBrk="1" fontAlgn="auto" latinLnBrk="0" hangingPunct="1">
+                        <a:lnSpc>
+                          <a:spcPct val="100000"/>
+                        </a:lnSpc>
+                        <a:spcBef>
+                          <a:spcPts val="0"/>
+                        </a:spcBef>
+                        <a:spcAft>
+                          <a:spcPts val="0"/>
+                        </a:spcAft>
+                        <a:buClrTx/>
+                        <a:buSzTx/>
+                        <a:buFontTx/>
+                        <a:buNone/>
+                        <a:tabLst/>
+                        <a:defRPr/>
+                      </a:pPr>
+                      <a:endParaRPr lang="en-US" sz="1000" i="0" baseline="0" dirty="0">
+                        <a:solidFill>
+                          <a:srgbClr val="000000"/>
+                        </a:solidFill>
+                        <a:latin typeface="Consolas" panose="020B0609020204030204" pitchFamily="49" charset="0"/>
+                        <a:cs typeface="Segoe UI" pitchFamily="34" charset="0"/>
+                      </a:endParaRPr>
+                    </a:p>
+                    <a:p>
+                      <a:pPr marL="0" marR="0" indent="0" algn="l" defTabSz="584200" rtl="0" eaLnBrk="1" fontAlgn="auto" latinLnBrk="0" hangingPunct="1">
+                        <a:lnSpc>
+                          <a:spcPct val="100000"/>
+                        </a:lnSpc>
+                        <a:spcBef>
+                          <a:spcPts val="0"/>
+                        </a:spcBef>
+                        <a:spcAft>
+                          <a:spcPts val="0"/>
+                        </a:spcAft>
+                        <a:buClrTx/>
+                        <a:buSzTx/>
+                        <a:buFontTx/>
+                        <a:buNone/>
+                        <a:tabLst/>
+                        <a:defRPr/>
+                      </a:pPr>
+                      <a:r>
+                        <a:rPr lang="en-US" sz="1000" i="0" baseline="0" dirty="0">
+                          <a:solidFill>
+                            <a:srgbClr val="000000"/>
+                          </a:solidFill>
+                          <a:latin typeface="Consolas" panose="020B0609020204030204" pitchFamily="49" charset="0"/>
+                          <a:cs typeface="Segoe UI" pitchFamily="34" charset="0"/>
+                        </a:rPr>
+                        <a:t>class Category(</a:t>
+                      </a:r>
+                      <a:r>
+                        <a:rPr lang="en-US" sz="1000" i="0" baseline="0" dirty="0" err="1">
+                          <a:solidFill>
+                            <a:srgbClr val="000000"/>
+                          </a:solidFill>
+                          <a:latin typeface="Consolas" panose="020B0609020204030204" pitchFamily="49" charset="0"/>
+                          <a:cs typeface="Segoe UI" pitchFamily="34" charset="0"/>
+                        </a:rPr>
+                        <a:t>models.Model</a:t>
+                      </a:r>
+                      <a:r>
+                        <a:rPr lang="en-US" sz="1000" i="0" baseline="0" dirty="0">
+                          <a:solidFill>
+                            <a:srgbClr val="000000"/>
+                          </a:solidFill>
+                          <a:latin typeface="Consolas" panose="020B0609020204030204" pitchFamily="49" charset="0"/>
+                          <a:cs typeface="Segoe UI" pitchFamily="34" charset="0"/>
+                        </a:rPr>
+                        <a:t>):</a:t>
+                      </a:r>
+                    </a:p>
+                    <a:p>
+                      <a:pPr marL="0" marR="0" indent="0" algn="l" defTabSz="584200" rtl="0" eaLnBrk="1" fontAlgn="auto" latinLnBrk="0" hangingPunct="1">
+                        <a:lnSpc>
+                          <a:spcPct val="100000"/>
+                        </a:lnSpc>
+                        <a:spcBef>
+                          <a:spcPts val="0"/>
+                        </a:spcBef>
+                        <a:spcAft>
+                          <a:spcPts val="0"/>
+                        </a:spcAft>
+                        <a:buClrTx/>
+                        <a:buSzTx/>
+                        <a:buFontTx/>
+                        <a:buNone/>
+                        <a:tabLst/>
+                        <a:defRPr/>
+                      </a:pPr>
+                      <a:r>
+                        <a:rPr lang="en-US" sz="1000" i="0" baseline="0" dirty="0">
+                          <a:solidFill>
+                            <a:srgbClr val="000000"/>
+                          </a:solidFill>
+                          <a:latin typeface="Consolas" panose="020B0609020204030204" pitchFamily="49" charset="0"/>
+                          <a:cs typeface="Segoe UI" pitchFamily="34" charset="0"/>
+                        </a:rPr>
+                        <a:t>    name = </a:t>
+                      </a:r>
+                      <a:r>
+                        <a:rPr lang="en-US" sz="1000" i="0" baseline="0" dirty="0" err="1">
+                          <a:solidFill>
+                            <a:srgbClr val="000000"/>
+                          </a:solidFill>
+                          <a:latin typeface="Consolas" panose="020B0609020204030204" pitchFamily="49" charset="0"/>
+                          <a:cs typeface="Segoe UI" pitchFamily="34" charset="0"/>
+                        </a:rPr>
+                        <a:t>models.CharField</a:t>
+                      </a:r>
+                      <a:r>
+                        <a:rPr lang="en-US" sz="1000" i="0" baseline="0" dirty="0">
+                          <a:solidFill>
+                            <a:srgbClr val="000000"/>
+                          </a:solidFill>
+                          <a:latin typeface="Consolas" panose="020B0609020204030204" pitchFamily="49" charset="0"/>
+                          <a:cs typeface="Segoe UI" pitchFamily="34" charset="0"/>
+                        </a:rPr>
+                        <a:t>(</a:t>
+                      </a:r>
+                      <a:r>
+                        <a:rPr lang="en-US" sz="1000" i="0" baseline="0" dirty="0" err="1">
+                          <a:solidFill>
+                            <a:srgbClr val="000000"/>
+                          </a:solidFill>
+                          <a:latin typeface="Consolas" panose="020B0609020204030204" pitchFamily="49" charset="0"/>
+                          <a:cs typeface="Segoe UI" pitchFamily="34" charset="0"/>
+                        </a:rPr>
+                        <a:t>max_length</a:t>
+                      </a:r>
+                      <a:r>
+                        <a:rPr lang="en-US" sz="1000" i="0" baseline="0" dirty="0">
+                          <a:solidFill>
+                            <a:srgbClr val="000000"/>
+                          </a:solidFill>
+                          <a:latin typeface="Consolas" panose="020B0609020204030204" pitchFamily="49" charset="0"/>
+                          <a:cs typeface="Segoe UI" pitchFamily="34" charset="0"/>
+                        </a:rPr>
+                        <a:t>=128, unique=True)</a:t>
+                      </a:r>
+                    </a:p>
+                    <a:p>
+                      <a:pPr marL="0" marR="0" indent="0" algn="l" defTabSz="584200" rtl="0" eaLnBrk="1" fontAlgn="auto" latinLnBrk="0" hangingPunct="1">
+                        <a:lnSpc>
+                          <a:spcPct val="100000"/>
+                        </a:lnSpc>
+                        <a:spcBef>
+                          <a:spcPts val="0"/>
+                        </a:spcBef>
+                        <a:spcAft>
+                          <a:spcPts val="0"/>
+                        </a:spcAft>
+                        <a:buClrTx/>
+                        <a:buSzTx/>
+                        <a:buFontTx/>
+                        <a:buNone/>
+                        <a:tabLst/>
+                        <a:defRPr/>
+                      </a:pPr>
+                      <a:endParaRPr lang="en-US" sz="1000" i="0" baseline="0" dirty="0">
+                        <a:solidFill>
+                          <a:srgbClr val="000000"/>
+                        </a:solidFill>
+                        <a:latin typeface="Consolas" panose="020B0609020204030204" pitchFamily="49" charset="0"/>
+                        <a:cs typeface="Segoe UI" pitchFamily="34" charset="0"/>
+                      </a:endParaRPr>
+                    </a:p>
+                    <a:p>
+                      <a:pPr marL="0" marR="0" indent="0" algn="l" defTabSz="584200" rtl="0" eaLnBrk="1" fontAlgn="auto" latinLnBrk="0" hangingPunct="1">
+                        <a:lnSpc>
+                          <a:spcPct val="100000"/>
+                        </a:lnSpc>
+                        <a:spcBef>
+                          <a:spcPts val="0"/>
+                        </a:spcBef>
+                        <a:spcAft>
+                          <a:spcPts val="0"/>
+                        </a:spcAft>
+                        <a:buClrTx/>
+                        <a:buSzTx/>
+                        <a:buFontTx/>
+                        <a:buNone/>
+                        <a:tabLst/>
+                        <a:defRPr/>
+                      </a:pPr>
+                      <a:r>
+                        <a:rPr lang="en-US" sz="1000" i="0" baseline="0" dirty="0">
+                          <a:solidFill>
+                            <a:srgbClr val="000000"/>
+                          </a:solidFill>
+                          <a:latin typeface="Consolas" panose="020B0609020204030204" pitchFamily="49" charset="0"/>
+                          <a:cs typeface="Segoe UI" pitchFamily="34" charset="0"/>
+                        </a:rPr>
+                        <a:t>    def __str__(self):</a:t>
+                      </a:r>
+                    </a:p>
+                    <a:p>
+                      <a:pPr marL="0" marR="0" indent="0" algn="l" defTabSz="584200" rtl="0" eaLnBrk="1" fontAlgn="auto" latinLnBrk="0" hangingPunct="1">
+                        <a:lnSpc>
+                          <a:spcPct val="100000"/>
+                        </a:lnSpc>
+                        <a:spcBef>
+                          <a:spcPts val="0"/>
+                        </a:spcBef>
+                        <a:spcAft>
+                          <a:spcPts val="0"/>
+                        </a:spcAft>
+                        <a:buClrTx/>
+                        <a:buSzTx/>
+                        <a:buFontTx/>
+                        <a:buNone/>
+                        <a:tabLst/>
+                        <a:defRPr/>
+                      </a:pPr>
+                      <a:r>
+                        <a:rPr lang="en-US" sz="1000" i="0" baseline="0" dirty="0">
+                          <a:solidFill>
+                            <a:srgbClr val="000000"/>
+                          </a:solidFill>
+                          <a:latin typeface="Consolas" panose="020B0609020204030204" pitchFamily="49" charset="0"/>
+                          <a:cs typeface="Segoe UI" pitchFamily="34" charset="0"/>
+                        </a:rPr>
+                        <a:t>        return self.name</a:t>
+                      </a:r>
+                    </a:p>
+                    <a:p>
+                      <a:pPr marL="0" marR="0" indent="0" algn="l" defTabSz="584200" rtl="0" eaLnBrk="1" fontAlgn="auto" latinLnBrk="0" hangingPunct="1">
+                        <a:lnSpc>
+                          <a:spcPct val="100000"/>
+                        </a:lnSpc>
+                        <a:spcBef>
+                          <a:spcPts val="0"/>
+                        </a:spcBef>
+                        <a:spcAft>
+                          <a:spcPts val="0"/>
+                        </a:spcAft>
+                        <a:buClrTx/>
+                        <a:buSzTx/>
+                        <a:buFontTx/>
+                        <a:buNone/>
+                        <a:tabLst/>
+                        <a:defRPr/>
+                      </a:pPr>
+                      <a:endParaRPr lang="en-US" sz="1000" i="0" baseline="0" dirty="0">
+                        <a:solidFill>
+                          <a:srgbClr val="000000"/>
+                        </a:solidFill>
+                        <a:latin typeface="Consolas" panose="020B0609020204030204" pitchFamily="49" charset="0"/>
+                        <a:cs typeface="Segoe UI" pitchFamily="34" charset="0"/>
+                      </a:endParaRPr>
+                    </a:p>
+                    <a:p>
+                      <a:pPr marL="0" marR="0" indent="0" algn="l" defTabSz="584200" rtl="0" eaLnBrk="1" fontAlgn="auto" latinLnBrk="0" hangingPunct="1">
+                        <a:lnSpc>
+                          <a:spcPct val="100000"/>
+                        </a:lnSpc>
+                        <a:spcBef>
+                          <a:spcPts val="0"/>
+                        </a:spcBef>
+                        <a:spcAft>
+                          <a:spcPts val="0"/>
+                        </a:spcAft>
+                        <a:buClrTx/>
+                        <a:buSzTx/>
+                        <a:buFontTx/>
+                        <a:buNone/>
+                        <a:tabLst/>
+                        <a:defRPr/>
+                      </a:pPr>
+                      <a:r>
+                        <a:rPr lang="en-US" sz="1000" i="0" baseline="0" dirty="0">
+                          <a:solidFill>
+                            <a:srgbClr val="000000"/>
+                          </a:solidFill>
+                          <a:latin typeface="Consolas" panose="020B0609020204030204" pitchFamily="49" charset="0"/>
+                          <a:cs typeface="Segoe UI" pitchFamily="34" charset="0"/>
+                        </a:rPr>
+                        <a:t>class Page(</a:t>
+                      </a:r>
+                      <a:r>
+                        <a:rPr lang="en-US" sz="1000" i="0" baseline="0" dirty="0" err="1">
+                          <a:solidFill>
+                            <a:srgbClr val="000000"/>
+                          </a:solidFill>
+                          <a:latin typeface="Consolas" panose="020B0609020204030204" pitchFamily="49" charset="0"/>
+                          <a:cs typeface="Segoe UI" pitchFamily="34" charset="0"/>
+                        </a:rPr>
+                        <a:t>models.Model</a:t>
+                      </a:r>
+                      <a:r>
+                        <a:rPr lang="en-US" sz="1000" i="0" baseline="0" dirty="0">
+                          <a:solidFill>
+                            <a:srgbClr val="000000"/>
+                          </a:solidFill>
+                          <a:latin typeface="Consolas" panose="020B0609020204030204" pitchFamily="49" charset="0"/>
+                          <a:cs typeface="Segoe UI" pitchFamily="34" charset="0"/>
+                        </a:rPr>
+                        <a:t>):</a:t>
+                      </a:r>
+                    </a:p>
+                    <a:p>
+                      <a:pPr marL="0" marR="0" indent="0" algn="l" defTabSz="584200" rtl="0" eaLnBrk="1" fontAlgn="auto" latinLnBrk="0" hangingPunct="1">
+                        <a:lnSpc>
+                          <a:spcPct val="100000"/>
+                        </a:lnSpc>
+                        <a:spcBef>
+                          <a:spcPts val="0"/>
+                        </a:spcBef>
+                        <a:spcAft>
+                          <a:spcPts val="0"/>
+                        </a:spcAft>
+                        <a:buClrTx/>
+                        <a:buSzTx/>
+                        <a:buFontTx/>
+                        <a:buNone/>
+                        <a:tabLst/>
+                        <a:defRPr/>
+                      </a:pPr>
+                      <a:r>
+                        <a:rPr lang="en-US" sz="1000" i="0" baseline="0" dirty="0">
+                          <a:solidFill>
+                            <a:srgbClr val="000000"/>
+                          </a:solidFill>
+                          <a:latin typeface="Consolas" panose="020B0609020204030204" pitchFamily="49" charset="0"/>
+                          <a:cs typeface="Segoe UI" pitchFamily="34" charset="0"/>
+                        </a:rPr>
+                        <a:t>    category = </a:t>
+                      </a:r>
+                      <a:r>
+                        <a:rPr lang="en-US" sz="1000" i="0" baseline="0" dirty="0" err="1">
+                          <a:solidFill>
+                            <a:srgbClr val="000000"/>
+                          </a:solidFill>
+                          <a:latin typeface="Consolas" panose="020B0609020204030204" pitchFamily="49" charset="0"/>
+                          <a:cs typeface="Segoe UI" pitchFamily="34" charset="0"/>
+                        </a:rPr>
+                        <a:t>models.ForeignKey</a:t>
+                      </a:r>
+                      <a:r>
+                        <a:rPr lang="en-US" sz="1000" i="0" baseline="0" dirty="0">
+                          <a:solidFill>
+                            <a:srgbClr val="000000"/>
+                          </a:solidFill>
+                          <a:latin typeface="Consolas" panose="020B0609020204030204" pitchFamily="49" charset="0"/>
+                          <a:cs typeface="Segoe UI" pitchFamily="34" charset="0"/>
+                        </a:rPr>
+                        <a:t>(Category, </a:t>
+                      </a:r>
+                      <a:r>
+                        <a:rPr lang="en-US" sz="1000" i="0" baseline="0" dirty="0" err="1">
+                          <a:solidFill>
+                            <a:srgbClr val="000000"/>
+                          </a:solidFill>
+                          <a:latin typeface="Consolas" panose="020B0609020204030204" pitchFamily="49" charset="0"/>
+                          <a:cs typeface="Segoe UI" pitchFamily="34" charset="0"/>
+                        </a:rPr>
+                        <a:t>on_delete</a:t>
+                      </a:r>
+                      <a:r>
+                        <a:rPr lang="en-US" sz="1000" i="0" baseline="0" dirty="0">
+                          <a:solidFill>
+                            <a:srgbClr val="000000"/>
+                          </a:solidFill>
+                          <a:latin typeface="Consolas" panose="020B0609020204030204" pitchFamily="49" charset="0"/>
+                          <a:cs typeface="Segoe UI" pitchFamily="34" charset="0"/>
+                        </a:rPr>
+                        <a:t>=</a:t>
+                      </a:r>
+                      <a:r>
+                        <a:rPr lang="en-US" sz="1000" i="0" baseline="0" dirty="0" err="1">
+                          <a:solidFill>
+                            <a:srgbClr val="000000"/>
+                          </a:solidFill>
+                          <a:latin typeface="Consolas" panose="020B0609020204030204" pitchFamily="49" charset="0"/>
+                          <a:cs typeface="Segoe UI" pitchFamily="34" charset="0"/>
+                        </a:rPr>
+                        <a:t>models.CASCADE</a:t>
+                      </a:r>
+                      <a:r>
+                        <a:rPr lang="en-US" sz="1000" i="0" baseline="0" dirty="0">
+                          <a:solidFill>
+                            <a:srgbClr val="000000"/>
+                          </a:solidFill>
+                          <a:latin typeface="Consolas" panose="020B0609020204030204" pitchFamily="49" charset="0"/>
+                          <a:cs typeface="Segoe UI" pitchFamily="34" charset="0"/>
+                        </a:rPr>
+                        <a:t>)</a:t>
+                      </a:r>
+                    </a:p>
+                    <a:p>
+                      <a:pPr marL="0" marR="0" indent="0" algn="l" defTabSz="584200" rtl="0" eaLnBrk="1" fontAlgn="auto" latinLnBrk="0" hangingPunct="1">
+                        <a:lnSpc>
+                          <a:spcPct val="100000"/>
+                        </a:lnSpc>
+                        <a:spcBef>
+                          <a:spcPts val="0"/>
+                        </a:spcBef>
+                        <a:spcAft>
+                          <a:spcPts val="0"/>
+                        </a:spcAft>
+                        <a:buClrTx/>
+                        <a:buSzTx/>
+                        <a:buFontTx/>
+                        <a:buNone/>
+                        <a:tabLst/>
+                        <a:defRPr/>
+                      </a:pPr>
+                      <a:r>
+                        <a:rPr lang="en-US" sz="1000" i="0" baseline="0" dirty="0">
+                          <a:solidFill>
+                            <a:srgbClr val="000000"/>
+                          </a:solidFill>
+                          <a:latin typeface="Consolas" panose="020B0609020204030204" pitchFamily="49" charset="0"/>
+                          <a:cs typeface="Segoe UI" pitchFamily="34" charset="0"/>
+                        </a:rPr>
+                        <a:t>    title    = </a:t>
+                      </a:r>
+                      <a:r>
+                        <a:rPr lang="en-US" sz="1000" i="0" baseline="0" dirty="0" err="1">
+                          <a:solidFill>
+                            <a:srgbClr val="000000"/>
+                          </a:solidFill>
+                          <a:latin typeface="Consolas" panose="020B0609020204030204" pitchFamily="49" charset="0"/>
+                          <a:cs typeface="Segoe UI" pitchFamily="34" charset="0"/>
+                        </a:rPr>
+                        <a:t>models.CharField</a:t>
+                      </a:r>
+                      <a:r>
+                        <a:rPr lang="en-US" sz="1000" i="0" baseline="0" dirty="0">
+                          <a:solidFill>
+                            <a:srgbClr val="000000"/>
+                          </a:solidFill>
+                          <a:latin typeface="Consolas" panose="020B0609020204030204" pitchFamily="49" charset="0"/>
+                          <a:cs typeface="Segoe UI" pitchFamily="34" charset="0"/>
+                        </a:rPr>
+                        <a:t>(</a:t>
+                      </a:r>
+                      <a:r>
+                        <a:rPr lang="en-US" sz="1000" i="0" baseline="0" dirty="0" err="1">
+                          <a:solidFill>
+                            <a:srgbClr val="000000"/>
+                          </a:solidFill>
+                          <a:latin typeface="Consolas" panose="020B0609020204030204" pitchFamily="49" charset="0"/>
+                          <a:cs typeface="Segoe UI" pitchFamily="34" charset="0"/>
+                        </a:rPr>
+                        <a:t>max_length</a:t>
+                      </a:r>
+                      <a:r>
+                        <a:rPr lang="en-US" sz="1000" i="0" baseline="0" dirty="0">
+                          <a:solidFill>
+                            <a:srgbClr val="000000"/>
+                          </a:solidFill>
+                          <a:latin typeface="Consolas" panose="020B0609020204030204" pitchFamily="49" charset="0"/>
+                          <a:cs typeface="Segoe UI" pitchFamily="34" charset="0"/>
+                        </a:rPr>
+                        <a:t>=128)</a:t>
+                      </a:r>
+                    </a:p>
+                    <a:p>
+                      <a:pPr marL="0" marR="0" indent="0" algn="l" defTabSz="584200" rtl="0" eaLnBrk="1" fontAlgn="auto" latinLnBrk="0" hangingPunct="1">
+                        <a:lnSpc>
+                          <a:spcPct val="100000"/>
+                        </a:lnSpc>
+                        <a:spcBef>
+                          <a:spcPts val="0"/>
+                        </a:spcBef>
+                        <a:spcAft>
+                          <a:spcPts val="0"/>
+                        </a:spcAft>
+                        <a:buClrTx/>
+                        <a:buSzTx/>
+                        <a:buFontTx/>
+                        <a:buNone/>
+                        <a:tabLst/>
+                        <a:defRPr/>
+                      </a:pPr>
+                      <a:r>
+                        <a:rPr lang="en-US" sz="1000" i="0" baseline="0" dirty="0">
+                          <a:solidFill>
+                            <a:srgbClr val="000000"/>
+                          </a:solidFill>
+                          <a:latin typeface="Consolas" panose="020B0609020204030204" pitchFamily="49" charset="0"/>
+                          <a:cs typeface="Segoe UI" pitchFamily="34" charset="0"/>
+                        </a:rPr>
+                        <a:t>    </a:t>
+                      </a:r>
+                      <a:r>
+                        <a:rPr lang="en-US" sz="1000" i="0" baseline="0" dirty="0" err="1">
+                          <a:solidFill>
+                            <a:srgbClr val="000000"/>
+                          </a:solidFill>
+                          <a:latin typeface="Consolas" panose="020B0609020204030204" pitchFamily="49" charset="0"/>
+                          <a:cs typeface="Segoe UI" pitchFamily="34" charset="0"/>
+                        </a:rPr>
+                        <a:t>url</a:t>
+                      </a:r>
+                      <a:r>
+                        <a:rPr lang="en-US" sz="1000" i="0" baseline="0" dirty="0">
+                          <a:solidFill>
+                            <a:srgbClr val="000000"/>
+                          </a:solidFill>
+                          <a:latin typeface="Consolas" panose="020B0609020204030204" pitchFamily="49" charset="0"/>
+                          <a:cs typeface="Segoe UI" pitchFamily="34" charset="0"/>
+                        </a:rPr>
+                        <a:t>      = </a:t>
+                      </a:r>
+                      <a:r>
+                        <a:rPr lang="en-US" sz="1000" i="0" baseline="0" dirty="0" err="1">
+                          <a:solidFill>
+                            <a:srgbClr val="000000"/>
+                          </a:solidFill>
+                          <a:latin typeface="Consolas" panose="020B0609020204030204" pitchFamily="49" charset="0"/>
+                          <a:cs typeface="Segoe UI" pitchFamily="34" charset="0"/>
+                        </a:rPr>
+                        <a:t>models.URLField</a:t>
+                      </a:r>
+                      <a:r>
+                        <a:rPr lang="en-US" sz="1000" i="0" baseline="0" dirty="0">
+                          <a:solidFill>
+                            <a:srgbClr val="000000"/>
+                          </a:solidFill>
+                          <a:latin typeface="Consolas" panose="020B0609020204030204" pitchFamily="49" charset="0"/>
+                          <a:cs typeface="Segoe UI" pitchFamily="34" charset="0"/>
+                        </a:rPr>
+                        <a:t>()</a:t>
+                      </a:r>
+                    </a:p>
+                    <a:p>
+                      <a:pPr marL="0" marR="0" indent="0" algn="l" defTabSz="584200" rtl="0" eaLnBrk="1" fontAlgn="auto" latinLnBrk="0" hangingPunct="1">
+                        <a:lnSpc>
+                          <a:spcPct val="100000"/>
+                        </a:lnSpc>
+                        <a:spcBef>
+                          <a:spcPts val="0"/>
+                        </a:spcBef>
+                        <a:spcAft>
+                          <a:spcPts val="0"/>
+                        </a:spcAft>
+                        <a:buClrTx/>
+                        <a:buSzTx/>
+                        <a:buFontTx/>
+                        <a:buNone/>
+                        <a:tabLst/>
+                        <a:defRPr/>
+                      </a:pPr>
+                      <a:r>
+                        <a:rPr lang="en-US" sz="1000" i="0" baseline="0" dirty="0">
+                          <a:solidFill>
+                            <a:srgbClr val="000000"/>
+                          </a:solidFill>
+                          <a:latin typeface="Consolas" panose="020B0609020204030204" pitchFamily="49" charset="0"/>
+                          <a:cs typeface="Segoe UI" pitchFamily="34" charset="0"/>
+                        </a:rPr>
+                        <a:t>    views    = </a:t>
+                      </a:r>
+                      <a:r>
+                        <a:rPr lang="en-US" sz="1000" i="0" baseline="0" dirty="0" err="1">
+                          <a:solidFill>
+                            <a:srgbClr val="000000"/>
+                          </a:solidFill>
+                          <a:latin typeface="Consolas" panose="020B0609020204030204" pitchFamily="49" charset="0"/>
+                          <a:cs typeface="Segoe UI" pitchFamily="34" charset="0"/>
+                        </a:rPr>
+                        <a:t>models.IntegerField</a:t>
+                      </a:r>
+                      <a:r>
+                        <a:rPr lang="en-US" sz="1000" i="0" baseline="0" dirty="0">
+                          <a:solidFill>
+                            <a:srgbClr val="000000"/>
+                          </a:solidFill>
+                          <a:latin typeface="Consolas" panose="020B0609020204030204" pitchFamily="49" charset="0"/>
+                          <a:cs typeface="Segoe UI" pitchFamily="34" charset="0"/>
+                        </a:rPr>
+                        <a:t>(default=0)</a:t>
+                      </a:r>
+                    </a:p>
+                    <a:p>
+                      <a:pPr marL="0" marR="0" indent="0" algn="l" defTabSz="584200" rtl="0" eaLnBrk="1" fontAlgn="auto" latinLnBrk="0" hangingPunct="1">
+                        <a:lnSpc>
+                          <a:spcPct val="100000"/>
+                        </a:lnSpc>
+                        <a:spcBef>
+                          <a:spcPts val="0"/>
+                        </a:spcBef>
+                        <a:spcAft>
+                          <a:spcPts val="0"/>
+                        </a:spcAft>
+                        <a:buClrTx/>
+                        <a:buSzTx/>
+                        <a:buFontTx/>
+                        <a:buNone/>
+                        <a:tabLst/>
+                        <a:defRPr/>
+                      </a:pPr>
+                      <a:endParaRPr lang="en-US" sz="1000" i="0" baseline="0" dirty="0">
+                        <a:solidFill>
+                          <a:srgbClr val="000000"/>
+                        </a:solidFill>
+                        <a:latin typeface="Consolas" panose="020B0609020204030204" pitchFamily="49" charset="0"/>
+                        <a:cs typeface="Segoe UI" pitchFamily="34" charset="0"/>
+                      </a:endParaRPr>
+                    </a:p>
+                    <a:p>
+                      <a:pPr marL="0" marR="0" indent="0" algn="l" defTabSz="584200" rtl="0" eaLnBrk="1" fontAlgn="auto" latinLnBrk="0" hangingPunct="1">
+                        <a:lnSpc>
+                          <a:spcPct val="100000"/>
+                        </a:lnSpc>
+                        <a:spcBef>
+                          <a:spcPts val="0"/>
+                        </a:spcBef>
+                        <a:spcAft>
+                          <a:spcPts val="0"/>
+                        </a:spcAft>
+                        <a:buClrTx/>
+                        <a:buSzTx/>
+                        <a:buFontTx/>
+                        <a:buNone/>
+                        <a:tabLst/>
+                        <a:defRPr/>
+                      </a:pPr>
+                      <a:r>
+                        <a:rPr lang="en-US" sz="1000" i="0" baseline="0" dirty="0">
+                          <a:solidFill>
+                            <a:srgbClr val="000000"/>
+                          </a:solidFill>
+                          <a:latin typeface="Consolas" panose="020B0609020204030204" pitchFamily="49" charset="0"/>
+                          <a:cs typeface="Segoe UI" pitchFamily="34" charset="0"/>
+                        </a:rPr>
+                        <a:t>    def __str__(self):</a:t>
+                      </a:r>
+                    </a:p>
+                    <a:p>
+                      <a:pPr marL="0" marR="0" indent="0" algn="l" defTabSz="584200" rtl="0" eaLnBrk="1" fontAlgn="auto" latinLnBrk="0" hangingPunct="1">
+                        <a:lnSpc>
+                          <a:spcPct val="100000"/>
+                        </a:lnSpc>
+                        <a:spcBef>
+                          <a:spcPts val="0"/>
+                        </a:spcBef>
+                        <a:spcAft>
+                          <a:spcPts val="0"/>
+                        </a:spcAft>
+                        <a:buClrTx/>
+                        <a:buSzTx/>
+                        <a:buFontTx/>
+                        <a:buNone/>
+                        <a:tabLst/>
+                        <a:defRPr/>
+                      </a:pPr>
+                      <a:r>
+                        <a:rPr lang="en-US" sz="1000" i="0" baseline="0" dirty="0">
+                          <a:solidFill>
+                            <a:srgbClr val="000000"/>
+                          </a:solidFill>
+                          <a:latin typeface="Consolas" panose="020B0609020204030204" pitchFamily="49" charset="0"/>
+                          <a:cs typeface="Segoe UI" pitchFamily="34" charset="0"/>
+                        </a:rPr>
+                        <a:t>        return </a:t>
+                      </a:r>
+                      <a:r>
+                        <a:rPr lang="en-US" sz="1000" i="0" baseline="0" dirty="0" err="1">
+                          <a:solidFill>
+                            <a:srgbClr val="000000"/>
+                          </a:solidFill>
+                          <a:latin typeface="Consolas" panose="020B0609020204030204" pitchFamily="49" charset="0"/>
+                          <a:cs typeface="Segoe UI" pitchFamily="34" charset="0"/>
+                        </a:rPr>
+                        <a:t>self.title</a:t>
+                      </a:r>
+                      <a:endParaRPr lang="en-GB" sz="1000" i="0" baseline="0" dirty="0">
+                        <a:solidFill>
+                          <a:srgbClr val="000000"/>
+                        </a:solidFill>
+                        <a:latin typeface="Consolas" panose="020B0609020204030204" pitchFamily="49" charset="0"/>
+                        <a:cs typeface="Segoe UI" pitchFamily="34" charset="0"/>
+                      </a:endParaRPr>
+                    </a:p>
+                  </a:txBody>
+                  <a:tcPr marL="46800" marR="46800" marT="21600" marB="21600">
+                    <a:lnL w="12700" cap="flat" cmpd="sng" algn="ctr">
+                      <a:solidFill>
+                        <a:schemeClr val="tx1"/>
+                      </a:solidFill>
+                      <a:prstDash val="solid"/>
+                      <a:round/>
+                      <a:headEnd type="none" w="med" len="med"/>
+                      <a:tailEnd type="none" w="med" len="med"/>
+                    </a:lnL>
+                    <a:lnR w="12700" cap="flat" cmpd="sng" algn="ctr">
+                      <a:solidFill>
+                        <a:schemeClr val="tx1"/>
+                      </a:solidFill>
+                      <a:prstDash val="solid"/>
+                      <a:round/>
+                      <a:headEnd type="none" w="med" len="med"/>
+                      <a:tailEnd type="none" w="med" len="med"/>
+                    </a:lnR>
+                    <a:lnT w="6350" cap="flat" cmpd="sng" algn="ctr">
+                      <a:noFill/>
+                      <a:prstDash val="solid"/>
+                      <a:round/>
+                      <a:headEnd type="none" w="med" len="med"/>
+                      <a:tailEnd type="none" w="med" len="med"/>
+                    </a:lnT>
+                    <a:lnB w="6350" cap="flat" cmpd="sng" algn="ctr">
+                      <a:noFill/>
+                      <a:prstDash val="solid"/>
+                      <a:round/>
+                      <a:headEnd type="none" w="med" len="med"/>
+                      <a:tailEnd type="none" w="med" len="med"/>
+                    </a:lnB>
+                    <a:lnTlToBr w="12700" cmpd="sng">
+                      <a:noFill/>
+                      <a:prstDash val="solid"/>
+                    </a:lnTlToBr>
+                    <a:lnBlToTr w="12700" cmpd="sng">
+                      <a:noFill/>
+                      <a:prstDash val="solid"/>
+                    </a:lnBlToTr>
+                  </a:tcPr>
+                </a:tc>
+                <a:extLst>
+                  <a:ext uri="{0D108BD9-81ED-4DB2-BD59-A6C34878D82A}">
+                    <a16:rowId xmlns:a16="http://schemas.microsoft.com/office/drawing/2014/main" val="3983574495"/>
+                  </a:ext>
+                </a:extLst>
+              </a:tr>
+            </a:tbl>
+          </a:graphicData>
+        </a:graphic>
+      </p:graphicFrame>
+      <p:graphicFrame>
+        <p:nvGraphicFramePr>
+          <p:cNvPr id="20" name="Table 19">
+            <a:extLst>
+              <a:ext uri="{FF2B5EF4-FFF2-40B4-BE49-F238E27FC236}">
+                <a16:creationId xmlns:a16="http://schemas.microsoft.com/office/drawing/2014/main" id="{915CF411-D8D6-4332-965B-87FE20AC8AAC}"/>
+              </a:ext>
+            </a:extLst>
+          </p:cNvPr>
+          <p:cNvGraphicFramePr>
+            <a:graphicFrameLocks noGrp="1"/>
+          </p:cNvGraphicFramePr>
+          <p:nvPr>
+            <p:extLst>
+              <p:ext uri="{D42A27DB-BD31-4B8C-83A1-F6EECF244321}">
+                <p14:modId xmlns:p14="http://schemas.microsoft.com/office/powerpoint/2010/main" val="1621304794"/>
+              </p:ext>
+            </p:extLst>
+          </p:nvPr>
+        </p:nvGraphicFramePr>
+        <p:xfrm>
+          <a:off x="1117486" y="5459495"/>
+          <a:ext cx="3452495" cy="2194560"/>
+        </p:xfrm>
+        <a:graphic>
+          <a:graphicData uri="http://schemas.openxmlformats.org/drawingml/2006/table">
+            <a:tbl>
+              <a:tblPr firstRow="1" bandRow="1">
+                <a:tableStyleId>{5940675A-B579-460E-94D1-54222C63F5DA}</a:tableStyleId>
+              </a:tblPr>
+              <a:tblGrid>
+                <a:gridCol w="3452495">
+                  <a:extLst>
+                    <a:ext uri="{9D8B030D-6E8A-4147-A177-3AD203B41FA5}">
+                      <a16:colId xmlns:a16="http://schemas.microsoft.com/office/drawing/2014/main" val="20000"/>
+                    </a:ext>
+                  </a:extLst>
+                </a:gridCol>
+              </a:tblGrid>
+              <a:tr h="216000">
+                <a:tc>
+                  <a:txBody>
+                    <a:bodyPr/>
+                    <a:lstStyle/>
+                    <a:p>
+                      <a:pPr algn="l"/>
+                      <a:r>
+                        <a:rPr lang="en-GB" sz="1000" b="1" baseline="0" dirty="0">
+                          <a:solidFill>
+                            <a:srgbClr val="000000"/>
+                          </a:solidFill>
+                          <a:latin typeface="Segoe UI" pitchFamily="34" charset="0"/>
+                          <a:cs typeface="Segoe UI" pitchFamily="34" charset="0"/>
+                        </a:rPr>
+                        <a:t>Migrate to DB</a:t>
+                      </a:r>
+                    </a:p>
+                  </a:txBody>
+                  <a:tcPr marL="46800" marR="46800">
+                    <a:lnL w="12700" cap="flat" cmpd="sng" algn="ctr">
+                      <a:solidFill>
+                        <a:schemeClr val="tx1"/>
+                      </a:solidFill>
+                      <a:prstDash val="solid"/>
+                      <a:round/>
+                      <a:headEnd type="none" w="med" len="med"/>
+                      <a:tailEnd type="none" w="med" len="med"/>
+                    </a:lnL>
+                    <a:lnR w="12700" cap="flat" cmpd="sng" algn="ctr">
+                      <a:solidFill>
+                        <a:schemeClr val="tx1"/>
+                      </a:solidFill>
+                      <a:prstDash val="solid"/>
+                      <a:round/>
+                      <a:headEnd type="none" w="med" len="med"/>
+                      <a:tailEnd type="none" w="med" len="med"/>
+                    </a:lnR>
+                    <a:lnT w="12700" cap="flat" cmpd="sng" algn="ctr">
+                      <a:solidFill>
+                        <a:schemeClr val="tx1"/>
+                      </a:solidFill>
+                      <a:prstDash val="solid"/>
+                      <a:round/>
+                      <a:headEnd type="none" w="med" len="med"/>
+                      <a:tailEnd type="none" w="med" len="med"/>
+                    </a:lnT>
+                    <a:lnB w="6350" cap="flat" cmpd="sng" algn="ctr">
+                      <a:noFill/>
+                      <a:prstDash val="solid"/>
+                      <a:round/>
+                      <a:headEnd type="none" w="med" len="med"/>
+                      <a:tailEnd type="none" w="med" len="med"/>
+                    </a:lnB>
+                    <a:lnTlToBr w="12700" cmpd="sng">
+                      <a:noFill/>
+                      <a:prstDash val="solid"/>
+                    </a:lnTlToBr>
+                    <a:lnBlToTr w="12700" cmpd="sng">
+                      <a:noFill/>
+                      <a:prstDash val="solid"/>
+                    </a:lnBlToTr>
+                  </a:tcPr>
+                </a:tc>
+                <a:extLst>
+                  <a:ext uri="{0D108BD9-81ED-4DB2-BD59-A6C34878D82A}">
+                    <a16:rowId xmlns:a16="http://schemas.microsoft.com/office/drawing/2014/main" val="10000"/>
+                  </a:ext>
+                </a:extLst>
+              </a:tr>
+              <a:tr h="216000">
+                <a:tc>
+                  <a:txBody>
+                    <a:bodyPr/>
+                    <a:lstStyle/>
+                    <a:p>
+                      <a:pPr marL="0" marR="0" indent="0" algn="l" defTabSz="584200" rtl="0" eaLnBrk="1" fontAlgn="auto" latinLnBrk="0" hangingPunct="1">
+                        <a:lnSpc>
+                          <a:spcPct val="100000"/>
+                        </a:lnSpc>
+                        <a:spcBef>
+                          <a:spcPts val="0"/>
+                        </a:spcBef>
+                        <a:spcAft>
+                          <a:spcPts val="0"/>
+                        </a:spcAft>
+                        <a:buClrTx/>
+                        <a:buSzTx/>
+                        <a:buFontTx/>
+                        <a:buNone/>
+                        <a:tabLst/>
+                        <a:defRPr/>
+                      </a:pPr>
+                      <a:r>
+                        <a:rPr lang="en-GB" sz="1000" i="0" dirty="0">
+                          <a:solidFill>
+                            <a:srgbClr val="000000"/>
+                          </a:solidFill>
+                          <a:latin typeface="Segoe UI" pitchFamily="34" charset="0"/>
+                          <a:cs typeface="Segoe UI" pitchFamily="34" charset="0"/>
+                        </a:rPr>
+                        <a:t>To tell </a:t>
+                      </a:r>
+                      <a:r>
+                        <a:rPr lang="en-GB" sz="1000" i="0" dirty="0" err="1">
+                          <a:solidFill>
+                            <a:srgbClr val="000000"/>
+                          </a:solidFill>
+                          <a:latin typeface="Segoe UI" pitchFamily="34" charset="0"/>
+                          <a:cs typeface="Segoe UI" pitchFamily="34" charset="0"/>
+                        </a:rPr>
+                        <a:t>django</a:t>
+                      </a:r>
+                      <a:r>
+                        <a:rPr lang="en-GB" sz="1000" i="0" dirty="0">
+                          <a:solidFill>
+                            <a:srgbClr val="000000"/>
+                          </a:solidFill>
+                          <a:latin typeface="Segoe UI" pitchFamily="34" charset="0"/>
+                          <a:cs typeface="Segoe UI" pitchFamily="34" charset="0"/>
+                        </a:rPr>
+                        <a:t> you’ve made changes. Run</a:t>
+                      </a:r>
+                      <a:endParaRPr lang="en-GB" sz="1000" i="1" dirty="0">
+                        <a:solidFill>
+                          <a:srgbClr val="000000"/>
+                        </a:solidFill>
+                        <a:latin typeface="Segoe UI" pitchFamily="34" charset="0"/>
+                        <a:cs typeface="Segoe UI" pitchFamily="34" charset="0"/>
+                      </a:endParaRPr>
+                    </a:p>
+                  </a:txBody>
+                  <a:tcPr marL="46800" marR="46800">
+                    <a:lnL w="12700" cap="flat" cmpd="sng" algn="ctr">
+                      <a:solidFill>
+                        <a:schemeClr val="tx1"/>
+                      </a:solidFill>
+                      <a:prstDash val="solid"/>
+                      <a:round/>
+                      <a:headEnd type="none" w="med" len="med"/>
+                      <a:tailEnd type="none" w="med" len="med"/>
+                    </a:lnL>
+                    <a:lnR w="12700" cap="flat" cmpd="sng" algn="ctr">
+                      <a:solidFill>
+                        <a:schemeClr val="tx1"/>
+                      </a:solidFill>
+                      <a:prstDash val="solid"/>
+                      <a:round/>
+                      <a:headEnd type="none" w="med" len="med"/>
+                      <a:tailEnd type="none" w="med" len="med"/>
+                    </a:lnR>
+                    <a:lnT w="6350" cap="flat" cmpd="sng" algn="ctr">
+                      <a:noFill/>
+                      <a:prstDash val="solid"/>
+                      <a:round/>
+                      <a:headEnd type="none" w="med" len="med"/>
+                      <a:tailEnd type="none" w="med" len="med"/>
+                    </a:lnT>
+                    <a:lnB w="6350" cap="flat" cmpd="sng" algn="ctr">
+                      <a:noFill/>
+                      <a:prstDash val="solid"/>
+                      <a:round/>
+                      <a:headEnd type="none" w="med" len="med"/>
+                      <a:tailEnd type="none" w="med" len="med"/>
+                    </a:lnB>
+                    <a:lnTlToBr w="12700" cmpd="sng">
+                      <a:noFill/>
+                      <a:prstDash val="solid"/>
+                    </a:lnTlToBr>
+                    <a:lnBlToTr w="12700" cmpd="sng">
+                      <a:noFill/>
+                      <a:prstDash val="solid"/>
+                    </a:lnBlToTr>
+                  </a:tcPr>
+                </a:tc>
+                <a:extLst>
+                  <a:ext uri="{0D108BD9-81ED-4DB2-BD59-A6C34878D82A}">
+                    <a16:rowId xmlns:a16="http://schemas.microsoft.com/office/drawing/2014/main" val="694626626"/>
+                  </a:ext>
+                </a:extLst>
+              </a:tr>
+              <a:tr h="216000">
+                <a:tc>
+                  <a:txBody>
+                    <a:bodyPr/>
+                    <a:lstStyle/>
+                    <a:p>
+                      <a:pPr marL="0" marR="0" indent="0" algn="l" defTabSz="584200" rtl="0" eaLnBrk="1" fontAlgn="auto" latinLnBrk="0" hangingPunct="1">
+                        <a:lnSpc>
+                          <a:spcPct val="100000"/>
+                        </a:lnSpc>
+                        <a:spcBef>
+                          <a:spcPts val="0"/>
+                        </a:spcBef>
+                        <a:spcAft>
+                          <a:spcPts val="0"/>
+                        </a:spcAft>
+                        <a:buClrTx/>
+                        <a:buSzTx/>
+                        <a:buFontTx/>
+                        <a:buNone/>
+                        <a:tabLst/>
+                        <a:defRPr/>
+                      </a:pPr>
+                      <a:r>
+                        <a:rPr lang="en-GB" sz="1000" i="0" dirty="0">
+                          <a:solidFill>
+                            <a:srgbClr val="000000"/>
+                          </a:solidFill>
+                          <a:latin typeface="Segoe UI" pitchFamily="34" charset="0"/>
+                          <a:cs typeface="Segoe UI" pitchFamily="34" charset="0"/>
+                        </a:rPr>
+                        <a:t>code &gt; python manage.py </a:t>
+                      </a:r>
+                      <a:r>
+                        <a:rPr lang="en-GB" sz="1000" i="0" dirty="0" err="1">
+                          <a:solidFill>
+                            <a:srgbClr val="000000"/>
+                          </a:solidFill>
+                          <a:latin typeface="Segoe UI" pitchFamily="34" charset="0"/>
+                          <a:cs typeface="Segoe UI" pitchFamily="34" charset="0"/>
+                        </a:rPr>
+                        <a:t>makemigrations</a:t>
+                      </a:r>
+                      <a:r>
+                        <a:rPr lang="en-GB" sz="1000" i="0" dirty="0">
+                          <a:solidFill>
+                            <a:srgbClr val="000000"/>
+                          </a:solidFill>
+                          <a:latin typeface="Segoe UI" pitchFamily="34" charset="0"/>
+                          <a:cs typeface="Segoe UI" pitchFamily="34" charset="0"/>
+                        </a:rPr>
+                        <a:t> </a:t>
+                      </a:r>
+                      <a:r>
+                        <a:rPr lang="en-GB" sz="1000" i="0" dirty="0" err="1">
+                          <a:solidFill>
+                            <a:srgbClr val="000000"/>
+                          </a:solidFill>
+                          <a:latin typeface="Segoe UI" pitchFamily="34" charset="0"/>
+                          <a:cs typeface="Segoe UI" pitchFamily="34" charset="0"/>
+                        </a:rPr>
+                        <a:t>rango</a:t>
+                      </a:r>
+                      <a:endParaRPr lang="en-GB" sz="1000" i="0" dirty="0">
+                        <a:solidFill>
+                          <a:srgbClr val="000000"/>
+                        </a:solidFill>
+                        <a:latin typeface="Segoe UI" pitchFamily="34" charset="0"/>
+                        <a:cs typeface="Segoe UI" pitchFamily="34" charset="0"/>
+                      </a:endParaRPr>
+                    </a:p>
+                  </a:txBody>
+                  <a:tcPr marL="46800" marR="46800">
+                    <a:lnL w="12700" cap="flat" cmpd="sng" algn="ctr">
+                      <a:solidFill>
+                        <a:schemeClr val="tx1"/>
+                      </a:solidFill>
+                      <a:prstDash val="solid"/>
+                      <a:round/>
+                      <a:headEnd type="none" w="med" len="med"/>
+                      <a:tailEnd type="none" w="med" len="med"/>
+                    </a:lnL>
+                    <a:lnR w="12700" cap="flat" cmpd="sng" algn="ctr">
+                      <a:solidFill>
+                        <a:schemeClr val="tx1"/>
+                      </a:solidFill>
+                      <a:prstDash val="solid"/>
+                      <a:round/>
+                      <a:headEnd type="none" w="med" len="med"/>
+                      <a:tailEnd type="none" w="med" len="med"/>
+                    </a:lnR>
+                    <a:lnT w="6350" cap="flat" cmpd="sng" algn="ctr">
+                      <a:noFill/>
+                      <a:prstDash val="solid"/>
+                      <a:round/>
+                      <a:headEnd type="none" w="med" len="med"/>
+                      <a:tailEnd type="none" w="med" len="med"/>
+                    </a:lnT>
+                    <a:lnB w="6350" cap="flat" cmpd="sng" algn="ctr">
+                      <a:noFill/>
+                      <a:prstDash val="solid"/>
+                      <a:round/>
+                      <a:headEnd type="none" w="med" len="med"/>
+                      <a:tailEnd type="none" w="med" len="med"/>
+                    </a:lnB>
+                    <a:lnTlToBr w="12700" cmpd="sng">
+                      <a:noFill/>
+                      <a:prstDash val="solid"/>
+                    </a:lnTlToBr>
+                    <a:lnBlToTr w="12700" cmpd="sng">
+                      <a:noFill/>
+                      <a:prstDash val="solid"/>
+                    </a:lnBlToTr>
+                  </a:tcPr>
+                </a:tc>
+                <a:extLst>
+                  <a:ext uri="{0D108BD9-81ED-4DB2-BD59-A6C34878D82A}">
+                    <a16:rowId xmlns:a16="http://schemas.microsoft.com/office/drawing/2014/main" val="265647606"/>
+                  </a:ext>
+                </a:extLst>
+              </a:tr>
+              <a:tr h="216000">
+                <a:tc>
+                  <a:txBody>
+                    <a:bodyPr/>
+                    <a:lstStyle/>
+                    <a:p>
+                      <a:pPr marL="0" marR="0" indent="0" algn="l" defTabSz="584200" rtl="0" eaLnBrk="1" fontAlgn="auto" latinLnBrk="0" hangingPunct="1">
+                        <a:lnSpc>
+                          <a:spcPct val="100000"/>
+                        </a:lnSpc>
+                        <a:spcBef>
+                          <a:spcPts val="0"/>
+                        </a:spcBef>
+                        <a:spcAft>
+                          <a:spcPts val="0"/>
+                        </a:spcAft>
+                        <a:buClrTx/>
+                        <a:buSzTx/>
+                        <a:buFontTx/>
+                        <a:buNone/>
+                        <a:tabLst/>
+                        <a:defRPr/>
+                      </a:pPr>
+                      <a:r>
+                        <a:rPr lang="en-GB" sz="1000" i="0" dirty="0">
+                          <a:solidFill>
+                            <a:srgbClr val="000000"/>
+                          </a:solidFill>
+                          <a:latin typeface="Segoe UI" pitchFamily="34" charset="0"/>
+                          <a:cs typeface="Segoe UI" pitchFamily="34" charset="0"/>
+                        </a:rPr>
+                        <a:t>and then to actually perform changes on </a:t>
+                      </a:r>
+                      <a:r>
+                        <a:rPr lang="en-GB" sz="1000" i="0" dirty="0" err="1">
+                          <a:solidFill>
+                            <a:srgbClr val="000000"/>
+                          </a:solidFill>
+                          <a:latin typeface="Segoe UI" pitchFamily="34" charset="0"/>
+                          <a:cs typeface="Segoe UI" pitchFamily="34" charset="0"/>
+                        </a:rPr>
+                        <a:t>db</a:t>
+                      </a:r>
+                      <a:r>
+                        <a:rPr lang="en-GB" sz="1000" i="0" dirty="0">
+                          <a:solidFill>
+                            <a:srgbClr val="000000"/>
+                          </a:solidFill>
+                          <a:latin typeface="Segoe UI" pitchFamily="34" charset="0"/>
+                          <a:cs typeface="Segoe UI" pitchFamily="34" charset="0"/>
+                        </a:rPr>
+                        <a:t>, run</a:t>
+                      </a:r>
+                    </a:p>
+                  </a:txBody>
+                  <a:tcPr marL="46800" marR="46800">
+                    <a:lnL w="12700" cap="flat" cmpd="sng" algn="ctr">
+                      <a:solidFill>
+                        <a:schemeClr val="tx1"/>
+                      </a:solidFill>
+                      <a:prstDash val="solid"/>
+                      <a:round/>
+                      <a:headEnd type="none" w="med" len="med"/>
+                      <a:tailEnd type="none" w="med" len="med"/>
+                    </a:lnL>
+                    <a:lnR w="12700" cap="flat" cmpd="sng" algn="ctr">
+                      <a:solidFill>
+                        <a:schemeClr val="tx1"/>
+                      </a:solidFill>
+                      <a:prstDash val="solid"/>
+                      <a:round/>
+                      <a:headEnd type="none" w="med" len="med"/>
+                      <a:tailEnd type="none" w="med" len="med"/>
+                    </a:lnR>
+                    <a:lnT w="6350" cap="flat" cmpd="sng" algn="ctr">
+                      <a:noFill/>
+                      <a:prstDash val="solid"/>
+                      <a:round/>
+                      <a:headEnd type="none" w="med" len="med"/>
+                      <a:tailEnd type="none" w="med" len="med"/>
+                    </a:lnT>
+                    <a:lnB w="6350" cap="flat" cmpd="sng" algn="ctr">
+                      <a:noFill/>
+                      <a:prstDash val="solid"/>
+                      <a:round/>
+                      <a:headEnd type="none" w="med" len="med"/>
+                      <a:tailEnd type="none" w="med" len="med"/>
+                    </a:lnB>
+                    <a:lnTlToBr w="12700" cmpd="sng">
+                      <a:noFill/>
+                      <a:prstDash val="solid"/>
+                    </a:lnTlToBr>
+                    <a:lnBlToTr w="12700" cmpd="sng">
+                      <a:noFill/>
+                      <a:prstDash val="solid"/>
+                    </a:lnBlToTr>
+                  </a:tcPr>
+                </a:tc>
+                <a:extLst>
+                  <a:ext uri="{0D108BD9-81ED-4DB2-BD59-A6C34878D82A}">
+                    <a16:rowId xmlns:a16="http://schemas.microsoft.com/office/drawing/2014/main" val="1254229278"/>
+                  </a:ext>
+                </a:extLst>
+              </a:tr>
+              <a:tr h="216000">
+                <a:tc>
+                  <a:txBody>
+                    <a:bodyPr/>
+                    <a:lstStyle/>
+                    <a:p>
+                      <a:pPr marL="0" marR="0" indent="0" algn="l" defTabSz="584200" rtl="0" eaLnBrk="1" fontAlgn="auto" latinLnBrk="0" hangingPunct="1">
+                        <a:lnSpc>
+                          <a:spcPct val="100000"/>
+                        </a:lnSpc>
+                        <a:spcBef>
+                          <a:spcPts val="0"/>
+                        </a:spcBef>
+                        <a:spcAft>
+                          <a:spcPts val="0"/>
+                        </a:spcAft>
+                        <a:buClrTx/>
+                        <a:buSzTx/>
+                        <a:buFontTx/>
+                        <a:buNone/>
+                        <a:tabLst/>
+                        <a:defRPr/>
+                      </a:pPr>
+                      <a:r>
+                        <a:rPr lang="en-GB" sz="1000" i="0" dirty="0">
+                          <a:solidFill>
+                            <a:srgbClr val="000000"/>
+                          </a:solidFill>
+                          <a:latin typeface="Segoe UI" pitchFamily="34" charset="0"/>
+                          <a:cs typeface="Segoe UI" pitchFamily="34" charset="0"/>
+                        </a:rPr>
+                        <a:t>code &gt; python manage.py migrate</a:t>
+                      </a:r>
+                    </a:p>
+                  </a:txBody>
+                  <a:tcPr marL="46800" marR="46800">
+                    <a:lnL w="12700" cap="flat" cmpd="sng" algn="ctr">
+                      <a:solidFill>
+                        <a:schemeClr val="tx1"/>
+                      </a:solidFill>
+                      <a:prstDash val="solid"/>
+                      <a:round/>
+                      <a:headEnd type="none" w="med" len="med"/>
+                      <a:tailEnd type="none" w="med" len="med"/>
+                    </a:lnL>
+                    <a:lnR w="12700" cap="flat" cmpd="sng" algn="ctr">
+                      <a:solidFill>
+                        <a:schemeClr val="tx1"/>
+                      </a:solidFill>
+                      <a:prstDash val="solid"/>
+                      <a:round/>
+                      <a:headEnd type="none" w="med" len="med"/>
+                      <a:tailEnd type="none" w="med" len="med"/>
+                    </a:lnR>
+                    <a:lnT w="6350" cap="flat" cmpd="sng" algn="ctr">
+                      <a:noFill/>
+                      <a:prstDash val="solid"/>
+                      <a:round/>
+                      <a:headEnd type="none" w="med" len="med"/>
+                      <a:tailEnd type="none" w="med" len="med"/>
+                    </a:lnT>
+                    <a:lnB w="6350" cap="flat" cmpd="sng" algn="ctr">
+                      <a:noFill/>
+                      <a:prstDash val="solid"/>
+                      <a:round/>
+                      <a:headEnd type="none" w="med" len="med"/>
+                      <a:tailEnd type="none" w="med" len="med"/>
+                    </a:lnB>
+                    <a:lnTlToBr w="12700" cmpd="sng">
+                      <a:noFill/>
+                      <a:prstDash val="solid"/>
+                    </a:lnTlToBr>
+                    <a:lnBlToTr w="12700" cmpd="sng">
+                      <a:noFill/>
+                      <a:prstDash val="solid"/>
+                    </a:lnBlToTr>
+                  </a:tcPr>
+                </a:tc>
+                <a:extLst>
+                  <a:ext uri="{0D108BD9-81ED-4DB2-BD59-A6C34878D82A}">
+                    <a16:rowId xmlns:a16="http://schemas.microsoft.com/office/drawing/2014/main" val="1259011600"/>
+                  </a:ext>
+                </a:extLst>
+              </a:tr>
+              <a:tr h="216000">
+                <a:tc>
+                  <a:txBody>
+                    <a:bodyPr/>
+                    <a:lstStyle/>
+                    <a:p>
+                      <a:pPr marL="0" marR="0" indent="0" algn="l" defTabSz="584200" rtl="0" eaLnBrk="1" fontAlgn="auto" latinLnBrk="0" hangingPunct="1">
+                        <a:lnSpc>
+                          <a:spcPct val="100000"/>
+                        </a:lnSpc>
+                        <a:spcBef>
+                          <a:spcPts val="0"/>
+                        </a:spcBef>
+                        <a:spcAft>
+                          <a:spcPts val="0"/>
+                        </a:spcAft>
+                        <a:buClrTx/>
+                        <a:buSzTx/>
+                        <a:buFontTx/>
+                        <a:buNone/>
+                        <a:tabLst/>
+                        <a:defRPr/>
+                      </a:pPr>
+                      <a:endParaRPr lang="en-GB" sz="1000" i="0" dirty="0">
+                        <a:solidFill>
+                          <a:srgbClr val="000000"/>
+                        </a:solidFill>
+                        <a:latin typeface="Segoe UI" pitchFamily="34" charset="0"/>
+                        <a:cs typeface="Segoe UI" pitchFamily="34" charset="0"/>
+                      </a:endParaRPr>
+                    </a:p>
+                  </a:txBody>
+                  <a:tcPr marL="46800" marR="46800">
+                    <a:lnL w="12700" cap="flat" cmpd="sng" algn="ctr">
+                      <a:solidFill>
+                        <a:schemeClr val="tx1"/>
+                      </a:solidFill>
+                      <a:prstDash val="solid"/>
+                      <a:round/>
+                      <a:headEnd type="none" w="med" len="med"/>
+                      <a:tailEnd type="none" w="med" len="med"/>
+                    </a:lnL>
+                    <a:lnR w="12700" cap="flat" cmpd="sng" algn="ctr">
+                      <a:solidFill>
+                        <a:schemeClr val="tx1"/>
+                      </a:solidFill>
+                      <a:prstDash val="solid"/>
+                      <a:round/>
+                      <a:headEnd type="none" w="med" len="med"/>
+                      <a:tailEnd type="none" w="med" len="med"/>
+                    </a:lnR>
+                    <a:lnT w="6350" cap="flat" cmpd="sng" algn="ctr">
+                      <a:noFill/>
+                      <a:prstDash val="solid"/>
+                      <a:round/>
+                      <a:headEnd type="none" w="med" len="med"/>
+                      <a:tailEnd type="none" w="med" len="med"/>
+                    </a:lnT>
+                    <a:lnB w="6350" cap="flat" cmpd="sng" algn="ctr">
+                      <a:noFill/>
+                      <a:prstDash val="solid"/>
+                      <a:round/>
+                      <a:headEnd type="none" w="med" len="med"/>
+                      <a:tailEnd type="none" w="med" len="med"/>
+                    </a:lnB>
+                    <a:lnTlToBr w="12700" cmpd="sng">
+                      <a:noFill/>
+                      <a:prstDash val="solid"/>
+                    </a:lnTlToBr>
+                    <a:lnBlToTr w="12700" cmpd="sng">
+                      <a:noFill/>
+                      <a:prstDash val="solid"/>
+                    </a:lnBlToTr>
+                  </a:tcPr>
+                </a:tc>
+                <a:extLst>
+                  <a:ext uri="{0D108BD9-81ED-4DB2-BD59-A6C34878D82A}">
+                    <a16:rowId xmlns:a16="http://schemas.microsoft.com/office/drawing/2014/main" val="599195773"/>
+                  </a:ext>
+                </a:extLst>
+              </a:tr>
+              <a:tr h="216000">
+                <a:tc>
+                  <a:txBody>
+                    <a:bodyPr/>
+                    <a:lstStyle/>
+                    <a:p>
+                      <a:pPr marL="0" marR="0" indent="0" algn="l" defTabSz="584200" rtl="0" eaLnBrk="1" fontAlgn="auto" latinLnBrk="0" hangingPunct="1">
+                        <a:lnSpc>
+                          <a:spcPct val="100000"/>
+                        </a:lnSpc>
+                        <a:spcBef>
+                          <a:spcPts val="0"/>
+                        </a:spcBef>
+                        <a:spcAft>
+                          <a:spcPts val="0"/>
+                        </a:spcAft>
+                        <a:buClrTx/>
+                        <a:buSzTx/>
+                        <a:buFontTx/>
+                        <a:buNone/>
+                        <a:tabLst/>
+                        <a:defRPr/>
+                      </a:pPr>
+                      <a:r>
+                        <a:rPr lang="en-GB" sz="1000" i="0" dirty="0">
+                          <a:solidFill>
+                            <a:srgbClr val="000000"/>
+                          </a:solidFill>
+                          <a:latin typeface="Segoe UI" pitchFamily="34" charset="0"/>
+                          <a:cs typeface="Segoe UI" pitchFamily="34" charset="0"/>
+                        </a:rPr>
+                        <a:t>To play around with </a:t>
+                      </a:r>
+                      <a:r>
+                        <a:rPr lang="en-GB" sz="1000" i="0" dirty="0" err="1">
+                          <a:solidFill>
+                            <a:srgbClr val="000000"/>
+                          </a:solidFill>
+                          <a:latin typeface="Segoe UI" pitchFamily="34" charset="0"/>
+                          <a:cs typeface="Segoe UI" pitchFamily="34" charset="0"/>
+                        </a:rPr>
+                        <a:t>db</a:t>
+                      </a:r>
+                      <a:r>
+                        <a:rPr lang="en-GB" sz="1000" i="0" dirty="0">
+                          <a:solidFill>
+                            <a:srgbClr val="000000"/>
+                          </a:solidFill>
+                          <a:latin typeface="Segoe UI" pitchFamily="34" charset="0"/>
+                          <a:cs typeface="Segoe UI" pitchFamily="34" charset="0"/>
+                        </a:rPr>
+                        <a:t>, use</a:t>
+                      </a:r>
+                    </a:p>
+                  </a:txBody>
+                  <a:tcPr marL="46800" marR="46800">
+                    <a:lnL w="12700" cap="flat" cmpd="sng" algn="ctr">
+                      <a:solidFill>
+                        <a:schemeClr val="tx1"/>
+                      </a:solidFill>
+                      <a:prstDash val="solid"/>
+                      <a:round/>
+                      <a:headEnd type="none" w="med" len="med"/>
+                      <a:tailEnd type="none" w="med" len="med"/>
+                    </a:lnL>
+                    <a:lnR w="12700" cap="flat" cmpd="sng" algn="ctr">
+                      <a:solidFill>
+                        <a:schemeClr val="tx1"/>
+                      </a:solidFill>
+                      <a:prstDash val="solid"/>
+                      <a:round/>
+                      <a:headEnd type="none" w="med" len="med"/>
+                      <a:tailEnd type="none" w="med" len="med"/>
+                    </a:lnR>
+                    <a:lnT w="6350" cap="flat" cmpd="sng" algn="ctr">
+                      <a:noFill/>
+                      <a:prstDash val="solid"/>
+                      <a:round/>
+                      <a:headEnd type="none" w="med" len="med"/>
+                      <a:tailEnd type="none" w="med" len="med"/>
+                    </a:lnT>
+                    <a:lnB w="6350" cap="flat" cmpd="sng" algn="ctr">
+                      <a:noFill/>
+                      <a:prstDash val="solid"/>
+                      <a:round/>
+                      <a:headEnd type="none" w="med" len="med"/>
+                      <a:tailEnd type="none" w="med" len="med"/>
+                    </a:lnB>
+                    <a:lnTlToBr w="12700" cmpd="sng">
+                      <a:noFill/>
+                      <a:prstDash val="solid"/>
+                    </a:lnTlToBr>
+                    <a:lnBlToTr w="12700" cmpd="sng">
+                      <a:noFill/>
+                      <a:prstDash val="solid"/>
+                    </a:lnBlToTr>
+                  </a:tcPr>
+                </a:tc>
+                <a:extLst>
+                  <a:ext uri="{0D108BD9-81ED-4DB2-BD59-A6C34878D82A}">
+                    <a16:rowId xmlns:a16="http://schemas.microsoft.com/office/drawing/2014/main" val="4252143377"/>
+                  </a:ext>
+                </a:extLst>
+              </a:tr>
+              <a:tr h="216000">
+                <a:tc>
+                  <a:txBody>
+                    <a:bodyPr/>
+                    <a:lstStyle/>
+                    <a:p>
+                      <a:pPr marL="0" marR="0" indent="0" algn="l" defTabSz="584200" rtl="0" eaLnBrk="1" fontAlgn="auto" latinLnBrk="0" hangingPunct="1">
+                        <a:lnSpc>
+                          <a:spcPct val="100000"/>
+                        </a:lnSpc>
+                        <a:spcBef>
+                          <a:spcPts val="0"/>
+                        </a:spcBef>
+                        <a:spcAft>
+                          <a:spcPts val="0"/>
+                        </a:spcAft>
+                        <a:buClrTx/>
+                        <a:buSzTx/>
+                        <a:buFontTx/>
+                        <a:buNone/>
+                        <a:tabLst/>
+                        <a:defRPr/>
+                      </a:pPr>
+                      <a:r>
+                        <a:rPr lang="en-GB" sz="1000" b="0" i="0" dirty="0">
+                          <a:solidFill>
+                            <a:srgbClr val="000000"/>
+                          </a:solidFill>
+                          <a:latin typeface="Segoe UI" pitchFamily="34" charset="0"/>
+                          <a:cs typeface="Segoe UI" pitchFamily="34" charset="0"/>
+                        </a:rPr>
+                        <a:t>code &gt; python manage.py shell</a:t>
+                      </a:r>
+                    </a:p>
+                  </a:txBody>
+                  <a:tcPr marL="46800" marR="46800">
+                    <a:lnL w="12700" cap="flat" cmpd="sng" algn="ctr">
+                      <a:solidFill>
+                        <a:schemeClr val="tx1"/>
+                      </a:solidFill>
+                      <a:prstDash val="solid"/>
+                      <a:round/>
+                      <a:headEnd type="none" w="med" len="med"/>
+                      <a:tailEnd type="none" w="med" len="med"/>
+                    </a:lnL>
+                    <a:lnR w="12700" cap="flat" cmpd="sng" algn="ctr">
+                      <a:solidFill>
+                        <a:schemeClr val="tx1"/>
+                      </a:solidFill>
+                      <a:prstDash val="solid"/>
+                      <a:round/>
+                      <a:headEnd type="none" w="med" len="med"/>
+                      <a:tailEnd type="none" w="med" len="med"/>
+                    </a:lnR>
+                    <a:lnT w="6350" cap="flat" cmpd="sng" algn="ctr">
+                      <a:noFill/>
+                      <a:prstDash val="solid"/>
+                      <a:round/>
+                      <a:headEnd type="none" w="med" len="med"/>
+                      <a:tailEnd type="none" w="med" len="med"/>
+                    </a:lnT>
+                    <a:lnB w="6350" cap="flat" cmpd="sng" algn="ctr">
+                      <a:noFill/>
+                      <a:prstDash val="solid"/>
+                      <a:round/>
+                      <a:headEnd type="none" w="med" len="med"/>
+                      <a:tailEnd type="none" w="med" len="med"/>
+                    </a:lnB>
+                    <a:lnTlToBr w="12700" cmpd="sng">
+                      <a:noFill/>
+                      <a:prstDash val="solid"/>
+                    </a:lnTlToBr>
+                    <a:lnBlToTr w="12700" cmpd="sng">
+                      <a:noFill/>
+                      <a:prstDash val="solid"/>
+                    </a:lnBlToTr>
+                  </a:tcPr>
+                </a:tc>
+                <a:extLst>
+                  <a:ext uri="{0D108BD9-81ED-4DB2-BD59-A6C34878D82A}">
+                    <a16:rowId xmlns:a16="http://schemas.microsoft.com/office/drawing/2014/main" val="10001"/>
+                  </a:ext>
+                </a:extLst>
+              </a:tr>
+              <a:tr h="216000">
+                <a:tc>
+                  <a:txBody>
+                    <a:bodyPr/>
+                    <a:lstStyle/>
+                    <a:p>
+                      <a:pPr marL="0" marR="0" lvl="0" indent="0" algn="l" defTabSz="584200" rtl="0" eaLnBrk="1" fontAlgn="auto" latinLnBrk="0" hangingPunct="1">
+                        <a:lnSpc>
+                          <a:spcPct val="100000"/>
+                        </a:lnSpc>
+                        <a:spcBef>
+                          <a:spcPts val="0"/>
+                        </a:spcBef>
+                        <a:spcAft>
+                          <a:spcPts val="0"/>
+                        </a:spcAft>
+                        <a:buClrTx/>
+                        <a:buSzTx/>
+                        <a:buFontTx/>
+                        <a:buNone/>
+                        <a:tabLst/>
+                        <a:defRPr/>
+                      </a:pPr>
+                      <a:r>
+                        <a:rPr lang="en-GB" sz="1000" i="0" dirty="0">
+                          <a:solidFill>
+                            <a:srgbClr val="000000"/>
+                          </a:solidFill>
+                          <a:latin typeface="Segoe UI" pitchFamily="34" charset="0"/>
+                          <a:cs typeface="Segoe UI" pitchFamily="34" charset="0"/>
+                        </a:rPr>
+                        <a:t>https://docs.djangoproject.com/en/2.2/intro/tutorial02/</a:t>
+                      </a:r>
+                    </a:p>
+                  </a:txBody>
+                  <a:tcPr marL="46800" marR="46800">
+                    <a:lnL w="12700" cap="flat" cmpd="sng" algn="ctr">
+                      <a:solidFill>
+                        <a:schemeClr val="tx1"/>
+                      </a:solidFill>
+                      <a:prstDash val="solid"/>
+                      <a:round/>
+                      <a:headEnd type="none" w="med" len="med"/>
+                      <a:tailEnd type="none" w="med" len="med"/>
+                    </a:lnL>
+                    <a:lnR w="12700" cap="flat" cmpd="sng" algn="ctr">
+                      <a:solidFill>
+                        <a:schemeClr val="tx1"/>
+                      </a:solidFill>
+                      <a:prstDash val="solid"/>
+                      <a:round/>
+                      <a:headEnd type="none" w="med" len="med"/>
+                      <a:tailEnd type="none" w="med" len="med"/>
+                    </a:lnR>
+                    <a:lnT w="6350" cap="flat" cmpd="sng" algn="ctr">
+                      <a:noFill/>
+                      <a:prstDash val="solid"/>
+                      <a:round/>
+                      <a:headEnd type="none" w="med" len="med"/>
+                      <a:tailEnd type="none" w="med" len="med"/>
+                    </a:lnT>
+                    <a:lnB w="12700" cap="flat" cmpd="sng" algn="ctr">
+                      <a:solidFill>
+                        <a:schemeClr val="tx1"/>
+                      </a:solidFill>
+                      <a:prstDash val="solid"/>
+                      <a:round/>
+                      <a:headEnd type="none" w="med" len="med"/>
+                      <a:tailEnd type="none" w="med" len="med"/>
+                    </a:lnB>
+                    <a:lnTlToBr w="12700" cmpd="sng">
+                      <a:noFill/>
+                      <a:prstDash val="solid"/>
+                    </a:lnTlToBr>
+                    <a:lnBlToTr w="12700" cmpd="sng">
+                      <a:noFill/>
+                      <a:prstDash val="solid"/>
+                    </a:lnBlToTr>
+                  </a:tcPr>
+                </a:tc>
+                <a:extLst>
+                  <a:ext uri="{0D108BD9-81ED-4DB2-BD59-A6C34878D82A}">
+                    <a16:rowId xmlns:a16="http://schemas.microsoft.com/office/drawing/2014/main" val="10002"/>
+                  </a:ext>
+                </a:extLst>
+              </a:tr>
+            </a:tbl>
+          </a:graphicData>
+        </a:graphic>
+      </p:graphicFrame>
+    </p:spTree>
+    <p:extLst>
+      <p:ext uri="{BB962C8B-B14F-4D97-AF65-F5344CB8AC3E}">
+        <p14:creationId xmlns:p14="http://schemas.microsoft.com/office/powerpoint/2010/main" val="2466931694"/>
       </p:ext>
     </p:extLst>
   </p:cSld>

</xml_diff>

<commit_message>
Added models to admin site.
</commit_message>
<xml_diff>
--- a/Django.pptx
+++ b/Django.pptx
@@ -2456,7 +2456,7 @@
           </a:ln>
           <a:extLst>
             <a:ext uri="{C572A759-6A51-4108-AA02-DFA0A04FC94B}">
-              <ma14:wrappingTextBoxFlag xmlns="" xmlns:m="http://schemas.openxmlformats.org/officeDocument/2006/math" xmlns:a14="http://schemas.microsoft.com/office/drawing/2010/main" xmlns:ma14="http://schemas.microsoft.com/office/mac/drawingml/2011/main" val="1"/>
+              <ma14:wrappingTextBoxFlag xmlns:ma14="http://schemas.microsoft.com/office/mac/drawingml/2011/main" xmlns:a14="http://schemas.microsoft.com/office/drawing/2010/main" xmlns:m="http://schemas.openxmlformats.org/officeDocument/2006/math" xmlns="" val="1"/>
             </a:ext>
           </a:extLst>
         </p:spPr>
@@ -2495,7 +2495,7 @@
           </a:ln>
           <a:extLst>
             <a:ext uri="{C572A759-6A51-4108-AA02-DFA0A04FC94B}">
-              <ma14:wrappingTextBoxFlag xmlns="" xmlns:m="http://schemas.openxmlformats.org/officeDocument/2006/math" xmlns:a14="http://schemas.microsoft.com/office/drawing/2010/main" xmlns:ma14="http://schemas.microsoft.com/office/mac/drawingml/2011/main" val="1"/>
+              <ma14:wrappingTextBoxFlag xmlns:ma14="http://schemas.microsoft.com/office/mac/drawingml/2011/main" xmlns:a14="http://schemas.microsoft.com/office/drawing/2010/main" xmlns:m="http://schemas.openxmlformats.org/officeDocument/2006/math" xmlns="" val="1"/>
             </a:ext>
           </a:extLst>
         </p:spPr>
@@ -11249,7 +11249,7 @@
           <p:nvPr>
             <p:extLst>
               <p:ext uri="{D42A27DB-BD31-4B8C-83A1-F6EECF244321}">
-                <p14:modId xmlns:p14="http://schemas.microsoft.com/office/powerpoint/2010/main" val="1621304794"/>
+                <p14:modId xmlns:p14="http://schemas.microsoft.com/office/powerpoint/2010/main" val="2229678196"/>
               </p:ext>
             </p:extLst>
           </p:nvPr>
@@ -12029,6 +12029,478 @@
                 <a:extLst>
                   <a:ext uri="{0D108BD9-81ED-4DB2-BD59-A6C34878D82A}">
                     <a16:rowId xmlns:a16="http://schemas.microsoft.com/office/drawing/2014/main" val="10001"/>
+                  </a:ext>
+                </a:extLst>
+              </a:tr>
+              <a:tr h="216000">
+                <a:tc>
+                  <a:txBody>
+                    <a:bodyPr/>
+                    <a:lstStyle/>
+                    <a:p>
+                      <a:pPr marL="0" marR="0" lvl="0" indent="0" algn="l" defTabSz="584200" rtl="0" eaLnBrk="1" fontAlgn="auto" latinLnBrk="0" hangingPunct="1">
+                        <a:lnSpc>
+                          <a:spcPct val="100000"/>
+                        </a:lnSpc>
+                        <a:spcBef>
+                          <a:spcPts val="0"/>
+                        </a:spcBef>
+                        <a:spcAft>
+                          <a:spcPts val="0"/>
+                        </a:spcAft>
+                        <a:buClrTx/>
+                        <a:buSzTx/>
+                        <a:buFontTx/>
+                        <a:buNone/>
+                        <a:tabLst/>
+                        <a:defRPr/>
+                      </a:pPr>
+                      <a:r>
+                        <a:rPr lang="en-GB" sz="1000" i="0" dirty="0">
+                          <a:solidFill>
+                            <a:srgbClr val="000000"/>
+                          </a:solidFill>
+                          <a:latin typeface="Segoe UI" pitchFamily="34" charset="0"/>
+                          <a:cs typeface="Segoe UI" pitchFamily="34" charset="0"/>
+                        </a:rPr>
+                        <a:t>https://docs.djangoproject.com/en/2.2/intro/tutorial02/</a:t>
+                      </a:r>
+                    </a:p>
+                  </a:txBody>
+                  <a:tcPr marL="46800" marR="46800">
+                    <a:lnL w="12700" cap="flat" cmpd="sng" algn="ctr">
+                      <a:solidFill>
+                        <a:schemeClr val="tx1"/>
+                      </a:solidFill>
+                      <a:prstDash val="solid"/>
+                      <a:round/>
+                      <a:headEnd type="none" w="med" len="med"/>
+                      <a:tailEnd type="none" w="med" len="med"/>
+                    </a:lnL>
+                    <a:lnR w="12700" cap="flat" cmpd="sng" algn="ctr">
+                      <a:solidFill>
+                        <a:schemeClr val="tx1"/>
+                      </a:solidFill>
+                      <a:prstDash val="solid"/>
+                      <a:round/>
+                      <a:headEnd type="none" w="med" len="med"/>
+                      <a:tailEnd type="none" w="med" len="med"/>
+                    </a:lnR>
+                    <a:lnT w="6350" cap="flat" cmpd="sng" algn="ctr">
+                      <a:noFill/>
+                      <a:prstDash val="solid"/>
+                      <a:round/>
+                      <a:headEnd type="none" w="med" len="med"/>
+                      <a:tailEnd type="none" w="med" len="med"/>
+                    </a:lnT>
+                    <a:lnB w="12700" cap="flat" cmpd="sng" algn="ctr">
+                      <a:solidFill>
+                        <a:schemeClr val="tx1"/>
+                      </a:solidFill>
+                      <a:prstDash val="solid"/>
+                      <a:round/>
+                      <a:headEnd type="none" w="med" len="med"/>
+                      <a:tailEnd type="none" w="med" len="med"/>
+                    </a:lnB>
+                    <a:lnTlToBr w="12700" cmpd="sng">
+                      <a:noFill/>
+                      <a:prstDash val="solid"/>
+                    </a:lnTlToBr>
+                    <a:lnBlToTr w="12700" cmpd="sng">
+                      <a:noFill/>
+                      <a:prstDash val="solid"/>
+                    </a:lnBlToTr>
+                  </a:tcPr>
+                </a:tc>
+                <a:extLst>
+                  <a:ext uri="{0D108BD9-81ED-4DB2-BD59-A6C34878D82A}">
+                    <a16:rowId xmlns:a16="http://schemas.microsoft.com/office/drawing/2014/main" val="10002"/>
+                  </a:ext>
+                </a:extLst>
+              </a:tr>
+            </a:tbl>
+          </a:graphicData>
+        </a:graphic>
+      </p:graphicFrame>
+      <p:graphicFrame>
+        <p:nvGraphicFramePr>
+          <p:cNvPr id="7" name="Table 6">
+            <a:extLst>
+              <a:ext uri="{FF2B5EF4-FFF2-40B4-BE49-F238E27FC236}">
+                <a16:creationId xmlns:a16="http://schemas.microsoft.com/office/drawing/2014/main" id="{2E5BF99D-D38F-46A3-82F4-9E9C666B08B8}"/>
+              </a:ext>
+            </a:extLst>
+          </p:cNvPr>
+          <p:cNvGraphicFramePr>
+            <a:graphicFrameLocks noGrp="1"/>
+          </p:cNvGraphicFramePr>
+          <p:nvPr>
+            <p:extLst>
+              <p:ext uri="{D42A27DB-BD31-4B8C-83A1-F6EECF244321}">
+                <p14:modId xmlns:p14="http://schemas.microsoft.com/office/powerpoint/2010/main" val="4093482040"/>
+              </p:ext>
+            </p:extLst>
+          </p:nvPr>
+        </p:nvGraphicFramePr>
+        <p:xfrm>
+          <a:off x="1117485" y="7778044"/>
+          <a:ext cx="3452495" cy="1493520"/>
+        </p:xfrm>
+        <a:graphic>
+          <a:graphicData uri="http://schemas.openxmlformats.org/drawingml/2006/table">
+            <a:tbl>
+              <a:tblPr firstRow="1" bandRow="1">
+                <a:tableStyleId>{5940675A-B579-460E-94D1-54222C63F5DA}</a:tableStyleId>
+              </a:tblPr>
+              <a:tblGrid>
+                <a:gridCol w="3452495">
+                  <a:extLst>
+                    <a:ext uri="{9D8B030D-6E8A-4147-A177-3AD203B41FA5}">
+                      <a16:colId xmlns:a16="http://schemas.microsoft.com/office/drawing/2014/main" val="20000"/>
+                    </a:ext>
+                  </a:extLst>
+                </a:gridCol>
+              </a:tblGrid>
+              <a:tr h="216000">
+                <a:tc>
+                  <a:txBody>
+                    <a:bodyPr/>
+                    <a:lstStyle/>
+                    <a:p>
+                      <a:pPr algn="l"/>
+                      <a:r>
+                        <a:rPr lang="en-GB" sz="1000" b="1" baseline="0" dirty="0">
+                          <a:solidFill>
+                            <a:srgbClr val="000000"/>
+                          </a:solidFill>
+                          <a:latin typeface="Segoe UI" pitchFamily="34" charset="0"/>
+                          <a:cs typeface="Segoe UI" pitchFamily="34" charset="0"/>
+                        </a:rPr>
+                        <a:t>Add Models to Admin Site</a:t>
+                      </a:r>
+                    </a:p>
+                    <a:p>
+                      <a:pPr marL="0" marR="0" lvl="0" indent="0" algn="l" defTabSz="584200" rtl="0" eaLnBrk="1" fontAlgn="auto" latinLnBrk="0" hangingPunct="1">
+                        <a:lnSpc>
+                          <a:spcPct val="100000"/>
+                        </a:lnSpc>
+                        <a:spcBef>
+                          <a:spcPts val="0"/>
+                        </a:spcBef>
+                        <a:spcAft>
+                          <a:spcPts val="0"/>
+                        </a:spcAft>
+                        <a:buClrTx/>
+                        <a:buSzTx/>
+                        <a:buFontTx/>
+                        <a:buNone/>
+                        <a:tabLst/>
+                        <a:defRPr/>
+                      </a:pPr>
+                      <a:r>
+                        <a:rPr lang="en-GB" sz="1000" i="1" u="none" dirty="0">
+                          <a:solidFill>
+                            <a:srgbClr val="000000"/>
+                          </a:solidFill>
+                          <a:latin typeface="Segoe UI" pitchFamily="34" charset="0"/>
+                          <a:cs typeface="Segoe UI" pitchFamily="34" charset="0"/>
+                        </a:rPr>
+                        <a:t>tango_with_django/rango/admin.py</a:t>
+                      </a:r>
+                    </a:p>
+                  </a:txBody>
+                  <a:tcPr marL="46800" marR="46800">
+                    <a:lnL w="12700" cap="flat" cmpd="sng" algn="ctr">
+                      <a:solidFill>
+                        <a:schemeClr val="tx1"/>
+                      </a:solidFill>
+                      <a:prstDash val="solid"/>
+                      <a:round/>
+                      <a:headEnd type="none" w="med" len="med"/>
+                      <a:tailEnd type="none" w="med" len="med"/>
+                    </a:lnL>
+                    <a:lnR w="12700" cap="flat" cmpd="sng" algn="ctr">
+                      <a:solidFill>
+                        <a:schemeClr val="tx1"/>
+                      </a:solidFill>
+                      <a:prstDash val="solid"/>
+                      <a:round/>
+                      <a:headEnd type="none" w="med" len="med"/>
+                      <a:tailEnd type="none" w="med" len="med"/>
+                    </a:lnR>
+                    <a:lnT w="12700" cap="flat" cmpd="sng" algn="ctr">
+                      <a:solidFill>
+                        <a:schemeClr val="tx1"/>
+                      </a:solidFill>
+                      <a:prstDash val="solid"/>
+                      <a:round/>
+                      <a:headEnd type="none" w="med" len="med"/>
+                      <a:tailEnd type="none" w="med" len="med"/>
+                    </a:lnT>
+                    <a:lnB w="6350" cap="flat" cmpd="sng" algn="ctr">
+                      <a:noFill/>
+                      <a:prstDash val="solid"/>
+                      <a:round/>
+                      <a:headEnd type="none" w="med" len="med"/>
+                      <a:tailEnd type="none" w="med" len="med"/>
+                    </a:lnB>
+                    <a:lnTlToBr w="12700" cmpd="sng">
+                      <a:noFill/>
+                      <a:prstDash val="solid"/>
+                    </a:lnTlToBr>
+                    <a:lnBlToTr w="12700" cmpd="sng">
+                      <a:noFill/>
+                      <a:prstDash val="solid"/>
+                    </a:lnBlToTr>
+                  </a:tcPr>
+                </a:tc>
+                <a:extLst>
+                  <a:ext uri="{0D108BD9-81ED-4DB2-BD59-A6C34878D82A}">
+                    <a16:rowId xmlns:a16="http://schemas.microsoft.com/office/drawing/2014/main" val="10000"/>
+                  </a:ext>
+                </a:extLst>
+              </a:tr>
+              <a:tr h="216000">
+                <a:tc>
+                  <a:txBody>
+                    <a:bodyPr/>
+                    <a:lstStyle/>
+                    <a:p>
+                      <a:pPr marL="0" marR="0" indent="0" algn="l" defTabSz="584200" rtl="0" eaLnBrk="1" fontAlgn="auto" latinLnBrk="0" hangingPunct="1">
+                        <a:lnSpc>
+                          <a:spcPct val="100000"/>
+                        </a:lnSpc>
+                        <a:spcBef>
+                          <a:spcPts val="0"/>
+                        </a:spcBef>
+                        <a:spcAft>
+                          <a:spcPts val="0"/>
+                        </a:spcAft>
+                        <a:buClrTx/>
+                        <a:buSzTx/>
+                        <a:buFontTx/>
+                        <a:buNone/>
+                        <a:tabLst/>
+                        <a:defRPr/>
+                      </a:pPr>
+                      <a:r>
+                        <a:rPr lang="en-US" sz="1000" i="0" baseline="0" dirty="0">
+                          <a:solidFill>
+                            <a:srgbClr val="000000"/>
+                          </a:solidFill>
+                          <a:latin typeface="Consolas" panose="020B0609020204030204" pitchFamily="49" charset="0"/>
+                          <a:cs typeface="Segoe UI" pitchFamily="34" charset="0"/>
+                        </a:rPr>
+                        <a:t>from </a:t>
+                      </a:r>
+                      <a:r>
+                        <a:rPr lang="en-US" sz="1000" i="0" baseline="0" dirty="0" err="1">
+                          <a:solidFill>
+                            <a:srgbClr val="000000"/>
+                          </a:solidFill>
+                          <a:latin typeface="Consolas" panose="020B0609020204030204" pitchFamily="49" charset="0"/>
+                          <a:cs typeface="Segoe UI" pitchFamily="34" charset="0"/>
+                        </a:rPr>
+                        <a:t>django.contrib</a:t>
+                      </a:r>
+                      <a:r>
+                        <a:rPr lang="en-US" sz="1000" i="0" baseline="0" dirty="0">
+                          <a:solidFill>
+                            <a:srgbClr val="000000"/>
+                          </a:solidFill>
+                          <a:latin typeface="Consolas" panose="020B0609020204030204" pitchFamily="49" charset="0"/>
+                          <a:cs typeface="Segoe UI" pitchFamily="34" charset="0"/>
+                        </a:rPr>
+                        <a:t> import admin</a:t>
+                      </a:r>
+                    </a:p>
+                    <a:p>
+                      <a:pPr marL="0" marR="0" indent="0" algn="l" defTabSz="584200" rtl="0" eaLnBrk="1" fontAlgn="auto" latinLnBrk="0" hangingPunct="1">
+                        <a:lnSpc>
+                          <a:spcPct val="100000"/>
+                        </a:lnSpc>
+                        <a:spcBef>
+                          <a:spcPts val="0"/>
+                        </a:spcBef>
+                        <a:spcAft>
+                          <a:spcPts val="0"/>
+                        </a:spcAft>
+                        <a:buClrTx/>
+                        <a:buSzTx/>
+                        <a:buFontTx/>
+                        <a:buNone/>
+                        <a:tabLst/>
+                        <a:defRPr/>
+                      </a:pPr>
+                      <a:r>
+                        <a:rPr lang="en-US" sz="1000" i="0" baseline="0" dirty="0">
+                          <a:solidFill>
+                            <a:srgbClr val="000000"/>
+                          </a:solidFill>
+                          <a:latin typeface="Consolas" panose="020B0609020204030204" pitchFamily="49" charset="0"/>
+                          <a:cs typeface="Segoe UI" pitchFamily="34" charset="0"/>
+                        </a:rPr>
+                        <a:t>from .models import Category, Page</a:t>
+                      </a:r>
+                    </a:p>
+                    <a:p>
+                      <a:pPr marL="0" marR="0" indent="0" algn="l" defTabSz="584200" rtl="0" eaLnBrk="1" fontAlgn="auto" latinLnBrk="0" hangingPunct="1">
+                        <a:lnSpc>
+                          <a:spcPct val="100000"/>
+                        </a:lnSpc>
+                        <a:spcBef>
+                          <a:spcPts val="0"/>
+                        </a:spcBef>
+                        <a:spcAft>
+                          <a:spcPts val="0"/>
+                        </a:spcAft>
+                        <a:buClrTx/>
+                        <a:buSzTx/>
+                        <a:buFontTx/>
+                        <a:buNone/>
+                        <a:tabLst/>
+                        <a:defRPr/>
+                      </a:pPr>
+                      <a:endParaRPr lang="en-US" sz="1000" i="0" baseline="0" dirty="0">
+                        <a:solidFill>
+                          <a:srgbClr val="000000"/>
+                        </a:solidFill>
+                        <a:latin typeface="Consolas" panose="020B0609020204030204" pitchFamily="49" charset="0"/>
+                        <a:cs typeface="Segoe UI" pitchFamily="34" charset="0"/>
+                      </a:endParaRPr>
+                    </a:p>
+                    <a:p>
+                      <a:pPr marL="0" marR="0" indent="0" algn="l" defTabSz="584200" rtl="0" eaLnBrk="1" fontAlgn="auto" latinLnBrk="0" hangingPunct="1">
+                        <a:lnSpc>
+                          <a:spcPct val="100000"/>
+                        </a:lnSpc>
+                        <a:spcBef>
+                          <a:spcPts val="0"/>
+                        </a:spcBef>
+                        <a:spcAft>
+                          <a:spcPts val="0"/>
+                        </a:spcAft>
+                        <a:buClrTx/>
+                        <a:buSzTx/>
+                        <a:buFontTx/>
+                        <a:buNone/>
+                        <a:tabLst/>
+                        <a:defRPr/>
+                      </a:pPr>
+                      <a:r>
+                        <a:rPr lang="en-US" sz="1000" i="0" baseline="0" dirty="0" err="1">
+                          <a:solidFill>
+                            <a:srgbClr val="000000"/>
+                          </a:solidFill>
+                          <a:latin typeface="Consolas" panose="020B0609020204030204" pitchFamily="49" charset="0"/>
+                          <a:cs typeface="Segoe UI" pitchFamily="34" charset="0"/>
+                        </a:rPr>
+                        <a:t>admin.site.register</a:t>
+                      </a:r>
+                      <a:r>
+                        <a:rPr lang="en-US" sz="1000" i="0" baseline="0" dirty="0">
+                          <a:solidFill>
+                            <a:srgbClr val="000000"/>
+                          </a:solidFill>
+                          <a:latin typeface="Consolas" panose="020B0609020204030204" pitchFamily="49" charset="0"/>
+                          <a:cs typeface="Segoe UI" pitchFamily="34" charset="0"/>
+                        </a:rPr>
+                        <a:t>(Category)</a:t>
+                      </a:r>
+                    </a:p>
+                    <a:p>
+                      <a:pPr marL="0" marR="0" indent="0" algn="l" defTabSz="584200" rtl="0" eaLnBrk="1" fontAlgn="auto" latinLnBrk="0" hangingPunct="1">
+                        <a:lnSpc>
+                          <a:spcPct val="100000"/>
+                        </a:lnSpc>
+                        <a:spcBef>
+                          <a:spcPts val="0"/>
+                        </a:spcBef>
+                        <a:spcAft>
+                          <a:spcPts val="0"/>
+                        </a:spcAft>
+                        <a:buClrTx/>
+                        <a:buSzTx/>
+                        <a:buFontTx/>
+                        <a:buNone/>
+                        <a:tabLst/>
+                        <a:defRPr/>
+                      </a:pPr>
+                      <a:r>
+                        <a:rPr lang="en-US" sz="1000" i="0" baseline="0" dirty="0" err="1">
+                          <a:solidFill>
+                            <a:srgbClr val="000000"/>
+                          </a:solidFill>
+                          <a:latin typeface="Consolas" panose="020B0609020204030204" pitchFamily="49" charset="0"/>
+                          <a:cs typeface="Segoe UI" pitchFamily="34" charset="0"/>
+                        </a:rPr>
+                        <a:t>admin.site.register</a:t>
+                      </a:r>
+                      <a:r>
+                        <a:rPr lang="en-US" sz="1000" i="0" baseline="0" dirty="0">
+                          <a:solidFill>
+                            <a:srgbClr val="000000"/>
+                          </a:solidFill>
+                          <a:latin typeface="Consolas" panose="020B0609020204030204" pitchFamily="49" charset="0"/>
+                          <a:cs typeface="Segoe UI" pitchFamily="34" charset="0"/>
+                        </a:rPr>
+                        <a:t>(Page)</a:t>
+                      </a:r>
+                      <a:endParaRPr lang="en-GB" sz="1000" i="1" dirty="0">
+                        <a:solidFill>
+                          <a:srgbClr val="000000"/>
+                        </a:solidFill>
+                        <a:latin typeface="Segoe UI" pitchFamily="34" charset="0"/>
+                        <a:cs typeface="Segoe UI" pitchFamily="34" charset="0"/>
+                      </a:endParaRPr>
+                    </a:p>
+                  </a:txBody>
+                  <a:tcPr marL="46800" marR="46800">
+                    <a:lnL w="12700" cap="flat" cmpd="sng" algn="ctr">
+                      <a:solidFill>
+                        <a:schemeClr val="tx1"/>
+                      </a:solidFill>
+                      <a:prstDash val="solid"/>
+                      <a:round/>
+                      <a:headEnd type="none" w="med" len="med"/>
+                      <a:tailEnd type="none" w="med" len="med"/>
+                    </a:lnL>
+                    <a:lnR w="12700" cap="flat" cmpd="sng" algn="ctr">
+                      <a:solidFill>
+                        <a:schemeClr val="tx1"/>
+                      </a:solidFill>
+                      <a:prstDash val="solid"/>
+                      <a:round/>
+                      <a:headEnd type="none" w="med" len="med"/>
+                      <a:tailEnd type="none" w="med" len="med"/>
+                    </a:lnR>
+                    <a:lnT w="6350" cap="flat" cmpd="sng" algn="ctr">
+                      <a:noFill/>
+                      <a:prstDash val="solid"/>
+                      <a:round/>
+                      <a:headEnd type="none" w="med" len="med"/>
+                      <a:tailEnd type="none" w="med" len="med"/>
+                    </a:lnT>
+                    <a:lnB w="6350" cap="flat" cmpd="sng" algn="ctr">
+                      <a:noFill/>
+                      <a:prstDash val="solid"/>
+                      <a:round/>
+                      <a:headEnd type="none" w="med" len="med"/>
+                      <a:tailEnd type="none" w="med" len="med"/>
+                    </a:lnB>
+                    <a:lnTlToBr w="12700" cmpd="sng">
+                      <a:noFill/>
+                      <a:prstDash val="solid"/>
+                    </a:lnTlToBr>
+                    <a:lnBlToTr w="12700" cmpd="sng">
+                      <a:noFill/>
+                      <a:prstDash val="solid"/>
+                    </a:lnBlToTr>
+                  </a:tcPr>
+                </a:tc>
+                <a:extLst>
+                  <a:ext uri="{0D108BD9-81ED-4DB2-BD59-A6C34878D82A}">
+                    <a16:rowId xmlns:a16="http://schemas.microsoft.com/office/drawing/2014/main" val="694626626"/>
                   </a:ext>
                 </a:extLst>
               </a:tr>

</xml_diff>

<commit_message>
Added app urls and app to INSTALLED_APPS in settings.
</commit_message>
<xml_diff>
--- a/Django.pptx
+++ b/Django.pptx
@@ -426,7 +426,7 @@
           <a:p>
             <a:fld id="{37C50D7F-5172-434D-9E20-E71FDF806C79}" type="datetimeFigureOut">
               <a:rPr lang="en-GB" smtClean="0"/>
-              <a:t>12/08/2019</a:t>
+              <a:t>19/10/2019</a:t>
             </a:fld>
             <a:endParaRPr lang="en-GB"/>
           </a:p>
@@ -2456,7 +2456,7 @@
           </a:ln>
           <a:extLst>
             <a:ext uri="{C572A759-6A51-4108-AA02-DFA0A04FC94B}">
-              <ma14:wrappingTextBoxFlag xmlns:ma14="http://schemas.microsoft.com/office/mac/drawingml/2011/main" xmlns:a14="http://schemas.microsoft.com/office/drawing/2010/main" xmlns:m="http://schemas.openxmlformats.org/officeDocument/2006/math" xmlns="" val="1"/>
+              <ma14:wrappingTextBoxFlag xmlns="" xmlns:m="http://schemas.openxmlformats.org/officeDocument/2006/math" xmlns:a14="http://schemas.microsoft.com/office/drawing/2010/main" xmlns:ma14="http://schemas.microsoft.com/office/mac/drawingml/2011/main" val="1"/>
             </a:ext>
           </a:extLst>
         </p:spPr>
@@ -2495,7 +2495,7 @@
           </a:ln>
           <a:extLst>
             <a:ext uri="{C572A759-6A51-4108-AA02-DFA0A04FC94B}">
-              <ma14:wrappingTextBoxFlag xmlns:ma14="http://schemas.microsoft.com/office/mac/drawingml/2011/main" xmlns:a14="http://schemas.microsoft.com/office/drawing/2010/main" xmlns:m="http://schemas.openxmlformats.org/officeDocument/2006/math" xmlns="" val="1"/>
+              <ma14:wrappingTextBoxFlag xmlns="" xmlns:m="http://schemas.openxmlformats.org/officeDocument/2006/math" xmlns:a14="http://schemas.microsoft.com/office/drawing/2010/main" xmlns:ma14="http://schemas.microsoft.com/office/mac/drawingml/2011/main" val="1"/>
             </a:ext>
           </a:extLst>
         </p:spPr>
@@ -5171,7 +5171,7 @@
           <p:nvPr>
             <p:extLst>
               <p:ext uri="{D42A27DB-BD31-4B8C-83A1-F6EECF244321}">
-                <p14:modId xmlns:p14="http://schemas.microsoft.com/office/powerpoint/2010/main" val="2008072593"/>
+                <p14:modId xmlns:p14="http://schemas.microsoft.com/office/powerpoint/2010/main" val="2499652990"/>
               </p:ext>
             </p:extLst>
           </p:nvPr>
@@ -6613,7 +6613,7 @@
           <p:nvPr>
             <p:extLst>
               <p:ext uri="{D42A27DB-BD31-4B8C-83A1-F6EECF244321}">
-                <p14:modId xmlns:p14="http://schemas.microsoft.com/office/powerpoint/2010/main" val="4212848574"/>
+                <p14:modId xmlns:p14="http://schemas.microsoft.com/office/powerpoint/2010/main" val="3627187892"/>
               </p:ext>
             </p:extLst>
           </p:nvPr>
@@ -7143,13 +7143,13 @@
           <p:nvPr>
             <p:extLst>
               <p:ext uri="{D42A27DB-BD31-4B8C-83A1-F6EECF244321}">
-                <p14:modId xmlns:p14="http://schemas.microsoft.com/office/powerpoint/2010/main" val="3543906862"/>
+                <p14:modId xmlns:p14="http://schemas.microsoft.com/office/powerpoint/2010/main" val="3320400886"/>
               </p:ext>
             </p:extLst>
           </p:nvPr>
         </p:nvGraphicFramePr>
         <p:xfrm>
-          <a:off x="4026245" y="5722784"/>
+          <a:off x="4026247" y="7380009"/>
           <a:ext cx="3962053" cy="1696800"/>
         </p:xfrm>
         <a:graphic>
@@ -7810,14 +7810,14 @@
           <p:nvPr>
             <p:extLst>
               <p:ext uri="{D42A27DB-BD31-4B8C-83A1-F6EECF244321}">
-                <p14:modId xmlns:p14="http://schemas.microsoft.com/office/powerpoint/2010/main" val="2429121692"/>
+                <p14:modId xmlns:p14="http://schemas.microsoft.com/office/powerpoint/2010/main" val="3622348074"/>
               </p:ext>
             </p:extLst>
           </p:nvPr>
         </p:nvGraphicFramePr>
         <p:xfrm>
-          <a:off x="4026244" y="9989736"/>
-          <a:ext cx="8993069" cy="391200"/>
+          <a:off x="288925" y="9989736"/>
+          <a:ext cx="3140075" cy="391200"/>
         </p:xfrm>
         <a:graphic>
           <a:graphicData uri="http://schemas.openxmlformats.org/drawingml/2006/table">
@@ -7826,7 +7826,7 @@
                 <a:tableStyleId>{5940675A-B579-460E-94D1-54222C63F5DA}</a:tableStyleId>
               </a:tblPr>
               <a:tblGrid>
-                <a:gridCol w="8993069">
+                <a:gridCol w="3140075">
                   <a:extLst>
                     <a:ext uri="{9D8B030D-6E8A-4147-A177-3AD203B41FA5}">
                       <a16:colId xmlns:a16="http://schemas.microsoft.com/office/drawing/2014/main" val="20000"/>
@@ -9934,6 +9934,1131 @@
                 <a:extLst>
                   <a:ext uri="{0D108BD9-81ED-4DB2-BD59-A6C34878D82A}">
                     <a16:rowId xmlns:a16="http://schemas.microsoft.com/office/drawing/2014/main" val="3983574495"/>
+                  </a:ext>
+                </a:extLst>
+              </a:tr>
+            </a:tbl>
+          </a:graphicData>
+        </a:graphic>
+      </p:graphicFrame>
+      <p:graphicFrame>
+        <p:nvGraphicFramePr>
+          <p:cNvPr id="19" name="Table 18">
+            <a:extLst>
+              <a:ext uri="{FF2B5EF4-FFF2-40B4-BE49-F238E27FC236}">
+                <a16:creationId xmlns:a16="http://schemas.microsoft.com/office/drawing/2014/main" id="{CC7EF1EB-212F-4994-A2BB-CBF53B538153}"/>
+              </a:ext>
+            </a:extLst>
+          </p:cNvPr>
+          <p:cNvGraphicFramePr>
+            <a:graphicFrameLocks noGrp="1"/>
+          </p:cNvGraphicFramePr>
+          <p:nvPr>
+            <p:extLst>
+              <p:ext uri="{D42A27DB-BD31-4B8C-83A1-F6EECF244321}">
+                <p14:modId xmlns:p14="http://schemas.microsoft.com/office/powerpoint/2010/main" val="2064889221"/>
+              </p:ext>
+            </p:extLst>
+          </p:nvPr>
+        </p:nvGraphicFramePr>
+        <p:xfrm>
+          <a:off x="4026247" y="5626225"/>
+          <a:ext cx="3962053" cy="1544400"/>
+        </p:xfrm>
+        <a:graphic>
+          <a:graphicData uri="http://schemas.openxmlformats.org/drawingml/2006/table">
+            <a:tbl>
+              <a:tblPr firstRow="1" bandRow="1">
+                <a:tableStyleId>{5940675A-B579-460E-94D1-54222C63F5DA}</a:tableStyleId>
+              </a:tblPr>
+              <a:tblGrid>
+                <a:gridCol w="3962053">
+                  <a:extLst>
+                    <a:ext uri="{9D8B030D-6E8A-4147-A177-3AD203B41FA5}">
+                      <a16:colId xmlns:a16="http://schemas.microsoft.com/office/drawing/2014/main" val="20000"/>
+                    </a:ext>
+                  </a:extLst>
+                </a:gridCol>
+              </a:tblGrid>
+              <a:tr h="0">
+                <a:tc>
+                  <a:txBody>
+                    <a:bodyPr/>
+                    <a:lstStyle/>
+                    <a:p>
+                      <a:pPr algn="l"/>
+                      <a:r>
+                        <a:rPr lang="en-GB" sz="1000" b="1" baseline="0" dirty="0">
+                          <a:solidFill>
+                            <a:srgbClr val="000000"/>
+                          </a:solidFill>
+                          <a:latin typeface="Segoe UI" pitchFamily="34" charset="0"/>
+                          <a:cs typeface="Segoe UI" pitchFamily="34" charset="0"/>
+                        </a:rPr>
+                        <a:t>1. </a:t>
+                      </a:r>
+                    </a:p>
+                  </a:txBody>
+                  <a:tcPr marL="46800" marR="46800" marT="21600" marB="21600">
+                    <a:lnL w="12700" cap="flat" cmpd="sng" algn="ctr">
+                      <a:solidFill>
+                        <a:schemeClr val="tx1"/>
+                      </a:solidFill>
+                      <a:prstDash val="solid"/>
+                      <a:round/>
+                      <a:headEnd type="none" w="med" len="med"/>
+                      <a:tailEnd type="none" w="med" len="med"/>
+                    </a:lnL>
+                    <a:lnR w="12700" cap="flat" cmpd="sng" algn="ctr">
+                      <a:solidFill>
+                        <a:schemeClr val="tx1"/>
+                      </a:solidFill>
+                      <a:prstDash val="solid"/>
+                      <a:round/>
+                      <a:headEnd type="none" w="med" len="med"/>
+                      <a:tailEnd type="none" w="med" len="med"/>
+                    </a:lnR>
+                    <a:lnT w="12700" cap="flat" cmpd="sng" algn="ctr">
+                      <a:solidFill>
+                        <a:schemeClr val="tx1"/>
+                      </a:solidFill>
+                      <a:prstDash val="solid"/>
+                      <a:round/>
+                      <a:headEnd type="none" w="med" len="med"/>
+                      <a:tailEnd type="none" w="med" len="med"/>
+                    </a:lnT>
+                    <a:lnB w="6350" cap="flat" cmpd="sng" algn="ctr">
+                      <a:noFill/>
+                      <a:prstDash val="solid"/>
+                      <a:round/>
+                      <a:headEnd type="none" w="med" len="med"/>
+                      <a:tailEnd type="none" w="med" len="med"/>
+                    </a:lnB>
+                    <a:lnTlToBr w="12700" cmpd="sng">
+                      <a:noFill/>
+                      <a:prstDash val="solid"/>
+                    </a:lnTlToBr>
+                    <a:lnBlToTr w="12700" cmpd="sng">
+                      <a:noFill/>
+                      <a:prstDash val="solid"/>
+                    </a:lnBlToTr>
+                  </a:tcPr>
+                </a:tc>
+                <a:extLst>
+                  <a:ext uri="{0D108BD9-81ED-4DB2-BD59-A6C34878D82A}">
+                    <a16:rowId xmlns:a16="http://schemas.microsoft.com/office/drawing/2014/main" val="10000"/>
+                  </a:ext>
+                </a:extLst>
+              </a:tr>
+              <a:tr h="0">
+                <a:tc>
+                  <a:txBody>
+                    <a:bodyPr/>
+                    <a:lstStyle/>
+                    <a:p>
+                      <a:pPr marL="0" marR="0" indent="0" algn="l" defTabSz="584200" rtl="0" eaLnBrk="1" fontAlgn="auto" latinLnBrk="0" hangingPunct="1">
+                        <a:lnSpc>
+                          <a:spcPct val="100000"/>
+                        </a:lnSpc>
+                        <a:spcBef>
+                          <a:spcPts val="0"/>
+                        </a:spcBef>
+                        <a:spcAft>
+                          <a:spcPts val="0"/>
+                        </a:spcAft>
+                        <a:buClrTx/>
+                        <a:buSzTx/>
+                        <a:buFontTx/>
+                        <a:buNone/>
+                        <a:tabLst/>
+                        <a:defRPr/>
+                      </a:pPr>
+                      <a:r>
+                        <a:rPr lang="en-GB" sz="1000" i="1" u="none" dirty="0">
+                          <a:solidFill>
+                            <a:srgbClr val="000000"/>
+                          </a:solidFill>
+                          <a:latin typeface="Segoe UI" pitchFamily="34" charset="0"/>
+                          <a:cs typeface="Segoe UI" pitchFamily="34" charset="0"/>
+                        </a:rPr>
+                        <a:t>tango_with_django/rango/urls.py</a:t>
+                      </a:r>
+                    </a:p>
+                  </a:txBody>
+                  <a:tcPr marL="46800" marR="46800" marT="21600" marB="21600">
+                    <a:lnL w="12700" cap="flat" cmpd="sng" algn="ctr">
+                      <a:solidFill>
+                        <a:schemeClr val="tx1"/>
+                      </a:solidFill>
+                      <a:prstDash val="solid"/>
+                      <a:round/>
+                      <a:headEnd type="none" w="med" len="med"/>
+                      <a:tailEnd type="none" w="med" len="med"/>
+                    </a:lnL>
+                    <a:lnR w="12700" cap="flat" cmpd="sng" algn="ctr">
+                      <a:solidFill>
+                        <a:schemeClr val="tx1"/>
+                      </a:solidFill>
+                      <a:prstDash val="solid"/>
+                      <a:round/>
+                      <a:headEnd type="none" w="med" len="med"/>
+                      <a:tailEnd type="none" w="med" len="med"/>
+                    </a:lnR>
+                    <a:lnT w="6350" cap="flat" cmpd="sng" algn="ctr">
+                      <a:noFill/>
+                      <a:prstDash val="solid"/>
+                      <a:round/>
+                      <a:headEnd type="none" w="med" len="med"/>
+                      <a:tailEnd type="none" w="med" len="med"/>
+                    </a:lnT>
+                    <a:lnB w="6350" cap="flat" cmpd="sng" algn="ctr">
+                      <a:noFill/>
+                      <a:prstDash val="solid"/>
+                      <a:round/>
+                      <a:headEnd type="none" w="med" len="med"/>
+                      <a:tailEnd type="none" w="med" len="med"/>
+                    </a:lnB>
+                    <a:lnTlToBr w="12700" cmpd="sng">
+                      <a:noFill/>
+                      <a:prstDash val="solid"/>
+                    </a:lnTlToBr>
+                    <a:lnBlToTr w="12700" cmpd="sng">
+                      <a:noFill/>
+                      <a:prstDash val="solid"/>
+                    </a:lnBlToTr>
+                  </a:tcPr>
+                </a:tc>
+                <a:extLst>
+                  <a:ext uri="{0D108BD9-81ED-4DB2-BD59-A6C34878D82A}">
+                    <a16:rowId xmlns:a16="http://schemas.microsoft.com/office/drawing/2014/main" val="694626626"/>
+                  </a:ext>
+                </a:extLst>
+              </a:tr>
+              <a:tr h="0">
+                <a:tc>
+                  <a:txBody>
+                    <a:bodyPr/>
+                    <a:lstStyle/>
+                    <a:p>
+                      <a:pPr marL="0" marR="0" indent="0" algn="l" defTabSz="584200" rtl="0" eaLnBrk="1" fontAlgn="auto" latinLnBrk="0" hangingPunct="1">
+                        <a:lnSpc>
+                          <a:spcPct val="100000"/>
+                        </a:lnSpc>
+                        <a:spcBef>
+                          <a:spcPts val="0"/>
+                        </a:spcBef>
+                        <a:spcAft>
+                          <a:spcPts val="0"/>
+                        </a:spcAft>
+                        <a:buClrTx/>
+                        <a:buSzTx/>
+                        <a:buFontTx/>
+                        <a:buNone/>
+                        <a:tabLst/>
+                        <a:defRPr/>
+                      </a:pPr>
+                      <a:endParaRPr lang="en-GB" sz="1000" i="0" baseline="0" dirty="0">
+                        <a:solidFill>
+                          <a:srgbClr val="000000"/>
+                        </a:solidFill>
+                        <a:latin typeface="Consolas" panose="020B0609020204030204" pitchFamily="49" charset="0"/>
+                        <a:cs typeface="Segoe UI" pitchFamily="34" charset="0"/>
+                      </a:endParaRPr>
+                    </a:p>
+                  </a:txBody>
+                  <a:tcPr marL="46800" marR="46800" marT="21600" marB="21600">
+                    <a:lnL w="12700" cap="flat" cmpd="sng" algn="ctr">
+                      <a:solidFill>
+                        <a:schemeClr val="tx1"/>
+                      </a:solidFill>
+                      <a:prstDash val="solid"/>
+                      <a:round/>
+                      <a:headEnd type="none" w="med" len="med"/>
+                      <a:tailEnd type="none" w="med" len="med"/>
+                    </a:lnL>
+                    <a:lnR w="12700" cap="flat" cmpd="sng" algn="ctr">
+                      <a:solidFill>
+                        <a:schemeClr val="tx1"/>
+                      </a:solidFill>
+                      <a:prstDash val="solid"/>
+                      <a:round/>
+                      <a:headEnd type="none" w="med" len="med"/>
+                      <a:tailEnd type="none" w="med" len="med"/>
+                    </a:lnR>
+                    <a:lnT w="6350" cap="flat" cmpd="sng" algn="ctr">
+                      <a:noFill/>
+                      <a:prstDash val="solid"/>
+                      <a:round/>
+                      <a:headEnd type="none" w="med" len="med"/>
+                      <a:tailEnd type="none" w="med" len="med"/>
+                    </a:lnT>
+                    <a:lnB w="6350" cap="flat" cmpd="sng" algn="ctr">
+                      <a:noFill/>
+                      <a:prstDash val="solid"/>
+                      <a:round/>
+                      <a:headEnd type="none" w="med" len="med"/>
+                      <a:tailEnd type="none" w="med" len="med"/>
+                    </a:lnB>
+                    <a:lnTlToBr w="12700" cmpd="sng">
+                      <a:noFill/>
+                      <a:prstDash val="solid"/>
+                    </a:lnTlToBr>
+                    <a:lnBlToTr w="12700" cmpd="sng">
+                      <a:noFill/>
+                      <a:prstDash val="solid"/>
+                    </a:lnBlToTr>
+                  </a:tcPr>
+                </a:tc>
+                <a:extLst>
+                  <a:ext uri="{0D108BD9-81ED-4DB2-BD59-A6C34878D82A}">
+                    <a16:rowId xmlns:a16="http://schemas.microsoft.com/office/drawing/2014/main" val="3003448997"/>
+                  </a:ext>
+                </a:extLst>
+              </a:tr>
+              <a:tr h="0">
+                <a:tc>
+                  <a:txBody>
+                    <a:bodyPr/>
+                    <a:lstStyle/>
+                    <a:p>
+                      <a:pPr marL="0" marR="0" indent="0" algn="l" defTabSz="584200" rtl="0" eaLnBrk="1" fontAlgn="auto" latinLnBrk="0" hangingPunct="1">
+                        <a:lnSpc>
+                          <a:spcPct val="100000"/>
+                        </a:lnSpc>
+                        <a:spcBef>
+                          <a:spcPts val="0"/>
+                        </a:spcBef>
+                        <a:spcAft>
+                          <a:spcPts val="0"/>
+                        </a:spcAft>
+                        <a:buClrTx/>
+                        <a:buSzTx/>
+                        <a:buFontTx/>
+                        <a:buNone/>
+                        <a:tabLst/>
+                        <a:defRPr/>
+                      </a:pPr>
+                      <a:r>
+                        <a:rPr lang="en-US" sz="1000" i="0" baseline="0" dirty="0">
+                          <a:solidFill>
+                            <a:srgbClr val="000000"/>
+                          </a:solidFill>
+                          <a:latin typeface="Consolas" panose="020B0609020204030204" pitchFamily="49" charset="0"/>
+                          <a:cs typeface="Segoe UI" pitchFamily="34" charset="0"/>
+                        </a:rPr>
+                        <a:t>from </a:t>
+                      </a:r>
+                      <a:r>
+                        <a:rPr lang="en-US" sz="1000" i="0" baseline="0" dirty="0" err="1">
+                          <a:solidFill>
+                            <a:srgbClr val="000000"/>
+                          </a:solidFill>
+                          <a:latin typeface="Consolas" panose="020B0609020204030204" pitchFamily="49" charset="0"/>
+                          <a:cs typeface="Segoe UI" pitchFamily="34" charset="0"/>
+                        </a:rPr>
+                        <a:t>django.urls</a:t>
+                      </a:r>
+                      <a:r>
+                        <a:rPr lang="en-US" sz="1000" i="0" baseline="0" dirty="0">
+                          <a:solidFill>
+                            <a:srgbClr val="000000"/>
+                          </a:solidFill>
+                          <a:latin typeface="Consolas" panose="020B0609020204030204" pitchFamily="49" charset="0"/>
+                          <a:cs typeface="Segoe UI" pitchFamily="34" charset="0"/>
+                        </a:rPr>
+                        <a:t> import </a:t>
+                      </a:r>
+                      <a:r>
+                        <a:rPr lang="en-US" sz="1000" i="0" baseline="0" dirty="0" err="1">
+                          <a:solidFill>
+                            <a:srgbClr val="000000"/>
+                          </a:solidFill>
+                          <a:latin typeface="Consolas" panose="020B0609020204030204" pitchFamily="49" charset="0"/>
+                          <a:cs typeface="Segoe UI" pitchFamily="34" charset="0"/>
+                        </a:rPr>
+                        <a:t>re_path</a:t>
+                      </a:r>
+                      <a:endParaRPr lang="en-US" sz="1000" i="0" baseline="0" dirty="0">
+                        <a:solidFill>
+                          <a:srgbClr val="000000"/>
+                        </a:solidFill>
+                        <a:latin typeface="Consolas" panose="020B0609020204030204" pitchFamily="49" charset="0"/>
+                        <a:cs typeface="Segoe UI" pitchFamily="34" charset="0"/>
+                      </a:endParaRPr>
+                    </a:p>
+                    <a:p>
+                      <a:pPr marL="0" marR="0" indent="0" algn="l" defTabSz="584200" rtl="0" eaLnBrk="1" fontAlgn="auto" latinLnBrk="0" hangingPunct="1">
+                        <a:lnSpc>
+                          <a:spcPct val="100000"/>
+                        </a:lnSpc>
+                        <a:spcBef>
+                          <a:spcPts val="0"/>
+                        </a:spcBef>
+                        <a:spcAft>
+                          <a:spcPts val="0"/>
+                        </a:spcAft>
+                        <a:buClrTx/>
+                        <a:buSzTx/>
+                        <a:buFontTx/>
+                        <a:buNone/>
+                        <a:tabLst/>
+                        <a:defRPr/>
+                      </a:pPr>
+                      <a:r>
+                        <a:rPr lang="en-US" sz="1000" i="0" baseline="0" dirty="0">
+                          <a:solidFill>
+                            <a:srgbClr val="000000"/>
+                          </a:solidFill>
+                          <a:latin typeface="Consolas" panose="020B0609020204030204" pitchFamily="49" charset="0"/>
+                          <a:cs typeface="Segoe UI" pitchFamily="34" charset="0"/>
+                        </a:rPr>
+                        <a:t>from </a:t>
+                      </a:r>
+                      <a:r>
+                        <a:rPr lang="en-US" sz="1000" i="0" baseline="0" dirty="0" err="1">
+                          <a:solidFill>
+                            <a:srgbClr val="000000"/>
+                          </a:solidFill>
+                          <a:latin typeface="Consolas" panose="020B0609020204030204" pitchFamily="49" charset="0"/>
+                          <a:cs typeface="Segoe UI" pitchFamily="34" charset="0"/>
+                        </a:rPr>
+                        <a:t>ekon</a:t>
+                      </a:r>
+                      <a:r>
+                        <a:rPr lang="en-US" sz="1000" i="0" baseline="0" dirty="0">
+                          <a:solidFill>
+                            <a:srgbClr val="000000"/>
+                          </a:solidFill>
+                          <a:latin typeface="Consolas" panose="020B0609020204030204" pitchFamily="49" charset="0"/>
+                          <a:cs typeface="Segoe UI" pitchFamily="34" charset="0"/>
+                        </a:rPr>
+                        <a:t> import views</a:t>
+                      </a:r>
+                    </a:p>
+                    <a:p>
+                      <a:pPr marL="0" marR="0" indent="0" algn="l" defTabSz="584200" rtl="0" eaLnBrk="1" fontAlgn="auto" latinLnBrk="0" hangingPunct="1">
+                        <a:lnSpc>
+                          <a:spcPct val="100000"/>
+                        </a:lnSpc>
+                        <a:spcBef>
+                          <a:spcPts val="0"/>
+                        </a:spcBef>
+                        <a:spcAft>
+                          <a:spcPts val="0"/>
+                        </a:spcAft>
+                        <a:buClrTx/>
+                        <a:buSzTx/>
+                        <a:buFontTx/>
+                        <a:buNone/>
+                        <a:tabLst/>
+                        <a:defRPr/>
+                      </a:pPr>
+                      <a:endParaRPr lang="en-US" sz="1000" i="0" baseline="0" dirty="0">
+                        <a:solidFill>
+                          <a:srgbClr val="000000"/>
+                        </a:solidFill>
+                        <a:latin typeface="Consolas" panose="020B0609020204030204" pitchFamily="49" charset="0"/>
+                        <a:cs typeface="Segoe UI" pitchFamily="34" charset="0"/>
+                      </a:endParaRPr>
+                    </a:p>
+                    <a:p>
+                      <a:pPr marL="0" marR="0" indent="0" algn="l" defTabSz="584200" rtl="0" eaLnBrk="1" fontAlgn="auto" latinLnBrk="0" hangingPunct="1">
+                        <a:lnSpc>
+                          <a:spcPct val="100000"/>
+                        </a:lnSpc>
+                        <a:spcBef>
+                          <a:spcPts val="0"/>
+                        </a:spcBef>
+                        <a:spcAft>
+                          <a:spcPts val="0"/>
+                        </a:spcAft>
+                        <a:buClrTx/>
+                        <a:buSzTx/>
+                        <a:buFontTx/>
+                        <a:buNone/>
+                        <a:tabLst/>
+                        <a:defRPr/>
+                      </a:pPr>
+                      <a:r>
+                        <a:rPr lang="en-US" sz="1000" i="0" baseline="0" dirty="0" err="1">
+                          <a:solidFill>
+                            <a:srgbClr val="000000"/>
+                          </a:solidFill>
+                          <a:latin typeface="Consolas" panose="020B0609020204030204" pitchFamily="49" charset="0"/>
+                          <a:cs typeface="Segoe UI" pitchFamily="34" charset="0"/>
+                        </a:rPr>
+                        <a:t>urlpatterns</a:t>
+                      </a:r>
+                      <a:r>
+                        <a:rPr lang="en-US" sz="1000" i="0" baseline="0" dirty="0">
+                          <a:solidFill>
+                            <a:srgbClr val="000000"/>
+                          </a:solidFill>
+                          <a:latin typeface="Consolas" panose="020B0609020204030204" pitchFamily="49" charset="0"/>
+                          <a:cs typeface="Segoe UI" pitchFamily="34" charset="0"/>
+                        </a:rPr>
+                        <a:t> = [</a:t>
+                      </a:r>
+                    </a:p>
+                    <a:p>
+                      <a:pPr marL="0" marR="0" indent="0" algn="l" defTabSz="584200" rtl="0" eaLnBrk="1" fontAlgn="auto" latinLnBrk="0" hangingPunct="1">
+                        <a:lnSpc>
+                          <a:spcPct val="100000"/>
+                        </a:lnSpc>
+                        <a:spcBef>
+                          <a:spcPts val="0"/>
+                        </a:spcBef>
+                        <a:spcAft>
+                          <a:spcPts val="0"/>
+                        </a:spcAft>
+                        <a:buClrTx/>
+                        <a:buSzTx/>
+                        <a:buFontTx/>
+                        <a:buNone/>
+                        <a:tabLst/>
+                        <a:defRPr/>
+                      </a:pPr>
+                      <a:r>
+                        <a:rPr lang="en-US" sz="1000" i="0" baseline="0" dirty="0">
+                          <a:solidFill>
+                            <a:srgbClr val="000000"/>
+                          </a:solidFill>
+                          <a:latin typeface="Consolas" panose="020B0609020204030204" pitchFamily="49" charset="0"/>
+                          <a:cs typeface="Segoe UI" pitchFamily="34" charset="0"/>
+                        </a:rPr>
+                        <a:t>    </a:t>
+                      </a:r>
+                      <a:r>
+                        <a:rPr lang="en-US" sz="1000" i="0" baseline="0" dirty="0" err="1">
+                          <a:solidFill>
+                            <a:srgbClr val="000000"/>
+                          </a:solidFill>
+                          <a:latin typeface="Consolas" panose="020B0609020204030204" pitchFamily="49" charset="0"/>
+                          <a:cs typeface="Segoe UI" pitchFamily="34" charset="0"/>
+                        </a:rPr>
+                        <a:t>re_path</a:t>
+                      </a:r>
+                      <a:r>
+                        <a:rPr lang="en-US" sz="1000" i="0" baseline="0" dirty="0">
+                          <a:solidFill>
+                            <a:srgbClr val="000000"/>
+                          </a:solidFill>
+                          <a:latin typeface="Consolas" panose="020B0609020204030204" pitchFamily="49" charset="0"/>
+                          <a:cs typeface="Segoe UI" pitchFamily="34" charset="0"/>
+                        </a:rPr>
+                        <a:t>(r'^$', </a:t>
+                      </a:r>
+                      <a:r>
+                        <a:rPr lang="en-US" sz="1000" i="0" baseline="0" dirty="0" err="1">
+                          <a:solidFill>
+                            <a:srgbClr val="000000"/>
+                          </a:solidFill>
+                          <a:latin typeface="Consolas" panose="020B0609020204030204" pitchFamily="49" charset="0"/>
+                          <a:cs typeface="Segoe UI" pitchFamily="34" charset="0"/>
+                        </a:rPr>
+                        <a:t>views.index</a:t>
+                      </a:r>
+                      <a:r>
+                        <a:rPr lang="en-US" sz="1000" i="0" baseline="0" dirty="0">
+                          <a:solidFill>
+                            <a:srgbClr val="000000"/>
+                          </a:solidFill>
+                          <a:latin typeface="Consolas" panose="020B0609020204030204" pitchFamily="49" charset="0"/>
+                          <a:cs typeface="Segoe UI" pitchFamily="34" charset="0"/>
+                        </a:rPr>
+                        <a:t>),</a:t>
+                      </a:r>
+                    </a:p>
+                    <a:p>
+                      <a:pPr marL="0" marR="0" indent="0" algn="l" defTabSz="584200" rtl="0" eaLnBrk="1" fontAlgn="auto" latinLnBrk="0" hangingPunct="1">
+                        <a:lnSpc>
+                          <a:spcPct val="100000"/>
+                        </a:lnSpc>
+                        <a:spcBef>
+                          <a:spcPts val="0"/>
+                        </a:spcBef>
+                        <a:spcAft>
+                          <a:spcPts val="0"/>
+                        </a:spcAft>
+                        <a:buClrTx/>
+                        <a:buSzTx/>
+                        <a:buFontTx/>
+                        <a:buNone/>
+                        <a:tabLst/>
+                        <a:defRPr/>
+                      </a:pPr>
+                      <a:r>
+                        <a:rPr lang="en-US" sz="1000" i="0" baseline="0" dirty="0">
+                          <a:solidFill>
+                            <a:srgbClr val="000000"/>
+                          </a:solidFill>
+                          <a:latin typeface="Consolas" panose="020B0609020204030204" pitchFamily="49" charset="0"/>
+                          <a:cs typeface="Segoe UI" pitchFamily="34" charset="0"/>
+                        </a:rPr>
+                        <a:t>]</a:t>
+                      </a:r>
+                      <a:endParaRPr lang="en-GB" sz="1000" i="0" baseline="0" dirty="0">
+                        <a:solidFill>
+                          <a:srgbClr val="000000"/>
+                        </a:solidFill>
+                        <a:latin typeface="Consolas" panose="020B0609020204030204" pitchFamily="49" charset="0"/>
+                        <a:cs typeface="Segoe UI" pitchFamily="34" charset="0"/>
+                      </a:endParaRPr>
+                    </a:p>
+                  </a:txBody>
+                  <a:tcPr marL="46800" marR="46800" marT="21600" marB="21600">
+                    <a:lnL w="12700" cap="flat" cmpd="sng" algn="ctr">
+                      <a:solidFill>
+                        <a:schemeClr val="tx1"/>
+                      </a:solidFill>
+                      <a:prstDash val="solid"/>
+                      <a:round/>
+                      <a:headEnd type="none" w="med" len="med"/>
+                      <a:tailEnd type="none" w="med" len="med"/>
+                    </a:lnL>
+                    <a:lnR w="12700" cap="flat" cmpd="sng" algn="ctr">
+                      <a:solidFill>
+                        <a:schemeClr val="tx1"/>
+                      </a:solidFill>
+                      <a:prstDash val="solid"/>
+                      <a:round/>
+                      <a:headEnd type="none" w="med" len="med"/>
+                      <a:tailEnd type="none" w="med" len="med"/>
+                    </a:lnR>
+                    <a:lnT w="6350" cap="flat" cmpd="sng" algn="ctr">
+                      <a:noFill/>
+                      <a:prstDash val="solid"/>
+                      <a:round/>
+                      <a:headEnd type="none" w="med" len="med"/>
+                      <a:tailEnd type="none" w="med" len="med"/>
+                    </a:lnT>
+                    <a:lnB w="6350" cap="flat" cmpd="sng" algn="ctr">
+                      <a:noFill/>
+                      <a:prstDash val="solid"/>
+                      <a:round/>
+                      <a:headEnd type="none" w="med" len="med"/>
+                      <a:tailEnd type="none" w="med" len="med"/>
+                    </a:lnB>
+                    <a:lnTlToBr w="12700" cmpd="sng">
+                      <a:noFill/>
+                      <a:prstDash val="solid"/>
+                    </a:lnTlToBr>
+                    <a:lnBlToTr w="12700" cmpd="sng">
+                      <a:noFill/>
+                      <a:prstDash val="solid"/>
+                    </a:lnBlToTr>
+                  </a:tcPr>
+                </a:tc>
+                <a:extLst>
+                  <a:ext uri="{0D108BD9-81ED-4DB2-BD59-A6C34878D82A}">
+                    <a16:rowId xmlns:a16="http://schemas.microsoft.com/office/drawing/2014/main" val="3983574495"/>
+                  </a:ext>
+                </a:extLst>
+              </a:tr>
+            </a:tbl>
+          </a:graphicData>
+        </a:graphic>
+      </p:graphicFrame>
+      <p:graphicFrame>
+        <p:nvGraphicFramePr>
+          <p:cNvPr id="20" name="Table 19">
+            <a:extLst>
+              <a:ext uri="{FF2B5EF4-FFF2-40B4-BE49-F238E27FC236}">
+                <a16:creationId xmlns:a16="http://schemas.microsoft.com/office/drawing/2014/main" id="{FB97FA96-C8B7-4157-8B00-73B1A10EA972}"/>
+              </a:ext>
+            </a:extLst>
+          </p:cNvPr>
+          <p:cNvGraphicFramePr>
+            <a:graphicFrameLocks noGrp="1"/>
+          </p:cNvGraphicFramePr>
+          <p:nvPr>
+            <p:extLst>
+              <p:ext uri="{D42A27DB-BD31-4B8C-83A1-F6EECF244321}">
+                <p14:modId xmlns:p14="http://schemas.microsoft.com/office/powerpoint/2010/main" val="3928428262"/>
+              </p:ext>
+            </p:extLst>
+          </p:nvPr>
+        </p:nvGraphicFramePr>
+        <p:xfrm>
+          <a:off x="288925" y="6718865"/>
+          <a:ext cx="3579842" cy="1584960"/>
+        </p:xfrm>
+        <a:graphic>
+          <a:graphicData uri="http://schemas.openxmlformats.org/drawingml/2006/table">
+            <a:tbl>
+              <a:tblPr firstRow="1" bandRow="1">
+                <a:tableStyleId>{5940675A-B579-460E-94D1-54222C63F5DA}</a:tableStyleId>
+              </a:tblPr>
+              <a:tblGrid>
+                <a:gridCol w="3579842">
+                  <a:extLst>
+                    <a:ext uri="{9D8B030D-6E8A-4147-A177-3AD203B41FA5}">
+                      <a16:colId xmlns:a16="http://schemas.microsoft.com/office/drawing/2014/main" val="20000"/>
+                    </a:ext>
+                  </a:extLst>
+                </a:gridCol>
+              </a:tblGrid>
+              <a:tr h="180000">
+                <a:tc>
+                  <a:txBody>
+                    <a:bodyPr/>
+                    <a:lstStyle/>
+                    <a:p>
+                      <a:pPr algn="l"/>
+                      <a:r>
+                        <a:rPr lang="en-GB" sz="1000" b="1" baseline="0" dirty="0">
+                          <a:solidFill>
+                            <a:srgbClr val="000000"/>
+                          </a:solidFill>
+                          <a:latin typeface="Segoe UI" pitchFamily="34" charset="0"/>
+                          <a:cs typeface="Segoe UI" pitchFamily="34" charset="0"/>
+                        </a:rPr>
+                        <a:t>Add App to INSTALLED_APPS</a:t>
+                      </a:r>
+                    </a:p>
+                    <a:p>
+                      <a:pPr marL="0" marR="0" lvl="0" indent="0" algn="l" defTabSz="584200" rtl="0" eaLnBrk="1" fontAlgn="auto" latinLnBrk="0" hangingPunct="1">
+                        <a:lnSpc>
+                          <a:spcPct val="100000"/>
+                        </a:lnSpc>
+                        <a:spcBef>
+                          <a:spcPts val="0"/>
+                        </a:spcBef>
+                        <a:spcAft>
+                          <a:spcPts val="0"/>
+                        </a:spcAft>
+                        <a:buClrTx/>
+                        <a:buSzTx/>
+                        <a:buFontTx/>
+                        <a:buNone/>
+                        <a:tabLst/>
+                        <a:defRPr/>
+                      </a:pPr>
+                      <a:r>
+                        <a:rPr lang="en-GB" sz="1000" i="1" u="none" dirty="0">
+                          <a:solidFill>
+                            <a:srgbClr val="000000"/>
+                          </a:solidFill>
+                          <a:latin typeface="Segoe UI" pitchFamily="34" charset="0"/>
+                          <a:cs typeface="Segoe UI" pitchFamily="34" charset="0"/>
+                        </a:rPr>
+                        <a:t>tango_with_django/tango_with_django/settings.py</a:t>
+                      </a:r>
+                    </a:p>
+                  </a:txBody>
+                  <a:tcPr marL="46800" marR="46800">
+                    <a:lnL w="12700" cap="flat" cmpd="sng" algn="ctr">
+                      <a:solidFill>
+                        <a:schemeClr val="tx1"/>
+                      </a:solidFill>
+                      <a:prstDash val="solid"/>
+                      <a:round/>
+                      <a:headEnd type="none" w="med" len="med"/>
+                      <a:tailEnd type="none" w="med" len="med"/>
+                    </a:lnL>
+                    <a:lnR w="12700" cap="flat" cmpd="sng" algn="ctr">
+                      <a:solidFill>
+                        <a:schemeClr val="tx1"/>
+                      </a:solidFill>
+                      <a:prstDash val="solid"/>
+                      <a:round/>
+                      <a:headEnd type="none" w="med" len="med"/>
+                      <a:tailEnd type="none" w="med" len="med"/>
+                    </a:lnR>
+                    <a:lnT w="12700" cap="flat" cmpd="sng" algn="ctr">
+                      <a:solidFill>
+                        <a:schemeClr val="tx1"/>
+                      </a:solidFill>
+                      <a:prstDash val="solid"/>
+                      <a:round/>
+                      <a:headEnd type="none" w="med" len="med"/>
+                      <a:tailEnd type="none" w="med" len="med"/>
+                    </a:lnT>
+                    <a:lnB w="6350" cap="flat" cmpd="sng" algn="ctr">
+                      <a:noFill/>
+                      <a:prstDash val="solid"/>
+                      <a:round/>
+                      <a:headEnd type="none" w="med" len="med"/>
+                      <a:tailEnd type="none" w="med" len="med"/>
+                    </a:lnB>
+                    <a:lnTlToBr w="12700" cmpd="sng">
+                      <a:noFill/>
+                      <a:prstDash val="solid"/>
+                    </a:lnTlToBr>
+                    <a:lnBlToTr w="12700" cmpd="sng">
+                      <a:noFill/>
+                      <a:prstDash val="solid"/>
+                    </a:lnBlToTr>
+                  </a:tcPr>
+                </a:tc>
+                <a:extLst>
+                  <a:ext uri="{0D108BD9-81ED-4DB2-BD59-A6C34878D82A}">
+                    <a16:rowId xmlns:a16="http://schemas.microsoft.com/office/drawing/2014/main" val="10000"/>
+                  </a:ext>
+                </a:extLst>
+              </a:tr>
+              <a:tr h="180000">
+                <a:tc>
+                  <a:txBody>
+                    <a:bodyPr/>
+                    <a:lstStyle/>
+                    <a:p>
+                      <a:pPr marL="0" marR="0" indent="0" algn="l" defTabSz="584200" rtl="0" eaLnBrk="1" fontAlgn="auto" latinLnBrk="0" hangingPunct="1">
+                        <a:lnSpc>
+                          <a:spcPct val="100000"/>
+                        </a:lnSpc>
+                        <a:spcBef>
+                          <a:spcPts val="0"/>
+                        </a:spcBef>
+                        <a:spcAft>
+                          <a:spcPts val="0"/>
+                        </a:spcAft>
+                        <a:buClrTx/>
+                        <a:buSzTx/>
+                        <a:buFontTx/>
+                        <a:buNone/>
+                        <a:tabLst/>
+                        <a:defRPr/>
+                      </a:pPr>
+                      <a:r>
+                        <a:rPr lang="en-US" sz="1000" i="0" baseline="0" dirty="0">
+                          <a:solidFill>
+                            <a:srgbClr val="000000"/>
+                          </a:solidFill>
+                          <a:latin typeface="Consolas" panose="020B0609020204030204" pitchFamily="49" charset="0"/>
+                          <a:cs typeface="Segoe UI" pitchFamily="34" charset="0"/>
+                        </a:rPr>
+                        <a:t>INSTALLED_APPS = [</a:t>
+                      </a:r>
+                    </a:p>
+                    <a:p>
+                      <a:pPr marL="0" marR="0" indent="0" algn="l" defTabSz="584200" rtl="0" eaLnBrk="1" fontAlgn="auto" latinLnBrk="0" hangingPunct="1">
+                        <a:lnSpc>
+                          <a:spcPct val="100000"/>
+                        </a:lnSpc>
+                        <a:spcBef>
+                          <a:spcPts val="0"/>
+                        </a:spcBef>
+                        <a:spcAft>
+                          <a:spcPts val="0"/>
+                        </a:spcAft>
+                        <a:buClrTx/>
+                        <a:buSzTx/>
+                        <a:buFontTx/>
+                        <a:buNone/>
+                        <a:tabLst/>
+                        <a:defRPr/>
+                      </a:pPr>
+                      <a:r>
+                        <a:rPr lang="en-US" sz="1000" i="0" baseline="0" dirty="0">
+                          <a:solidFill>
+                            <a:srgbClr val="000000"/>
+                          </a:solidFill>
+                          <a:latin typeface="Consolas" panose="020B0609020204030204" pitchFamily="49" charset="0"/>
+                          <a:cs typeface="Segoe UI" pitchFamily="34" charset="0"/>
+                        </a:rPr>
+                        <a:t>    ...</a:t>
+                      </a:r>
+                    </a:p>
+                    <a:p>
+                      <a:pPr marL="0" marR="0" indent="0" algn="l" defTabSz="584200" rtl="0" eaLnBrk="1" fontAlgn="auto" latinLnBrk="0" hangingPunct="1">
+                        <a:lnSpc>
+                          <a:spcPct val="100000"/>
+                        </a:lnSpc>
+                        <a:spcBef>
+                          <a:spcPts val="0"/>
+                        </a:spcBef>
+                        <a:spcAft>
+                          <a:spcPts val="0"/>
+                        </a:spcAft>
+                        <a:buClrTx/>
+                        <a:buSzTx/>
+                        <a:buFontTx/>
+                        <a:buNone/>
+                        <a:tabLst/>
+                        <a:defRPr/>
+                      </a:pPr>
+                      <a:r>
+                        <a:rPr lang="en-US" sz="1000" i="0" baseline="0" dirty="0">
+                          <a:solidFill>
+                            <a:srgbClr val="000000"/>
+                          </a:solidFill>
+                          <a:latin typeface="Consolas" panose="020B0609020204030204" pitchFamily="49" charset="0"/>
+                          <a:cs typeface="Segoe UI" pitchFamily="34" charset="0"/>
+                        </a:rPr>
+                        <a:t>    ‘</a:t>
+                      </a:r>
+                      <a:r>
+                        <a:rPr lang="en-US" sz="1000" i="0" baseline="0" dirty="0" err="1">
+                          <a:solidFill>
+                            <a:srgbClr val="000000"/>
+                          </a:solidFill>
+                          <a:latin typeface="Consolas" panose="020B0609020204030204" pitchFamily="49" charset="0"/>
+                          <a:cs typeface="Segoe UI" pitchFamily="34" charset="0"/>
+                        </a:rPr>
+                        <a:t>rango</a:t>
+                      </a:r>
+                      <a:r>
+                        <a:rPr lang="en-US" sz="1000" i="0" baseline="0" dirty="0">
+                          <a:solidFill>
+                            <a:srgbClr val="000000"/>
+                          </a:solidFill>
+                          <a:latin typeface="Consolas" panose="020B0609020204030204" pitchFamily="49" charset="0"/>
+                          <a:cs typeface="Segoe UI" pitchFamily="34" charset="0"/>
+                        </a:rPr>
+                        <a:t>',</a:t>
+                      </a:r>
+                    </a:p>
+                    <a:p>
+                      <a:pPr marL="0" marR="0" indent="0" algn="l" defTabSz="584200" rtl="0" eaLnBrk="1" fontAlgn="auto" latinLnBrk="0" hangingPunct="1">
+                        <a:lnSpc>
+                          <a:spcPct val="100000"/>
+                        </a:lnSpc>
+                        <a:spcBef>
+                          <a:spcPts val="0"/>
+                        </a:spcBef>
+                        <a:spcAft>
+                          <a:spcPts val="0"/>
+                        </a:spcAft>
+                        <a:buClrTx/>
+                        <a:buSzTx/>
+                        <a:buFontTx/>
+                        <a:buNone/>
+                        <a:tabLst/>
+                        <a:defRPr/>
+                      </a:pPr>
+                      <a:r>
+                        <a:rPr lang="en-US" sz="1000" i="0" baseline="0" dirty="0">
+                          <a:solidFill>
+                            <a:srgbClr val="000000"/>
+                          </a:solidFill>
+                          <a:latin typeface="Consolas" panose="020B0609020204030204" pitchFamily="49" charset="0"/>
+                          <a:cs typeface="Segoe UI" pitchFamily="34" charset="0"/>
+                        </a:rPr>
+                        <a:t>]</a:t>
+                      </a:r>
+                      <a:endParaRPr lang="en-GB" sz="1000" i="0" baseline="0" dirty="0">
+                        <a:solidFill>
+                          <a:srgbClr val="000000"/>
+                        </a:solidFill>
+                        <a:latin typeface="Consolas" panose="020B0609020204030204" pitchFamily="49" charset="0"/>
+                        <a:cs typeface="Segoe UI" pitchFamily="34" charset="0"/>
+                      </a:endParaRPr>
+                    </a:p>
+                  </a:txBody>
+                  <a:tcPr marL="46800" marR="46800">
+                    <a:lnL w="12700" cap="flat" cmpd="sng" algn="ctr">
+                      <a:solidFill>
+                        <a:schemeClr val="tx1"/>
+                      </a:solidFill>
+                      <a:prstDash val="solid"/>
+                      <a:round/>
+                      <a:headEnd type="none" w="med" len="med"/>
+                      <a:tailEnd type="none" w="med" len="med"/>
+                    </a:lnL>
+                    <a:lnR w="12700" cap="flat" cmpd="sng" algn="ctr">
+                      <a:solidFill>
+                        <a:schemeClr val="tx1"/>
+                      </a:solidFill>
+                      <a:prstDash val="solid"/>
+                      <a:round/>
+                      <a:headEnd type="none" w="med" len="med"/>
+                      <a:tailEnd type="none" w="med" len="med"/>
+                    </a:lnR>
+                    <a:lnT w="6350" cap="flat" cmpd="sng" algn="ctr">
+                      <a:noFill/>
+                      <a:prstDash val="solid"/>
+                      <a:round/>
+                      <a:headEnd type="none" w="med" len="med"/>
+                      <a:tailEnd type="none" w="med" len="med"/>
+                    </a:lnT>
+                    <a:lnB w="6350" cap="flat" cmpd="sng" algn="ctr">
+                      <a:noFill/>
+                      <a:prstDash val="solid"/>
+                      <a:round/>
+                      <a:headEnd type="none" w="med" len="med"/>
+                      <a:tailEnd type="none" w="med" len="med"/>
+                    </a:lnB>
+                    <a:lnTlToBr w="12700" cmpd="sng">
+                      <a:noFill/>
+                      <a:prstDash val="solid"/>
+                    </a:lnTlToBr>
+                    <a:lnBlToTr w="12700" cmpd="sng">
+                      <a:noFill/>
+                      <a:prstDash val="solid"/>
+                    </a:lnBlToTr>
+                  </a:tcPr>
+                </a:tc>
+                <a:extLst>
+                  <a:ext uri="{0D108BD9-81ED-4DB2-BD59-A6C34878D82A}">
+                    <a16:rowId xmlns:a16="http://schemas.microsoft.com/office/drawing/2014/main" val="265647606"/>
+                  </a:ext>
+                </a:extLst>
+              </a:tr>
+              <a:tr h="180000">
+                <a:tc>
+                  <a:txBody>
+                    <a:bodyPr/>
+                    <a:lstStyle/>
+                    <a:p>
+                      <a:pPr marL="0" marR="0" indent="0" algn="l" defTabSz="584200" rtl="0" eaLnBrk="1" fontAlgn="auto" latinLnBrk="0" hangingPunct="1">
+                        <a:lnSpc>
+                          <a:spcPct val="100000"/>
+                        </a:lnSpc>
+                        <a:spcBef>
+                          <a:spcPts val="0"/>
+                        </a:spcBef>
+                        <a:spcAft>
+                          <a:spcPts val="0"/>
+                        </a:spcAft>
+                        <a:buClrTx/>
+                        <a:buSzTx/>
+                        <a:buFontTx/>
+                        <a:buNone/>
+                        <a:tabLst/>
+                        <a:defRPr/>
+                      </a:pPr>
+                      <a:endParaRPr lang="en-GB" sz="1000" i="0" dirty="0">
+                        <a:solidFill>
+                          <a:srgbClr val="000000"/>
+                        </a:solidFill>
+                        <a:latin typeface="Segoe UI" pitchFamily="34" charset="0"/>
+                        <a:cs typeface="Segoe UI" pitchFamily="34" charset="0"/>
+                      </a:endParaRPr>
+                    </a:p>
+                  </a:txBody>
+                  <a:tcPr marL="46800" marR="46800">
+                    <a:lnL w="12700" cap="flat" cmpd="sng" algn="ctr">
+                      <a:solidFill>
+                        <a:schemeClr val="tx1"/>
+                      </a:solidFill>
+                      <a:prstDash val="solid"/>
+                      <a:round/>
+                      <a:headEnd type="none" w="med" len="med"/>
+                      <a:tailEnd type="none" w="med" len="med"/>
+                    </a:lnL>
+                    <a:lnR w="12700" cap="flat" cmpd="sng" algn="ctr">
+                      <a:solidFill>
+                        <a:schemeClr val="tx1"/>
+                      </a:solidFill>
+                      <a:prstDash val="solid"/>
+                      <a:round/>
+                      <a:headEnd type="none" w="med" len="med"/>
+                      <a:tailEnd type="none" w="med" len="med"/>
+                    </a:lnR>
+                    <a:lnT w="6350" cap="flat" cmpd="sng" algn="ctr">
+                      <a:noFill/>
+                      <a:prstDash val="solid"/>
+                      <a:round/>
+                      <a:headEnd type="none" w="med" len="med"/>
+                      <a:tailEnd type="none" w="med" len="med"/>
+                    </a:lnT>
+                    <a:lnB w="6350" cap="flat" cmpd="sng" algn="ctr">
+                      <a:noFill/>
+                      <a:prstDash val="solid"/>
+                      <a:round/>
+                      <a:headEnd type="none" w="med" len="med"/>
+                      <a:tailEnd type="none" w="med" len="med"/>
+                    </a:lnB>
+                    <a:lnTlToBr w="12700" cmpd="sng">
+                      <a:noFill/>
+                      <a:prstDash val="solid"/>
+                    </a:lnTlToBr>
+                    <a:lnBlToTr w="12700" cmpd="sng">
+                      <a:noFill/>
+                      <a:prstDash val="solid"/>
+                    </a:lnBlToTr>
+                  </a:tcPr>
+                </a:tc>
+                <a:extLst>
+                  <a:ext uri="{0D108BD9-81ED-4DB2-BD59-A6C34878D82A}">
+                    <a16:rowId xmlns:a16="http://schemas.microsoft.com/office/drawing/2014/main" val="1254229278"/>
+                  </a:ext>
+                </a:extLst>
+              </a:tr>
+              <a:tr h="194675">
+                <a:tc>
+                  <a:txBody>
+                    <a:bodyPr/>
+                    <a:lstStyle/>
+                    <a:p>
+                      <a:pPr marL="0" marR="0" lvl="0" indent="0" algn="l" defTabSz="584200" rtl="0" eaLnBrk="1" fontAlgn="auto" latinLnBrk="0" hangingPunct="1">
+                        <a:lnSpc>
+                          <a:spcPct val="100000"/>
+                        </a:lnSpc>
+                        <a:spcBef>
+                          <a:spcPts val="0"/>
+                        </a:spcBef>
+                        <a:spcAft>
+                          <a:spcPts val="0"/>
+                        </a:spcAft>
+                        <a:buClrTx/>
+                        <a:buSzTx/>
+                        <a:buFontTx/>
+                        <a:buNone/>
+                        <a:tabLst/>
+                        <a:defRPr/>
+                      </a:pPr>
+                      <a:r>
+                        <a:rPr lang="en-GB" sz="1000" i="0" dirty="0">
+                          <a:solidFill>
+                            <a:srgbClr val="000000"/>
+                          </a:solidFill>
+                          <a:latin typeface="Segoe UI" pitchFamily="34" charset="0"/>
+                          <a:cs typeface="Segoe UI" pitchFamily="34" charset="0"/>
+                        </a:rPr>
+                        <a:t>https://docs.djangoproject.com/en/2.2/intro/tutorial03/</a:t>
+                      </a:r>
+                    </a:p>
+                  </a:txBody>
+                  <a:tcPr marL="46800" marR="46800">
+                    <a:lnL w="12700" cap="flat" cmpd="sng" algn="ctr">
+                      <a:solidFill>
+                        <a:schemeClr val="tx1"/>
+                      </a:solidFill>
+                      <a:prstDash val="solid"/>
+                      <a:round/>
+                      <a:headEnd type="none" w="med" len="med"/>
+                      <a:tailEnd type="none" w="med" len="med"/>
+                    </a:lnL>
+                    <a:lnR w="12700" cap="flat" cmpd="sng" algn="ctr">
+                      <a:solidFill>
+                        <a:schemeClr val="tx1"/>
+                      </a:solidFill>
+                      <a:prstDash val="solid"/>
+                      <a:round/>
+                      <a:headEnd type="none" w="med" len="med"/>
+                      <a:tailEnd type="none" w="med" len="med"/>
+                    </a:lnR>
+                    <a:lnT w="6350" cap="flat" cmpd="sng" algn="ctr">
+                      <a:noFill/>
+                      <a:prstDash val="solid"/>
+                      <a:round/>
+                      <a:headEnd type="none" w="med" len="med"/>
+                      <a:tailEnd type="none" w="med" len="med"/>
+                    </a:lnT>
+                    <a:lnB w="12700" cap="flat" cmpd="sng" algn="ctr">
+                      <a:solidFill>
+                        <a:schemeClr val="tx1"/>
+                      </a:solidFill>
+                      <a:prstDash val="solid"/>
+                      <a:round/>
+                      <a:headEnd type="none" w="med" len="med"/>
+                      <a:tailEnd type="none" w="med" len="med"/>
+                    </a:lnB>
+                    <a:lnTlToBr w="12700" cmpd="sng">
+                      <a:noFill/>
+                      <a:prstDash val="solid"/>
+                    </a:lnTlToBr>
+                    <a:lnBlToTr w="12700" cmpd="sng">
+                      <a:noFill/>
+                      <a:prstDash val="solid"/>
+                    </a:lnBlToTr>
+                  </a:tcPr>
+                </a:tc>
+                <a:extLst>
+                  <a:ext uri="{0D108BD9-81ED-4DB2-BD59-A6C34878D82A}">
+                    <a16:rowId xmlns:a16="http://schemas.microsoft.com/office/drawing/2014/main" val="10002"/>
                   </a:ext>
                 </a:extLst>
               </a:tr>

</xml_diff>

<commit_message>
Added model fields to django.pptx
</commit_message>
<xml_diff>
--- a/Django.pptx
+++ b/Django.pptx
@@ -426,7 +426,7 @@
           <a:p>
             <a:fld id="{37C50D7F-5172-434D-9E20-E71FDF806C79}" type="datetimeFigureOut">
               <a:rPr lang="en-GB" smtClean="0"/>
-              <a:t>19/10/2019</a:t>
+              <a:t>20/10/2019</a:t>
             </a:fld>
             <a:endParaRPr lang="en-GB"/>
           </a:p>
@@ -2456,7 +2456,7 @@
           </a:ln>
           <a:extLst>
             <a:ext uri="{C572A759-6A51-4108-AA02-DFA0A04FC94B}">
-              <ma14:wrappingTextBoxFlag xmlns="" xmlns:m="http://schemas.openxmlformats.org/officeDocument/2006/math" xmlns:a14="http://schemas.microsoft.com/office/drawing/2010/main" xmlns:ma14="http://schemas.microsoft.com/office/mac/drawingml/2011/main" val="1"/>
+              <ma14:wrappingTextBoxFlag xmlns:ma14="http://schemas.microsoft.com/office/mac/drawingml/2011/main" xmlns:a14="http://schemas.microsoft.com/office/drawing/2010/main" xmlns:m="http://schemas.openxmlformats.org/officeDocument/2006/math" xmlns="" val="1"/>
             </a:ext>
           </a:extLst>
         </p:spPr>
@@ -2495,7 +2495,7 @@
           </a:ln>
           <a:extLst>
             <a:ext uri="{C572A759-6A51-4108-AA02-DFA0A04FC94B}">
-              <ma14:wrappingTextBoxFlag xmlns="" xmlns:m="http://schemas.openxmlformats.org/officeDocument/2006/math" xmlns:a14="http://schemas.microsoft.com/office/drawing/2010/main" xmlns:ma14="http://schemas.microsoft.com/office/mac/drawingml/2011/main" val="1"/>
+              <ma14:wrappingTextBoxFlag xmlns:ma14="http://schemas.microsoft.com/office/mac/drawingml/2011/main" xmlns:a14="http://schemas.microsoft.com/office/drawing/2010/main" xmlns:m="http://schemas.openxmlformats.org/officeDocument/2006/math" xmlns="" val="1"/>
             </a:ext>
           </a:extLst>
         </p:spPr>
@@ -11312,7 +11312,7 @@
           <p:nvPr>
             <p:extLst>
               <p:ext uri="{D42A27DB-BD31-4B8C-83A1-F6EECF244321}">
-                <p14:modId xmlns:p14="http://schemas.microsoft.com/office/powerpoint/2010/main" val="443960388"/>
+                <p14:modId xmlns:p14="http://schemas.microsoft.com/office/powerpoint/2010/main" val="2676931491"/>
               </p:ext>
             </p:extLst>
           </p:nvPr>
@@ -12374,14 +12374,14 @@
           <p:nvPr>
             <p:extLst>
               <p:ext uri="{D42A27DB-BD31-4B8C-83A1-F6EECF244321}">
-                <p14:modId xmlns:p14="http://schemas.microsoft.com/office/powerpoint/2010/main" val="2229678196"/>
+                <p14:modId xmlns:p14="http://schemas.microsoft.com/office/powerpoint/2010/main" val="3942741612"/>
               </p:ext>
             </p:extLst>
           </p:nvPr>
         </p:nvGraphicFramePr>
         <p:xfrm>
           <a:off x="1117486" y="5459495"/>
-          <a:ext cx="3452495" cy="2194560"/>
+          <a:ext cx="3452495" cy="2682240"/>
         </p:xfrm>
         <a:graphic>
           <a:graphicData uri="http://schemas.openxmlformats.org/drawingml/2006/table">
@@ -13154,6 +13154,231 @@
                 <a:extLst>
                   <a:ext uri="{0D108BD9-81ED-4DB2-BD59-A6C34878D82A}">
                     <a16:rowId xmlns:a16="http://schemas.microsoft.com/office/drawing/2014/main" val="10001"/>
+                  </a:ext>
+                </a:extLst>
+              </a:tr>
+              <a:tr h="216000">
+                <a:tc>
+                  <a:txBody>
+                    <a:bodyPr/>
+                    <a:lstStyle/>
+                    <a:p>
+                      <a:pPr marL="0" marR="0" indent="0" algn="l" defTabSz="584200" rtl="0" eaLnBrk="1" fontAlgn="auto" latinLnBrk="0" hangingPunct="1">
+                        <a:lnSpc>
+                          <a:spcPct val="100000"/>
+                        </a:lnSpc>
+                        <a:spcBef>
+                          <a:spcPts val="0"/>
+                        </a:spcBef>
+                        <a:spcAft>
+                          <a:spcPts val="0"/>
+                        </a:spcAft>
+                        <a:buClrTx/>
+                        <a:buSzTx/>
+                        <a:buFontTx/>
+                        <a:buNone/>
+                        <a:tabLst/>
+                        <a:defRPr/>
+                      </a:pPr>
+                      <a:r>
+                        <a:rPr lang="en-GB" sz="1000" b="0" i="0" dirty="0">
+                          <a:solidFill>
+                            <a:srgbClr val="000000"/>
+                          </a:solidFill>
+                          <a:latin typeface="Segoe UI" pitchFamily="34" charset="0"/>
+                          <a:cs typeface="Segoe UI" pitchFamily="34" charset="0"/>
+                        </a:rPr>
+                        <a:t>shell &gt; </a:t>
+                      </a:r>
+                      <a:r>
+                        <a:rPr lang="en-US" sz="1000" b="0" i="0" dirty="0">
+                          <a:solidFill>
+                            <a:srgbClr val="000000"/>
+                          </a:solidFill>
+                          <a:latin typeface="Segoe UI" pitchFamily="34" charset="0"/>
+                          <a:cs typeface="Segoe UI" pitchFamily="34" charset="0"/>
+                        </a:rPr>
+                        <a:t>from </a:t>
+                      </a:r>
+                      <a:r>
+                        <a:rPr lang="en-US" sz="1000" b="0" i="0" dirty="0" err="1">
+                          <a:solidFill>
+                            <a:srgbClr val="000000"/>
+                          </a:solidFill>
+                          <a:latin typeface="Segoe UI" pitchFamily="34" charset="0"/>
+                          <a:cs typeface="Segoe UI" pitchFamily="34" charset="0"/>
+                        </a:rPr>
+                        <a:t>rango.models</a:t>
+                      </a:r>
+                      <a:r>
+                        <a:rPr lang="en-US" sz="1000" b="0" i="0" dirty="0">
+                          <a:solidFill>
+                            <a:srgbClr val="000000"/>
+                          </a:solidFill>
+                          <a:latin typeface="Segoe UI" pitchFamily="34" charset="0"/>
+                          <a:cs typeface="Segoe UI" pitchFamily="34" charset="0"/>
+                        </a:rPr>
+                        <a:t> import Page</a:t>
+                      </a:r>
+                      <a:endParaRPr lang="en-GB" sz="1000" b="0" i="0" dirty="0">
+                        <a:solidFill>
+                          <a:srgbClr val="000000"/>
+                        </a:solidFill>
+                        <a:latin typeface="Segoe UI" pitchFamily="34" charset="0"/>
+                        <a:cs typeface="Segoe UI" pitchFamily="34" charset="0"/>
+                      </a:endParaRPr>
+                    </a:p>
+                  </a:txBody>
+                  <a:tcPr marL="46800" marR="46800">
+                    <a:lnL w="12700" cap="flat" cmpd="sng" algn="ctr">
+                      <a:solidFill>
+                        <a:schemeClr val="tx1"/>
+                      </a:solidFill>
+                      <a:prstDash val="solid"/>
+                      <a:round/>
+                      <a:headEnd type="none" w="med" len="med"/>
+                      <a:tailEnd type="none" w="med" len="med"/>
+                    </a:lnL>
+                    <a:lnR w="12700" cap="flat" cmpd="sng" algn="ctr">
+                      <a:solidFill>
+                        <a:schemeClr val="tx1"/>
+                      </a:solidFill>
+                      <a:prstDash val="solid"/>
+                      <a:round/>
+                      <a:headEnd type="none" w="med" len="med"/>
+                      <a:tailEnd type="none" w="med" len="med"/>
+                    </a:lnR>
+                    <a:lnT w="6350" cap="flat" cmpd="sng" algn="ctr">
+                      <a:noFill/>
+                      <a:prstDash val="solid"/>
+                      <a:round/>
+                      <a:headEnd type="none" w="med" len="med"/>
+                      <a:tailEnd type="none" w="med" len="med"/>
+                    </a:lnT>
+                    <a:lnB w="6350" cap="flat" cmpd="sng" algn="ctr">
+                      <a:noFill/>
+                      <a:prstDash val="solid"/>
+                      <a:round/>
+                      <a:headEnd type="none" w="med" len="med"/>
+                      <a:tailEnd type="none" w="med" len="med"/>
+                    </a:lnB>
+                    <a:lnTlToBr w="12700" cmpd="sng">
+                      <a:noFill/>
+                      <a:prstDash val="solid"/>
+                    </a:lnTlToBr>
+                    <a:lnBlToTr w="12700" cmpd="sng">
+                      <a:noFill/>
+                      <a:prstDash val="solid"/>
+                    </a:lnBlToTr>
+                  </a:tcPr>
+                </a:tc>
+                <a:extLst>
+                  <a:ext uri="{0D108BD9-81ED-4DB2-BD59-A6C34878D82A}">
+                    <a16:rowId xmlns:a16="http://schemas.microsoft.com/office/drawing/2014/main" val="3337809136"/>
+                  </a:ext>
+                </a:extLst>
+              </a:tr>
+              <a:tr h="216000">
+                <a:tc>
+                  <a:txBody>
+                    <a:bodyPr/>
+                    <a:lstStyle/>
+                    <a:p>
+                      <a:pPr marL="0" marR="0" indent="0" algn="l" defTabSz="584200" rtl="0" eaLnBrk="1" fontAlgn="auto" latinLnBrk="0" hangingPunct="1">
+                        <a:lnSpc>
+                          <a:spcPct val="100000"/>
+                        </a:lnSpc>
+                        <a:spcBef>
+                          <a:spcPts val="0"/>
+                        </a:spcBef>
+                        <a:spcAft>
+                          <a:spcPts val="0"/>
+                        </a:spcAft>
+                        <a:buClrTx/>
+                        <a:buSzTx/>
+                        <a:buFontTx/>
+                        <a:buNone/>
+                        <a:tabLst/>
+                        <a:defRPr/>
+                      </a:pPr>
+                      <a:r>
+                        <a:rPr lang="en-GB" sz="1000" b="0" i="0" dirty="0">
+                          <a:solidFill>
+                            <a:srgbClr val="000000"/>
+                          </a:solidFill>
+                          <a:latin typeface="Segoe UI" pitchFamily="34" charset="0"/>
+                          <a:cs typeface="Segoe UI" pitchFamily="34" charset="0"/>
+                        </a:rPr>
+                        <a:t>shell &gt; </a:t>
+                      </a:r>
+                      <a:r>
+                        <a:rPr lang="en-GB" sz="1000" b="0" i="0" dirty="0" err="1">
+                          <a:solidFill>
+                            <a:srgbClr val="000000"/>
+                          </a:solidFill>
+                          <a:latin typeface="Segoe UI" pitchFamily="34" charset="0"/>
+                          <a:cs typeface="Segoe UI" pitchFamily="34" charset="0"/>
+                        </a:rPr>
+                        <a:t>Page.objects.all</a:t>
+                      </a:r>
+                      <a:r>
+                        <a:rPr lang="en-GB" sz="1000" b="0" i="0" dirty="0">
+                          <a:solidFill>
+                            <a:srgbClr val="000000"/>
+                          </a:solidFill>
+                          <a:latin typeface="Segoe UI" pitchFamily="34" charset="0"/>
+                          <a:cs typeface="Segoe UI" pitchFamily="34" charset="0"/>
+                        </a:rPr>
+                        <a:t>()</a:t>
+                      </a:r>
+                    </a:p>
+                  </a:txBody>
+                  <a:tcPr marL="46800" marR="46800">
+                    <a:lnL w="12700" cap="flat" cmpd="sng" algn="ctr">
+                      <a:solidFill>
+                        <a:schemeClr val="tx1"/>
+                      </a:solidFill>
+                      <a:prstDash val="solid"/>
+                      <a:round/>
+                      <a:headEnd type="none" w="med" len="med"/>
+                      <a:tailEnd type="none" w="med" len="med"/>
+                    </a:lnL>
+                    <a:lnR w="12700" cap="flat" cmpd="sng" algn="ctr">
+                      <a:solidFill>
+                        <a:schemeClr val="tx1"/>
+                      </a:solidFill>
+                      <a:prstDash val="solid"/>
+                      <a:round/>
+                      <a:headEnd type="none" w="med" len="med"/>
+                      <a:tailEnd type="none" w="med" len="med"/>
+                    </a:lnR>
+                    <a:lnT w="6350" cap="flat" cmpd="sng" algn="ctr">
+                      <a:noFill/>
+                      <a:prstDash val="solid"/>
+                      <a:round/>
+                      <a:headEnd type="none" w="med" len="med"/>
+                      <a:tailEnd type="none" w="med" len="med"/>
+                    </a:lnT>
+                    <a:lnB w="6350" cap="flat" cmpd="sng" algn="ctr">
+                      <a:noFill/>
+                      <a:prstDash val="solid"/>
+                      <a:round/>
+                      <a:headEnd type="none" w="med" len="med"/>
+                      <a:tailEnd type="none" w="med" len="med"/>
+                    </a:lnB>
+                    <a:lnTlToBr w="12700" cmpd="sng">
+                      <a:noFill/>
+                      <a:prstDash val="solid"/>
+                    </a:lnTlToBr>
+                    <a:lnBlToTr w="12700" cmpd="sng">
+                      <a:noFill/>
+                      <a:prstDash val="solid"/>
+                    </a:lnBlToTr>
+                  </a:tcPr>
+                </a:tc>
+                <a:extLst>
+                  <a:ext uri="{0D108BD9-81ED-4DB2-BD59-A6C34878D82A}">
+                    <a16:rowId xmlns:a16="http://schemas.microsoft.com/office/drawing/2014/main" val="3642182698"/>
                   </a:ext>
                 </a:extLst>
               </a:tr>
@@ -13262,13 +13487,13 @@
           <p:nvPr>
             <p:extLst>
               <p:ext uri="{D42A27DB-BD31-4B8C-83A1-F6EECF244321}">
-                <p14:modId xmlns:p14="http://schemas.microsoft.com/office/powerpoint/2010/main" val="4093482040"/>
+                <p14:modId xmlns:p14="http://schemas.microsoft.com/office/powerpoint/2010/main" val="4007803652"/>
               </p:ext>
             </p:extLst>
           </p:nvPr>
         </p:nvGraphicFramePr>
         <p:xfrm>
-          <a:off x="1117485" y="7778044"/>
+          <a:off x="1117485" y="8397804"/>
           <a:ext cx="3452495" cy="1493520"/>
         </p:xfrm>
         <a:graphic>
@@ -13712,6 +13937,893 @@
                 <a:extLst>
                   <a:ext uri="{0D108BD9-81ED-4DB2-BD59-A6C34878D82A}">
                     <a16:rowId xmlns:a16="http://schemas.microsoft.com/office/drawing/2014/main" val="10002"/>
+                  </a:ext>
+                </a:extLst>
+              </a:tr>
+            </a:tbl>
+          </a:graphicData>
+        </a:graphic>
+      </p:graphicFrame>
+      <p:graphicFrame>
+        <p:nvGraphicFramePr>
+          <p:cNvPr id="8" name="Table 7">
+            <a:extLst>
+              <a:ext uri="{FF2B5EF4-FFF2-40B4-BE49-F238E27FC236}">
+                <a16:creationId xmlns:a16="http://schemas.microsoft.com/office/drawing/2014/main" id="{ECDBF522-5D81-4840-8ED4-628CD3D642A9}"/>
+              </a:ext>
+            </a:extLst>
+          </p:cNvPr>
+          <p:cNvGraphicFramePr>
+            <a:graphicFrameLocks noGrp="1"/>
+          </p:cNvGraphicFramePr>
+          <p:nvPr>
+            <p:extLst>
+              <p:ext uri="{D42A27DB-BD31-4B8C-83A1-F6EECF244321}">
+                <p14:modId xmlns:p14="http://schemas.microsoft.com/office/powerpoint/2010/main" val="2350700023"/>
+              </p:ext>
+            </p:extLst>
+          </p:nvPr>
+        </p:nvGraphicFramePr>
+        <p:xfrm>
+          <a:off x="6166738" y="2267106"/>
+          <a:ext cx="4885887" cy="1610400"/>
+        </p:xfrm>
+        <a:graphic>
+          <a:graphicData uri="http://schemas.openxmlformats.org/drawingml/2006/table">
+            <a:tbl>
+              <a:tblPr firstRow="1" bandRow="1">
+                <a:tableStyleId>{5940675A-B579-460E-94D1-54222C63F5DA}</a:tableStyleId>
+              </a:tblPr>
+              <a:tblGrid>
+                <a:gridCol w="4885887">
+                  <a:extLst>
+                    <a:ext uri="{9D8B030D-6E8A-4147-A177-3AD203B41FA5}">
+                      <a16:colId xmlns:a16="http://schemas.microsoft.com/office/drawing/2014/main" val="20000"/>
+                    </a:ext>
+                  </a:extLst>
+                </a:gridCol>
+              </a:tblGrid>
+              <a:tr h="0">
+                <a:tc>
+                  <a:txBody>
+                    <a:bodyPr/>
+                    <a:lstStyle/>
+                    <a:p>
+                      <a:pPr algn="l"/>
+                      <a:r>
+                        <a:rPr lang="en-GB" sz="1000" b="1" baseline="0" dirty="0">
+                          <a:solidFill>
+                            <a:srgbClr val="000000"/>
+                          </a:solidFill>
+                          <a:latin typeface="Segoe UI" pitchFamily="34" charset="0"/>
+                          <a:cs typeface="Segoe UI" pitchFamily="34" charset="0"/>
+                        </a:rPr>
+                        <a:t>Model Fields</a:t>
+                      </a:r>
+                    </a:p>
+                  </a:txBody>
+                  <a:tcPr marL="46800" marR="46800" marT="21600" marB="21600">
+                    <a:lnL w="12700" cap="flat" cmpd="sng" algn="ctr">
+                      <a:solidFill>
+                        <a:schemeClr val="tx1"/>
+                      </a:solidFill>
+                      <a:prstDash val="solid"/>
+                      <a:round/>
+                      <a:headEnd type="none" w="med" len="med"/>
+                      <a:tailEnd type="none" w="med" len="med"/>
+                    </a:lnL>
+                    <a:lnR w="12700" cap="flat" cmpd="sng" algn="ctr">
+                      <a:solidFill>
+                        <a:schemeClr val="tx1"/>
+                      </a:solidFill>
+                      <a:prstDash val="solid"/>
+                      <a:round/>
+                      <a:headEnd type="none" w="med" len="med"/>
+                      <a:tailEnd type="none" w="med" len="med"/>
+                    </a:lnR>
+                    <a:lnT w="12700" cap="flat" cmpd="sng" algn="ctr">
+                      <a:solidFill>
+                        <a:schemeClr val="tx1"/>
+                      </a:solidFill>
+                      <a:prstDash val="solid"/>
+                      <a:round/>
+                      <a:headEnd type="none" w="med" len="med"/>
+                      <a:tailEnd type="none" w="med" len="med"/>
+                    </a:lnT>
+                    <a:lnB w="6350" cap="flat" cmpd="sng" algn="ctr">
+                      <a:noFill/>
+                      <a:prstDash val="solid"/>
+                      <a:round/>
+                      <a:headEnd type="none" w="med" len="med"/>
+                      <a:tailEnd type="none" w="med" len="med"/>
+                    </a:lnB>
+                    <a:lnTlToBr w="12700" cmpd="sng">
+                      <a:noFill/>
+                      <a:prstDash val="solid"/>
+                    </a:lnTlToBr>
+                    <a:lnBlToTr w="12700" cmpd="sng">
+                      <a:noFill/>
+                      <a:prstDash val="solid"/>
+                    </a:lnBlToTr>
+                  </a:tcPr>
+                </a:tc>
+                <a:extLst>
+                  <a:ext uri="{0D108BD9-81ED-4DB2-BD59-A6C34878D82A}">
+                    <a16:rowId xmlns:a16="http://schemas.microsoft.com/office/drawing/2014/main" val="10000"/>
+                  </a:ext>
+                </a:extLst>
+              </a:tr>
+              <a:tr h="0">
+                <a:tc>
+                  <a:txBody>
+                    <a:bodyPr/>
+                    <a:lstStyle/>
+                    <a:p>
+                      <a:pPr marL="0" marR="0" indent="0" algn="l" defTabSz="584200" rtl="0" eaLnBrk="1" fontAlgn="auto" latinLnBrk="0" hangingPunct="1">
+                        <a:lnSpc>
+                          <a:spcPct val="100000"/>
+                        </a:lnSpc>
+                        <a:spcBef>
+                          <a:spcPts val="0"/>
+                        </a:spcBef>
+                        <a:spcAft>
+                          <a:spcPts val="0"/>
+                        </a:spcAft>
+                        <a:buClrTx/>
+                        <a:buSzTx/>
+                        <a:buFontTx/>
+                        <a:buNone/>
+                        <a:tabLst/>
+                        <a:defRPr/>
+                      </a:pPr>
+                      <a:endParaRPr lang="en-US" sz="1000" i="0" baseline="0" dirty="0">
+                        <a:solidFill>
+                          <a:srgbClr val="000000"/>
+                        </a:solidFill>
+                        <a:latin typeface="Consolas" panose="020B0609020204030204" pitchFamily="49" charset="0"/>
+                        <a:cs typeface="Segoe UI" pitchFamily="34" charset="0"/>
+                      </a:endParaRPr>
+                    </a:p>
+                    <a:p>
+                      <a:pPr marL="0" marR="0" indent="0" algn="l" defTabSz="584200" rtl="0" eaLnBrk="1" fontAlgn="auto" latinLnBrk="0" hangingPunct="1">
+                        <a:lnSpc>
+                          <a:spcPct val="100000"/>
+                        </a:lnSpc>
+                        <a:spcBef>
+                          <a:spcPts val="0"/>
+                        </a:spcBef>
+                        <a:spcAft>
+                          <a:spcPts val="0"/>
+                        </a:spcAft>
+                        <a:buClrTx/>
+                        <a:buSzTx/>
+                        <a:buFontTx/>
+                        <a:buNone/>
+                        <a:tabLst/>
+                        <a:defRPr/>
+                      </a:pPr>
+                      <a:endParaRPr lang="en-US" sz="1000" i="0" baseline="0" dirty="0">
+                        <a:solidFill>
+                          <a:srgbClr val="000000"/>
+                        </a:solidFill>
+                        <a:latin typeface="Consolas" panose="020B0609020204030204" pitchFamily="49" charset="0"/>
+                        <a:cs typeface="Segoe UI" pitchFamily="34" charset="0"/>
+                      </a:endParaRPr>
+                    </a:p>
+                    <a:p>
+                      <a:pPr marL="0" marR="0" indent="0" algn="l" defTabSz="584200" rtl="0" eaLnBrk="1" fontAlgn="auto" latinLnBrk="0" hangingPunct="1">
+                        <a:lnSpc>
+                          <a:spcPct val="100000"/>
+                        </a:lnSpc>
+                        <a:spcBef>
+                          <a:spcPts val="0"/>
+                        </a:spcBef>
+                        <a:spcAft>
+                          <a:spcPts val="0"/>
+                        </a:spcAft>
+                        <a:buClrTx/>
+                        <a:buSzTx/>
+                        <a:buFontTx/>
+                        <a:buNone/>
+                        <a:tabLst/>
+                        <a:defRPr/>
+                      </a:pPr>
+                      <a:endParaRPr lang="en-US" sz="1000" i="0" baseline="0" dirty="0">
+                        <a:solidFill>
+                          <a:srgbClr val="000000"/>
+                        </a:solidFill>
+                        <a:latin typeface="Consolas" panose="020B0609020204030204" pitchFamily="49" charset="0"/>
+                        <a:cs typeface="Segoe UI" pitchFamily="34" charset="0"/>
+                      </a:endParaRPr>
+                    </a:p>
+                    <a:p>
+                      <a:pPr marL="0" marR="0" indent="0" algn="l" defTabSz="584200" rtl="0" eaLnBrk="1" fontAlgn="auto" latinLnBrk="0" hangingPunct="1">
+                        <a:lnSpc>
+                          <a:spcPct val="100000"/>
+                        </a:lnSpc>
+                        <a:spcBef>
+                          <a:spcPts val="0"/>
+                        </a:spcBef>
+                        <a:spcAft>
+                          <a:spcPts val="0"/>
+                        </a:spcAft>
+                        <a:buClrTx/>
+                        <a:buSzTx/>
+                        <a:buFontTx/>
+                        <a:buNone/>
+                        <a:tabLst/>
+                        <a:defRPr/>
+                      </a:pPr>
+                      <a:r>
+                        <a:rPr lang="en-US" sz="1000" i="0" baseline="0" dirty="0">
+                          <a:solidFill>
+                            <a:srgbClr val="000000"/>
+                          </a:solidFill>
+                          <a:latin typeface="Consolas" panose="020B0609020204030204" pitchFamily="49" charset="0"/>
+                          <a:cs typeface="Segoe UI" pitchFamily="34" charset="0"/>
+                        </a:rPr>
+                        <a:t>date   = </a:t>
+                      </a:r>
+                      <a:r>
+                        <a:rPr lang="en-US" sz="1000" i="0" baseline="0" dirty="0" err="1">
+                          <a:solidFill>
+                            <a:srgbClr val="000000"/>
+                          </a:solidFill>
+                          <a:latin typeface="Consolas" panose="020B0609020204030204" pitchFamily="49" charset="0"/>
+                          <a:cs typeface="Segoe UI" pitchFamily="34" charset="0"/>
+                        </a:rPr>
+                        <a:t>models.DateField</a:t>
+                      </a:r>
+                      <a:r>
+                        <a:rPr lang="en-US" sz="1000" i="0" baseline="0" dirty="0">
+                          <a:solidFill>
+                            <a:srgbClr val="000000"/>
+                          </a:solidFill>
+                          <a:latin typeface="Consolas" panose="020B0609020204030204" pitchFamily="49" charset="0"/>
+                          <a:cs typeface="Segoe UI" pitchFamily="34" charset="0"/>
+                        </a:rPr>
+                        <a:t>(default=</a:t>
+                      </a:r>
+                      <a:r>
+                        <a:rPr lang="en-US" sz="1000" i="0" baseline="0" dirty="0" err="1">
+                          <a:solidFill>
+                            <a:srgbClr val="000000"/>
+                          </a:solidFill>
+                          <a:latin typeface="Consolas" panose="020B0609020204030204" pitchFamily="49" charset="0"/>
+                          <a:cs typeface="Segoe UI" pitchFamily="34" charset="0"/>
+                        </a:rPr>
+                        <a:t>datetime.date.today</a:t>
+                      </a:r>
+                      <a:r>
+                        <a:rPr lang="en-US" sz="1000" i="0" baseline="0" dirty="0">
+                          <a:solidFill>
+                            <a:srgbClr val="000000"/>
+                          </a:solidFill>
+                          <a:latin typeface="Consolas" panose="020B0609020204030204" pitchFamily="49" charset="0"/>
+                          <a:cs typeface="Segoe UI" pitchFamily="34" charset="0"/>
+                        </a:rPr>
+                        <a:t>)</a:t>
+                      </a:r>
+                    </a:p>
+                    <a:p>
+                      <a:pPr marL="0" marR="0" indent="0" algn="l" defTabSz="584200" rtl="0" eaLnBrk="1" fontAlgn="auto" latinLnBrk="0" hangingPunct="1">
+                        <a:lnSpc>
+                          <a:spcPct val="100000"/>
+                        </a:lnSpc>
+                        <a:spcBef>
+                          <a:spcPts val="0"/>
+                        </a:spcBef>
+                        <a:spcAft>
+                          <a:spcPts val="0"/>
+                        </a:spcAft>
+                        <a:buClrTx/>
+                        <a:buSzTx/>
+                        <a:buFontTx/>
+                        <a:buNone/>
+                        <a:tabLst/>
+                        <a:defRPr/>
+                      </a:pPr>
+                      <a:r>
+                        <a:rPr lang="en-US" sz="1000" i="0" baseline="0" dirty="0">
+                          <a:solidFill>
+                            <a:srgbClr val="000000"/>
+                          </a:solidFill>
+                          <a:latin typeface="Consolas" panose="020B0609020204030204" pitchFamily="49" charset="0"/>
+                          <a:cs typeface="Segoe UI" pitchFamily="34" charset="0"/>
+                        </a:rPr>
+                        <a:t>amount = </a:t>
+                      </a:r>
+                      <a:r>
+                        <a:rPr lang="en-US" sz="1000" i="0" baseline="0" dirty="0" err="1">
+                          <a:solidFill>
+                            <a:srgbClr val="000000"/>
+                          </a:solidFill>
+                          <a:latin typeface="Consolas" panose="020B0609020204030204" pitchFamily="49" charset="0"/>
+                          <a:cs typeface="Segoe UI" pitchFamily="34" charset="0"/>
+                        </a:rPr>
+                        <a:t>models.DecimalField</a:t>
+                      </a:r>
+                      <a:r>
+                        <a:rPr lang="en-US" sz="1000" i="0" baseline="0" dirty="0">
+                          <a:solidFill>
+                            <a:srgbClr val="000000"/>
+                          </a:solidFill>
+                          <a:latin typeface="Consolas" panose="020B0609020204030204" pitchFamily="49" charset="0"/>
+                          <a:cs typeface="Segoe UI" pitchFamily="34" charset="0"/>
+                        </a:rPr>
+                        <a:t>(</a:t>
+                      </a:r>
+                      <a:r>
+                        <a:rPr lang="en-US" sz="1000" i="0" baseline="0" dirty="0" err="1">
+                          <a:solidFill>
+                            <a:srgbClr val="000000"/>
+                          </a:solidFill>
+                          <a:latin typeface="Consolas" panose="020B0609020204030204" pitchFamily="49" charset="0"/>
+                          <a:cs typeface="Segoe UI" pitchFamily="34" charset="0"/>
+                        </a:rPr>
+                        <a:t>max_digits</a:t>
+                      </a:r>
+                      <a:r>
+                        <a:rPr lang="en-US" sz="1000" i="0" baseline="0" dirty="0">
+                          <a:solidFill>
+                            <a:srgbClr val="000000"/>
+                          </a:solidFill>
+                          <a:latin typeface="Consolas" panose="020B0609020204030204" pitchFamily="49" charset="0"/>
+                          <a:cs typeface="Segoe UI" pitchFamily="34" charset="0"/>
+                        </a:rPr>
+                        <a:t>=9, </a:t>
+                      </a:r>
+                      <a:r>
+                        <a:rPr lang="en-US" sz="1000" i="0" baseline="0" dirty="0" err="1">
+                          <a:solidFill>
+                            <a:srgbClr val="000000"/>
+                          </a:solidFill>
+                          <a:latin typeface="Consolas" panose="020B0609020204030204" pitchFamily="49" charset="0"/>
+                          <a:cs typeface="Segoe UI" pitchFamily="34" charset="0"/>
+                        </a:rPr>
+                        <a:t>decimal_places</a:t>
+                      </a:r>
+                      <a:r>
+                        <a:rPr lang="en-US" sz="1000" i="0" baseline="0" dirty="0">
+                          <a:solidFill>
+                            <a:srgbClr val="000000"/>
+                          </a:solidFill>
+                          <a:latin typeface="Consolas" panose="020B0609020204030204" pitchFamily="49" charset="0"/>
+                          <a:cs typeface="Segoe UI" pitchFamily="34" charset="0"/>
+                        </a:rPr>
+                        <a:t>=3)</a:t>
+                      </a:r>
+                    </a:p>
+                    <a:p>
+                      <a:pPr marL="0" marR="0" indent="0" algn="l" defTabSz="584200" rtl="0" eaLnBrk="1" fontAlgn="auto" latinLnBrk="0" hangingPunct="1">
+                        <a:lnSpc>
+                          <a:spcPct val="100000"/>
+                        </a:lnSpc>
+                        <a:spcBef>
+                          <a:spcPts val="0"/>
+                        </a:spcBef>
+                        <a:spcAft>
+                          <a:spcPts val="0"/>
+                        </a:spcAft>
+                        <a:buClrTx/>
+                        <a:buSzTx/>
+                        <a:buFontTx/>
+                        <a:buNone/>
+                        <a:tabLst/>
+                        <a:defRPr/>
+                      </a:pPr>
+                      <a:endParaRPr lang="en-GB" sz="1000" i="0" baseline="0" dirty="0">
+                        <a:solidFill>
+                          <a:srgbClr val="000000"/>
+                        </a:solidFill>
+                        <a:latin typeface="Consolas" panose="020B0609020204030204" pitchFamily="49" charset="0"/>
+                        <a:cs typeface="Segoe UI" pitchFamily="34" charset="0"/>
+                        <a:hlinkClick r:id="rId3"/>
+                      </a:endParaRPr>
+                    </a:p>
+                    <a:p>
+                      <a:pPr marL="0" marR="0" indent="0" algn="l" defTabSz="584200" rtl="0" eaLnBrk="1" fontAlgn="auto" latinLnBrk="0" hangingPunct="1">
+                        <a:lnSpc>
+                          <a:spcPct val="100000"/>
+                        </a:lnSpc>
+                        <a:spcBef>
+                          <a:spcPts val="0"/>
+                        </a:spcBef>
+                        <a:spcAft>
+                          <a:spcPts val="0"/>
+                        </a:spcAft>
+                        <a:buClrTx/>
+                        <a:buSzTx/>
+                        <a:buFontTx/>
+                        <a:buNone/>
+                        <a:tabLst/>
+                        <a:defRPr/>
+                      </a:pPr>
+                      <a:endParaRPr lang="en-GB" sz="1000" i="0" baseline="0" dirty="0">
+                        <a:solidFill>
+                          <a:srgbClr val="000000"/>
+                        </a:solidFill>
+                        <a:latin typeface="Consolas" panose="020B0609020204030204" pitchFamily="49" charset="0"/>
+                        <a:cs typeface="Segoe UI" pitchFamily="34" charset="0"/>
+                        <a:hlinkClick r:id="rId3"/>
+                      </a:endParaRPr>
+                    </a:p>
+                    <a:p>
+                      <a:pPr marL="0" marR="0" indent="0" algn="l" defTabSz="584200" rtl="0" eaLnBrk="1" fontAlgn="auto" latinLnBrk="0" hangingPunct="1">
+                        <a:lnSpc>
+                          <a:spcPct val="100000"/>
+                        </a:lnSpc>
+                        <a:spcBef>
+                          <a:spcPts val="0"/>
+                        </a:spcBef>
+                        <a:spcAft>
+                          <a:spcPts val="0"/>
+                        </a:spcAft>
+                        <a:buClrTx/>
+                        <a:buSzTx/>
+                        <a:buFontTx/>
+                        <a:buNone/>
+                        <a:tabLst/>
+                        <a:defRPr/>
+                      </a:pPr>
+                      <a:r>
+                        <a:rPr lang="en-GB" sz="1000" i="0" baseline="0" dirty="0">
+                          <a:solidFill>
+                            <a:srgbClr val="000000"/>
+                          </a:solidFill>
+                          <a:latin typeface="Consolas" panose="020B0609020204030204" pitchFamily="49" charset="0"/>
+                          <a:cs typeface="Segoe UI" pitchFamily="34" charset="0"/>
+                          <a:hlinkClick r:id="rId3"/>
+                        </a:rPr>
+                        <a:t>https://docs.djangoproject.com/en/2.2/ref/models/fields/</a:t>
+                      </a:r>
+                      <a:endParaRPr lang="en-GB" sz="1000" i="0" baseline="0" dirty="0">
+                        <a:solidFill>
+                          <a:srgbClr val="000000"/>
+                        </a:solidFill>
+                        <a:latin typeface="Consolas" panose="020B0609020204030204" pitchFamily="49" charset="0"/>
+                        <a:cs typeface="Segoe UI" pitchFamily="34" charset="0"/>
+                      </a:endParaRPr>
+                    </a:p>
+                    <a:p>
+                      <a:pPr marL="0" marR="0" indent="0" algn="l" defTabSz="584200" rtl="0" eaLnBrk="1" fontAlgn="auto" latinLnBrk="0" hangingPunct="1">
+                        <a:lnSpc>
+                          <a:spcPct val="100000"/>
+                        </a:lnSpc>
+                        <a:spcBef>
+                          <a:spcPts val="0"/>
+                        </a:spcBef>
+                        <a:spcAft>
+                          <a:spcPts val="0"/>
+                        </a:spcAft>
+                        <a:buClrTx/>
+                        <a:buSzTx/>
+                        <a:buFontTx/>
+                        <a:buNone/>
+                        <a:tabLst/>
+                        <a:defRPr/>
+                      </a:pPr>
+                      <a:endParaRPr lang="en-GB" sz="1000" i="0" baseline="0" dirty="0">
+                        <a:solidFill>
+                          <a:srgbClr val="000000"/>
+                        </a:solidFill>
+                        <a:latin typeface="Consolas" panose="020B0609020204030204" pitchFamily="49" charset="0"/>
+                        <a:cs typeface="Segoe UI" pitchFamily="34" charset="0"/>
+                      </a:endParaRPr>
+                    </a:p>
+                  </a:txBody>
+                  <a:tcPr marL="46800" marR="46800" marT="21600" marB="21600">
+                    <a:lnL w="12700" cap="flat" cmpd="sng" algn="ctr">
+                      <a:solidFill>
+                        <a:schemeClr val="tx1"/>
+                      </a:solidFill>
+                      <a:prstDash val="solid"/>
+                      <a:round/>
+                      <a:headEnd type="none" w="med" len="med"/>
+                      <a:tailEnd type="none" w="med" len="med"/>
+                    </a:lnL>
+                    <a:lnR w="12700" cap="flat" cmpd="sng" algn="ctr">
+                      <a:solidFill>
+                        <a:schemeClr val="tx1"/>
+                      </a:solidFill>
+                      <a:prstDash val="solid"/>
+                      <a:round/>
+                      <a:headEnd type="none" w="med" len="med"/>
+                      <a:tailEnd type="none" w="med" len="med"/>
+                    </a:lnR>
+                    <a:lnT w="6350" cap="flat" cmpd="sng" algn="ctr">
+                      <a:noFill/>
+                      <a:prstDash val="solid"/>
+                      <a:round/>
+                      <a:headEnd type="none" w="med" len="med"/>
+                      <a:tailEnd type="none" w="med" len="med"/>
+                    </a:lnT>
+                    <a:lnB w="6350" cap="flat" cmpd="sng" algn="ctr">
+                      <a:noFill/>
+                      <a:prstDash val="solid"/>
+                      <a:round/>
+                      <a:headEnd type="none" w="med" len="med"/>
+                      <a:tailEnd type="none" w="med" len="med"/>
+                    </a:lnB>
+                    <a:lnTlToBr w="12700" cmpd="sng">
+                      <a:noFill/>
+                      <a:prstDash val="solid"/>
+                    </a:lnTlToBr>
+                    <a:lnBlToTr w="12700" cmpd="sng">
+                      <a:noFill/>
+                      <a:prstDash val="solid"/>
+                    </a:lnBlToTr>
+                  </a:tcPr>
+                </a:tc>
+                <a:extLst>
+                  <a:ext uri="{0D108BD9-81ED-4DB2-BD59-A6C34878D82A}">
+                    <a16:rowId xmlns:a16="http://schemas.microsoft.com/office/drawing/2014/main" val="3983574495"/>
+                  </a:ext>
+                </a:extLst>
+              </a:tr>
+            </a:tbl>
+          </a:graphicData>
+        </a:graphic>
+      </p:graphicFrame>
+      <p:graphicFrame>
+        <p:nvGraphicFramePr>
+          <p:cNvPr id="9" name="Table 8">
+            <a:extLst>
+              <a:ext uri="{FF2B5EF4-FFF2-40B4-BE49-F238E27FC236}">
+                <a16:creationId xmlns:a16="http://schemas.microsoft.com/office/drawing/2014/main" id="{02675E58-571D-4287-AD5B-05791E5B7938}"/>
+              </a:ext>
+            </a:extLst>
+          </p:cNvPr>
+          <p:cNvGraphicFramePr>
+            <a:graphicFrameLocks noGrp="1"/>
+          </p:cNvGraphicFramePr>
+          <p:nvPr>
+            <p:extLst>
+              <p:ext uri="{D42A27DB-BD31-4B8C-83A1-F6EECF244321}">
+                <p14:modId xmlns:p14="http://schemas.microsoft.com/office/powerpoint/2010/main" val="2818826078"/>
+              </p:ext>
+            </p:extLst>
+          </p:nvPr>
+        </p:nvGraphicFramePr>
+        <p:xfrm>
+          <a:off x="6166737" y="4654295"/>
+          <a:ext cx="4885887" cy="1153200"/>
+        </p:xfrm>
+        <a:graphic>
+          <a:graphicData uri="http://schemas.openxmlformats.org/drawingml/2006/table">
+            <a:tbl>
+              <a:tblPr firstRow="1" bandRow="1">
+                <a:tableStyleId>{5940675A-B579-460E-94D1-54222C63F5DA}</a:tableStyleId>
+              </a:tblPr>
+              <a:tblGrid>
+                <a:gridCol w="4885887">
+                  <a:extLst>
+                    <a:ext uri="{9D8B030D-6E8A-4147-A177-3AD203B41FA5}">
+                      <a16:colId xmlns:a16="http://schemas.microsoft.com/office/drawing/2014/main" val="20000"/>
+                    </a:ext>
+                  </a:extLst>
+                </a:gridCol>
+              </a:tblGrid>
+              <a:tr h="0">
+                <a:tc>
+                  <a:txBody>
+                    <a:bodyPr/>
+                    <a:lstStyle/>
+                    <a:p>
+                      <a:pPr algn="l"/>
+                      <a:r>
+                        <a:rPr lang="en-GB" sz="1000" b="1" baseline="0" dirty="0">
+                          <a:solidFill>
+                            <a:srgbClr val="000000"/>
+                          </a:solidFill>
+                          <a:latin typeface="Segoe UI" pitchFamily="34" charset="0"/>
+                          <a:cs typeface="Segoe UI" pitchFamily="34" charset="0"/>
+                        </a:rPr>
+                        <a:t>Date to String</a:t>
+                      </a:r>
+                    </a:p>
+                  </a:txBody>
+                  <a:tcPr marL="46800" marR="46800" marT="21600" marB="21600">
+                    <a:lnL w="12700" cap="flat" cmpd="sng" algn="ctr">
+                      <a:solidFill>
+                        <a:schemeClr val="tx1"/>
+                      </a:solidFill>
+                      <a:prstDash val="solid"/>
+                      <a:round/>
+                      <a:headEnd type="none" w="med" len="med"/>
+                      <a:tailEnd type="none" w="med" len="med"/>
+                    </a:lnL>
+                    <a:lnR w="12700" cap="flat" cmpd="sng" algn="ctr">
+                      <a:solidFill>
+                        <a:schemeClr val="tx1"/>
+                      </a:solidFill>
+                      <a:prstDash val="solid"/>
+                      <a:round/>
+                      <a:headEnd type="none" w="med" len="med"/>
+                      <a:tailEnd type="none" w="med" len="med"/>
+                    </a:lnR>
+                    <a:lnT w="12700" cap="flat" cmpd="sng" algn="ctr">
+                      <a:solidFill>
+                        <a:schemeClr val="tx1"/>
+                      </a:solidFill>
+                      <a:prstDash val="solid"/>
+                      <a:round/>
+                      <a:headEnd type="none" w="med" len="med"/>
+                      <a:tailEnd type="none" w="med" len="med"/>
+                    </a:lnT>
+                    <a:lnB w="6350" cap="flat" cmpd="sng" algn="ctr">
+                      <a:noFill/>
+                      <a:prstDash val="solid"/>
+                      <a:round/>
+                      <a:headEnd type="none" w="med" len="med"/>
+                      <a:tailEnd type="none" w="med" len="med"/>
+                    </a:lnB>
+                    <a:lnTlToBr w="12700" cmpd="sng">
+                      <a:noFill/>
+                      <a:prstDash val="solid"/>
+                    </a:lnTlToBr>
+                    <a:lnBlToTr w="12700" cmpd="sng">
+                      <a:noFill/>
+                      <a:prstDash val="solid"/>
+                    </a:lnBlToTr>
+                  </a:tcPr>
+                </a:tc>
+                <a:extLst>
+                  <a:ext uri="{0D108BD9-81ED-4DB2-BD59-A6C34878D82A}">
+                    <a16:rowId xmlns:a16="http://schemas.microsoft.com/office/drawing/2014/main" val="10000"/>
+                  </a:ext>
+                </a:extLst>
+              </a:tr>
+              <a:tr h="0">
+                <a:tc>
+                  <a:txBody>
+                    <a:bodyPr/>
+                    <a:lstStyle/>
+                    <a:p>
+                      <a:pPr marL="0" marR="0" indent="0" algn="l" defTabSz="584200" rtl="0" eaLnBrk="1" fontAlgn="auto" latinLnBrk="0" hangingPunct="1">
+                        <a:lnSpc>
+                          <a:spcPct val="100000"/>
+                        </a:lnSpc>
+                        <a:spcBef>
+                          <a:spcPts val="0"/>
+                        </a:spcBef>
+                        <a:spcAft>
+                          <a:spcPts val="0"/>
+                        </a:spcAft>
+                        <a:buClrTx/>
+                        <a:buSzTx/>
+                        <a:buFontTx/>
+                        <a:buNone/>
+                        <a:tabLst/>
+                        <a:defRPr/>
+                      </a:pPr>
+                      <a:endParaRPr lang="en-US" sz="1000" i="0" baseline="0" dirty="0">
+                        <a:solidFill>
+                          <a:srgbClr val="000000"/>
+                        </a:solidFill>
+                        <a:latin typeface="Consolas" panose="020B0609020204030204" pitchFamily="49" charset="0"/>
+                        <a:cs typeface="Segoe UI" pitchFamily="34" charset="0"/>
+                      </a:endParaRPr>
+                    </a:p>
+                    <a:p>
+                      <a:pPr marL="0" marR="0" indent="0" algn="l" defTabSz="584200" rtl="0" eaLnBrk="1" fontAlgn="auto" latinLnBrk="0" hangingPunct="1">
+                        <a:lnSpc>
+                          <a:spcPct val="100000"/>
+                        </a:lnSpc>
+                        <a:spcBef>
+                          <a:spcPts val="0"/>
+                        </a:spcBef>
+                        <a:spcAft>
+                          <a:spcPts val="0"/>
+                        </a:spcAft>
+                        <a:buClrTx/>
+                        <a:buSzTx/>
+                        <a:buFontTx/>
+                        <a:buNone/>
+                        <a:tabLst/>
+                        <a:defRPr/>
+                      </a:pPr>
+                      <a:r>
+                        <a:rPr lang="en-US" sz="1000" i="0" baseline="0" dirty="0">
+                          <a:solidFill>
+                            <a:srgbClr val="000000"/>
+                          </a:solidFill>
+                          <a:latin typeface="Consolas" panose="020B0609020204030204" pitchFamily="49" charset="0"/>
+                          <a:cs typeface="Segoe UI" pitchFamily="34" charset="0"/>
+                        </a:rPr>
+                        <a:t>from datetime import datetime</a:t>
+                      </a:r>
+                    </a:p>
+                    <a:p>
+                      <a:pPr marL="0" marR="0" indent="0" algn="l" defTabSz="584200" rtl="0" eaLnBrk="1" fontAlgn="auto" latinLnBrk="0" hangingPunct="1">
+                        <a:lnSpc>
+                          <a:spcPct val="100000"/>
+                        </a:lnSpc>
+                        <a:spcBef>
+                          <a:spcPts val="0"/>
+                        </a:spcBef>
+                        <a:spcAft>
+                          <a:spcPts val="0"/>
+                        </a:spcAft>
+                        <a:buClrTx/>
+                        <a:buSzTx/>
+                        <a:buFontTx/>
+                        <a:buNone/>
+                        <a:tabLst/>
+                        <a:defRPr/>
+                      </a:pPr>
+                      <a:r>
+                        <a:rPr lang="en-US" sz="1000" i="0" baseline="0" dirty="0">
+                          <a:solidFill>
+                            <a:srgbClr val="000000"/>
+                          </a:solidFill>
+                          <a:latin typeface="Consolas" panose="020B0609020204030204" pitchFamily="49" charset="0"/>
+                          <a:cs typeface="Segoe UI" pitchFamily="34" charset="0"/>
+                        </a:rPr>
+                        <a:t>now = </a:t>
+                      </a:r>
+                      <a:r>
+                        <a:rPr lang="en-US" sz="1000" i="0" baseline="0" dirty="0" err="1">
+                          <a:solidFill>
+                            <a:srgbClr val="000000"/>
+                          </a:solidFill>
+                          <a:latin typeface="Consolas" panose="020B0609020204030204" pitchFamily="49" charset="0"/>
+                          <a:cs typeface="Segoe UI" pitchFamily="34" charset="0"/>
+                        </a:rPr>
+                        <a:t>datetime.now</a:t>
+                      </a:r>
+                      <a:r>
+                        <a:rPr lang="en-US" sz="1000" i="0" baseline="0" dirty="0">
+                          <a:solidFill>
+                            <a:srgbClr val="000000"/>
+                          </a:solidFill>
+                          <a:latin typeface="Consolas" panose="020B0609020204030204" pitchFamily="49" charset="0"/>
+                          <a:cs typeface="Segoe UI" pitchFamily="34" charset="0"/>
+                        </a:rPr>
+                        <a:t>() # current date and time</a:t>
+                      </a:r>
+                    </a:p>
+                    <a:p>
+                      <a:pPr marL="0" marR="0" indent="0" algn="l" defTabSz="584200" rtl="0" eaLnBrk="1" fontAlgn="auto" latinLnBrk="0" hangingPunct="1">
+                        <a:lnSpc>
+                          <a:spcPct val="100000"/>
+                        </a:lnSpc>
+                        <a:spcBef>
+                          <a:spcPts val="0"/>
+                        </a:spcBef>
+                        <a:spcAft>
+                          <a:spcPts val="0"/>
+                        </a:spcAft>
+                        <a:buClrTx/>
+                        <a:buSzTx/>
+                        <a:buFontTx/>
+                        <a:buNone/>
+                        <a:tabLst/>
+                        <a:defRPr/>
+                      </a:pPr>
+                      <a:r>
+                        <a:rPr lang="en-US" sz="1000" i="0" baseline="0" dirty="0" err="1">
+                          <a:solidFill>
+                            <a:srgbClr val="000000"/>
+                          </a:solidFill>
+                          <a:latin typeface="Consolas" panose="020B0609020204030204" pitchFamily="49" charset="0"/>
+                          <a:cs typeface="Segoe UI" pitchFamily="34" charset="0"/>
+                        </a:rPr>
+                        <a:t>now.strftime</a:t>
+                      </a:r>
+                      <a:r>
+                        <a:rPr lang="en-US" sz="1000" i="0" baseline="0" dirty="0">
+                          <a:solidFill>
+                            <a:srgbClr val="000000"/>
+                          </a:solidFill>
+                          <a:latin typeface="Consolas" panose="020B0609020204030204" pitchFamily="49" charset="0"/>
+                          <a:cs typeface="Segoe UI" pitchFamily="34" charset="0"/>
+                        </a:rPr>
+                        <a:t>("%Y-%m-%d") </a:t>
+                      </a:r>
+                    </a:p>
+                    <a:p>
+                      <a:pPr marL="0" marR="0" indent="0" algn="l" defTabSz="584200" rtl="0" eaLnBrk="1" fontAlgn="auto" latinLnBrk="0" hangingPunct="1">
+                        <a:lnSpc>
+                          <a:spcPct val="100000"/>
+                        </a:lnSpc>
+                        <a:spcBef>
+                          <a:spcPts val="0"/>
+                        </a:spcBef>
+                        <a:spcAft>
+                          <a:spcPts val="0"/>
+                        </a:spcAft>
+                        <a:buClrTx/>
+                        <a:buSzTx/>
+                        <a:buFontTx/>
+                        <a:buNone/>
+                        <a:tabLst/>
+                        <a:defRPr/>
+                      </a:pPr>
+                      <a:endParaRPr lang="en-US" sz="1000" i="0" baseline="0" dirty="0">
+                        <a:solidFill>
+                          <a:srgbClr val="000000"/>
+                        </a:solidFill>
+                        <a:latin typeface="Consolas" panose="020B0609020204030204" pitchFamily="49" charset="0"/>
+                        <a:cs typeface="Segoe UI" pitchFamily="34" charset="0"/>
+                      </a:endParaRPr>
+                    </a:p>
+                    <a:p>
+                      <a:pPr marL="0" marR="0" indent="0" algn="l" defTabSz="584200" rtl="0" eaLnBrk="1" fontAlgn="auto" latinLnBrk="0" hangingPunct="1">
+                        <a:lnSpc>
+                          <a:spcPct val="100000"/>
+                        </a:lnSpc>
+                        <a:spcBef>
+                          <a:spcPts val="0"/>
+                        </a:spcBef>
+                        <a:spcAft>
+                          <a:spcPts val="0"/>
+                        </a:spcAft>
+                        <a:buClrTx/>
+                        <a:buSzTx/>
+                        <a:buFontTx/>
+                        <a:buNone/>
+                        <a:tabLst/>
+                        <a:defRPr/>
+                      </a:pPr>
+                      <a:r>
+                        <a:rPr lang="en-GB" sz="1000" i="0" baseline="0" dirty="0">
+                          <a:solidFill>
+                            <a:srgbClr val="000000"/>
+                          </a:solidFill>
+                          <a:latin typeface="Consolas" panose="020B0609020204030204" pitchFamily="49" charset="0"/>
+                          <a:cs typeface="Segoe UI" pitchFamily="34" charset="0"/>
+                        </a:rPr>
+                        <a:t>https://www.programiz.com/python-programming/datetime/strftime</a:t>
+                      </a:r>
+                    </a:p>
+                  </a:txBody>
+                  <a:tcPr marL="46800" marR="46800" marT="21600" marB="21600">
+                    <a:lnL w="12700" cap="flat" cmpd="sng" algn="ctr">
+                      <a:solidFill>
+                        <a:schemeClr val="tx1"/>
+                      </a:solidFill>
+                      <a:prstDash val="solid"/>
+                      <a:round/>
+                      <a:headEnd type="none" w="med" len="med"/>
+                      <a:tailEnd type="none" w="med" len="med"/>
+                    </a:lnL>
+                    <a:lnR w="12700" cap="flat" cmpd="sng" algn="ctr">
+                      <a:solidFill>
+                        <a:schemeClr val="tx1"/>
+                      </a:solidFill>
+                      <a:prstDash val="solid"/>
+                      <a:round/>
+                      <a:headEnd type="none" w="med" len="med"/>
+                      <a:tailEnd type="none" w="med" len="med"/>
+                    </a:lnR>
+                    <a:lnT w="6350" cap="flat" cmpd="sng" algn="ctr">
+                      <a:noFill/>
+                      <a:prstDash val="solid"/>
+                      <a:round/>
+                      <a:headEnd type="none" w="med" len="med"/>
+                      <a:tailEnd type="none" w="med" len="med"/>
+                    </a:lnT>
+                    <a:lnB w="6350" cap="flat" cmpd="sng" algn="ctr">
+                      <a:noFill/>
+                      <a:prstDash val="solid"/>
+                      <a:round/>
+                      <a:headEnd type="none" w="med" len="med"/>
+                      <a:tailEnd type="none" w="med" len="med"/>
+                    </a:lnB>
+                    <a:lnTlToBr w="12700" cmpd="sng">
+                      <a:noFill/>
+                      <a:prstDash val="solid"/>
+                    </a:lnTlToBr>
+                    <a:lnBlToTr w="12700" cmpd="sng">
+                      <a:noFill/>
+                      <a:prstDash val="solid"/>
+                    </a:lnBlToTr>
+                  </a:tcPr>
+                </a:tc>
+                <a:extLst>
+                  <a:ext uri="{0D108BD9-81ED-4DB2-BD59-A6C34878D82A}">
+                    <a16:rowId xmlns:a16="http://schemas.microsoft.com/office/drawing/2014/main" val="3983574495"/>
                   </a:ext>
                 </a:extLst>
               </a:tr>

</xml_diff>

<commit_message>
Added ref to project structure.
</commit_message>
<xml_diff>
--- a/Django.pptx
+++ b/Django.pptx
@@ -426,7 +426,7 @@
           <a:p>
             <a:fld id="{37C50D7F-5172-434D-9E20-E71FDF806C79}" type="datetimeFigureOut">
               <a:rPr lang="en-GB" smtClean="0"/>
-              <a:t>20/10/2019</a:t>
+              <a:t>21/10/2019</a:t>
             </a:fld>
             <a:endParaRPr lang="en-GB"/>
           </a:p>
@@ -2456,7 +2456,7 @@
           </a:ln>
           <a:extLst>
             <a:ext uri="{C572A759-6A51-4108-AA02-DFA0A04FC94B}">
-              <ma14:wrappingTextBoxFlag xmlns:ma14="http://schemas.microsoft.com/office/mac/drawingml/2011/main" xmlns:a14="http://schemas.microsoft.com/office/drawing/2010/main" xmlns:m="http://schemas.openxmlformats.org/officeDocument/2006/math" xmlns="" val="1"/>
+              <ma14:wrappingTextBoxFlag xmlns="" xmlns:m="http://schemas.openxmlformats.org/officeDocument/2006/math" xmlns:a14="http://schemas.microsoft.com/office/drawing/2010/main" xmlns:ma14="http://schemas.microsoft.com/office/mac/drawingml/2011/main" val="1"/>
             </a:ext>
           </a:extLst>
         </p:spPr>
@@ -2495,7 +2495,7 @@
           </a:ln>
           <a:extLst>
             <a:ext uri="{C572A759-6A51-4108-AA02-DFA0A04FC94B}">
-              <ma14:wrappingTextBoxFlag xmlns:ma14="http://schemas.microsoft.com/office/mac/drawingml/2011/main" xmlns:a14="http://schemas.microsoft.com/office/drawing/2010/main" xmlns:m="http://schemas.openxmlformats.org/officeDocument/2006/math" xmlns="" val="1"/>
+              <ma14:wrappingTextBoxFlag xmlns="" xmlns:m="http://schemas.openxmlformats.org/officeDocument/2006/math" xmlns:a14="http://schemas.microsoft.com/office/drawing/2010/main" xmlns:ma14="http://schemas.microsoft.com/office/mac/drawingml/2011/main" val="1"/>
             </a:ext>
           </a:extLst>
         </p:spPr>
@@ -5572,14 +5572,14 @@
           <p:nvPr>
             <p:extLst>
               <p:ext uri="{D42A27DB-BD31-4B8C-83A1-F6EECF244321}">
-                <p14:modId xmlns:p14="http://schemas.microsoft.com/office/powerpoint/2010/main" val="4159632955"/>
+                <p14:modId xmlns:p14="http://schemas.microsoft.com/office/powerpoint/2010/main" val="2429649793"/>
               </p:ext>
             </p:extLst>
           </p:nvPr>
         </p:nvGraphicFramePr>
         <p:xfrm>
-          <a:off x="3868767" y="1227219"/>
-          <a:ext cx="3140075" cy="2893200"/>
+          <a:off x="3868767" y="905422"/>
+          <a:ext cx="3794776" cy="3088800"/>
         </p:xfrm>
         <a:graphic>
           <a:graphicData uri="http://schemas.openxmlformats.org/drawingml/2006/table">
@@ -5588,7 +5588,7 @@
                 <a:tableStyleId>{5940675A-B579-460E-94D1-54222C63F5DA}</a:tableStyleId>
               </a:tblPr>
               <a:tblGrid>
-                <a:gridCol w="3140075">
+                <a:gridCol w="3794776">
                   <a:extLst>
                     <a:ext uri="{9D8B030D-6E8A-4147-A177-3AD203B41FA5}">
                       <a16:colId xmlns:a16="http://schemas.microsoft.com/office/drawing/2014/main" val="20000"/>
@@ -6591,6 +6591,90 @@
                 <a:extLst>
                   <a:ext uri="{0D108BD9-81ED-4DB2-BD59-A6C34878D82A}">
                     <a16:rowId xmlns:a16="http://schemas.microsoft.com/office/drawing/2014/main" val="599195773"/>
+                  </a:ext>
+                </a:extLst>
+              </a:tr>
+              <a:tr h="0">
+                <a:tc>
+                  <a:txBody>
+                    <a:bodyPr/>
+                    <a:lstStyle/>
+                    <a:p>
+                      <a:pPr marL="0" marR="0" indent="0" algn="l" defTabSz="584200" rtl="0" eaLnBrk="1" fontAlgn="auto" latinLnBrk="0" hangingPunct="1">
+                        <a:lnSpc>
+                          <a:spcPct val="100000"/>
+                        </a:lnSpc>
+                        <a:spcBef>
+                          <a:spcPts val="0"/>
+                        </a:spcBef>
+                        <a:spcAft>
+                          <a:spcPts val="0"/>
+                        </a:spcAft>
+                        <a:buClrTx/>
+                        <a:buSzTx/>
+                        <a:buFontTx/>
+                        <a:buNone/>
+                        <a:tabLst/>
+                        <a:defRPr/>
+                      </a:pPr>
+                      <a:r>
+                        <a:rPr lang="en-GB" sz="1000" i="0" dirty="0">
+                          <a:solidFill>
+                            <a:srgbClr val="000000"/>
+                          </a:solidFill>
+                          <a:latin typeface="Segoe UI" pitchFamily="34" charset="0"/>
+                          <a:cs typeface="Segoe UI" pitchFamily="34" charset="0"/>
+                        </a:rPr>
+                        <a:t>https://docs.djangoproject.com/en/2.2/intro/reusable-apps/</a:t>
+                      </a:r>
+                    </a:p>
+                  </a:txBody>
+                  <a:tcPr marL="46800" marR="46800" marT="21600" marB="21600">
+                    <a:lnL w="12700" cap="flat" cmpd="sng" algn="ctr">
+                      <a:solidFill>
+                        <a:schemeClr val="tx1"/>
+                      </a:solidFill>
+                      <a:prstDash val="solid"/>
+                      <a:round/>
+                      <a:headEnd type="none" w="med" len="med"/>
+                      <a:tailEnd type="none" w="med" len="med"/>
+                    </a:lnL>
+                    <a:lnR w="12700" cap="flat" cmpd="sng" algn="ctr">
+                      <a:solidFill>
+                        <a:schemeClr val="tx1"/>
+                      </a:solidFill>
+                      <a:prstDash val="solid"/>
+                      <a:round/>
+                      <a:headEnd type="none" w="med" len="med"/>
+                      <a:tailEnd type="none" w="med" len="med"/>
+                    </a:lnR>
+                    <a:lnT w="6350" cap="flat" cmpd="sng" algn="ctr">
+                      <a:noFill/>
+                      <a:prstDash val="solid"/>
+                      <a:round/>
+                      <a:headEnd type="none" w="med" len="med"/>
+                      <a:tailEnd type="none" w="med" len="med"/>
+                    </a:lnT>
+                    <a:lnB w="6350" cap="flat" cmpd="sng" algn="ctr">
+                      <a:noFill/>
+                      <a:prstDash val="solid"/>
+                      <a:round/>
+                      <a:headEnd type="none" w="med" len="med"/>
+                      <a:tailEnd type="none" w="med" len="med"/>
+                    </a:lnB>
+                    <a:lnTlToBr w="12700" cmpd="sng">
+                      <a:noFill/>
+                      <a:prstDash val="solid"/>
+                    </a:lnTlToBr>
+                    <a:lnBlToTr w="12700" cmpd="sng">
+                      <a:noFill/>
+                      <a:prstDash val="solid"/>
+                    </a:lnBlToTr>
+                  </a:tcPr>
+                </a:tc>
+                <a:extLst>
+                  <a:ext uri="{0D108BD9-81ED-4DB2-BD59-A6C34878D82A}">
+                    <a16:rowId xmlns:a16="http://schemas.microsoft.com/office/drawing/2014/main" val="3228484360"/>
                   </a:ext>
                 </a:extLst>
               </a:tr>

</xml_diff>